<commit_message>
CT tumor standardization ppt
</commit_message>
<xml_diff>
--- a/presentations/BIG_2024.pptx
+++ b/presentations/BIG_2024.pptx
@@ -5,12 +5,18 @@
     <p:sldMasterId id="2147483672" r:id="rId4"/>
   </p:sldMasterIdLst>
   <p:notesMasterIdLst>
-    <p:notesMasterId r:id="rId8"/>
+    <p:notesMasterId r:id="rId14"/>
   </p:notesMasterIdLst>
   <p:sldIdLst>
     <p:sldId id="256" r:id="rId5"/>
-    <p:sldId id="257" r:id="rId6"/>
-    <p:sldId id="258" r:id="rId7"/>
+    <p:sldId id="259" r:id="rId6"/>
+    <p:sldId id="257" r:id="rId7"/>
+    <p:sldId id="260" r:id="rId8"/>
+    <p:sldId id="261" r:id="rId9"/>
+    <p:sldId id="262" r:id="rId10"/>
+    <p:sldId id="263" r:id="rId11"/>
+    <p:sldId id="264" r:id="rId12"/>
+    <p:sldId id="265" r:id="rId13"/>
   </p:sldIdLst>
   <p:sldSz cx="12192000" cy="6858000"/>
   <p:notesSz cx="6858000" cy="9144000"/>
@@ -210,7 +216,7 @@
           <a:p>
             <a:fld id="{6B374326-AD78-4E67-8599-BA8A5604D89A}" type="datetimeFigureOut">
               <a:rPr lang="en-US" smtClean="0"/>
-              <a:t>3/17/21</a:t>
+              <a:t>3/6/24</a:t>
             </a:fld>
             <a:endParaRPr lang="en-US"/>
           </a:p>
@@ -1520,7 +1526,10 @@
           <a:bodyPr/>
           <a:lstStyle/>
           <a:p>
-            <a:endParaRPr lang="en-US" dirty="0"/>
+            <a:r>
+              <a:rPr lang="en-US" dirty="0"/>
+              <a:t>Embedding analysis of CT Tumors	</a:t>
+            </a:r>
           </a:p>
         </p:txBody>
       </p:sp>
@@ -1539,7 +1548,18 @@
           <a:bodyPr/>
           <a:lstStyle/>
           <a:p>
-            <a:endParaRPr lang="en-US"/>
+            <a:r>
+              <a:rPr lang="en-US" dirty="0"/>
+              <a:t>Aditya </a:t>
+            </a:r>
+            <a:r>
+              <a:rPr lang="en-US" dirty="0" err="1"/>
+              <a:t>Lahiri</a:t>
+            </a:r>
+            <a:r>
+              <a:rPr lang="en-US" dirty="0"/>
+              <a:t>, Deanne Taylor</a:t>
+            </a:r>
           </a:p>
         </p:txBody>
       </p:sp>
@@ -1563,25 +1583,6 @@
               <a:t>1</a:t>
             </a:fld>
             <a:endParaRPr lang="en-US" dirty="0"/>
-          </a:p>
-        </p:txBody>
-      </p:sp>
-      <p:sp>
-        <p:nvSpPr>
-          <p:cNvPr id="9" name="Text Placeholder 8"/>
-          <p:cNvSpPr>
-            <a:spLocks noGrp="1"/>
-          </p:cNvSpPr>
-          <p:nvPr>
-            <p:ph type="body" sz="quarter" idx="13"/>
-          </p:nvPr>
-        </p:nvSpPr>
-        <p:spPr/>
-        <p:txBody>
-          <a:bodyPr/>
-          <a:lstStyle/>
-          <a:p>
-            <a:endParaRPr lang="en-US"/>
           </a:p>
         </p:txBody>
       </p:sp>
@@ -1629,7 +1630,13 @@
   <p:cSld>
     <p:spTree>
       <p:nvGrpSpPr>
-        <p:cNvPr id="1" name=""/>
+        <p:cNvPr id="1" name="">
+          <a:extLst>
+            <a:ext uri="{FF2B5EF4-FFF2-40B4-BE49-F238E27FC236}">
+              <a16:creationId xmlns:a16="http://schemas.microsoft.com/office/drawing/2014/main" id="{877C788D-8BD2-8663-D598-72CC1B6728D8}"/>
+            </a:ext>
+          </a:extLst>
+        </p:cNvPr>
         <p:cNvGrpSpPr/>
         <p:nvPr/>
       </p:nvGrpSpPr>
@@ -1643,7 +1650,13 @@
       </p:grpSpPr>
       <p:sp>
         <p:nvSpPr>
-          <p:cNvPr id="2" name="Title 1"/>
+          <p:cNvPr id="2" name="Title 1">
+            <a:extLst>
+              <a:ext uri="{FF2B5EF4-FFF2-40B4-BE49-F238E27FC236}">
+                <a16:creationId xmlns:a16="http://schemas.microsoft.com/office/drawing/2014/main" id="{158A800C-AEE8-7922-963C-4490BD7ED36E}"/>
+              </a:ext>
+            </a:extLst>
+          </p:cNvPr>
           <p:cNvSpPr>
             <a:spLocks noGrp="1"/>
           </p:cNvSpPr>
@@ -1653,7 +1666,7 @@
         </p:nvSpPr>
         <p:spPr>
           <a:xfrm>
-            <a:off x="1222053" y="320156"/>
+            <a:off x="107628" y="83425"/>
             <a:ext cx="10651402" cy="1143000"/>
           </a:xfrm>
         </p:spPr>
@@ -1661,37 +1674,57 @@
           <a:bodyPr/>
           <a:lstStyle/>
           <a:p>
-            <a:endParaRPr lang="en-US" dirty="0"/>
-          </a:p>
-        </p:txBody>
-      </p:sp>
-      <p:sp>
-        <p:nvSpPr>
-          <p:cNvPr id="3" name="Content Placeholder 2"/>
-          <p:cNvSpPr>
-            <a:spLocks noGrp="1"/>
-          </p:cNvSpPr>
+            <a:r>
+              <a:rPr lang="en-US" dirty="0"/>
+              <a:t>BACKGROUND</a:t>
+            </a:r>
+          </a:p>
+        </p:txBody>
+      </p:sp>
+      <p:pic>
+        <p:nvPicPr>
+          <p:cNvPr id="6" name="Content Placeholder 5" descr="A diagram of a diagram&#10;&#10;Description automatically generated">
+            <a:extLst>
+              <a:ext uri="{FF2B5EF4-FFF2-40B4-BE49-F238E27FC236}">
+                <a16:creationId xmlns:a16="http://schemas.microsoft.com/office/drawing/2014/main" id="{E3F40D52-348B-AE73-9488-BEB644D0255C}"/>
+              </a:ext>
+            </a:extLst>
+          </p:cNvPr>
+          <p:cNvPicPr>
+            <a:picLocks noGrp="1" noChangeAspect="1"/>
+          </p:cNvPicPr>
           <p:nvPr>
             <p:ph idx="1"/>
           </p:nvPr>
-        </p:nvSpPr>
-        <p:spPr>
-          <a:xfrm>
-            <a:off x="1222053" y="1736231"/>
-            <a:ext cx="10651402" cy="3895344"/>
-          </a:xfrm>
-        </p:spPr>
-        <p:txBody>
-          <a:bodyPr/>
-          <a:lstStyle/>
-          <a:p>
-            <a:endParaRPr lang="en-US" dirty="0"/>
-          </a:p>
-        </p:txBody>
-      </p:sp>
-      <p:sp>
-        <p:nvSpPr>
-          <p:cNvPr id="4" name="Slide Number Placeholder 3"/>
+        </p:nvPicPr>
+        <p:blipFill>
+          <a:blip r:embed="rId2">
+            <a:extLst>
+              <a:ext uri="{28A0092B-C50C-407E-A947-70E740481C1C}">
+                <a14:useLocalDpi xmlns:a14="http://schemas.microsoft.com/office/drawing/2010/main" val="0"/>
+              </a:ext>
+            </a:extLst>
+          </a:blip>
+          <a:stretch>
+            <a:fillRect/>
+          </a:stretch>
+        </p:blipFill>
+        <p:spPr>
+          <a:xfrm>
+            <a:off x="2955314" y="316579"/>
+            <a:ext cx="6815002" cy="4706938"/>
+          </a:xfrm>
+        </p:spPr>
+      </p:pic>
+      <p:sp>
+        <p:nvSpPr>
+          <p:cNvPr id="4" name="Slide Number Placeholder 3">
+            <a:extLst>
+              <a:ext uri="{FF2B5EF4-FFF2-40B4-BE49-F238E27FC236}">
+                <a16:creationId xmlns:a16="http://schemas.microsoft.com/office/drawing/2014/main" id="{AED3F0BB-49E2-A61E-7C62-1C43B223E524}"/>
+              </a:ext>
+            </a:extLst>
+          </p:cNvPr>
           <p:cNvSpPr>
             <a:spLocks noGrp="1"/>
           </p:cNvSpPr>
@@ -1723,7 +1756,7 @@
     </p:spTree>
     <p:extLst>
       <p:ext uri="{BB962C8B-B14F-4D97-AF65-F5344CB8AC3E}">
-        <p14:creationId xmlns:p14="http://schemas.microsoft.com/office/powerpoint/2010/main" val="334728898"/>
+        <p14:creationId xmlns:p14="http://schemas.microsoft.com/office/powerpoint/2010/main" val="1860131220"/>
       </p:ext>
     </p:extLst>
   </p:cSld>
@@ -1752,7 +1785,34 @@
       </p:grpSpPr>
       <p:sp>
         <p:nvSpPr>
-          <p:cNvPr id="2" name="Slide Number Placeholder 1"/>
+          <p:cNvPr id="2" name="Title 1"/>
+          <p:cNvSpPr>
+            <a:spLocks noGrp="1"/>
+          </p:cNvSpPr>
+          <p:nvPr>
+            <p:ph type="title"/>
+          </p:nvPr>
+        </p:nvSpPr>
+        <p:spPr>
+          <a:xfrm>
+            <a:off x="107628" y="83425"/>
+            <a:ext cx="10651402" cy="1143000"/>
+          </a:xfrm>
+        </p:spPr>
+        <p:txBody>
+          <a:bodyPr/>
+          <a:lstStyle/>
+          <a:p>
+            <a:r>
+              <a:rPr lang="en-US" dirty="0"/>
+              <a:t>BACKGROUND</a:t>
+            </a:r>
+          </a:p>
+        </p:txBody>
+      </p:sp>
+      <p:sp>
+        <p:nvSpPr>
+          <p:cNvPr id="4" name="Slide Number Placeholder 3"/>
           <p:cNvSpPr>
             <a:spLocks noGrp="1"/>
           </p:cNvSpPr>
@@ -1768,42 +1828,1022 @@
             <a:fld id="{AD40181A-01B0-4CB8-8614-1473649F6741}" type="slidenum">
               <a:rPr lang="en-US" smtClean="0">
                 <a:solidFill>
-                  <a:srgbClr val="FFFFFE"/>
+                  <a:schemeClr val="bg1"/>
                 </a:solidFill>
               </a:rPr>
               <a:t>3</a:t>
             </a:fld>
             <a:endParaRPr lang="en-US" dirty="0">
               <a:solidFill>
-                <a:srgbClr val="FFFFFE"/>
+                <a:schemeClr val="bg1"/>
               </a:solidFill>
             </a:endParaRPr>
           </a:p>
         </p:txBody>
       </p:sp>
-      <p:sp>
-        <p:nvSpPr>
-          <p:cNvPr id="3" name="Title 2"/>
-          <p:cNvSpPr>
-            <a:spLocks noGrp="1"/>
-          </p:cNvSpPr>
-          <p:nvPr>
-            <p:ph type="title"/>
-          </p:nvPr>
-        </p:nvSpPr>
-        <p:spPr/>
-        <p:txBody>
-          <a:bodyPr/>
-          <a:lstStyle/>
-          <a:p>
-            <a:endParaRPr lang="en-US"/>
-          </a:p>
-        </p:txBody>
-      </p:sp>
+      <p:pic>
+        <p:nvPicPr>
+          <p:cNvPr id="12" name="Content Placeholder 11" descr="A diagram of a diagram of different types of drugs&#10;&#10;Description automatically generated">
+            <a:extLst>
+              <a:ext uri="{FF2B5EF4-FFF2-40B4-BE49-F238E27FC236}">
+                <a16:creationId xmlns:a16="http://schemas.microsoft.com/office/drawing/2014/main" id="{E2EDEF06-8B9F-091F-E87D-6B26227F7449}"/>
+              </a:ext>
+            </a:extLst>
+          </p:cNvPr>
+          <p:cNvPicPr>
+            <a:picLocks noGrp="1" noChangeAspect="1"/>
+          </p:cNvPicPr>
+          <p:nvPr>
+            <p:ph idx="1"/>
+          </p:nvPr>
+        </p:nvPicPr>
+        <p:blipFill>
+          <a:blip r:embed="rId2">
+            <a:extLst>
+              <a:ext uri="{28A0092B-C50C-407E-A947-70E740481C1C}">
+                <a14:useLocalDpi xmlns:a14="http://schemas.microsoft.com/office/drawing/2010/main" val="0"/>
+              </a:ext>
+            </a:extLst>
+          </a:blip>
+          <a:stretch>
+            <a:fillRect/>
+          </a:stretch>
+        </p:blipFill>
+        <p:spPr>
+          <a:xfrm>
+            <a:off x="2063948" y="0"/>
+            <a:ext cx="7560133" cy="5596128"/>
+          </a:xfrm>
+        </p:spPr>
+      </p:pic>
     </p:spTree>
     <p:extLst>
       <p:ext uri="{BB962C8B-B14F-4D97-AF65-F5344CB8AC3E}">
-        <p14:creationId xmlns:p14="http://schemas.microsoft.com/office/powerpoint/2010/main" val="3321473658"/>
+        <p14:creationId xmlns:p14="http://schemas.microsoft.com/office/powerpoint/2010/main" val="334728898"/>
+      </p:ext>
+    </p:extLst>
+  </p:cSld>
+  <p:clrMapOvr>
+    <a:masterClrMapping/>
+  </p:clrMapOvr>
+</p:sld>
+</file>
+
+<file path=ppt/slides/slide4.xml><?xml version="1.0" encoding="utf-8"?>
+<p:sld xmlns:a="http://schemas.openxmlformats.org/drawingml/2006/main" xmlns:r="http://schemas.openxmlformats.org/officeDocument/2006/relationships" xmlns:p="http://schemas.openxmlformats.org/presentationml/2006/main">
+  <p:cSld>
+    <p:spTree>
+      <p:nvGrpSpPr>
+        <p:cNvPr id="1" name="">
+          <a:extLst>
+            <a:ext uri="{FF2B5EF4-FFF2-40B4-BE49-F238E27FC236}">
+              <a16:creationId xmlns:a16="http://schemas.microsoft.com/office/drawing/2014/main" id="{10E11B06-2FB4-5F70-0653-C67724818805}"/>
+            </a:ext>
+          </a:extLst>
+        </p:cNvPr>
+        <p:cNvGrpSpPr/>
+        <p:nvPr/>
+      </p:nvGrpSpPr>
+      <p:grpSpPr>
+        <a:xfrm>
+          <a:off x="0" y="0"/>
+          <a:ext cx="0" cy="0"/>
+          <a:chOff x="0" y="0"/>
+          <a:chExt cx="0" cy="0"/>
+        </a:xfrm>
+      </p:grpSpPr>
+      <p:sp>
+        <p:nvSpPr>
+          <p:cNvPr id="2" name="Title 1">
+            <a:extLst>
+              <a:ext uri="{FF2B5EF4-FFF2-40B4-BE49-F238E27FC236}">
+                <a16:creationId xmlns:a16="http://schemas.microsoft.com/office/drawing/2014/main" id="{12B58A9B-5EE4-B6D4-EEFF-E8489D584B2A}"/>
+              </a:ext>
+            </a:extLst>
+          </p:cNvPr>
+          <p:cNvSpPr>
+            <a:spLocks noGrp="1"/>
+          </p:cNvSpPr>
+          <p:nvPr>
+            <p:ph type="title"/>
+          </p:nvPr>
+        </p:nvSpPr>
+        <p:spPr>
+          <a:xfrm>
+            <a:off x="107628" y="83425"/>
+            <a:ext cx="10651402" cy="1143000"/>
+          </a:xfrm>
+        </p:spPr>
+        <p:txBody>
+          <a:bodyPr/>
+          <a:lstStyle/>
+          <a:p>
+            <a:r>
+              <a:rPr lang="en-US" dirty="0"/>
+              <a:t>BACKGROUND</a:t>
+            </a:r>
+          </a:p>
+        </p:txBody>
+      </p:sp>
+      <p:sp>
+        <p:nvSpPr>
+          <p:cNvPr id="4" name="Slide Number Placeholder 3">
+            <a:extLst>
+              <a:ext uri="{FF2B5EF4-FFF2-40B4-BE49-F238E27FC236}">
+                <a16:creationId xmlns:a16="http://schemas.microsoft.com/office/drawing/2014/main" id="{E285927E-05BF-F5E1-86F6-A6E75BD13064}"/>
+              </a:ext>
+            </a:extLst>
+          </p:cNvPr>
+          <p:cNvSpPr>
+            <a:spLocks noGrp="1"/>
+          </p:cNvSpPr>
+          <p:nvPr>
+            <p:ph type="sldNum" sz="quarter" idx="12"/>
+          </p:nvPr>
+        </p:nvSpPr>
+        <p:spPr/>
+        <p:txBody>
+          <a:bodyPr/>
+          <a:lstStyle/>
+          <a:p>
+            <a:fld id="{AD40181A-01B0-4CB8-8614-1473649F6741}" type="slidenum">
+              <a:rPr lang="en-US" smtClean="0">
+                <a:solidFill>
+                  <a:schemeClr val="bg1"/>
+                </a:solidFill>
+              </a:rPr>
+              <a:t>4</a:t>
+            </a:fld>
+            <a:endParaRPr lang="en-US" dirty="0">
+              <a:solidFill>
+                <a:schemeClr val="bg1"/>
+              </a:solidFill>
+            </a:endParaRPr>
+          </a:p>
+        </p:txBody>
+      </p:sp>
+      <p:pic>
+        <p:nvPicPr>
+          <p:cNvPr id="7" name="Content Placeholder 6" descr="A diagram of a diagram of a group of white cylinders with text&#10;&#10;Description automatically generated with medium confidence">
+            <a:extLst>
+              <a:ext uri="{FF2B5EF4-FFF2-40B4-BE49-F238E27FC236}">
+                <a16:creationId xmlns:a16="http://schemas.microsoft.com/office/drawing/2014/main" id="{DB2A78CF-F253-A711-A61F-36A5ADC23D11}"/>
+              </a:ext>
+            </a:extLst>
+          </p:cNvPr>
+          <p:cNvPicPr>
+            <a:picLocks noGrp="1" noChangeAspect="1"/>
+          </p:cNvPicPr>
+          <p:nvPr>
+            <p:ph idx="1"/>
+          </p:nvPr>
+        </p:nvPicPr>
+        <p:blipFill>
+          <a:blip r:embed="rId2">
+            <a:extLst>
+              <a:ext uri="{28A0092B-C50C-407E-A947-70E740481C1C}">
+                <a14:useLocalDpi xmlns:a14="http://schemas.microsoft.com/office/drawing/2010/main" val="0"/>
+              </a:ext>
+            </a:extLst>
+          </a:blip>
+          <a:stretch>
+            <a:fillRect/>
+          </a:stretch>
+        </p:blipFill>
+        <p:spPr>
+          <a:xfrm>
+            <a:off x="2240279" y="-81167"/>
+            <a:ext cx="7424929" cy="5823390"/>
+          </a:xfrm>
+        </p:spPr>
+      </p:pic>
+    </p:spTree>
+    <p:extLst>
+      <p:ext uri="{BB962C8B-B14F-4D97-AF65-F5344CB8AC3E}">
+        <p14:creationId xmlns:p14="http://schemas.microsoft.com/office/powerpoint/2010/main" val="50774564"/>
+      </p:ext>
+    </p:extLst>
+  </p:cSld>
+  <p:clrMapOvr>
+    <a:masterClrMapping/>
+  </p:clrMapOvr>
+</p:sld>
+</file>
+
+<file path=ppt/slides/slide5.xml><?xml version="1.0" encoding="utf-8"?>
+<p:sld xmlns:a="http://schemas.openxmlformats.org/drawingml/2006/main" xmlns:r="http://schemas.openxmlformats.org/officeDocument/2006/relationships" xmlns:p="http://schemas.openxmlformats.org/presentationml/2006/main">
+  <p:cSld>
+    <p:spTree>
+      <p:nvGrpSpPr>
+        <p:cNvPr id="1" name="">
+          <a:extLst>
+            <a:ext uri="{FF2B5EF4-FFF2-40B4-BE49-F238E27FC236}">
+              <a16:creationId xmlns:a16="http://schemas.microsoft.com/office/drawing/2014/main" id="{CCD3D6BC-6626-C9A7-FE60-2FD7C03A2E34}"/>
+            </a:ext>
+          </a:extLst>
+        </p:cNvPr>
+        <p:cNvGrpSpPr/>
+        <p:nvPr/>
+      </p:nvGrpSpPr>
+      <p:grpSpPr>
+        <a:xfrm>
+          <a:off x="0" y="0"/>
+          <a:ext cx="0" cy="0"/>
+          <a:chOff x="0" y="0"/>
+          <a:chExt cx="0" cy="0"/>
+        </a:xfrm>
+      </p:grpSpPr>
+      <p:sp>
+        <p:nvSpPr>
+          <p:cNvPr id="2" name="Title 1">
+            <a:extLst>
+              <a:ext uri="{FF2B5EF4-FFF2-40B4-BE49-F238E27FC236}">
+                <a16:creationId xmlns:a16="http://schemas.microsoft.com/office/drawing/2014/main" id="{2B41CB3F-C801-9F75-EF25-D48F7334FBDC}"/>
+              </a:ext>
+            </a:extLst>
+          </p:cNvPr>
+          <p:cNvSpPr>
+            <a:spLocks noGrp="1"/>
+          </p:cNvSpPr>
+          <p:nvPr>
+            <p:ph type="title"/>
+          </p:nvPr>
+        </p:nvSpPr>
+        <p:spPr>
+          <a:xfrm>
+            <a:off x="107628" y="83425"/>
+            <a:ext cx="10651402" cy="1143000"/>
+          </a:xfrm>
+        </p:spPr>
+        <p:txBody>
+          <a:bodyPr/>
+          <a:lstStyle/>
+          <a:p>
+            <a:r>
+              <a:rPr lang="en-US" dirty="0"/>
+              <a:t>BACKGROUND</a:t>
+            </a:r>
+          </a:p>
+        </p:txBody>
+      </p:sp>
+      <p:sp>
+        <p:nvSpPr>
+          <p:cNvPr id="4" name="Slide Number Placeholder 3">
+            <a:extLst>
+              <a:ext uri="{FF2B5EF4-FFF2-40B4-BE49-F238E27FC236}">
+                <a16:creationId xmlns:a16="http://schemas.microsoft.com/office/drawing/2014/main" id="{DBE3A4E5-7FDF-E430-CA37-27812B316214}"/>
+              </a:ext>
+            </a:extLst>
+          </p:cNvPr>
+          <p:cNvSpPr>
+            <a:spLocks noGrp="1"/>
+          </p:cNvSpPr>
+          <p:nvPr>
+            <p:ph type="sldNum" sz="quarter" idx="12"/>
+          </p:nvPr>
+        </p:nvSpPr>
+        <p:spPr/>
+        <p:txBody>
+          <a:bodyPr/>
+          <a:lstStyle/>
+          <a:p>
+            <a:fld id="{AD40181A-01B0-4CB8-8614-1473649F6741}" type="slidenum">
+              <a:rPr lang="en-US" smtClean="0">
+                <a:solidFill>
+                  <a:schemeClr val="bg1"/>
+                </a:solidFill>
+              </a:rPr>
+              <a:t>5</a:t>
+            </a:fld>
+            <a:endParaRPr lang="en-US" dirty="0">
+              <a:solidFill>
+                <a:schemeClr val="bg1"/>
+              </a:solidFill>
+            </a:endParaRPr>
+          </a:p>
+        </p:txBody>
+      </p:sp>
+      <p:pic>
+        <p:nvPicPr>
+          <p:cNvPr id="8" name="Content Placeholder 7" descr="A diagram of a diagram of a group of cylinders&#10;&#10;Description automatically generated with medium confidence">
+            <a:extLst>
+              <a:ext uri="{FF2B5EF4-FFF2-40B4-BE49-F238E27FC236}">
+                <a16:creationId xmlns:a16="http://schemas.microsoft.com/office/drawing/2014/main" id="{6F769F6E-7683-AE68-09D8-4C2D86111AB1}"/>
+              </a:ext>
+            </a:extLst>
+          </p:cNvPr>
+          <p:cNvPicPr>
+            <a:picLocks noGrp="1" noChangeAspect="1"/>
+          </p:cNvPicPr>
+          <p:nvPr>
+            <p:ph idx="1"/>
+          </p:nvPr>
+        </p:nvPicPr>
+        <p:blipFill>
+          <a:blip r:embed="rId2">
+            <a:extLst>
+              <a:ext uri="{28A0092B-C50C-407E-A947-70E740481C1C}">
+                <a14:useLocalDpi xmlns:a14="http://schemas.microsoft.com/office/drawing/2010/main" val="0"/>
+              </a:ext>
+            </a:extLst>
+          </a:blip>
+          <a:stretch>
+            <a:fillRect/>
+          </a:stretch>
+        </p:blipFill>
+        <p:spPr>
+          <a:xfrm>
+            <a:off x="1922108" y="83425"/>
+            <a:ext cx="8205986" cy="5833011"/>
+          </a:xfrm>
+        </p:spPr>
+      </p:pic>
+    </p:spTree>
+    <p:extLst>
+      <p:ext uri="{BB962C8B-B14F-4D97-AF65-F5344CB8AC3E}">
+        <p14:creationId xmlns:p14="http://schemas.microsoft.com/office/powerpoint/2010/main" val="523651253"/>
+      </p:ext>
+    </p:extLst>
+  </p:cSld>
+  <p:clrMapOvr>
+    <a:masterClrMapping/>
+  </p:clrMapOvr>
+</p:sld>
+</file>
+
+<file path=ppt/slides/slide6.xml><?xml version="1.0" encoding="utf-8"?>
+<p:sld xmlns:a="http://schemas.openxmlformats.org/drawingml/2006/main" xmlns:r="http://schemas.openxmlformats.org/officeDocument/2006/relationships" xmlns:p="http://schemas.openxmlformats.org/presentationml/2006/main">
+  <p:cSld>
+    <p:spTree>
+      <p:nvGrpSpPr>
+        <p:cNvPr id="1" name="">
+          <a:extLst>
+            <a:ext uri="{FF2B5EF4-FFF2-40B4-BE49-F238E27FC236}">
+              <a16:creationId xmlns:a16="http://schemas.microsoft.com/office/drawing/2014/main" id="{6E175FE4-A361-D6D5-BB21-7352B4A29D8B}"/>
+            </a:ext>
+          </a:extLst>
+        </p:cNvPr>
+        <p:cNvGrpSpPr/>
+        <p:nvPr/>
+      </p:nvGrpSpPr>
+      <p:grpSpPr>
+        <a:xfrm>
+          <a:off x="0" y="0"/>
+          <a:ext cx="0" cy="0"/>
+          <a:chOff x="0" y="0"/>
+          <a:chExt cx="0" cy="0"/>
+        </a:xfrm>
+      </p:grpSpPr>
+      <p:sp>
+        <p:nvSpPr>
+          <p:cNvPr id="2" name="Title 1">
+            <a:extLst>
+              <a:ext uri="{FF2B5EF4-FFF2-40B4-BE49-F238E27FC236}">
+                <a16:creationId xmlns:a16="http://schemas.microsoft.com/office/drawing/2014/main" id="{D724C4A3-BF2A-103C-D4B4-77F7B6BBD867}"/>
+              </a:ext>
+            </a:extLst>
+          </p:cNvPr>
+          <p:cNvSpPr>
+            <a:spLocks noGrp="1"/>
+          </p:cNvSpPr>
+          <p:nvPr>
+            <p:ph type="title"/>
+          </p:nvPr>
+        </p:nvSpPr>
+        <p:spPr>
+          <a:xfrm>
+            <a:off x="107628" y="83425"/>
+            <a:ext cx="10651402" cy="1143000"/>
+          </a:xfrm>
+        </p:spPr>
+        <p:txBody>
+          <a:bodyPr/>
+          <a:lstStyle/>
+          <a:p>
+            <a:r>
+              <a:rPr lang="en-US" dirty="0"/>
+              <a:t>BACKGROUND</a:t>
+            </a:r>
+          </a:p>
+        </p:txBody>
+      </p:sp>
+      <p:sp>
+        <p:nvSpPr>
+          <p:cNvPr id="4" name="Slide Number Placeholder 3">
+            <a:extLst>
+              <a:ext uri="{FF2B5EF4-FFF2-40B4-BE49-F238E27FC236}">
+                <a16:creationId xmlns:a16="http://schemas.microsoft.com/office/drawing/2014/main" id="{92CA1B59-EA59-B7AB-173D-6DB4FBF41193}"/>
+              </a:ext>
+            </a:extLst>
+          </p:cNvPr>
+          <p:cNvSpPr>
+            <a:spLocks noGrp="1"/>
+          </p:cNvSpPr>
+          <p:nvPr>
+            <p:ph type="sldNum" sz="quarter" idx="12"/>
+          </p:nvPr>
+        </p:nvSpPr>
+        <p:spPr/>
+        <p:txBody>
+          <a:bodyPr/>
+          <a:lstStyle/>
+          <a:p>
+            <a:fld id="{AD40181A-01B0-4CB8-8614-1473649F6741}" type="slidenum">
+              <a:rPr lang="en-US" smtClean="0">
+                <a:solidFill>
+                  <a:schemeClr val="bg1"/>
+                </a:solidFill>
+              </a:rPr>
+              <a:t>6</a:t>
+            </a:fld>
+            <a:endParaRPr lang="en-US" dirty="0">
+              <a:solidFill>
+                <a:schemeClr val="bg1"/>
+              </a:solidFill>
+            </a:endParaRPr>
+          </a:p>
+        </p:txBody>
+      </p:sp>
+      <p:pic>
+        <p:nvPicPr>
+          <p:cNvPr id="21" name="Content Placeholder 20" descr="A diagram of a diagram of a group of white cylinders with text&#10;&#10;Description automatically generated with medium confidence">
+            <a:extLst>
+              <a:ext uri="{FF2B5EF4-FFF2-40B4-BE49-F238E27FC236}">
+                <a16:creationId xmlns:a16="http://schemas.microsoft.com/office/drawing/2014/main" id="{903A7541-5B04-F8B3-4BE9-707A50FF1D60}"/>
+              </a:ext>
+            </a:extLst>
+          </p:cNvPr>
+          <p:cNvPicPr>
+            <a:picLocks noGrp="1" noChangeAspect="1"/>
+          </p:cNvPicPr>
+          <p:nvPr>
+            <p:ph idx="1"/>
+          </p:nvPr>
+        </p:nvPicPr>
+        <p:blipFill>
+          <a:blip r:embed="rId2">
+            <a:extLst>
+              <a:ext uri="{28A0092B-C50C-407E-A947-70E740481C1C}">
+                <a14:useLocalDpi xmlns:a14="http://schemas.microsoft.com/office/drawing/2010/main" val="0"/>
+              </a:ext>
+            </a:extLst>
+          </a:blip>
+          <a:stretch>
+            <a:fillRect/>
+          </a:stretch>
+        </p:blipFill>
+        <p:spPr>
+          <a:xfrm>
+            <a:off x="2115052" y="0"/>
+            <a:ext cx="7866770" cy="5888736"/>
+          </a:xfrm>
+        </p:spPr>
+      </p:pic>
+    </p:spTree>
+    <p:extLst>
+      <p:ext uri="{BB962C8B-B14F-4D97-AF65-F5344CB8AC3E}">
+        <p14:creationId xmlns:p14="http://schemas.microsoft.com/office/powerpoint/2010/main" val="2540695753"/>
+      </p:ext>
+    </p:extLst>
+  </p:cSld>
+  <p:clrMapOvr>
+    <a:masterClrMapping/>
+  </p:clrMapOvr>
+</p:sld>
+</file>
+
+<file path=ppt/slides/slide7.xml><?xml version="1.0" encoding="utf-8"?>
+<p:sld xmlns:a="http://schemas.openxmlformats.org/drawingml/2006/main" xmlns:r="http://schemas.openxmlformats.org/officeDocument/2006/relationships" xmlns:p="http://schemas.openxmlformats.org/presentationml/2006/main">
+  <p:cSld>
+    <p:spTree>
+      <p:nvGrpSpPr>
+        <p:cNvPr id="1" name="">
+          <a:extLst>
+            <a:ext uri="{FF2B5EF4-FFF2-40B4-BE49-F238E27FC236}">
+              <a16:creationId xmlns:a16="http://schemas.microsoft.com/office/drawing/2014/main" id="{C4B7005B-DADB-A4E8-5D36-E476478E69AA}"/>
+            </a:ext>
+          </a:extLst>
+        </p:cNvPr>
+        <p:cNvGrpSpPr/>
+        <p:nvPr/>
+      </p:nvGrpSpPr>
+      <p:grpSpPr>
+        <a:xfrm>
+          <a:off x="0" y="0"/>
+          <a:ext cx="0" cy="0"/>
+          <a:chOff x="0" y="0"/>
+          <a:chExt cx="0" cy="0"/>
+        </a:xfrm>
+      </p:grpSpPr>
+      <p:sp>
+        <p:nvSpPr>
+          <p:cNvPr id="2" name="Title 1">
+            <a:extLst>
+              <a:ext uri="{FF2B5EF4-FFF2-40B4-BE49-F238E27FC236}">
+                <a16:creationId xmlns:a16="http://schemas.microsoft.com/office/drawing/2014/main" id="{2162D975-D602-64A2-BA6F-F24BE473F0E3}"/>
+              </a:ext>
+            </a:extLst>
+          </p:cNvPr>
+          <p:cNvSpPr>
+            <a:spLocks noGrp="1"/>
+          </p:cNvSpPr>
+          <p:nvPr>
+            <p:ph type="title"/>
+          </p:nvPr>
+        </p:nvSpPr>
+        <p:spPr>
+          <a:xfrm>
+            <a:off x="107628" y="83425"/>
+            <a:ext cx="10651402" cy="1143000"/>
+          </a:xfrm>
+        </p:spPr>
+        <p:txBody>
+          <a:bodyPr/>
+          <a:lstStyle/>
+          <a:p>
+            <a:r>
+              <a:rPr lang="en-US" dirty="0"/>
+              <a:t>BACKGROUND</a:t>
+            </a:r>
+          </a:p>
+        </p:txBody>
+      </p:sp>
+      <p:sp>
+        <p:nvSpPr>
+          <p:cNvPr id="4" name="Slide Number Placeholder 3">
+            <a:extLst>
+              <a:ext uri="{FF2B5EF4-FFF2-40B4-BE49-F238E27FC236}">
+                <a16:creationId xmlns:a16="http://schemas.microsoft.com/office/drawing/2014/main" id="{A8D28691-D865-C0D1-5141-2A65126DC7DD}"/>
+              </a:ext>
+            </a:extLst>
+          </p:cNvPr>
+          <p:cNvSpPr>
+            <a:spLocks noGrp="1"/>
+          </p:cNvSpPr>
+          <p:nvPr>
+            <p:ph type="sldNum" sz="quarter" idx="12"/>
+          </p:nvPr>
+        </p:nvSpPr>
+        <p:spPr/>
+        <p:txBody>
+          <a:bodyPr/>
+          <a:lstStyle/>
+          <a:p>
+            <a:fld id="{AD40181A-01B0-4CB8-8614-1473649F6741}" type="slidenum">
+              <a:rPr lang="en-US" smtClean="0">
+                <a:solidFill>
+                  <a:schemeClr val="bg1"/>
+                </a:solidFill>
+              </a:rPr>
+              <a:t>7</a:t>
+            </a:fld>
+            <a:endParaRPr lang="en-US" dirty="0">
+              <a:solidFill>
+                <a:schemeClr val="bg1"/>
+              </a:solidFill>
+            </a:endParaRPr>
+          </a:p>
+        </p:txBody>
+      </p:sp>
+      <p:pic>
+        <p:nvPicPr>
+          <p:cNvPr id="7" name="Content Placeholder 6" descr="A diagram of a diagram of a group of white cylinders with text&#10;&#10;Description automatically generated with medium confidence">
+            <a:extLst>
+              <a:ext uri="{FF2B5EF4-FFF2-40B4-BE49-F238E27FC236}">
+                <a16:creationId xmlns:a16="http://schemas.microsoft.com/office/drawing/2014/main" id="{7626875E-2DA8-C539-F10F-D16492E9E98E}"/>
+              </a:ext>
+            </a:extLst>
+          </p:cNvPr>
+          <p:cNvPicPr>
+            <a:picLocks noGrp="1" noChangeAspect="1"/>
+          </p:cNvPicPr>
+          <p:nvPr>
+            <p:ph idx="1"/>
+          </p:nvPr>
+        </p:nvPicPr>
+        <p:blipFill>
+          <a:blip r:embed="rId2">
+            <a:extLst>
+              <a:ext uri="{28A0092B-C50C-407E-A947-70E740481C1C}">
+                <a14:useLocalDpi xmlns:a14="http://schemas.microsoft.com/office/drawing/2010/main" val="0"/>
+              </a:ext>
+            </a:extLst>
+          </a:blip>
+          <a:stretch>
+            <a:fillRect/>
+          </a:stretch>
+        </p:blipFill>
+        <p:spPr>
+          <a:xfrm>
+            <a:off x="1904803" y="0"/>
+            <a:ext cx="8065472" cy="5933327"/>
+          </a:xfrm>
+        </p:spPr>
+      </p:pic>
+    </p:spTree>
+    <p:extLst>
+      <p:ext uri="{BB962C8B-B14F-4D97-AF65-F5344CB8AC3E}">
+        <p14:creationId xmlns:p14="http://schemas.microsoft.com/office/powerpoint/2010/main" val="15058226"/>
+      </p:ext>
+    </p:extLst>
+  </p:cSld>
+  <p:clrMapOvr>
+    <a:masterClrMapping/>
+  </p:clrMapOvr>
+</p:sld>
+</file>
+
+<file path=ppt/slides/slide8.xml><?xml version="1.0" encoding="utf-8"?>
+<p:sld xmlns:a="http://schemas.openxmlformats.org/drawingml/2006/main" xmlns:r="http://schemas.openxmlformats.org/officeDocument/2006/relationships" xmlns:p="http://schemas.openxmlformats.org/presentationml/2006/main">
+  <p:cSld>
+    <p:spTree>
+      <p:nvGrpSpPr>
+        <p:cNvPr id="1" name=""/>
+        <p:cNvGrpSpPr/>
+        <p:nvPr/>
+      </p:nvGrpSpPr>
+      <p:grpSpPr>
+        <a:xfrm>
+          <a:off x="0" y="0"/>
+          <a:ext cx="0" cy="0"/>
+          <a:chOff x="0" y="0"/>
+          <a:chExt cx="0" cy="0"/>
+        </a:xfrm>
+      </p:grpSpPr>
+      <p:sp>
+        <p:nvSpPr>
+          <p:cNvPr id="2" name="Title 1">
+            <a:extLst>
+              <a:ext uri="{FF2B5EF4-FFF2-40B4-BE49-F238E27FC236}">
+                <a16:creationId xmlns:a16="http://schemas.microsoft.com/office/drawing/2014/main" id="{5CF1118B-94CB-4D02-25D2-EBED731DA0FE}"/>
+              </a:ext>
+            </a:extLst>
+          </p:cNvPr>
+          <p:cNvSpPr>
+            <a:spLocks noGrp="1"/>
+          </p:cNvSpPr>
+          <p:nvPr>
+            <p:ph type="title"/>
+          </p:nvPr>
+        </p:nvSpPr>
+        <p:spPr>
+          <a:xfrm>
+            <a:off x="97340" y="83425"/>
+            <a:ext cx="11010595" cy="1143000"/>
+          </a:xfrm>
+        </p:spPr>
+        <p:txBody>
+          <a:bodyPr/>
+          <a:lstStyle/>
+          <a:p>
+            <a:r>
+              <a:rPr lang="en-US" dirty="0"/>
+              <a:t>Clinical Trials: Tumors</a:t>
+            </a:r>
+          </a:p>
+        </p:txBody>
+      </p:sp>
+      <p:sp>
+        <p:nvSpPr>
+          <p:cNvPr id="3" name="Content Placeholder 2">
+            <a:extLst>
+              <a:ext uri="{FF2B5EF4-FFF2-40B4-BE49-F238E27FC236}">
+                <a16:creationId xmlns:a16="http://schemas.microsoft.com/office/drawing/2014/main" id="{5B98EF3E-4944-E0B4-E5EC-8FE9EBCAF91F}"/>
+              </a:ext>
+            </a:extLst>
+          </p:cNvPr>
+          <p:cNvSpPr>
+            <a:spLocks noGrp="1"/>
+          </p:cNvSpPr>
+          <p:nvPr>
+            <p:ph idx="1"/>
+          </p:nvPr>
+        </p:nvSpPr>
+        <p:spPr>
+          <a:xfrm>
+            <a:off x="216212" y="1481328"/>
+            <a:ext cx="11010595" cy="3895344"/>
+          </a:xfrm>
+        </p:spPr>
+        <p:txBody>
+          <a:bodyPr>
+            <a:normAutofit/>
+          </a:bodyPr>
+          <a:lstStyle/>
+          <a:p>
+            <a:r>
+              <a:rPr lang="en-US" dirty="0">
+                <a:solidFill>
+                  <a:schemeClr val="tx2">
+                    <a:lumMod val="10000"/>
+                  </a:schemeClr>
+                </a:solidFill>
+              </a:rPr>
+              <a:t>Tumors in clinical trials can be obtains from the “conditions” table. </a:t>
+            </a:r>
+          </a:p>
+          <a:p>
+            <a:endParaRPr lang="en-US" dirty="0">
+              <a:solidFill>
+                <a:schemeClr val="tx2">
+                  <a:lumMod val="10000"/>
+                </a:schemeClr>
+              </a:solidFill>
+            </a:endParaRPr>
+          </a:p>
+          <a:p>
+            <a:r>
+              <a:rPr lang="en-US" dirty="0">
+                <a:solidFill>
+                  <a:schemeClr val="tx2">
+                    <a:lumMod val="10000"/>
+                  </a:schemeClr>
+                </a:solidFill>
+              </a:rPr>
+              <a:t>Table is provided in a tab separated text file containing NCT IDs and condition names in down case.</a:t>
+            </a:r>
+          </a:p>
+          <a:p>
+            <a:endParaRPr lang="en-US" dirty="0">
+              <a:solidFill>
+                <a:schemeClr val="tx2">
+                  <a:lumMod val="10000"/>
+                </a:schemeClr>
+              </a:solidFill>
+            </a:endParaRPr>
+          </a:p>
+          <a:p>
+            <a:r>
+              <a:rPr lang="en-US" dirty="0">
+                <a:solidFill>
+                  <a:schemeClr val="tx2">
+                    <a:lumMod val="10000"/>
+                  </a:schemeClr>
+                </a:solidFill>
+              </a:rPr>
+              <a:t>Downloaded data on Aug 22, 2023.  Data is updated monthly. </a:t>
+            </a:r>
+          </a:p>
+          <a:p>
+            <a:endParaRPr lang="en-US" dirty="0">
+              <a:solidFill>
+                <a:schemeClr val="tx2">
+                  <a:lumMod val="10000"/>
+                </a:schemeClr>
+              </a:solidFill>
+            </a:endParaRPr>
+          </a:p>
+          <a:p>
+            <a:pPr marL="0" indent="0">
+              <a:buNone/>
+            </a:pPr>
+            <a:endParaRPr lang="en-US" dirty="0">
+              <a:solidFill>
+                <a:schemeClr val="tx2">
+                  <a:lumMod val="10000"/>
+                </a:schemeClr>
+              </a:solidFill>
+            </a:endParaRPr>
+          </a:p>
+        </p:txBody>
+      </p:sp>
+      <p:sp>
+        <p:nvSpPr>
+          <p:cNvPr id="4" name="Slide Number Placeholder 3">
+            <a:extLst>
+              <a:ext uri="{FF2B5EF4-FFF2-40B4-BE49-F238E27FC236}">
+                <a16:creationId xmlns:a16="http://schemas.microsoft.com/office/drawing/2014/main" id="{634D0B71-ACEA-F9DC-9C3D-F6022E010AFC}"/>
+              </a:ext>
+            </a:extLst>
+          </p:cNvPr>
+          <p:cNvSpPr>
+            <a:spLocks noGrp="1"/>
+          </p:cNvSpPr>
+          <p:nvPr>
+            <p:ph type="sldNum" sz="quarter" idx="12"/>
+          </p:nvPr>
+        </p:nvSpPr>
+        <p:spPr/>
+        <p:txBody>
+          <a:bodyPr/>
+          <a:lstStyle/>
+          <a:p>
+            <a:fld id="{AD40181A-01B0-4CB8-8614-1473649F6741}" type="slidenum">
+              <a:rPr lang="en-US" smtClean="0"/>
+              <a:pPr/>
+              <a:t>8</a:t>
+            </a:fld>
+            <a:endParaRPr lang="en-US" dirty="0"/>
+          </a:p>
+        </p:txBody>
+      </p:sp>
+    </p:spTree>
+    <p:extLst>
+      <p:ext uri="{BB962C8B-B14F-4D97-AF65-F5344CB8AC3E}">
+        <p14:creationId xmlns:p14="http://schemas.microsoft.com/office/powerpoint/2010/main" val="1830375812"/>
+      </p:ext>
+    </p:extLst>
+  </p:cSld>
+  <p:clrMapOvr>
+    <a:masterClrMapping/>
+  </p:clrMapOvr>
+</p:sld>
+</file>
+
+<file path=ppt/slides/slide9.xml><?xml version="1.0" encoding="utf-8"?>
+<p:sld xmlns:a="http://schemas.openxmlformats.org/drawingml/2006/main" xmlns:r="http://schemas.openxmlformats.org/officeDocument/2006/relationships" xmlns:p="http://schemas.openxmlformats.org/presentationml/2006/main">
+  <p:cSld>
+    <p:spTree>
+      <p:nvGrpSpPr>
+        <p:cNvPr id="1" name="">
+          <a:extLst>
+            <a:ext uri="{FF2B5EF4-FFF2-40B4-BE49-F238E27FC236}">
+              <a16:creationId xmlns:a16="http://schemas.microsoft.com/office/drawing/2014/main" id="{45650616-B315-8B32-0D58-48C54363C6E2}"/>
+            </a:ext>
+          </a:extLst>
+        </p:cNvPr>
+        <p:cNvGrpSpPr/>
+        <p:nvPr/>
+      </p:nvGrpSpPr>
+      <p:grpSpPr>
+        <a:xfrm>
+          <a:off x="0" y="0"/>
+          <a:ext cx="0" cy="0"/>
+          <a:chOff x="0" y="0"/>
+          <a:chExt cx="0" cy="0"/>
+        </a:xfrm>
+      </p:grpSpPr>
+      <p:sp>
+        <p:nvSpPr>
+          <p:cNvPr id="2" name="Title 1">
+            <a:extLst>
+              <a:ext uri="{FF2B5EF4-FFF2-40B4-BE49-F238E27FC236}">
+                <a16:creationId xmlns:a16="http://schemas.microsoft.com/office/drawing/2014/main" id="{B5CF393F-5A21-D0AD-C21A-61159576E7CF}"/>
+              </a:ext>
+            </a:extLst>
+          </p:cNvPr>
+          <p:cNvSpPr>
+            <a:spLocks noGrp="1"/>
+          </p:cNvSpPr>
+          <p:nvPr>
+            <p:ph type="title"/>
+          </p:nvPr>
+        </p:nvSpPr>
+        <p:spPr>
+          <a:xfrm>
+            <a:off x="97340" y="83425"/>
+            <a:ext cx="11010595" cy="1143000"/>
+          </a:xfrm>
+        </p:spPr>
+        <p:txBody>
+          <a:bodyPr/>
+          <a:lstStyle/>
+          <a:p>
+            <a:r>
+              <a:rPr lang="en-US" dirty="0"/>
+              <a:t>Clinical Trials: Tumors</a:t>
+            </a:r>
+          </a:p>
+        </p:txBody>
+      </p:sp>
+      <p:sp>
+        <p:nvSpPr>
+          <p:cNvPr id="3" name="Content Placeholder 2">
+            <a:extLst>
+              <a:ext uri="{FF2B5EF4-FFF2-40B4-BE49-F238E27FC236}">
+                <a16:creationId xmlns:a16="http://schemas.microsoft.com/office/drawing/2014/main" id="{EFF8F6C6-948A-3AA6-CCBF-4A871989922F}"/>
+              </a:ext>
+            </a:extLst>
+          </p:cNvPr>
+          <p:cNvSpPr>
+            <a:spLocks noGrp="1"/>
+          </p:cNvSpPr>
+          <p:nvPr>
+            <p:ph idx="1"/>
+          </p:nvPr>
+        </p:nvSpPr>
+        <p:spPr>
+          <a:xfrm>
+            <a:off x="216212" y="1481328"/>
+            <a:ext cx="11010595" cy="3895344"/>
+          </a:xfrm>
+        </p:spPr>
+        <p:txBody>
+          <a:bodyPr>
+            <a:normAutofit/>
+          </a:bodyPr>
+          <a:lstStyle/>
+          <a:p>
+            <a:r>
+              <a:rPr lang="en-US" dirty="0">
+                <a:solidFill>
+                  <a:schemeClr val="tx2">
+                    <a:lumMod val="10000"/>
+                  </a:schemeClr>
+                </a:solidFill>
+              </a:rPr>
+              <a:t>Tumors in clinical trials can be obtains from the “conditions” table. </a:t>
+            </a:r>
+          </a:p>
+          <a:p>
+            <a:endParaRPr lang="en-US" dirty="0">
+              <a:solidFill>
+                <a:schemeClr val="tx2">
+                  <a:lumMod val="10000"/>
+                </a:schemeClr>
+              </a:solidFill>
+            </a:endParaRPr>
+          </a:p>
+          <a:p>
+            <a:r>
+              <a:rPr lang="en-US" dirty="0">
+                <a:solidFill>
+                  <a:schemeClr val="tx2">
+                    <a:lumMod val="10000"/>
+                  </a:schemeClr>
+                </a:solidFill>
+              </a:rPr>
+              <a:t>Table is provided in a tab separated text file containing NCT IDs and condition names in down case.</a:t>
+            </a:r>
+          </a:p>
+          <a:p>
+            <a:endParaRPr lang="en-US" dirty="0">
+              <a:solidFill>
+                <a:schemeClr val="tx2">
+                  <a:lumMod val="10000"/>
+                </a:schemeClr>
+              </a:solidFill>
+            </a:endParaRPr>
+          </a:p>
+          <a:p>
+            <a:r>
+              <a:rPr lang="en-US" dirty="0">
+                <a:solidFill>
+                  <a:schemeClr val="tx2">
+                    <a:lumMod val="10000"/>
+                  </a:schemeClr>
+                </a:solidFill>
+              </a:rPr>
+              <a:t>Downloaded data on Aug 22, 2023.  Data is updated monthly. </a:t>
+            </a:r>
+          </a:p>
+          <a:p>
+            <a:endParaRPr lang="en-US" dirty="0">
+              <a:solidFill>
+                <a:schemeClr val="tx2">
+                  <a:lumMod val="10000"/>
+                </a:schemeClr>
+              </a:solidFill>
+            </a:endParaRPr>
+          </a:p>
+          <a:p>
+            <a:pPr marL="0" indent="0">
+              <a:buNone/>
+            </a:pPr>
+            <a:endParaRPr lang="en-US" dirty="0">
+              <a:solidFill>
+                <a:schemeClr val="tx2">
+                  <a:lumMod val="10000"/>
+                </a:schemeClr>
+              </a:solidFill>
+            </a:endParaRPr>
+          </a:p>
+        </p:txBody>
+      </p:sp>
+      <p:sp>
+        <p:nvSpPr>
+          <p:cNvPr id="4" name="Slide Number Placeholder 3">
+            <a:extLst>
+              <a:ext uri="{FF2B5EF4-FFF2-40B4-BE49-F238E27FC236}">
+                <a16:creationId xmlns:a16="http://schemas.microsoft.com/office/drawing/2014/main" id="{27E522C5-49EC-C79E-F7EB-0717E74FF1F6}"/>
+              </a:ext>
+            </a:extLst>
+          </p:cNvPr>
+          <p:cNvSpPr>
+            <a:spLocks noGrp="1"/>
+          </p:cNvSpPr>
+          <p:nvPr>
+            <p:ph type="sldNum" sz="quarter" idx="12"/>
+          </p:nvPr>
+        </p:nvSpPr>
+        <p:spPr/>
+        <p:txBody>
+          <a:bodyPr/>
+          <a:lstStyle/>
+          <a:p>
+            <a:fld id="{AD40181A-01B0-4CB8-8614-1473649F6741}" type="slidenum">
+              <a:rPr lang="en-US" smtClean="0"/>
+              <a:pPr/>
+              <a:t>9</a:t>
+            </a:fld>
+            <a:endParaRPr lang="en-US" dirty="0"/>
+          </a:p>
+        </p:txBody>
+      </p:sp>
+    </p:spTree>
+    <p:extLst>
+      <p:ext uri="{BB962C8B-B14F-4D97-AF65-F5344CB8AC3E}">
+        <p14:creationId xmlns:p14="http://schemas.microsoft.com/office/powerpoint/2010/main" val="323955064"/>
       </p:ext>
     </p:extLst>
   </p:cSld>
@@ -2451,15 +3491,6 @@
 </file>
 
 <file path=customXml/item2.xml><?xml version="1.0" encoding="utf-8"?>
-<?mso-contentType ?>
-<FormTemplates xmlns="http://schemas.microsoft.com/sharepoint/v3/contenttype/forms">
-  <Display>DocumentLibraryForm</Display>
-  <Edit>DocumentLibraryForm</Edit>
-  <New>DocumentLibraryForm</New>
-</FormTemplates>
-</file>
-
-<file path=customXml/item3.xml><?xml version="1.0" encoding="utf-8"?>
 <p:properties xmlns:p="http://schemas.microsoft.com/office/2006/metadata/properties" xmlns:xsi="http://www.w3.org/2001/XMLSchema-instance" xmlns:pc="http://schemas.microsoft.com/office/infopath/2007/PartnerControls">
   <documentManagement>
     <h6a4a4262ab844b18de92e197378cee0 xmlns="e96402cb-0a6e-49e7-8465-cfae72b5129c">
@@ -2475,6 +3506,15 @@
     <IconOverlay xmlns="http://schemas.microsoft.com/sharepoint/v4" xsi:nil="true"/>
   </documentManagement>
 </p:properties>
+</file>
+
+<file path=customXml/item3.xml><?xml version="1.0" encoding="utf-8"?>
+<?mso-contentType ?>
+<FormTemplates xmlns="http://schemas.microsoft.com/sharepoint/v3/contenttype/forms">
+  <Display>DocumentLibraryForm</Display>
+  <Edit>DocumentLibraryForm</Edit>
+  <New>DocumentLibraryForm</New>
+</FormTemplates>
 </file>
 
 <file path=customXml/itemProps1.xml><?xml version="1.0" encoding="utf-8"?>
@@ -2499,14 +3539,6 @@
 </file>
 
 <file path=customXml/itemProps2.xml><?xml version="1.0" encoding="utf-8"?>
-<ds:datastoreItem xmlns:ds="http://schemas.openxmlformats.org/officeDocument/2006/customXml" ds:itemID="{8E78B9CA-BC85-4AC4-82A4-AD53C20980F5}">
-  <ds:schemaRefs>
-    <ds:schemaRef ds:uri="http://schemas.microsoft.com/sharepoint/v3/contenttype/forms"/>
-  </ds:schemaRefs>
-</ds:datastoreItem>
-</file>
-
-<file path=customXml/itemProps3.xml><?xml version="1.0" encoding="utf-8"?>
 <ds:datastoreItem xmlns:ds="http://schemas.openxmlformats.org/officeDocument/2006/customXml" ds:itemID="{7C493EF0-0BE4-4E84-A0BC-FF9879CDB9E8}">
   <ds:schemaRefs>
     <ds:schemaRef ds:uri="http://schemas.microsoft.com/office/2006/metadata/properties"/>
@@ -2517,4 +3549,12 @@
     <ds:schemaRef ds:uri="http://schemas.microsoft.com/sharepoint/v4"/>
   </ds:schemaRefs>
 </ds:datastoreItem>
+</file>
+
+<file path=customXml/itemProps3.xml><?xml version="1.0" encoding="utf-8"?>
+<ds:datastoreItem xmlns:ds="http://schemas.openxmlformats.org/officeDocument/2006/customXml" ds:itemID="{8E78B9CA-BC85-4AC4-82A4-AD53C20980F5}">
+  <ds:schemaRefs>
+    <ds:schemaRef ds:uri="http://schemas.microsoft.com/sharepoint/v3/contenttype/forms"/>
+  </ds:schemaRefs>
+</ds:datastoreItem>
 </file>
</xml_diff>

<commit_message>
adding tumor extraction pipeline to ppt
</commit_message>
<xml_diff>
--- a/presentations/BIG_2024.pptx
+++ b/presentations/BIG_2024.pptx
@@ -5,7 +5,7 @@
     <p:sldMasterId id="2147483672" r:id="rId4"/>
   </p:sldMasterIdLst>
   <p:notesMasterIdLst>
-    <p:notesMasterId r:id="rId14"/>
+    <p:notesMasterId r:id="rId15"/>
   </p:notesMasterIdLst>
   <p:sldIdLst>
     <p:sldId id="256" r:id="rId5"/>
@@ -15,8 +15,9 @@
     <p:sldId id="261" r:id="rId9"/>
     <p:sldId id="262" r:id="rId10"/>
     <p:sldId id="263" r:id="rId11"/>
-    <p:sldId id="264" r:id="rId12"/>
-    <p:sldId id="265" r:id="rId13"/>
+    <p:sldId id="265" r:id="rId12"/>
+    <p:sldId id="264" r:id="rId13"/>
+    <p:sldId id="266" r:id="rId14"/>
   </p:sldIdLst>
   <p:sldSz cx="12192000" cy="6858000"/>
   <p:notesSz cx="6858000" cy="9144000"/>
@@ -1625,6 +1626,188 @@
 </p:sld>
 </file>
 
+<file path=ppt/slides/slide10.xml><?xml version="1.0" encoding="utf-8"?>
+<p:sld xmlns:a="http://schemas.openxmlformats.org/drawingml/2006/main" xmlns:r="http://schemas.openxmlformats.org/officeDocument/2006/relationships" xmlns:p="http://schemas.openxmlformats.org/presentationml/2006/main">
+  <p:cSld>
+    <p:spTree>
+      <p:nvGrpSpPr>
+        <p:cNvPr id="1" name="">
+          <a:extLst>
+            <a:ext uri="{FF2B5EF4-FFF2-40B4-BE49-F238E27FC236}">
+              <a16:creationId xmlns:a16="http://schemas.microsoft.com/office/drawing/2014/main" id="{A441CDB7-FC02-3704-3DAB-3AB63DC2A511}"/>
+            </a:ext>
+          </a:extLst>
+        </p:cNvPr>
+        <p:cNvGrpSpPr/>
+        <p:nvPr/>
+      </p:nvGrpSpPr>
+      <p:grpSpPr>
+        <a:xfrm>
+          <a:off x="0" y="0"/>
+          <a:ext cx="0" cy="0"/>
+          <a:chOff x="0" y="0"/>
+          <a:chExt cx="0" cy="0"/>
+        </a:xfrm>
+      </p:grpSpPr>
+      <p:sp>
+        <p:nvSpPr>
+          <p:cNvPr id="2" name="Title 1">
+            <a:extLst>
+              <a:ext uri="{FF2B5EF4-FFF2-40B4-BE49-F238E27FC236}">
+                <a16:creationId xmlns:a16="http://schemas.microsoft.com/office/drawing/2014/main" id="{66DF99B6-4C04-36AC-E1E5-721B70666E29}"/>
+              </a:ext>
+            </a:extLst>
+          </p:cNvPr>
+          <p:cNvSpPr>
+            <a:spLocks noGrp="1"/>
+          </p:cNvSpPr>
+          <p:nvPr>
+            <p:ph type="title"/>
+          </p:nvPr>
+        </p:nvSpPr>
+        <p:spPr>
+          <a:xfrm>
+            <a:off x="97340" y="83425"/>
+            <a:ext cx="11010595" cy="1143000"/>
+          </a:xfrm>
+        </p:spPr>
+        <p:txBody>
+          <a:bodyPr/>
+          <a:lstStyle/>
+          <a:p>
+            <a:r>
+              <a:rPr lang="en-US" dirty="0"/>
+              <a:t>Clinical Trials: Tumors</a:t>
+            </a:r>
+          </a:p>
+        </p:txBody>
+      </p:sp>
+      <p:sp>
+        <p:nvSpPr>
+          <p:cNvPr id="3" name="Content Placeholder 2">
+            <a:extLst>
+              <a:ext uri="{FF2B5EF4-FFF2-40B4-BE49-F238E27FC236}">
+                <a16:creationId xmlns:a16="http://schemas.microsoft.com/office/drawing/2014/main" id="{CE4BFE00-154C-B280-D403-E23154AC4FEA}"/>
+              </a:ext>
+            </a:extLst>
+          </p:cNvPr>
+          <p:cNvSpPr>
+            <a:spLocks noGrp="1"/>
+          </p:cNvSpPr>
+          <p:nvPr>
+            <p:ph idx="1"/>
+          </p:nvPr>
+        </p:nvSpPr>
+        <p:spPr>
+          <a:xfrm>
+            <a:off x="216212" y="1481328"/>
+            <a:ext cx="11010595" cy="3895344"/>
+          </a:xfrm>
+        </p:spPr>
+        <p:txBody>
+          <a:bodyPr>
+            <a:normAutofit/>
+          </a:bodyPr>
+          <a:lstStyle/>
+          <a:p>
+            <a:r>
+              <a:rPr lang="en-US" dirty="0">
+                <a:solidFill>
+                  <a:schemeClr val="tx2">
+                    <a:lumMod val="10000"/>
+                  </a:schemeClr>
+                </a:solidFill>
+              </a:rPr>
+              <a:t>Tumors in clinical trials can be obtains from the “conditions” table. </a:t>
+            </a:r>
+          </a:p>
+          <a:p>
+            <a:endParaRPr lang="en-US" dirty="0">
+              <a:solidFill>
+                <a:schemeClr val="tx2">
+                  <a:lumMod val="10000"/>
+                </a:schemeClr>
+              </a:solidFill>
+            </a:endParaRPr>
+          </a:p>
+          <a:p>
+            <a:pPr marL="0" indent="0">
+              <a:buNone/>
+            </a:pPr>
+            <a:endParaRPr lang="en-US" dirty="0">
+              <a:solidFill>
+                <a:schemeClr val="tx2">
+                  <a:lumMod val="10000"/>
+                </a:schemeClr>
+              </a:solidFill>
+            </a:endParaRPr>
+          </a:p>
+          <a:p>
+            <a:endParaRPr lang="en-US" dirty="0">
+              <a:solidFill>
+                <a:schemeClr val="tx2">
+                  <a:lumMod val="10000"/>
+                </a:schemeClr>
+              </a:solidFill>
+            </a:endParaRPr>
+          </a:p>
+          <a:p>
+            <a:pPr marL="0" indent="0">
+              <a:buNone/>
+            </a:pPr>
+            <a:endParaRPr lang="en-US" dirty="0">
+              <a:solidFill>
+                <a:schemeClr val="tx2">
+                  <a:lumMod val="10000"/>
+                </a:schemeClr>
+              </a:solidFill>
+            </a:endParaRPr>
+          </a:p>
+        </p:txBody>
+      </p:sp>
+      <p:sp>
+        <p:nvSpPr>
+          <p:cNvPr id="4" name="Slide Number Placeholder 3">
+            <a:extLst>
+              <a:ext uri="{FF2B5EF4-FFF2-40B4-BE49-F238E27FC236}">
+                <a16:creationId xmlns:a16="http://schemas.microsoft.com/office/drawing/2014/main" id="{EFF9523B-1C71-788B-76C7-721FC9B2E88E}"/>
+              </a:ext>
+            </a:extLst>
+          </p:cNvPr>
+          <p:cNvSpPr>
+            <a:spLocks noGrp="1"/>
+          </p:cNvSpPr>
+          <p:nvPr>
+            <p:ph type="sldNum" sz="quarter" idx="12"/>
+          </p:nvPr>
+        </p:nvSpPr>
+        <p:spPr/>
+        <p:txBody>
+          <a:bodyPr/>
+          <a:lstStyle/>
+          <a:p>
+            <a:fld id="{AD40181A-01B0-4CB8-8614-1473649F6741}" type="slidenum">
+              <a:rPr lang="en-US" smtClean="0"/>
+              <a:pPr/>
+              <a:t>10</a:t>
+            </a:fld>
+            <a:endParaRPr lang="en-US" dirty="0"/>
+          </a:p>
+        </p:txBody>
+      </p:sp>
+    </p:spTree>
+    <p:extLst>
+      <p:ext uri="{BB962C8B-B14F-4D97-AF65-F5344CB8AC3E}">
+        <p14:creationId xmlns:p14="http://schemas.microsoft.com/office/powerpoint/2010/main" val="1855793675"/>
+      </p:ext>
+    </p:extLst>
+  </p:cSld>
+  <p:clrMapOvr>
+    <a:masterClrMapping/>
+  </p:clrMapOvr>
+</p:sld>
+</file>
+
 <file path=ppt/slides/slide2.xml><?xml version="1.0" encoding="utf-8"?>
 <p:sld xmlns:a="http://schemas.openxmlformats.org/drawingml/2006/main" xmlns:r="http://schemas.openxmlformats.org/officeDocument/2006/relationships" xmlns:p="http://schemas.openxmlformats.org/presentationml/2006/main">
   <p:cSld>
@@ -2458,203 +2641,6 @@
   <p:cSld>
     <p:spTree>
       <p:nvGrpSpPr>
-        <p:cNvPr id="1" name=""/>
-        <p:cNvGrpSpPr/>
-        <p:nvPr/>
-      </p:nvGrpSpPr>
-      <p:grpSpPr>
-        <a:xfrm>
-          <a:off x="0" y="0"/>
-          <a:ext cx="0" cy="0"/>
-          <a:chOff x="0" y="0"/>
-          <a:chExt cx="0" cy="0"/>
-        </a:xfrm>
-      </p:grpSpPr>
-      <p:sp>
-        <p:nvSpPr>
-          <p:cNvPr id="2" name="Title 1">
-            <a:extLst>
-              <a:ext uri="{FF2B5EF4-FFF2-40B4-BE49-F238E27FC236}">
-                <a16:creationId xmlns:a16="http://schemas.microsoft.com/office/drawing/2014/main" id="{5CF1118B-94CB-4D02-25D2-EBED731DA0FE}"/>
-              </a:ext>
-            </a:extLst>
-          </p:cNvPr>
-          <p:cNvSpPr>
-            <a:spLocks noGrp="1"/>
-          </p:cNvSpPr>
-          <p:nvPr>
-            <p:ph type="title"/>
-          </p:nvPr>
-        </p:nvSpPr>
-        <p:spPr>
-          <a:xfrm>
-            <a:off x="97340" y="83425"/>
-            <a:ext cx="11010595" cy="1143000"/>
-          </a:xfrm>
-        </p:spPr>
-        <p:txBody>
-          <a:bodyPr/>
-          <a:lstStyle/>
-          <a:p>
-            <a:r>
-              <a:rPr lang="en-US" dirty="0"/>
-              <a:t>Clinical Trials: Tumors</a:t>
-            </a:r>
-          </a:p>
-        </p:txBody>
-      </p:sp>
-      <p:sp>
-        <p:nvSpPr>
-          <p:cNvPr id="3" name="Content Placeholder 2">
-            <a:extLst>
-              <a:ext uri="{FF2B5EF4-FFF2-40B4-BE49-F238E27FC236}">
-                <a16:creationId xmlns:a16="http://schemas.microsoft.com/office/drawing/2014/main" id="{5B98EF3E-4944-E0B4-E5EC-8FE9EBCAF91F}"/>
-              </a:ext>
-            </a:extLst>
-          </p:cNvPr>
-          <p:cNvSpPr>
-            <a:spLocks noGrp="1"/>
-          </p:cNvSpPr>
-          <p:nvPr>
-            <p:ph idx="1"/>
-          </p:nvPr>
-        </p:nvSpPr>
-        <p:spPr>
-          <a:xfrm>
-            <a:off x="216212" y="1481328"/>
-            <a:ext cx="11010595" cy="3895344"/>
-          </a:xfrm>
-        </p:spPr>
-        <p:txBody>
-          <a:bodyPr>
-            <a:normAutofit/>
-          </a:bodyPr>
-          <a:lstStyle/>
-          <a:p>
-            <a:r>
-              <a:rPr lang="en-US" dirty="0">
-                <a:solidFill>
-                  <a:schemeClr val="tx2">
-                    <a:lumMod val="10000"/>
-                  </a:schemeClr>
-                </a:solidFill>
-              </a:rPr>
-              <a:t>Tumors in clinical trials can be obtains from the “conditions” table. </a:t>
-            </a:r>
-          </a:p>
-          <a:p>
-            <a:endParaRPr lang="en-US" dirty="0">
-              <a:solidFill>
-                <a:schemeClr val="tx2">
-                  <a:lumMod val="10000"/>
-                </a:schemeClr>
-              </a:solidFill>
-            </a:endParaRPr>
-          </a:p>
-          <a:p>
-            <a:r>
-              <a:rPr lang="en-US" dirty="0">
-                <a:solidFill>
-                  <a:schemeClr val="tx2">
-                    <a:lumMod val="10000"/>
-                  </a:schemeClr>
-                </a:solidFill>
-              </a:rPr>
-              <a:t>Table is provided in a tab separated text file containing NCT IDs and condition names in down case.</a:t>
-            </a:r>
-          </a:p>
-          <a:p>
-            <a:endParaRPr lang="en-US" dirty="0">
-              <a:solidFill>
-                <a:schemeClr val="tx2">
-                  <a:lumMod val="10000"/>
-                </a:schemeClr>
-              </a:solidFill>
-            </a:endParaRPr>
-          </a:p>
-          <a:p>
-            <a:r>
-              <a:rPr lang="en-US" dirty="0">
-                <a:solidFill>
-                  <a:schemeClr val="tx2">
-                    <a:lumMod val="10000"/>
-                  </a:schemeClr>
-                </a:solidFill>
-              </a:rPr>
-              <a:t>Downloaded data on Aug 22, 2023.  Data is updated monthly. </a:t>
-            </a:r>
-          </a:p>
-          <a:p>
-            <a:endParaRPr lang="en-US" dirty="0">
-              <a:solidFill>
-                <a:schemeClr val="tx2">
-                  <a:lumMod val="10000"/>
-                </a:schemeClr>
-              </a:solidFill>
-            </a:endParaRPr>
-          </a:p>
-          <a:p>
-            <a:pPr marL="0" indent="0">
-              <a:buNone/>
-            </a:pPr>
-            <a:endParaRPr lang="en-US" dirty="0">
-              <a:solidFill>
-                <a:schemeClr val="tx2">
-                  <a:lumMod val="10000"/>
-                </a:schemeClr>
-              </a:solidFill>
-            </a:endParaRPr>
-          </a:p>
-        </p:txBody>
-      </p:sp>
-      <p:sp>
-        <p:nvSpPr>
-          <p:cNvPr id="4" name="Slide Number Placeholder 3">
-            <a:extLst>
-              <a:ext uri="{FF2B5EF4-FFF2-40B4-BE49-F238E27FC236}">
-                <a16:creationId xmlns:a16="http://schemas.microsoft.com/office/drawing/2014/main" id="{634D0B71-ACEA-F9DC-9C3D-F6022E010AFC}"/>
-              </a:ext>
-            </a:extLst>
-          </p:cNvPr>
-          <p:cNvSpPr>
-            <a:spLocks noGrp="1"/>
-          </p:cNvSpPr>
-          <p:nvPr>
-            <p:ph type="sldNum" sz="quarter" idx="12"/>
-          </p:nvPr>
-        </p:nvSpPr>
-        <p:spPr/>
-        <p:txBody>
-          <a:bodyPr/>
-          <a:lstStyle/>
-          <a:p>
-            <a:fld id="{AD40181A-01B0-4CB8-8614-1473649F6741}" type="slidenum">
-              <a:rPr lang="en-US" smtClean="0"/>
-              <a:pPr/>
-              <a:t>8</a:t>
-            </a:fld>
-            <a:endParaRPr lang="en-US" dirty="0"/>
-          </a:p>
-        </p:txBody>
-      </p:sp>
-    </p:spTree>
-    <p:extLst>
-      <p:ext uri="{BB962C8B-B14F-4D97-AF65-F5344CB8AC3E}">
-        <p14:creationId xmlns:p14="http://schemas.microsoft.com/office/powerpoint/2010/main" val="1830375812"/>
-      </p:ext>
-    </p:extLst>
-  </p:cSld>
-  <p:clrMapOvr>
-    <a:masterClrMapping/>
-  </p:clrMapOvr>
-</p:sld>
-</file>
-
-<file path=ppt/slides/slide9.xml><?xml version="1.0" encoding="utf-8"?>
-<p:sld xmlns:a="http://schemas.openxmlformats.org/drawingml/2006/main" xmlns:r="http://schemas.openxmlformats.org/officeDocument/2006/relationships" xmlns:p="http://schemas.openxmlformats.org/presentationml/2006/main">
-  <p:cSld>
-    <p:spTree>
-      <p:nvGrpSpPr>
         <p:cNvPr id="1" name="">
           <a:extLst>
             <a:ext uri="{FF2B5EF4-FFF2-40B4-BE49-F238E27FC236}">
@@ -2701,7 +2687,7 @@
           <a:p>
             <a:r>
               <a:rPr lang="en-US" dirty="0"/>
-              <a:t>Clinical Trials: Tumors</a:t>
+              <a:t>Clinical Trials: Conditions to Tumors</a:t>
             </a:r>
           </a:p>
         </p:txBody>
@@ -2730,7 +2716,7 @@
         </p:spPr>
         <p:txBody>
           <a:bodyPr>
-            <a:normAutofit/>
+            <a:normAutofit lnSpcReduction="10000"/>
           </a:bodyPr>
           <a:lstStyle/>
           <a:p>
@@ -2797,6 +2783,27 @@
             </a:endParaRPr>
           </a:p>
           <a:p>
+            <a:r>
+              <a:rPr lang="en-US" dirty="0">
+                <a:solidFill>
+                  <a:schemeClr val="tx2">
+                    <a:lumMod val="10000"/>
+                  </a:schemeClr>
+                </a:solidFill>
+              </a:rPr>
+              <a:t>Retrieved 107257 unique conditions.</a:t>
+            </a:r>
+          </a:p>
+          <a:p>
+            <a:endParaRPr lang="en-US" dirty="0">
+              <a:solidFill>
+                <a:schemeClr val="tx2">
+                  <a:lumMod val="10000"/>
+                </a:schemeClr>
+              </a:solidFill>
+            </a:endParaRPr>
+          </a:p>
+          <a:p>
             <a:pPr marL="0" indent="0">
               <a:buNone/>
             </a:pPr>
@@ -2834,7 +2841,7 @@
             <a:fld id="{AD40181A-01B0-4CB8-8614-1473649F6741}" type="slidenum">
               <a:rPr lang="en-US" smtClean="0"/>
               <a:pPr/>
-              <a:t>9</a:t>
+              <a:t>8</a:t>
             </a:fld>
             <a:endParaRPr lang="en-US" dirty="0"/>
           </a:p>
@@ -2844,6 +2851,185 @@
     <p:extLst>
       <p:ext uri="{BB962C8B-B14F-4D97-AF65-F5344CB8AC3E}">
         <p14:creationId xmlns:p14="http://schemas.microsoft.com/office/powerpoint/2010/main" val="323955064"/>
+      </p:ext>
+    </p:extLst>
+  </p:cSld>
+  <p:clrMapOvr>
+    <a:masterClrMapping/>
+  </p:clrMapOvr>
+</p:sld>
+</file>
+
+<file path=ppt/slides/slide9.xml><?xml version="1.0" encoding="utf-8"?>
+<p:sld xmlns:a="http://schemas.openxmlformats.org/drawingml/2006/main" xmlns:r="http://schemas.openxmlformats.org/officeDocument/2006/relationships" xmlns:p="http://schemas.openxmlformats.org/presentationml/2006/main">
+  <p:cSld>
+    <p:spTree>
+      <p:nvGrpSpPr>
+        <p:cNvPr id="1" name=""/>
+        <p:cNvGrpSpPr/>
+        <p:nvPr/>
+      </p:nvGrpSpPr>
+      <p:grpSpPr>
+        <a:xfrm>
+          <a:off x="0" y="0"/>
+          <a:ext cx="0" cy="0"/>
+          <a:chOff x="0" y="0"/>
+          <a:chExt cx="0" cy="0"/>
+        </a:xfrm>
+      </p:grpSpPr>
+      <p:sp>
+        <p:nvSpPr>
+          <p:cNvPr id="2" name="Title 1">
+            <a:extLst>
+              <a:ext uri="{FF2B5EF4-FFF2-40B4-BE49-F238E27FC236}">
+                <a16:creationId xmlns:a16="http://schemas.microsoft.com/office/drawing/2014/main" id="{5CF1118B-94CB-4D02-25D2-EBED731DA0FE}"/>
+              </a:ext>
+            </a:extLst>
+          </p:cNvPr>
+          <p:cNvSpPr>
+            <a:spLocks noGrp="1"/>
+          </p:cNvSpPr>
+          <p:nvPr>
+            <p:ph type="title"/>
+          </p:nvPr>
+        </p:nvSpPr>
+        <p:spPr>
+          <a:xfrm>
+            <a:off x="97340" y="83425"/>
+            <a:ext cx="11010595" cy="1143000"/>
+          </a:xfrm>
+        </p:spPr>
+        <p:txBody>
+          <a:bodyPr/>
+          <a:lstStyle/>
+          <a:p>
+            <a:r>
+              <a:rPr lang="en-US" dirty="0"/>
+              <a:t>Clinical Trials: Conditions to Tumors</a:t>
+            </a:r>
+          </a:p>
+        </p:txBody>
+      </p:sp>
+      <p:sp>
+        <p:nvSpPr>
+          <p:cNvPr id="3" name="Content Placeholder 2">
+            <a:extLst>
+              <a:ext uri="{FF2B5EF4-FFF2-40B4-BE49-F238E27FC236}">
+                <a16:creationId xmlns:a16="http://schemas.microsoft.com/office/drawing/2014/main" id="{5B98EF3E-4944-E0B4-E5EC-8FE9EBCAF91F}"/>
+              </a:ext>
+            </a:extLst>
+          </p:cNvPr>
+          <p:cNvSpPr>
+            <a:spLocks noGrp="1"/>
+          </p:cNvSpPr>
+          <p:nvPr>
+            <p:ph idx="1"/>
+          </p:nvPr>
+        </p:nvSpPr>
+        <p:spPr>
+          <a:xfrm>
+            <a:off x="216212" y="1481328"/>
+            <a:ext cx="11010595" cy="3895344"/>
+          </a:xfrm>
+        </p:spPr>
+        <p:txBody>
+          <a:bodyPr>
+            <a:normAutofit/>
+          </a:bodyPr>
+          <a:lstStyle/>
+          <a:p>
+            <a:endParaRPr lang="en-US" dirty="0">
+              <a:solidFill>
+                <a:schemeClr val="tx2">
+                  <a:lumMod val="10000"/>
+                </a:schemeClr>
+              </a:solidFill>
+            </a:endParaRPr>
+          </a:p>
+          <a:p>
+            <a:pPr marL="0" indent="0">
+              <a:buNone/>
+            </a:pPr>
+            <a:endParaRPr lang="en-US" dirty="0">
+              <a:solidFill>
+                <a:schemeClr val="tx2">
+                  <a:lumMod val="10000"/>
+                </a:schemeClr>
+              </a:solidFill>
+            </a:endParaRPr>
+          </a:p>
+        </p:txBody>
+      </p:sp>
+      <p:sp>
+        <p:nvSpPr>
+          <p:cNvPr id="4" name="Slide Number Placeholder 3">
+            <a:extLst>
+              <a:ext uri="{FF2B5EF4-FFF2-40B4-BE49-F238E27FC236}">
+                <a16:creationId xmlns:a16="http://schemas.microsoft.com/office/drawing/2014/main" id="{634D0B71-ACEA-F9DC-9C3D-F6022E010AFC}"/>
+              </a:ext>
+            </a:extLst>
+          </p:cNvPr>
+          <p:cNvSpPr>
+            <a:spLocks noGrp="1"/>
+          </p:cNvSpPr>
+          <p:nvPr>
+            <p:ph type="sldNum" sz="quarter" idx="12"/>
+          </p:nvPr>
+        </p:nvSpPr>
+        <p:spPr/>
+        <p:txBody>
+          <a:bodyPr/>
+          <a:lstStyle/>
+          <a:p>
+            <a:fld id="{AD40181A-01B0-4CB8-8614-1473649F6741}" type="slidenum">
+              <a:rPr lang="en-US" smtClean="0"/>
+              <a:pPr/>
+              <a:t>9</a:t>
+            </a:fld>
+            <a:endParaRPr lang="en-US" dirty="0"/>
+          </a:p>
+        </p:txBody>
+      </p:sp>
+      <p:pic>
+        <p:nvPicPr>
+          <p:cNvPr id="10" name="Picture 9" descr="A diagram of a company&#10;&#10;Description automatically generated">
+            <a:extLst>
+              <a:ext uri="{FF2B5EF4-FFF2-40B4-BE49-F238E27FC236}">
+                <a16:creationId xmlns:a16="http://schemas.microsoft.com/office/drawing/2014/main" id="{3FA3197B-57D4-8AC7-9028-AAEC7CC76E40}"/>
+              </a:ext>
+            </a:extLst>
+          </p:cNvPr>
+          <p:cNvPicPr>
+            <a:picLocks noChangeAspect="1"/>
+          </p:cNvPicPr>
+          <p:nvPr/>
+        </p:nvPicPr>
+        <p:blipFill>
+          <a:blip r:embed="rId2">
+            <a:extLst>
+              <a:ext uri="{28A0092B-C50C-407E-A947-70E740481C1C}">
+                <a14:useLocalDpi xmlns:a14="http://schemas.microsoft.com/office/drawing/2010/main" val="0"/>
+              </a:ext>
+            </a:extLst>
+          </a:blip>
+          <a:stretch>
+            <a:fillRect/>
+          </a:stretch>
+        </p:blipFill>
+        <p:spPr>
+          <a:xfrm>
+            <a:off x="216212" y="1116132"/>
+            <a:ext cx="12059505" cy="4625736"/>
+          </a:xfrm>
+          <a:prstGeom prst="rect">
+            <a:avLst/>
+          </a:prstGeom>
+        </p:spPr>
+      </p:pic>
+    </p:spTree>
+    <p:extLst>
+      <p:ext uri="{BB962C8B-B14F-4D97-AF65-F5344CB8AC3E}">
+        <p14:creationId xmlns:p14="http://schemas.microsoft.com/office/powerpoint/2010/main" val="1830375812"/>
       </p:ext>
     </p:extLst>
   </p:cSld>

</xml_diff>

<commit_message>
adding unstandardized tumor names
</commit_message>
<xml_diff>
--- a/presentations/BIG_2024.pptx
+++ b/presentations/BIG_2024.pptx
@@ -1686,89 +1686,6 @@
       </p:sp>
       <p:sp>
         <p:nvSpPr>
-          <p:cNvPr id="3" name="Content Placeholder 2">
-            <a:extLst>
-              <a:ext uri="{FF2B5EF4-FFF2-40B4-BE49-F238E27FC236}">
-                <a16:creationId xmlns:a16="http://schemas.microsoft.com/office/drawing/2014/main" id="{CE4BFE00-154C-B280-D403-E23154AC4FEA}"/>
-              </a:ext>
-            </a:extLst>
-          </p:cNvPr>
-          <p:cNvSpPr>
-            <a:spLocks noGrp="1"/>
-          </p:cNvSpPr>
-          <p:nvPr>
-            <p:ph idx="1"/>
-          </p:nvPr>
-        </p:nvSpPr>
-        <p:spPr>
-          <a:xfrm>
-            <a:off x="216212" y="1481328"/>
-            <a:ext cx="11010595" cy="3895344"/>
-          </a:xfrm>
-        </p:spPr>
-        <p:txBody>
-          <a:bodyPr>
-            <a:normAutofit/>
-          </a:bodyPr>
-          <a:lstStyle/>
-          <a:p>
-            <a:r>
-              <a:rPr lang="en-US" dirty="0">
-                <a:solidFill>
-                  <a:schemeClr val="tx2">
-                    <a:lumMod val="10000"/>
-                  </a:schemeClr>
-                </a:solidFill>
-              </a:rPr>
-              <a:t>Tumors in clinical trials can be obtains from the “conditions” table. </a:t>
-            </a:r>
-          </a:p>
-          <a:p>
-            <a:endParaRPr lang="en-US" dirty="0">
-              <a:solidFill>
-                <a:schemeClr val="tx2">
-                  <a:lumMod val="10000"/>
-                </a:schemeClr>
-              </a:solidFill>
-            </a:endParaRPr>
-          </a:p>
-          <a:p>
-            <a:pPr marL="0" indent="0">
-              <a:buNone/>
-            </a:pPr>
-            <a:endParaRPr lang="en-US" dirty="0">
-              <a:solidFill>
-                <a:schemeClr val="tx2">
-                  <a:lumMod val="10000"/>
-                </a:schemeClr>
-              </a:solidFill>
-            </a:endParaRPr>
-          </a:p>
-          <a:p>
-            <a:endParaRPr lang="en-US" dirty="0">
-              <a:solidFill>
-                <a:schemeClr val="tx2">
-                  <a:lumMod val="10000"/>
-                </a:schemeClr>
-              </a:solidFill>
-            </a:endParaRPr>
-          </a:p>
-          <a:p>
-            <a:pPr marL="0" indent="0">
-              <a:buNone/>
-            </a:pPr>
-            <a:endParaRPr lang="en-US" dirty="0">
-              <a:solidFill>
-                <a:schemeClr val="tx2">
-                  <a:lumMod val="10000"/>
-                </a:schemeClr>
-              </a:solidFill>
-            </a:endParaRPr>
-          </a:p>
-        </p:txBody>
-      </p:sp>
-      <p:sp>
-        <p:nvSpPr>
           <p:cNvPr id="4" name="Slide Number Placeholder 3">
             <a:extLst>
               <a:ext uri="{FF2B5EF4-FFF2-40B4-BE49-F238E27FC236}">
@@ -1797,6 +1714,1499 @@
           </a:p>
         </p:txBody>
       </p:sp>
+      <p:graphicFrame>
+        <p:nvGraphicFramePr>
+          <p:cNvPr id="7" name="Table 6">
+            <a:extLst>
+              <a:ext uri="{FF2B5EF4-FFF2-40B4-BE49-F238E27FC236}">
+                <a16:creationId xmlns:a16="http://schemas.microsoft.com/office/drawing/2014/main" id="{355E85FD-6C57-7E5C-25FD-E5646B54F702}"/>
+              </a:ext>
+            </a:extLst>
+          </p:cNvPr>
+          <p:cNvGraphicFramePr>
+            <a:graphicFrameLocks noGrp="1"/>
+          </p:cNvGraphicFramePr>
+          <p:nvPr>
+            <p:extLst>
+              <p:ext uri="{D42A27DB-BD31-4B8C-83A1-F6EECF244321}">
+                <p14:modId xmlns:p14="http://schemas.microsoft.com/office/powerpoint/2010/main" val="881436295"/>
+              </p:ext>
+            </p:extLst>
+          </p:nvPr>
+        </p:nvGraphicFramePr>
+        <p:xfrm>
+          <a:off x="408479" y="1226425"/>
+          <a:ext cx="8098523" cy="3892555"/>
+        </p:xfrm>
+        <a:graphic>
+          <a:graphicData uri="http://schemas.openxmlformats.org/drawingml/2006/table">
+            <a:tbl>
+              <a:tblPr firstRow="1" bandRow="1">
+                <a:tableStyleId>{5C22544A-7EE6-4342-B048-85BDC9FD1C3A}</a:tableStyleId>
+              </a:tblPr>
+              <a:tblGrid>
+                <a:gridCol w="1319047">
+                  <a:extLst>
+                    <a:ext uri="{9D8B030D-6E8A-4147-A177-3AD203B41FA5}">
+                      <a16:colId xmlns:a16="http://schemas.microsoft.com/office/drawing/2014/main" val="4021694754"/>
+                    </a:ext>
+                  </a:extLst>
+                </a:gridCol>
+                <a:gridCol w="1466845">
+                  <a:extLst>
+                    <a:ext uri="{9D8B030D-6E8A-4147-A177-3AD203B41FA5}">
+                      <a16:colId xmlns:a16="http://schemas.microsoft.com/office/drawing/2014/main" val="3295535630"/>
+                    </a:ext>
+                  </a:extLst>
+                </a:gridCol>
+                <a:gridCol w="5312631">
+                  <a:extLst>
+                    <a:ext uri="{9D8B030D-6E8A-4147-A177-3AD203B41FA5}">
+                      <a16:colId xmlns:a16="http://schemas.microsoft.com/office/drawing/2014/main" val="1958709931"/>
+                    </a:ext>
+                  </a:extLst>
+                </a:gridCol>
+              </a:tblGrid>
+              <a:tr h="346537">
+                <a:tc>
+                  <a:txBody>
+                    <a:bodyPr/>
+                    <a:lstStyle/>
+                    <a:p>
+                      <a:r>
+                        <a:rPr lang="en-US" dirty="0"/>
+                        <a:t>ID</a:t>
+                      </a:r>
+                    </a:p>
+                  </a:txBody>
+                  <a:tcPr/>
+                </a:tc>
+                <a:tc>
+                  <a:txBody>
+                    <a:bodyPr/>
+                    <a:lstStyle/>
+                    <a:p>
+                      <a:r>
+                        <a:rPr lang="en-US" dirty="0"/>
+                        <a:t>NCT ID</a:t>
+                      </a:r>
+                    </a:p>
+                  </a:txBody>
+                  <a:tcPr/>
+                </a:tc>
+                <a:tc>
+                  <a:txBody>
+                    <a:bodyPr/>
+                    <a:lstStyle/>
+                    <a:p>
+                      <a:r>
+                        <a:rPr lang="en-US" dirty="0"/>
+                        <a:t>Condition</a:t>
+                      </a:r>
+                    </a:p>
+                  </a:txBody>
+                  <a:tcPr/>
+                </a:tc>
+                <a:extLst>
+                  <a:ext uri="{0D108BD9-81ED-4DB2-BD59-A6C34878D82A}">
+                    <a16:rowId xmlns:a16="http://schemas.microsoft.com/office/drawing/2014/main" val="655386625"/>
+                  </a:ext>
+                </a:extLst>
+              </a:tr>
+              <a:tr h="258465">
+                <a:tc>
+                  <a:txBody>
+                    <a:bodyPr/>
+                    <a:lstStyle/>
+                    <a:p>
+                      <a:pPr marL="0" algn="r" defTabSz="914400" rtl="0" eaLnBrk="1" fontAlgn="t" latinLnBrk="0" hangingPunct="1">
+                        <a:spcBef>
+                          <a:spcPts val="0"/>
+                        </a:spcBef>
+                        <a:spcAft>
+                          <a:spcPts val="2700"/>
+                        </a:spcAft>
+                      </a:pPr>
+                      <a:r>
+                        <a:rPr lang="en-US" sz="900" b="1" i="0" u="none" strike="noStrike" kern="1200" dirty="0">
+                          <a:solidFill>
+                            <a:srgbClr val="000000"/>
+                          </a:solidFill>
+                          <a:effectLst/>
+                          <a:latin typeface="+mj-lt"/>
+                          <a:ea typeface="+mn-ea"/>
+                          <a:cs typeface="+mn-cs"/>
+                        </a:rPr>
+                        <a:t>4159811</a:t>
+                      </a:r>
+                    </a:p>
+                  </a:txBody>
+                  <a:tcPr marL="50800" marR="50800" marT="38100" marB="38100"/>
+                </a:tc>
+                <a:tc>
+                  <a:txBody>
+                    <a:bodyPr/>
+                    <a:lstStyle/>
+                    <a:p>
+                      <a:pPr marL="0" algn="r" defTabSz="914400" rtl="0" eaLnBrk="1" fontAlgn="t" latinLnBrk="0" hangingPunct="1">
+                        <a:spcBef>
+                          <a:spcPts val="0"/>
+                        </a:spcBef>
+                        <a:spcAft>
+                          <a:spcPts val="2700"/>
+                        </a:spcAft>
+                      </a:pPr>
+                      <a:r>
+                        <a:rPr lang="en-US" sz="900" b="1" i="0" u="none" strike="noStrike" kern="1200" dirty="0">
+                          <a:solidFill>
+                            <a:srgbClr val="000000"/>
+                          </a:solidFill>
+                          <a:effectLst/>
+                          <a:latin typeface="+mj-lt"/>
+                          <a:ea typeface="+mn-ea"/>
+                          <a:cs typeface="+mn-cs"/>
+                        </a:rPr>
+                        <a:t>NCT03449069</a:t>
+                      </a:r>
+                    </a:p>
+                  </a:txBody>
+                  <a:tcPr marL="50800" marR="50800" marT="38100" marB="38100"/>
+                </a:tc>
+                <a:tc>
+                  <a:txBody>
+                    <a:bodyPr/>
+                    <a:lstStyle/>
+                    <a:p>
+                      <a:r>
+                        <a:rPr lang="en-US" sz="900" b="1" i="0" u="none" strike="noStrike" kern="1200" dirty="0" err="1">
+                          <a:solidFill>
+                            <a:schemeClr val="dk1"/>
+                          </a:solidFill>
+                          <a:effectLst/>
+                          <a:latin typeface="+mj-lt"/>
+                          <a:ea typeface="+mn-ea"/>
+                          <a:cs typeface="+mn-cs"/>
+                        </a:rPr>
+                        <a:t>crohn</a:t>
+                      </a:r>
+                      <a:r>
+                        <a:rPr lang="en-US" sz="900" b="1" i="0" u="none" strike="noStrike" kern="1200" dirty="0">
+                          <a:solidFill>
+                            <a:schemeClr val="dk1"/>
+                          </a:solidFill>
+                          <a:effectLst/>
+                          <a:latin typeface="+mj-lt"/>
+                          <a:ea typeface="+mn-ea"/>
+                          <a:cs typeface="+mn-cs"/>
+                        </a:rPr>
+                        <a:t> disease</a:t>
+                      </a:r>
+                      <a:endParaRPr lang="en-US" sz="900" dirty="0">
+                        <a:latin typeface="+mj-lt"/>
+                      </a:endParaRPr>
+                    </a:p>
+                  </a:txBody>
+                  <a:tcPr/>
+                </a:tc>
+                <a:extLst>
+                  <a:ext uri="{0D108BD9-81ED-4DB2-BD59-A6C34878D82A}">
+                    <a16:rowId xmlns:a16="http://schemas.microsoft.com/office/drawing/2014/main" val="134416144"/>
+                  </a:ext>
+                </a:extLst>
+              </a:tr>
+              <a:tr h="216586">
+                <a:tc>
+                  <a:txBody>
+                    <a:bodyPr/>
+                    <a:lstStyle/>
+                    <a:p>
+                      <a:pPr marL="0" algn="r" defTabSz="914400" rtl="0" eaLnBrk="1" fontAlgn="t" latinLnBrk="0" hangingPunct="1">
+                        <a:spcBef>
+                          <a:spcPts val="0"/>
+                        </a:spcBef>
+                        <a:spcAft>
+                          <a:spcPts val="2700"/>
+                        </a:spcAft>
+                      </a:pPr>
+                      <a:r>
+                        <a:rPr lang="en-US" sz="900" b="1" i="0" u="none" strike="noStrike" kern="1200" dirty="0">
+                          <a:solidFill>
+                            <a:srgbClr val="000000"/>
+                          </a:solidFill>
+                          <a:effectLst/>
+                          <a:latin typeface="+mj-lt"/>
+                          <a:ea typeface="+mn-ea"/>
+                          <a:cs typeface="+mn-cs"/>
+                        </a:rPr>
+                        <a:t>54148559</a:t>
+                      </a:r>
+                    </a:p>
+                  </a:txBody>
+                  <a:tcPr marL="50800" marR="50800" marT="38100" marB="38100"/>
+                </a:tc>
+                <a:tc>
+                  <a:txBody>
+                    <a:bodyPr/>
+                    <a:lstStyle/>
+                    <a:p>
+                      <a:pPr marL="0" algn="r" defTabSz="914400" rtl="0" eaLnBrk="1" fontAlgn="t" latinLnBrk="0" hangingPunct="1">
+                        <a:spcBef>
+                          <a:spcPts val="0"/>
+                        </a:spcBef>
+                        <a:spcAft>
+                          <a:spcPts val="2700"/>
+                        </a:spcAft>
+                      </a:pPr>
+                      <a:r>
+                        <a:rPr lang="en-US" sz="900" b="1" i="0" u="none" strike="noStrike" kern="1200" dirty="0">
+                          <a:solidFill>
+                            <a:srgbClr val="000000"/>
+                          </a:solidFill>
+                          <a:effectLst/>
+                          <a:latin typeface="+mj-lt"/>
+                          <a:ea typeface="+mn-ea"/>
+                          <a:cs typeface="+mn-cs"/>
+                        </a:rPr>
+                        <a:t>NCT05806385</a:t>
+                      </a:r>
+                    </a:p>
+                  </a:txBody>
+                  <a:tcPr marL="50800" marR="50800" marT="38100" marB="38100"/>
+                </a:tc>
+                <a:tc>
+                  <a:txBody>
+                    <a:bodyPr/>
+                    <a:lstStyle/>
+                    <a:p>
+                      <a:r>
+                        <a:rPr lang="en-US" sz="900" b="1" i="0" u="none" strike="noStrike" kern="1200" dirty="0">
+                          <a:solidFill>
+                            <a:schemeClr val="dk1"/>
+                          </a:solidFill>
+                          <a:effectLst/>
+                          <a:latin typeface="+mj-lt"/>
+                          <a:ea typeface="+mn-ea"/>
+                          <a:cs typeface="+mn-cs"/>
+                        </a:rPr>
+                        <a:t>triple negative breast cancer</a:t>
+                      </a:r>
+                      <a:endParaRPr lang="en-US" sz="900" dirty="0">
+                        <a:latin typeface="+mj-lt"/>
+                      </a:endParaRPr>
+                    </a:p>
+                  </a:txBody>
+                  <a:tcPr/>
+                </a:tc>
+                <a:extLst>
+                  <a:ext uri="{0D108BD9-81ED-4DB2-BD59-A6C34878D82A}">
+                    <a16:rowId xmlns:a16="http://schemas.microsoft.com/office/drawing/2014/main" val="2293699420"/>
+                  </a:ext>
+                </a:extLst>
+              </a:tr>
+              <a:tr h="216586">
+                <a:tc>
+                  <a:txBody>
+                    <a:bodyPr/>
+                    <a:lstStyle/>
+                    <a:p>
+                      <a:pPr marL="0" algn="r" defTabSz="914400" rtl="0" eaLnBrk="1" fontAlgn="t" latinLnBrk="0" hangingPunct="1">
+                        <a:spcBef>
+                          <a:spcPts val="0"/>
+                        </a:spcBef>
+                        <a:spcAft>
+                          <a:spcPts val="2700"/>
+                        </a:spcAft>
+                      </a:pPr>
+                      <a:r>
+                        <a:rPr lang="en-US" sz="900" b="1" i="0" u="none" strike="noStrike" kern="1200" dirty="0">
+                          <a:solidFill>
+                            <a:srgbClr val="000000"/>
+                          </a:solidFill>
+                          <a:effectLst/>
+                          <a:latin typeface="+mj-lt"/>
+                          <a:ea typeface="+mn-ea"/>
+                          <a:cs typeface="+mn-cs"/>
+                        </a:rPr>
+                        <a:t>54158880</a:t>
+                      </a:r>
+                    </a:p>
+                  </a:txBody>
+                  <a:tcPr marL="50800" marR="50800" marT="38100" marB="38100"/>
+                </a:tc>
+                <a:tc>
+                  <a:txBody>
+                    <a:bodyPr/>
+                    <a:lstStyle/>
+                    <a:p>
+                      <a:pPr marL="0" algn="r" defTabSz="914400" rtl="0" eaLnBrk="1" fontAlgn="t" latinLnBrk="0" hangingPunct="1">
+                        <a:spcBef>
+                          <a:spcPts val="0"/>
+                        </a:spcBef>
+                        <a:spcAft>
+                          <a:spcPts val="2700"/>
+                        </a:spcAft>
+                      </a:pPr>
+                      <a:r>
+                        <a:rPr lang="en-US" sz="900" b="1" i="0" u="none" strike="noStrike" kern="1200" dirty="0">
+                          <a:solidFill>
+                            <a:srgbClr val="000000"/>
+                          </a:solidFill>
+                          <a:effectLst/>
+                          <a:latin typeface="+mj-lt"/>
+                          <a:ea typeface="+mn-ea"/>
+                          <a:cs typeface="+mn-cs"/>
+                        </a:rPr>
+                        <a:t>NCT04529772</a:t>
+                      </a:r>
+                    </a:p>
+                  </a:txBody>
+                  <a:tcPr marL="50800" marR="50800" marT="38100" marB="38100"/>
+                </a:tc>
+                <a:tc>
+                  <a:txBody>
+                    <a:bodyPr/>
+                    <a:lstStyle/>
+                    <a:p>
+                      <a:r>
+                        <a:rPr lang="en-US" sz="900" b="1" i="0" u="none" strike="noStrike" kern="1200" dirty="0">
+                          <a:solidFill>
+                            <a:schemeClr val="dk1"/>
+                          </a:solidFill>
+                          <a:effectLst/>
+                          <a:latin typeface="+mj-lt"/>
+                          <a:ea typeface="+mn-ea"/>
+                          <a:cs typeface="+mn-cs"/>
+                        </a:rPr>
+                        <a:t>diffuse large b-cell lymphoma</a:t>
+                      </a:r>
+                      <a:endParaRPr lang="en-US" sz="900" dirty="0">
+                        <a:latin typeface="+mj-lt"/>
+                      </a:endParaRPr>
+                    </a:p>
+                  </a:txBody>
+                  <a:tcPr/>
+                </a:tc>
+                <a:extLst>
+                  <a:ext uri="{0D108BD9-81ED-4DB2-BD59-A6C34878D82A}">
+                    <a16:rowId xmlns:a16="http://schemas.microsoft.com/office/drawing/2014/main" val="1942469672"/>
+                  </a:ext>
+                </a:extLst>
+              </a:tr>
+              <a:tr h="228754">
+                <a:tc>
+                  <a:txBody>
+                    <a:bodyPr/>
+                    <a:lstStyle/>
+                    <a:p>
+                      <a:pPr marL="0" algn="r" defTabSz="914400" rtl="0" eaLnBrk="1" fontAlgn="t" latinLnBrk="0" hangingPunct="1">
+                        <a:spcBef>
+                          <a:spcPts val="0"/>
+                        </a:spcBef>
+                        <a:spcAft>
+                          <a:spcPts val="2700"/>
+                        </a:spcAft>
+                      </a:pPr>
+                      <a:r>
+                        <a:rPr lang="en-US" sz="900" b="1" i="0" u="none" strike="noStrike" kern="1200" dirty="0">
+                          <a:solidFill>
+                            <a:srgbClr val="000000"/>
+                          </a:solidFill>
+                          <a:effectLst/>
+                          <a:latin typeface="+mj-lt"/>
+                          <a:ea typeface="+mn-ea"/>
+                          <a:cs typeface="+mn-cs"/>
+                        </a:rPr>
+                        <a:t>54174814</a:t>
+                      </a:r>
+                    </a:p>
+                  </a:txBody>
+                  <a:tcPr marL="50800" marR="50800" marT="38100" marB="38100"/>
+                </a:tc>
+                <a:tc>
+                  <a:txBody>
+                    <a:bodyPr/>
+                    <a:lstStyle/>
+                    <a:p>
+                      <a:pPr marL="0" algn="r" defTabSz="914400" rtl="0" eaLnBrk="1" fontAlgn="t" latinLnBrk="0" hangingPunct="1">
+                        <a:spcBef>
+                          <a:spcPts val="0"/>
+                        </a:spcBef>
+                        <a:spcAft>
+                          <a:spcPts val="2700"/>
+                        </a:spcAft>
+                      </a:pPr>
+                      <a:r>
+                        <a:rPr lang="en-US" sz="900" b="1" i="0" u="none" strike="noStrike" kern="1200" dirty="0">
+                          <a:solidFill>
+                            <a:srgbClr val="000000"/>
+                          </a:solidFill>
+                          <a:effectLst/>
+                          <a:latin typeface="+mj-lt"/>
+                          <a:ea typeface="+mn-ea"/>
+                          <a:cs typeface="+mn-cs"/>
+                        </a:rPr>
+                        <a:t>NCT04317313</a:t>
+                      </a:r>
+                    </a:p>
+                  </a:txBody>
+                  <a:tcPr marL="50800" marR="50800" marT="38100" marB="38100"/>
+                </a:tc>
+                <a:tc>
+                  <a:txBody>
+                    <a:bodyPr/>
+                    <a:lstStyle/>
+                    <a:p>
+                      <a:r>
+                        <a:rPr lang="en-US" sz="900" b="1" i="0" u="none" strike="noStrike" kern="1200" dirty="0">
+                          <a:solidFill>
+                            <a:schemeClr val="dk1"/>
+                          </a:solidFill>
+                          <a:effectLst/>
+                          <a:latin typeface="+mj-lt"/>
+                          <a:ea typeface="+mn-ea"/>
+                          <a:cs typeface="+mn-cs"/>
+                        </a:rPr>
+                        <a:t>lymphoma, large b-cell, diffuse</a:t>
+                      </a:r>
+                      <a:endParaRPr lang="en-US" sz="900" dirty="0">
+                        <a:latin typeface="+mj-lt"/>
+                      </a:endParaRPr>
+                    </a:p>
+                  </a:txBody>
+                  <a:tcPr/>
+                </a:tc>
+                <a:extLst>
+                  <a:ext uri="{0D108BD9-81ED-4DB2-BD59-A6C34878D82A}">
+                    <a16:rowId xmlns:a16="http://schemas.microsoft.com/office/drawing/2014/main" val="115465766"/>
+                  </a:ext>
+                </a:extLst>
+              </a:tr>
+              <a:tr h="223886">
+                <a:tc>
+                  <a:txBody>
+                    <a:bodyPr/>
+                    <a:lstStyle/>
+                    <a:p>
+                      <a:pPr marL="0" algn="r" defTabSz="914400" rtl="0" eaLnBrk="1" fontAlgn="t" latinLnBrk="0" hangingPunct="1">
+                        <a:spcBef>
+                          <a:spcPts val="0"/>
+                        </a:spcBef>
+                        <a:spcAft>
+                          <a:spcPts val="2700"/>
+                        </a:spcAft>
+                      </a:pPr>
+                      <a:r>
+                        <a:rPr lang="en-US" sz="900" b="1" i="0" u="none" strike="noStrike" kern="1200" dirty="0">
+                          <a:solidFill>
+                            <a:srgbClr val="000000"/>
+                          </a:solidFill>
+                          <a:effectLst/>
+                          <a:latin typeface="+mj-lt"/>
+                          <a:ea typeface="+mn-ea"/>
+                          <a:cs typeface="+mn-cs"/>
+                        </a:rPr>
+                        <a:t>54159226</a:t>
+                      </a:r>
+                    </a:p>
+                  </a:txBody>
+                  <a:tcPr/>
+                </a:tc>
+                <a:tc>
+                  <a:txBody>
+                    <a:bodyPr/>
+                    <a:lstStyle/>
+                    <a:p>
+                      <a:pPr marL="0" algn="r" defTabSz="914400" rtl="0" eaLnBrk="1" fontAlgn="t" latinLnBrk="0" hangingPunct="1">
+                        <a:spcBef>
+                          <a:spcPts val="0"/>
+                        </a:spcBef>
+                        <a:spcAft>
+                          <a:spcPts val="2700"/>
+                        </a:spcAft>
+                      </a:pPr>
+                      <a:r>
+                        <a:rPr lang="en-US" sz="900" b="1" i="0" u="none" strike="noStrike" kern="1200" dirty="0">
+                          <a:solidFill>
+                            <a:srgbClr val="000000"/>
+                          </a:solidFill>
+                          <a:effectLst/>
+                          <a:latin typeface="+mj-lt"/>
+                          <a:ea typeface="+mn-ea"/>
+                          <a:cs typeface="+mn-cs"/>
+                        </a:rPr>
+                        <a:t>NCT04139304</a:t>
+                      </a:r>
+                    </a:p>
+                  </a:txBody>
+                  <a:tcPr/>
+                </a:tc>
+                <a:tc>
+                  <a:txBody>
+                    <a:bodyPr/>
+                    <a:lstStyle/>
+                    <a:p>
+                      <a:r>
+                        <a:rPr lang="en-US" sz="900" b="1" i="0" u="none" strike="noStrike" kern="1200" dirty="0">
+                          <a:solidFill>
+                            <a:schemeClr val="dk1"/>
+                          </a:solidFill>
+                          <a:effectLst/>
+                          <a:latin typeface="+mj-lt"/>
+                          <a:ea typeface="+mn-ea"/>
+                          <a:cs typeface="+mn-cs"/>
+                        </a:rPr>
+                        <a:t>Ann Arbor Stage II Diffuse Large B-Cell Lymphoma</a:t>
+                      </a:r>
+                      <a:endParaRPr lang="en-US" sz="900" dirty="0">
+                        <a:latin typeface="+mj-lt"/>
+                      </a:endParaRPr>
+                    </a:p>
+                  </a:txBody>
+                  <a:tcPr/>
+                </a:tc>
+                <a:extLst>
+                  <a:ext uri="{0D108BD9-81ED-4DB2-BD59-A6C34878D82A}">
+                    <a16:rowId xmlns:a16="http://schemas.microsoft.com/office/drawing/2014/main" val="3317250268"/>
+                  </a:ext>
+                </a:extLst>
+              </a:tr>
+              <a:tr h="216586">
+                <a:tc>
+                  <a:txBody>
+                    <a:bodyPr/>
+                    <a:lstStyle/>
+                    <a:p>
+                      <a:pPr marL="0" algn="r" defTabSz="914400" rtl="0" eaLnBrk="1" fontAlgn="t" latinLnBrk="0" hangingPunct="1">
+                        <a:spcBef>
+                          <a:spcPts val="0"/>
+                        </a:spcBef>
+                        <a:spcAft>
+                          <a:spcPts val="2700"/>
+                        </a:spcAft>
+                      </a:pPr>
+                      <a:r>
+                        <a:rPr lang="en-US" sz="900" b="1" i="0" u="none" strike="noStrike" kern="1200" dirty="0">
+                          <a:solidFill>
+                            <a:srgbClr val="000000"/>
+                          </a:solidFill>
+                          <a:effectLst/>
+                          <a:latin typeface="+mj-lt"/>
+                          <a:ea typeface="+mn-ea"/>
+                          <a:cs typeface="+mn-cs"/>
+                        </a:rPr>
+                        <a:t>54160394</a:t>
+                      </a:r>
+                    </a:p>
+                  </a:txBody>
+                  <a:tcPr marL="50800" marR="50800" marT="38100" marB="38100"/>
+                </a:tc>
+                <a:tc>
+                  <a:txBody>
+                    <a:bodyPr/>
+                    <a:lstStyle/>
+                    <a:p>
+                      <a:pPr marL="0" algn="r" defTabSz="914400" rtl="0" eaLnBrk="1" fontAlgn="t" latinLnBrk="0" hangingPunct="1">
+                        <a:spcBef>
+                          <a:spcPts val="0"/>
+                        </a:spcBef>
+                        <a:spcAft>
+                          <a:spcPts val="2700"/>
+                        </a:spcAft>
+                      </a:pPr>
+                      <a:r>
+                        <a:rPr lang="en-US" sz="900" b="1" i="0" u="none" strike="noStrike" kern="1200" dirty="0">
+                          <a:solidFill>
+                            <a:srgbClr val="000000"/>
+                          </a:solidFill>
+                          <a:effectLst/>
+                          <a:latin typeface="+mj-lt"/>
+                          <a:ea typeface="+mn-ea"/>
+                          <a:cs typeface="+mn-cs"/>
+                        </a:rPr>
+                        <a:t>NCT01365169</a:t>
+                      </a:r>
+                    </a:p>
+                  </a:txBody>
+                  <a:tcPr marL="50800" marR="50800" marT="38100" marB="38100"/>
+                </a:tc>
+                <a:tc>
+                  <a:txBody>
+                    <a:bodyPr/>
+                    <a:lstStyle/>
+                    <a:p>
+                      <a:r>
+                        <a:rPr lang="en-US" sz="900" b="1" i="0" u="none" strike="noStrike" kern="1200" dirty="0">
+                          <a:solidFill>
+                            <a:schemeClr val="dk1"/>
+                          </a:solidFill>
+                          <a:effectLst/>
+                          <a:latin typeface="+mj-lt"/>
+                          <a:ea typeface="+mn-ea"/>
+                          <a:cs typeface="+mn-cs"/>
+                        </a:rPr>
+                        <a:t>stage iv colorectal cancer </a:t>
+                      </a:r>
+                      <a:r>
+                        <a:rPr lang="en-US" sz="900" b="1" i="0" u="none" strike="noStrike" kern="1200" dirty="0" err="1">
+                          <a:solidFill>
+                            <a:schemeClr val="dk1"/>
+                          </a:solidFill>
+                          <a:effectLst/>
+                          <a:latin typeface="+mj-lt"/>
+                          <a:ea typeface="+mn-ea"/>
+                          <a:cs typeface="+mn-cs"/>
+                        </a:rPr>
+                        <a:t>ajcc</a:t>
+                      </a:r>
+                      <a:r>
+                        <a:rPr lang="en-US" sz="900" b="1" i="0" u="none" strike="noStrike" kern="1200" dirty="0">
+                          <a:solidFill>
+                            <a:schemeClr val="dk1"/>
+                          </a:solidFill>
+                          <a:effectLst/>
+                          <a:latin typeface="+mj-lt"/>
+                          <a:ea typeface="+mn-ea"/>
+                          <a:cs typeface="+mn-cs"/>
+                        </a:rPr>
+                        <a:t> v7</a:t>
+                      </a:r>
+                      <a:endParaRPr lang="en-US" sz="900" dirty="0">
+                        <a:latin typeface="+mj-lt"/>
+                      </a:endParaRPr>
+                    </a:p>
+                  </a:txBody>
+                  <a:tcPr/>
+                </a:tc>
+                <a:extLst>
+                  <a:ext uri="{0D108BD9-81ED-4DB2-BD59-A6C34878D82A}">
+                    <a16:rowId xmlns:a16="http://schemas.microsoft.com/office/drawing/2014/main" val="3252954973"/>
+                  </a:ext>
+                </a:extLst>
+              </a:tr>
+              <a:tr h="216586">
+                <a:tc>
+                  <a:txBody>
+                    <a:bodyPr/>
+                    <a:lstStyle/>
+                    <a:p>
+                      <a:pPr marL="0" algn="r" defTabSz="914400" rtl="0" eaLnBrk="1" fontAlgn="t" latinLnBrk="0" hangingPunct="1">
+                        <a:spcBef>
+                          <a:spcPts val="0"/>
+                        </a:spcBef>
+                        <a:spcAft>
+                          <a:spcPts val="2700"/>
+                        </a:spcAft>
+                      </a:pPr>
+                      <a:r>
+                        <a:rPr lang="en-US" sz="900" b="1" i="0" u="none" strike="noStrike" kern="1200" dirty="0">
+                          <a:solidFill>
+                            <a:srgbClr val="000000"/>
+                          </a:solidFill>
+                          <a:effectLst/>
+                          <a:latin typeface="+mj-lt"/>
+                          <a:ea typeface="+mn-ea"/>
+                          <a:cs typeface="+mn-cs"/>
+                        </a:rPr>
+                        <a:t>54167219</a:t>
+                      </a:r>
+                    </a:p>
+                  </a:txBody>
+                  <a:tcPr marL="50800" marR="50800" marT="38100" marB="38100"/>
+                </a:tc>
+                <a:tc>
+                  <a:txBody>
+                    <a:bodyPr/>
+                    <a:lstStyle/>
+                    <a:p>
+                      <a:pPr marL="0" algn="r" defTabSz="914400" rtl="0" eaLnBrk="1" fontAlgn="t" latinLnBrk="0" hangingPunct="1">
+                        <a:spcBef>
+                          <a:spcPts val="0"/>
+                        </a:spcBef>
+                        <a:spcAft>
+                          <a:spcPts val="2700"/>
+                        </a:spcAft>
+                      </a:pPr>
+                      <a:r>
+                        <a:rPr lang="en-US" sz="900" b="1" i="0" u="none" strike="noStrike" kern="1200" dirty="0">
+                          <a:solidFill>
+                            <a:srgbClr val="000000"/>
+                          </a:solidFill>
+                          <a:effectLst/>
+                          <a:latin typeface="+mj-lt"/>
+                          <a:ea typeface="+mn-ea"/>
+                          <a:cs typeface="+mn-cs"/>
+                        </a:rPr>
+                        <a:t>NCT00005799</a:t>
+                      </a:r>
+                    </a:p>
+                  </a:txBody>
+                  <a:tcPr marL="50800" marR="50800" marT="38100" marB="38100"/>
+                </a:tc>
+                <a:tc>
+                  <a:txBody>
+                    <a:bodyPr/>
+                    <a:lstStyle/>
+                    <a:p>
+                      <a:r>
+                        <a:rPr lang="en-US" sz="900" b="1" i="0" u="none" strike="noStrike" kern="1200" dirty="0" err="1">
+                          <a:solidFill>
+                            <a:schemeClr val="dk1"/>
+                          </a:solidFill>
+                          <a:effectLst/>
+                          <a:latin typeface="+mj-lt"/>
+                          <a:ea typeface="+mn-ea"/>
+                          <a:cs typeface="+mn-cs"/>
+                        </a:rPr>
+                        <a:t>waldenstr</a:t>
+                      </a:r>
+                      <a:r>
+                        <a:rPr lang="en-US" sz="900" b="1" i="0" u="none" strike="noStrike" kern="1200" dirty="0">
+                          <a:solidFill>
+                            <a:schemeClr val="dk1"/>
+                          </a:solidFill>
+                          <a:effectLst/>
+                          <a:latin typeface="+mj-lt"/>
+                          <a:ea typeface="+mn-ea"/>
+                          <a:cs typeface="+mn-cs"/>
+                        </a:rPr>
+                        <a:t>√∂m macroglobulinemia</a:t>
+                      </a:r>
+                      <a:endParaRPr lang="en-US" sz="900" dirty="0">
+                        <a:latin typeface="+mj-lt"/>
+                      </a:endParaRPr>
+                    </a:p>
+                  </a:txBody>
+                  <a:tcPr/>
+                </a:tc>
+                <a:extLst>
+                  <a:ext uri="{0D108BD9-81ED-4DB2-BD59-A6C34878D82A}">
+                    <a16:rowId xmlns:a16="http://schemas.microsoft.com/office/drawing/2014/main" val="299068278"/>
+                  </a:ext>
+                </a:extLst>
+              </a:tr>
+              <a:tr h="216586">
+                <a:tc>
+                  <a:txBody>
+                    <a:bodyPr/>
+                    <a:lstStyle/>
+                    <a:p>
+                      <a:pPr marL="0" algn="r" defTabSz="914400" rtl="0" eaLnBrk="1" fontAlgn="t" latinLnBrk="0" hangingPunct="1">
+                        <a:spcBef>
+                          <a:spcPts val="0"/>
+                        </a:spcBef>
+                        <a:spcAft>
+                          <a:spcPts val="2700"/>
+                        </a:spcAft>
+                      </a:pPr>
+                      <a:r>
+                        <a:rPr lang="en-US" sz="900" b="1" i="0" u="none" strike="noStrike" kern="1200" dirty="0">
+                          <a:solidFill>
+                            <a:srgbClr val="000000"/>
+                          </a:solidFill>
+                          <a:effectLst/>
+                          <a:latin typeface="+mj-lt"/>
+                          <a:ea typeface="+mn-ea"/>
+                          <a:cs typeface="+mn-cs"/>
+                        </a:rPr>
+                        <a:t>53807459</a:t>
+                      </a:r>
+                    </a:p>
+                  </a:txBody>
+                  <a:tcPr marL="50800" marR="50800" marT="38100" marB="38100"/>
+                </a:tc>
+                <a:tc>
+                  <a:txBody>
+                    <a:bodyPr/>
+                    <a:lstStyle/>
+                    <a:p>
+                      <a:pPr marL="0" algn="r" defTabSz="914400" rtl="0" eaLnBrk="1" fontAlgn="t" latinLnBrk="0" hangingPunct="1">
+                        <a:spcBef>
+                          <a:spcPts val="0"/>
+                        </a:spcBef>
+                        <a:spcAft>
+                          <a:spcPts val="2700"/>
+                        </a:spcAft>
+                      </a:pPr>
+                      <a:r>
+                        <a:rPr lang="en-US" sz="900" b="1" i="0" u="none" strike="noStrike" kern="1200" dirty="0">
+                          <a:solidFill>
+                            <a:srgbClr val="000000"/>
+                          </a:solidFill>
+                          <a:effectLst/>
+                          <a:latin typeface="+mj-lt"/>
+                          <a:ea typeface="+mn-ea"/>
+                          <a:cs typeface="+mn-cs"/>
+                        </a:rPr>
+                        <a:t>NCT05667415</a:t>
+                      </a:r>
+                    </a:p>
+                  </a:txBody>
+                  <a:tcPr marL="50800" marR="50800" marT="38100" marB="38100"/>
+                </a:tc>
+                <a:tc>
+                  <a:txBody>
+                    <a:bodyPr/>
+                    <a:lstStyle/>
+                    <a:p>
+                      <a:r>
+                        <a:rPr lang="en-US" sz="900" b="1" i="0" u="none" strike="noStrike" kern="1200" dirty="0" err="1">
+                          <a:solidFill>
+                            <a:schemeClr val="dk1"/>
+                          </a:solidFill>
+                          <a:effectLst/>
+                          <a:latin typeface="+mj-lt"/>
+                          <a:ea typeface="+mn-ea"/>
+                          <a:cs typeface="+mn-cs"/>
+                        </a:rPr>
+                        <a:t>chemotherapyÔºõadvanced</a:t>
+                      </a:r>
+                      <a:r>
+                        <a:rPr lang="en-US" sz="900" b="1" i="0" u="none" strike="noStrike" kern="1200" dirty="0">
+                          <a:solidFill>
+                            <a:schemeClr val="dk1"/>
+                          </a:solidFill>
+                          <a:effectLst/>
+                          <a:latin typeface="+mj-lt"/>
+                          <a:ea typeface="+mn-ea"/>
+                          <a:cs typeface="+mn-cs"/>
+                        </a:rPr>
+                        <a:t> gastric </a:t>
+                      </a:r>
+                      <a:r>
+                        <a:rPr lang="en-US" sz="900" b="1" i="0" u="none" strike="noStrike" kern="1200" dirty="0" err="1">
+                          <a:solidFill>
+                            <a:schemeClr val="dk1"/>
+                          </a:solidFill>
+                          <a:effectLst/>
+                          <a:latin typeface="+mj-lt"/>
+                          <a:ea typeface="+mn-ea"/>
+                          <a:cs typeface="+mn-cs"/>
+                        </a:rPr>
+                        <a:t>cancerÔºõcisplatin</a:t>
+                      </a:r>
+                      <a:endParaRPr lang="en-US" sz="900" dirty="0">
+                        <a:latin typeface="+mj-lt"/>
+                      </a:endParaRPr>
+                    </a:p>
+                  </a:txBody>
+                  <a:tcPr/>
+                </a:tc>
+                <a:extLst>
+                  <a:ext uri="{0D108BD9-81ED-4DB2-BD59-A6C34878D82A}">
+                    <a16:rowId xmlns:a16="http://schemas.microsoft.com/office/drawing/2014/main" val="2295531659"/>
+                  </a:ext>
+                </a:extLst>
+              </a:tr>
+              <a:tr h="216586">
+                <a:tc>
+                  <a:txBody>
+                    <a:bodyPr/>
+                    <a:lstStyle/>
+                    <a:p>
+                      <a:pPr marL="0" algn="r" defTabSz="914400" rtl="0" eaLnBrk="1" fontAlgn="t" latinLnBrk="0" hangingPunct="1">
+                        <a:spcBef>
+                          <a:spcPts val="0"/>
+                        </a:spcBef>
+                        <a:spcAft>
+                          <a:spcPts val="2700"/>
+                        </a:spcAft>
+                      </a:pPr>
+                      <a:r>
+                        <a:rPr lang="en-US" sz="900" b="1" i="0" u="none" strike="noStrike" kern="1200" dirty="0">
+                          <a:solidFill>
+                            <a:srgbClr val="000000"/>
+                          </a:solidFill>
+                          <a:effectLst/>
+                          <a:latin typeface="+mj-lt"/>
+                          <a:ea typeface="+mn-ea"/>
+                          <a:cs typeface="+mn-cs"/>
+                        </a:rPr>
+                        <a:t>53785094</a:t>
+                      </a:r>
+                    </a:p>
+                  </a:txBody>
+                  <a:tcPr marL="50800" marR="50800" marT="38100" marB="38100"/>
+                </a:tc>
+                <a:tc>
+                  <a:txBody>
+                    <a:bodyPr/>
+                    <a:lstStyle/>
+                    <a:p>
+                      <a:pPr marL="0" algn="r" defTabSz="914400" rtl="0" eaLnBrk="1" fontAlgn="t" latinLnBrk="0" hangingPunct="1">
+                        <a:spcBef>
+                          <a:spcPts val="0"/>
+                        </a:spcBef>
+                        <a:spcAft>
+                          <a:spcPts val="2700"/>
+                        </a:spcAft>
+                      </a:pPr>
+                      <a:r>
+                        <a:rPr lang="en-US" sz="900" b="1" i="0" u="none" strike="noStrike" kern="1200" dirty="0">
+                          <a:solidFill>
+                            <a:srgbClr val="000000"/>
+                          </a:solidFill>
+                          <a:effectLst/>
+                          <a:latin typeface="+mj-lt"/>
+                          <a:ea typeface="+mn-ea"/>
+                          <a:cs typeface="+mn-cs"/>
+                        </a:rPr>
+                        <a:t>NCT01127841</a:t>
+                      </a:r>
+                    </a:p>
+                  </a:txBody>
+                  <a:tcPr marL="50800" marR="50800" marT="38100" marB="38100"/>
+                </a:tc>
+                <a:tc>
+                  <a:txBody>
+                    <a:bodyPr/>
+                    <a:lstStyle/>
+                    <a:p>
+                      <a:r>
+                        <a:rPr lang="en-US" sz="900" b="1" i="0" u="none" strike="noStrike" kern="1200" dirty="0">
+                          <a:solidFill>
+                            <a:schemeClr val="dk1"/>
+                          </a:solidFill>
+                          <a:effectLst/>
+                          <a:latin typeface="+mj-lt"/>
+                          <a:ea typeface="+mn-ea"/>
+                          <a:cs typeface="+mn-cs"/>
+                        </a:rPr>
+                        <a:t>follicular non-</a:t>
+                      </a:r>
+                      <a:r>
+                        <a:rPr lang="en-US" sz="900" b="1" i="0" u="none" strike="noStrike" kern="1200" dirty="0" err="1">
+                          <a:solidFill>
+                            <a:schemeClr val="dk1"/>
+                          </a:solidFill>
+                          <a:effectLst/>
+                          <a:latin typeface="+mj-lt"/>
+                          <a:ea typeface="+mn-ea"/>
+                          <a:cs typeface="+mn-cs"/>
+                        </a:rPr>
+                        <a:t>hodgking</a:t>
+                      </a:r>
+                      <a:r>
+                        <a:rPr lang="en-US" sz="900" b="1" i="0" u="none" strike="noStrike" kern="1200" dirty="0">
+                          <a:solidFill>
+                            <a:schemeClr val="dk1"/>
+                          </a:solidFill>
+                          <a:effectLst/>
+                          <a:latin typeface="+mj-lt"/>
+                          <a:ea typeface="+mn-ea"/>
+                          <a:cs typeface="+mn-cs"/>
+                        </a:rPr>
+                        <a:t>¬¥s lymphoma refractory or </a:t>
+                      </a:r>
+                      <a:r>
+                        <a:rPr lang="en-US" sz="900" b="1" i="0" u="none" strike="noStrike" kern="1200" dirty="0" err="1">
+                          <a:solidFill>
+                            <a:schemeClr val="dk1"/>
+                          </a:solidFill>
+                          <a:effectLst/>
+                          <a:latin typeface="+mj-lt"/>
+                          <a:ea typeface="+mn-ea"/>
+                          <a:cs typeface="+mn-cs"/>
+                        </a:rPr>
+                        <a:t>rela</a:t>
+                      </a:r>
+                      <a:endParaRPr lang="en-US" sz="900" dirty="0">
+                        <a:latin typeface="+mj-lt"/>
+                      </a:endParaRPr>
+                    </a:p>
+                  </a:txBody>
+                  <a:tcPr/>
+                </a:tc>
+                <a:extLst>
+                  <a:ext uri="{0D108BD9-81ED-4DB2-BD59-A6C34878D82A}">
+                    <a16:rowId xmlns:a16="http://schemas.microsoft.com/office/drawing/2014/main" val="1749207277"/>
+                  </a:ext>
+                </a:extLst>
+              </a:tr>
+              <a:tr h="216586">
+                <a:tc>
+                  <a:txBody>
+                    <a:bodyPr/>
+                    <a:lstStyle/>
+                    <a:p>
+                      <a:pPr marL="0" algn="r" defTabSz="914400" rtl="0" eaLnBrk="1" fontAlgn="t" latinLnBrk="0" hangingPunct="1">
+                        <a:spcBef>
+                          <a:spcPts val="0"/>
+                        </a:spcBef>
+                        <a:spcAft>
+                          <a:spcPts val="2700"/>
+                        </a:spcAft>
+                      </a:pPr>
+                      <a:r>
+                        <a:rPr lang="en-US" sz="900" b="1" i="0" u="none" strike="noStrike" kern="1200" dirty="0">
+                          <a:solidFill>
+                            <a:srgbClr val="000000"/>
+                          </a:solidFill>
+                          <a:effectLst/>
+                          <a:latin typeface="+mj-lt"/>
+                          <a:ea typeface="+mn-ea"/>
+                          <a:cs typeface="+mn-cs"/>
+                        </a:rPr>
+                        <a:t>53878247</a:t>
+                      </a:r>
+                    </a:p>
+                  </a:txBody>
+                  <a:tcPr marL="50800" marR="50800" marT="38100" marB="38100"/>
+                </a:tc>
+                <a:tc>
+                  <a:txBody>
+                    <a:bodyPr/>
+                    <a:lstStyle/>
+                    <a:p>
+                      <a:pPr marL="0" algn="r" defTabSz="914400" rtl="0" eaLnBrk="1" fontAlgn="t" latinLnBrk="0" hangingPunct="1">
+                        <a:spcBef>
+                          <a:spcPts val="0"/>
+                        </a:spcBef>
+                        <a:spcAft>
+                          <a:spcPts val="2700"/>
+                        </a:spcAft>
+                      </a:pPr>
+                      <a:r>
+                        <a:rPr lang="en-US" sz="900" b="1" i="0" u="none" strike="noStrike" kern="1200" dirty="0">
+                          <a:solidFill>
+                            <a:srgbClr val="000000"/>
+                          </a:solidFill>
+                          <a:effectLst/>
+                          <a:latin typeface="+mj-lt"/>
+                          <a:ea typeface="+mn-ea"/>
+                          <a:cs typeface="+mn-cs"/>
+                        </a:rPr>
+                        <a:t>NCT02172768</a:t>
+                      </a:r>
+                    </a:p>
+                  </a:txBody>
+                  <a:tcPr marL="50800" marR="50800" marT="38100" marB="38100"/>
+                </a:tc>
+                <a:tc>
+                  <a:txBody>
+                    <a:bodyPr/>
+                    <a:lstStyle/>
+                    <a:p>
+                      <a:r>
+                        <a:rPr lang="en-US" sz="900" b="1" i="0" u="none" strike="noStrike" kern="1200" dirty="0">
+                          <a:solidFill>
+                            <a:schemeClr val="dk1"/>
+                          </a:solidFill>
+                          <a:effectLst/>
+                          <a:latin typeface="+mj-lt"/>
+                          <a:ea typeface="+mn-ea"/>
+                          <a:cs typeface="+mn-cs"/>
+                        </a:rPr>
+                        <a:t>acute myeloid </a:t>
+                      </a:r>
+                      <a:r>
+                        <a:rPr lang="en-US" sz="900" b="1" i="0" u="none" strike="noStrike" kern="1200" dirty="0" err="1">
+                          <a:solidFill>
+                            <a:schemeClr val="dk1"/>
+                          </a:solidFill>
+                          <a:effectLst/>
+                          <a:latin typeface="+mj-lt"/>
+                          <a:ea typeface="+mn-ea"/>
+                          <a:cs typeface="+mn-cs"/>
+                        </a:rPr>
+                        <a:t>leucaemia</a:t>
+                      </a:r>
+                      <a:endParaRPr lang="en-US" sz="900" dirty="0">
+                        <a:latin typeface="+mj-lt"/>
+                      </a:endParaRPr>
+                    </a:p>
+                  </a:txBody>
+                  <a:tcPr/>
+                </a:tc>
+                <a:extLst>
+                  <a:ext uri="{0D108BD9-81ED-4DB2-BD59-A6C34878D82A}">
+                    <a16:rowId xmlns:a16="http://schemas.microsoft.com/office/drawing/2014/main" val="3255761124"/>
+                  </a:ext>
+                </a:extLst>
+              </a:tr>
+              <a:tr h="250656">
+                <a:tc>
+                  <a:txBody>
+                    <a:bodyPr/>
+                    <a:lstStyle/>
+                    <a:p>
+                      <a:pPr marL="0" algn="r" defTabSz="914400" rtl="0" eaLnBrk="1" fontAlgn="t" latinLnBrk="0" hangingPunct="1">
+                        <a:spcBef>
+                          <a:spcPts val="0"/>
+                        </a:spcBef>
+                        <a:spcAft>
+                          <a:spcPts val="2700"/>
+                        </a:spcAft>
+                      </a:pPr>
+                      <a:r>
+                        <a:rPr lang="en-US" sz="900" b="1" i="0" u="none" strike="noStrike" kern="1200" dirty="0">
+                          <a:solidFill>
+                            <a:srgbClr val="000000"/>
+                          </a:solidFill>
+                          <a:effectLst/>
+                          <a:latin typeface="+mj-lt"/>
+                          <a:ea typeface="+mn-ea"/>
+                          <a:cs typeface="+mn-cs"/>
+                        </a:rPr>
+                        <a:t>54168238</a:t>
+                      </a:r>
+                    </a:p>
+                  </a:txBody>
+                  <a:tcPr marL="50800" marR="50800" marT="38100" marB="38100"/>
+                </a:tc>
+                <a:tc>
+                  <a:txBody>
+                    <a:bodyPr/>
+                    <a:lstStyle/>
+                    <a:p>
+                      <a:pPr marL="0" algn="r" defTabSz="914400" rtl="0" eaLnBrk="1" fontAlgn="t" latinLnBrk="0" hangingPunct="1">
+                        <a:spcBef>
+                          <a:spcPts val="0"/>
+                        </a:spcBef>
+                        <a:spcAft>
+                          <a:spcPts val="2700"/>
+                        </a:spcAft>
+                      </a:pPr>
+                      <a:r>
+                        <a:rPr lang="en-US" sz="900" b="1" i="0" u="none" strike="noStrike" kern="1200" dirty="0">
+                          <a:solidFill>
+                            <a:srgbClr val="000000"/>
+                          </a:solidFill>
+                          <a:effectLst/>
+                          <a:latin typeface="+mj-lt"/>
+                          <a:ea typeface="+mn-ea"/>
+                          <a:cs typeface="+mn-cs"/>
+                        </a:rPr>
+                        <a:t>NCT05587556</a:t>
+                      </a:r>
+                    </a:p>
+                  </a:txBody>
+                  <a:tcPr marL="50800" marR="50800" marT="38100" marB="38100"/>
+                </a:tc>
+                <a:tc>
+                  <a:txBody>
+                    <a:bodyPr/>
+                    <a:lstStyle/>
+                    <a:p>
+                      <a:r>
+                        <a:rPr lang="en-US" sz="900" b="1" i="0" u="none" strike="noStrike" kern="1200" dirty="0">
+                          <a:solidFill>
+                            <a:schemeClr val="dk1"/>
+                          </a:solidFill>
+                          <a:effectLst/>
+                          <a:latin typeface="+mj-lt"/>
+                          <a:ea typeface="+mn-ea"/>
+                          <a:cs typeface="+mn-cs"/>
+                        </a:rPr>
+                        <a:t>liver transplant, liver cancer, immunosuppressant</a:t>
+                      </a:r>
+                      <a:endParaRPr lang="en-US" sz="900" dirty="0">
+                        <a:latin typeface="+mj-lt"/>
+                      </a:endParaRPr>
+                    </a:p>
+                  </a:txBody>
+                  <a:tcPr/>
+                </a:tc>
+                <a:extLst>
+                  <a:ext uri="{0D108BD9-81ED-4DB2-BD59-A6C34878D82A}">
+                    <a16:rowId xmlns:a16="http://schemas.microsoft.com/office/drawing/2014/main" val="738192220"/>
+                  </a:ext>
+                </a:extLst>
+              </a:tr>
+              <a:tr h="223886">
+                <a:tc>
+                  <a:txBody>
+                    <a:bodyPr/>
+                    <a:lstStyle/>
+                    <a:p>
+                      <a:pPr marL="0" algn="r" defTabSz="914400" rtl="0" eaLnBrk="1" fontAlgn="t" latinLnBrk="0" hangingPunct="1">
+                        <a:spcBef>
+                          <a:spcPts val="0"/>
+                        </a:spcBef>
+                        <a:spcAft>
+                          <a:spcPts val="2700"/>
+                        </a:spcAft>
+                      </a:pPr>
+                      <a:r>
+                        <a:rPr lang="en-US" sz="900" b="1" i="0" u="none" strike="noStrike" kern="1200" dirty="0">
+                          <a:solidFill>
+                            <a:srgbClr val="000000"/>
+                          </a:solidFill>
+                          <a:effectLst/>
+                          <a:latin typeface="+mj-lt"/>
+                          <a:ea typeface="+mn-ea"/>
+                          <a:cs typeface="+mn-cs"/>
+                        </a:rPr>
+                        <a:t>53573690</a:t>
+                      </a:r>
+                    </a:p>
+                  </a:txBody>
+                  <a:tcPr marL="50800" marR="50800" marT="38100" marB="38100"/>
+                </a:tc>
+                <a:tc>
+                  <a:txBody>
+                    <a:bodyPr/>
+                    <a:lstStyle/>
+                    <a:p>
+                      <a:pPr marL="0" algn="r" defTabSz="914400" rtl="0" eaLnBrk="1" fontAlgn="t" latinLnBrk="0" hangingPunct="1">
+                        <a:spcBef>
+                          <a:spcPts val="0"/>
+                        </a:spcBef>
+                        <a:spcAft>
+                          <a:spcPts val="2700"/>
+                        </a:spcAft>
+                      </a:pPr>
+                      <a:r>
+                        <a:rPr lang="en-US" sz="900" b="1" i="0" u="none" strike="noStrike" kern="1200" dirty="0">
+                          <a:solidFill>
+                            <a:srgbClr val="000000"/>
+                          </a:solidFill>
+                          <a:effectLst/>
+                          <a:latin typeface="+mj-lt"/>
+                          <a:ea typeface="+mn-ea"/>
+                          <a:cs typeface="+mn-cs"/>
+                        </a:rPr>
+                        <a:t>NCT03452657</a:t>
+                      </a:r>
+                    </a:p>
+                  </a:txBody>
+                  <a:tcPr marL="50800" marR="50800" marT="38100" marB="38100"/>
+                </a:tc>
+                <a:tc>
+                  <a:txBody>
+                    <a:bodyPr/>
+                    <a:lstStyle/>
+                    <a:p>
+                      <a:r>
+                        <a:rPr lang="en-US" sz="900" b="1" i="0" u="none" strike="noStrike" kern="1200" dirty="0">
+                          <a:solidFill>
+                            <a:schemeClr val="dk1"/>
+                          </a:solidFill>
+                          <a:effectLst/>
+                          <a:latin typeface="+mj-lt"/>
+                          <a:ea typeface="+mn-ea"/>
+                          <a:cs typeface="+mn-cs"/>
+                        </a:rPr>
+                        <a:t>ranibizumab</a:t>
+                      </a:r>
+                      <a:endParaRPr lang="en-US" sz="900" dirty="0">
+                        <a:latin typeface="+mj-lt"/>
+                      </a:endParaRPr>
+                    </a:p>
+                  </a:txBody>
+                  <a:tcPr/>
+                </a:tc>
+                <a:extLst>
+                  <a:ext uri="{0D108BD9-81ED-4DB2-BD59-A6C34878D82A}">
+                    <a16:rowId xmlns:a16="http://schemas.microsoft.com/office/drawing/2014/main" val="1865049474"/>
+                  </a:ext>
+                </a:extLst>
+              </a:tr>
+              <a:tr h="216586">
+                <a:tc>
+                  <a:txBody>
+                    <a:bodyPr/>
+                    <a:lstStyle/>
+                    <a:p>
+                      <a:pPr marL="0" algn="r" defTabSz="914400" rtl="0" eaLnBrk="1" fontAlgn="t" latinLnBrk="0" hangingPunct="1">
+                        <a:spcBef>
+                          <a:spcPts val="0"/>
+                        </a:spcBef>
+                        <a:spcAft>
+                          <a:spcPts val="2700"/>
+                        </a:spcAft>
+                      </a:pPr>
+                      <a:r>
+                        <a:rPr lang="en-US" sz="900" b="1" i="0" u="none" strike="noStrike" kern="1200" dirty="0">
+                          <a:solidFill>
+                            <a:srgbClr val="000000"/>
+                          </a:solidFill>
+                          <a:effectLst/>
+                          <a:latin typeface="+mj-lt"/>
+                          <a:ea typeface="+mn-ea"/>
+                          <a:cs typeface="+mn-cs"/>
+                        </a:rPr>
+                        <a:t>53574738</a:t>
+                      </a:r>
+                    </a:p>
+                  </a:txBody>
+                  <a:tcPr marL="50800" marR="50800" marT="38100" marB="38100"/>
+                </a:tc>
+                <a:tc>
+                  <a:txBody>
+                    <a:bodyPr/>
+                    <a:lstStyle/>
+                    <a:p>
+                      <a:pPr marL="0" algn="r" defTabSz="914400" rtl="0" eaLnBrk="1" fontAlgn="t" latinLnBrk="0" hangingPunct="1">
+                        <a:spcBef>
+                          <a:spcPts val="0"/>
+                        </a:spcBef>
+                        <a:spcAft>
+                          <a:spcPts val="2700"/>
+                        </a:spcAft>
+                      </a:pPr>
+                      <a:r>
+                        <a:rPr lang="en-US" sz="900" b="1" i="0" u="none" strike="noStrike" kern="1200" dirty="0">
+                          <a:solidFill>
+                            <a:srgbClr val="000000"/>
+                          </a:solidFill>
+                          <a:effectLst/>
+                          <a:latin typeface="+mj-lt"/>
+                          <a:ea typeface="+mn-ea"/>
+                          <a:cs typeface="+mn-cs"/>
+                        </a:rPr>
+                        <a:t>NCT04669496</a:t>
+                      </a:r>
+                    </a:p>
+                  </a:txBody>
+                  <a:tcPr marL="50800" marR="50800" marT="38100" marB="38100"/>
+                </a:tc>
+                <a:tc>
+                  <a:txBody>
+                    <a:bodyPr/>
+                    <a:lstStyle/>
+                    <a:p>
+                      <a:r>
+                        <a:rPr lang="en-US" sz="900" b="1" i="0" u="none" strike="noStrike" kern="1200" dirty="0" err="1">
+                          <a:solidFill>
+                            <a:schemeClr val="dk1"/>
+                          </a:solidFill>
+                          <a:effectLst/>
+                          <a:latin typeface="+mj-lt"/>
+                          <a:ea typeface="+mn-ea"/>
+                          <a:cs typeface="+mn-cs"/>
+                        </a:rPr>
+                        <a:t>lenvatinib</a:t>
+                      </a:r>
+                      <a:endParaRPr lang="en-US" sz="900" dirty="0">
+                        <a:latin typeface="+mj-lt"/>
+                      </a:endParaRPr>
+                    </a:p>
+                  </a:txBody>
+                  <a:tcPr/>
+                </a:tc>
+                <a:extLst>
+                  <a:ext uri="{0D108BD9-81ED-4DB2-BD59-A6C34878D82A}">
+                    <a16:rowId xmlns:a16="http://schemas.microsoft.com/office/drawing/2014/main" val="1237844795"/>
+                  </a:ext>
+                </a:extLst>
+              </a:tr>
+              <a:tr h="243098">
+                <a:tc>
+                  <a:txBody>
+                    <a:bodyPr/>
+                    <a:lstStyle/>
+                    <a:p>
+                      <a:pPr marL="0" algn="r" defTabSz="914400" rtl="0" eaLnBrk="1" fontAlgn="t" latinLnBrk="0" hangingPunct="1">
+                        <a:spcBef>
+                          <a:spcPts val="0"/>
+                        </a:spcBef>
+                        <a:spcAft>
+                          <a:spcPts val="2700"/>
+                        </a:spcAft>
+                      </a:pPr>
+                      <a:r>
+                        <a:rPr lang="en-US" sz="900" b="1" i="0" u="none" strike="noStrike" kern="1200" dirty="0">
+                          <a:solidFill>
+                            <a:srgbClr val="000000"/>
+                          </a:solidFill>
+                          <a:effectLst/>
+                          <a:latin typeface="+mj-lt"/>
+                          <a:ea typeface="+mn-ea"/>
+                          <a:cs typeface="+mn-cs"/>
+                        </a:rPr>
+                        <a:t>53756631</a:t>
+                      </a:r>
+                    </a:p>
+                  </a:txBody>
+                  <a:tcPr marL="50800" marR="50800" marT="38100" marB="38100"/>
+                </a:tc>
+                <a:tc>
+                  <a:txBody>
+                    <a:bodyPr/>
+                    <a:lstStyle/>
+                    <a:p>
+                      <a:pPr marL="0" algn="r" defTabSz="914400" rtl="0" eaLnBrk="1" fontAlgn="t" latinLnBrk="0" hangingPunct="1">
+                        <a:spcBef>
+                          <a:spcPts val="0"/>
+                        </a:spcBef>
+                        <a:spcAft>
+                          <a:spcPts val="2700"/>
+                        </a:spcAft>
+                      </a:pPr>
+                      <a:r>
+                        <a:rPr lang="en-US" sz="900" b="1" i="0" u="none" strike="noStrike" kern="1200" dirty="0">
+                          <a:solidFill>
+                            <a:srgbClr val="000000"/>
+                          </a:solidFill>
+                          <a:effectLst/>
+                          <a:latin typeface="+mj-lt"/>
+                          <a:ea typeface="+mn-ea"/>
+                          <a:cs typeface="+mn-cs"/>
+                        </a:rPr>
+                        <a:t>NCT01227746</a:t>
+                      </a:r>
+                    </a:p>
+                  </a:txBody>
+                  <a:tcPr marL="50800" marR="50800" marT="38100" marB="38100"/>
+                </a:tc>
+                <a:tc>
+                  <a:txBody>
+                    <a:bodyPr/>
+                    <a:lstStyle/>
+                    <a:p>
+                      <a:pPr rtl="0"/>
+                      <a:r>
+                        <a:rPr lang="en-US" sz="900" b="1" i="0" u="none" strike="noStrike" kern="1200" dirty="0" err="1">
+                          <a:solidFill>
+                            <a:schemeClr val="dk1"/>
+                          </a:solidFill>
+                          <a:effectLst/>
+                          <a:latin typeface="+mj-lt"/>
+                          <a:ea typeface="+mn-ea"/>
+                          <a:cs typeface="+mn-cs"/>
+                        </a:rPr>
+                        <a:t>asian</a:t>
+                      </a:r>
+                      <a:r>
+                        <a:rPr lang="en-US" sz="900" b="1" i="0" u="none" strike="noStrike" kern="1200" dirty="0">
+                          <a:solidFill>
+                            <a:schemeClr val="dk1"/>
+                          </a:solidFill>
+                          <a:effectLst/>
+                          <a:latin typeface="+mj-lt"/>
+                          <a:ea typeface="+mn-ea"/>
+                          <a:cs typeface="+mn-cs"/>
+                        </a:rPr>
+                        <a:t> patients with advanced gastro-intestinal stromal tumors (gist) treated with imatinib</a:t>
+                      </a:r>
+                      <a:endParaRPr lang="en-US" sz="900" b="0" dirty="0">
+                        <a:effectLst/>
+                        <a:latin typeface="+mj-lt"/>
+                      </a:endParaRPr>
+                    </a:p>
+                    <a:p>
+                      <a:br>
+                        <a:rPr lang="en-US" sz="900" dirty="0">
+                          <a:latin typeface="+mj-lt"/>
+                        </a:rPr>
+                      </a:br>
+                      <a:endParaRPr lang="en-US" sz="900" dirty="0">
+                        <a:latin typeface="+mj-lt"/>
+                      </a:endParaRPr>
+                    </a:p>
+                  </a:txBody>
+                  <a:tcPr/>
+                </a:tc>
+                <a:extLst>
+                  <a:ext uri="{0D108BD9-81ED-4DB2-BD59-A6C34878D82A}">
+                    <a16:rowId xmlns:a16="http://schemas.microsoft.com/office/drawing/2014/main" val="11619582"/>
+                  </a:ext>
+                </a:extLst>
+              </a:tr>
+            </a:tbl>
+          </a:graphicData>
+        </a:graphic>
+      </p:graphicFrame>
     </p:spTree>
     <p:extLst>
       <p:ext uri="{BB962C8B-B14F-4D97-AF65-F5344CB8AC3E}">

</xml_diff>

<commit_message>
adding slides to ppt
</commit_message>
<xml_diff>
--- a/presentations/BIG_2024.pptx
+++ b/presentations/BIG_2024.pptx
@@ -5,7 +5,7 @@
     <p:sldMasterId id="2147483672" r:id="rId4"/>
   </p:sldMasterIdLst>
   <p:notesMasterIdLst>
-    <p:notesMasterId r:id="rId17"/>
+    <p:notesMasterId r:id="rId18"/>
   </p:notesMasterIdLst>
   <p:sldIdLst>
     <p:sldId id="256" r:id="rId5"/>
@@ -20,6 +20,7 @@
     <p:sldId id="266" r:id="rId14"/>
     <p:sldId id="267" r:id="rId15"/>
     <p:sldId id="268" r:id="rId16"/>
+    <p:sldId id="269" r:id="rId17"/>
   </p:sldIdLst>
   <p:sldSz cx="12192000" cy="6858000"/>
   <p:notesSz cx="6858000" cy="9144000"/>
@@ -1729,14 +1730,14 @@
           <p:nvPr>
             <p:extLst>
               <p:ext uri="{D42A27DB-BD31-4B8C-83A1-F6EECF244321}">
-                <p14:modId xmlns:p14="http://schemas.microsoft.com/office/powerpoint/2010/main" val="449719722"/>
+                <p14:modId xmlns:p14="http://schemas.microsoft.com/office/powerpoint/2010/main" val="1201206511"/>
               </p:ext>
             </p:extLst>
           </p:nvPr>
         </p:nvGraphicFramePr>
         <p:xfrm>
-          <a:off x="100908" y="681963"/>
-          <a:ext cx="11511972" cy="5183169"/>
+          <a:off x="232756" y="681963"/>
+          <a:ext cx="11366833" cy="4988085"/>
         </p:xfrm>
         <a:graphic>
           <a:graphicData uri="http://schemas.openxmlformats.org/drawingml/2006/table">
@@ -1745,28 +1746,28 @@
                 <a:tableStyleId>{5C22544A-7EE6-4342-B048-85BDC9FD1C3A}</a:tableStyleId>
               </a:tblPr>
               <a:tblGrid>
-                <a:gridCol w="1132254">
+                <a:gridCol w="1117979">
                   <a:extLst>
                     <a:ext uri="{9D8B030D-6E8A-4147-A177-3AD203B41FA5}">
                       <a16:colId xmlns:a16="http://schemas.microsoft.com/office/drawing/2014/main" val="4021694754"/>
                     </a:ext>
                   </a:extLst>
                 </a:gridCol>
-                <a:gridCol w="1762995">
+                <a:gridCol w="1740767">
                   <a:extLst>
                     <a:ext uri="{9D8B030D-6E8A-4147-A177-3AD203B41FA5}">
                       <a16:colId xmlns:a16="http://schemas.microsoft.com/office/drawing/2014/main" val="3295535630"/>
                     </a:ext>
                   </a:extLst>
                 </a:gridCol>
-                <a:gridCol w="4926143">
+                <a:gridCol w="4864036">
                   <a:extLst>
                     <a:ext uri="{9D8B030D-6E8A-4147-A177-3AD203B41FA5}">
                       <a16:colId xmlns:a16="http://schemas.microsoft.com/office/drawing/2014/main" val="1958709931"/>
                     </a:ext>
                   </a:extLst>
                 </a:gridCol>
-                <a:gridCol w="3690580">
+                <a:gridCol w="3644051">
                   <a:extLst>
                     <a:ext uri="{9D8B030D-6E8A-4147-A177-3AD203B41FA5}">
                       <a16:colId xmlns:a16="http://schemas.microsoft.com/office/drawing/2014/main" val="2309535513"/>
@@ -1774,7 +1775,7 @@
                   </a:extLst>
                 </a:gridCol>
               </a:tblGrid>
-              <a:tr h="225965">
+              <a:tr h="257338">
                 <a:tc>
                   <a:txBody>
                     <a:bodyPr/>
@@ -1833,13 +1834,13 @@
                   </a:ext>
                 </a:extLst>
               </a:tr>
-              <a:tr h="225965">
+              <a:tr h="257338">
                 <a:tc>
                   <a:txBody>
                     <a:bodyPr/>
                     <a:lstStyle/>
                     <a:p>
-                      <a:pPr marL="0" algn="r" defTabSz="914400" rtl="0" eaLnBrk="1" fontAlgn="t" latinLnBrk="0" hangingPunct="1">
+                      <a:pPr marL="0" algn="l" defTabSz="914400" rtl="0" eaLnBrk="1" fontAlgn="t" latinLnBrk="0" hangingPunct="1">
                         <a:spcBef>
                           <a:spcPts val="0"/>
                         </a:spcBef>
@@ -1868,7 +1869,7 @@
                     <a:bodyPr/>
                     <a:lstStyle/>
                     <a:p>
-                      <a:pPr marL="0" algn="r" defTabSz="914400" rtl="0" eaLnBrk="1" fontAlgn="t" latinLnBrk="0" hangingPunct="1">
+                      <a:pPr marL="0" algn="l" defTabSz="914400" rtl="0" eaLnBrk="1" fontAlgn="t" latinLnBrk="0" hangingPunct="1">
                         <a:spcBef>
                           <a:spcPts val="0"/>
                         </a:spcBef>
@@ -1897,6 +1898,7 @@
                     <a:bodyPr/>
                     <a:lstStyle/>
                     <a:p>
+                      <a:pPr algn="l"/>
                       <a:r>
                         <a:rPr lang="en-US" sz="1200" b="0" i="0" u="none" strike="noStrike" kern="1200" dirty="0">
                           <a:solidFill>
@@ -1921,6 +1923,7 @@
                     <a:bodyPr/>
                     <a:lstStyle/>
                     <a:p>
+                      <a:pPr algn="l"/>
                       <a:r>
                         <a:rPr lang="en-US" sz="900" b="0" dirty="0">
                           <a:latin typeface="+mj-lt"/>
@@ -1937,13 +1940,13 @@
                   </a:ext>
                 </a:extLst>
               </a:tr>
-              <a:tr h="225965">
+              <a:tr h="257338">
                 <a:tc>
                   <a:txBody>
                     <a:bodyPr/>
                     <a:lstStyle/>
                     <a:p>
-                      <a:pPr marL="0" algn="r" defTabSz="914400" rtl="0" eaLnBrk="1" fontAlgn="t" latinLnBrk="0" hangingPunct="1">
+                      <a:pPr marL="0" algn="l" defTabSz="914400" rtl="0" eaLnBrk="1" fontAlgn="t" latinLnBrk="0" hangingPunct="1">
                         <a:spcBef>
                           <a:spcPts val="0"/>
                         </a:spcBef>
@@ -1972,7 +1975,7 @@
                     <a:bodyPr/>
                     <a:lstStyle/>
                     <a:p>
-                      <a:pPr marL="0" algn="r" defTabSz="914400" rtl="0" eaLnBrk="1" fontAlgn="t" latinLnBrk="0" hangingPunct="1">
+                      <a:pPr marL="0" algn="l" defTabSz="914400" rtl="0" eaLnBrk="1" fontAlgn="t" latinLnBrk="0" hangingPunct="1">
                         <a:spcBef>
                           <a:spcPts val="0"/>
                         </a:spcBef>
@@ -2001,6 +2004,7 @@
                     <a:bodyPr/>
                     <a:lstStyle/>
                     <a:p>
+                      <a:pPr algn="l"/>
                       <a:r>
                         <a:rPr lang="en-US" sz="1200" b="0" i="0" u="none" strike="noStrike" kern="1200" dirty="0">
                           <a:solidFill>
@@ -2025,6 +2029,7 @@
                     <a:bodyPr/>
                     <a:lstStyle/>
                     <a:p>
+                      <a:pPr algn="l"/>
                       <a:r>
                         <a:rPr lang="en-US" sz="900" b="0" dirty="0">
                           <a:latin typeface="+mj-lt"/>
@@ -2041,13 +2046,13 @@
                   </a:ext>
                 </a:extLst>
               </a:tr>
-              <a:tr h="225965">
+              <a:tr h="257338">
                 <a:tc>
                   <a:txBody>
                     <a:bodyPr/>
                     <a:lstStyle/>
                     <a:p>
-                      <a:pPr marL="0" algn="r" defTabSz="914400" rtl="0" eaLnBrk="1" fontAlgn="t" latinLnBrk="0" hangingPunct="1">
+                      <a:pPr marL="0" algn="l" defTabSz="914400" rtl="0" eaLnBrk="1" fontAlgn="t" latinLnBrk="0" hangingPunct="1">
                         <a:spcBef>
                           <a:spcPts val="0"/>
                         </a:spcBef>
@@ -2076,7 +2081,7 @@
                     <a:bodyPr/>
                     <a:lstStyle/>
                     <a:p>
-                      <a:pPr marL="0" algn="r" defTabSz="914400" rtl="0" eaLnBrk="1" fontAlgn="t" latinLnBrk="0" hangingPunct="1">
+                      <a:pPr marL="0" algn="l" defTabSz="914400" rtl="0" eaLnBrk="1" fontAlgn="t" latinLnBrk="0" hangingPunct="1">
                         <a:spcBef>
                           <a:spcPts val="0"/>
                         </a:spcBef>
@@ -2105,6 +2110,7 @@
                     <a:bodyPr/>
                     <a:lstStyle/>
                     <a:p>
+                      <a:pPr algn="l"/>
                       <a:r>
                         <a:rPr lang="en-US" sz="1200" b="0" i="0" u="none" strike="noStrike" kern="1200" dirty="0" err="1">
                           <a:solidFill>
@@ -2141,6 +2147,7 @@
                     <a:bodyPr/>
                     <a:lstStyle/>
                     <a:p>
+                      <a:pPr algn="l"/>
                       <a:r>
                         <a:rPr lang="en-US" sz="900" b="0" dirty="0">
                           <a:latin typeface="+mj-lt"/>
@@ -2157,13 +2164,13 @@
                   </a:ext>
                 </a:extLst>
               </a:tr>
-              <a:tr h="225965">
+              <a:tr h="257338">
                 <a:tc>
                   <a:txBody>
                     <a:bodyPr/>
                     <a:lstStyle/>
                     <a:p>
-                      <a:pPr marL="0" algn="r" defTabSz="914400" rtl="0" eaLnBrk="1" fontAlgn="t" latinLnBrk="0" hangingPunct="1">
+                      <a:pPr marL="0" algn="l" defTabSz="914400" rtl="0" eaLnBrk="1" fontAlgn="t" latinLnBrk="0" hangingPunct="1">
                         <a:spcBef>
                           <a:spcPts val="0"/>
                         </a:spcBef>
@@ -2192,7 +2199,7 @@
                     <a:bodyPr/>
                     <a:lstStyle/>
                     <a:p>
-                      <a:pPr marL="0" algn="r" defTabSz="914400" rtl="0" eaLnBrk="1" fontAlgn="t" latinLnBrk="0" hangingPunct="1">
+                      <a:pPr marL="0" algn="l" defTabSz="914400" rtl="0" eaLnBrk="1" fontAlgn="t" latinLnBrk="0" hangingPunct="1">
                         <a:spcBef>
                           <a:spcPts val="0"/>
                         </a:spcBef>
@@ -2221,6 +2228,7 @@
                     <a:bodyPr/>
                     <a:lstStyle/>
                     <a:p>
+                      <a:pPr algn="l"/>
                       <a:r>
                         <a:rPr lang="en-US" sz="1200" b="0" i="0" u="none" strike="noStrike" kern="1200" dirty="0">
                           <a:solidFill>
@@ -2245,6 +2253,7 @@
                     <a:bodyPr/>
                     <a:lstStyle/>
                     <a:p>
+                      <a:pPr algn="l"/>
                       <a:r>
                         <a:rPr lang="en-US" sz="900" b="0" dirty="0">
                           <a:latin typeface="+mj-lt"/>
@@ -2261,13 +2270,13 @@
                   </a:ext>
                 </a:extLst>
               </a:tr>
-              <a:tr h="310855">
+              <a:tr h="267965">
                 <a:tc>
                   <a:txBody>
                     <a:bodyPr/>
                     <a:lstStyle/>
                     <a:p>
-                      <a:pPr marL="0" algn="r" defTabSz="914400" rtl="0" eaLnBrk="1" fontAlgn="t" latinLnBrk="0" hangingPunct="1">
+                      <a:pPr marL="0" algn="l" defTabSz="914400" rtl="0" eaLnBrk="1" fontAlgn="t" latinLnBrk="0" hangingPunct="1">
                         <a:spcBef>
                           <a:spcPts val="0"/>
                         </a:spcBef>
@@ -2296,7 +2305,7 @@
                     <a:bodyPr/>
                     <a:lstStyle/>
                     <a:p>
-                      <a:pPr marL="0" algn="r" defTabSz="914400" rtl="0" eaLnBrk="1" fontAlgn="t" latinLnBrk="0" hangingPunct="1">
+                      <a:pPr marL="0" algn="l" defTabSz="914400" rtl="0" eaLnBrk="1" fontAlgn="t" latinLnBrk="0" hangingPunct="1">
                         <a:spcBef>
                           <a:spcPts val="0"/>
                         </a:spcBef>
@@ -2325,6 +2334,7 @@
                     <a:bodyPr/>
                     <a:lstStyle/>
                     <a:p>
+                      <a:pPr algn="l"/>
                       <a:r>
                         <a:rPr lang="en-US" sz="1200" b="0" i="0" u="none" strike="noStrike" kern="1200" dirty="0" err="1">
                           <a:solidFill>
@@ -2361,6 +2371,7 @@
                     <a:bodyPr/>
                     <a:lstStyle/>
                     <a:p>
+                      <a:pPr algn="l"/>
                       <a:r>
                         <a:rPr lang="en-US" sz="900" b="0" dirty="0">
                           <a:latin typeface="+mj-lt"/>
@@ -2377,13 +2388,13 @@
                   </a:ext>
                 </a:extLst>
               </a:tr>
-              <a:tr h="225965">
+              <a:tr h="257338">
                 <a:tc>
                   <a:txBody>
                     <a:bodyPr/>
                     <a:lstStyle/>
                     <a:p>
-                      <a:pPr marL="0" algn="r" defTabSz="914400" rtl="0" eaLnBrk="1" fontAlgn="t" latinLnBrk="0" hangingPunct="1">
+                      <a:pPr marL="0" algn="l" defTabSz="914400" rtl="0" eaLnBrk="1" fontAlgn="t" latinLnBrk="0" hangingPunct="1">
                         <a:spcBef>
                           <a:spcPts val="0"/>
                         </a:spcBef>
@@ -2412,7 +2423,7 @@
                     <a:bodyPr/>
                     <a:lstStyle/>
                     <a:p>
-                      <a:pPr marL="0" algn="r" defTabSz="914400" rtl="0" eaLnBrk="1" fontAlgn="t" latinLnBrk="0" hangingPunct="1">
+                      <a:pPr marL="0" algn="l" defTabSz="914400" rtl="0" eaLnBrk="1" fontAlgn="t" latinLnBrk="0" hangingPunct="1">
                         <a:spcBef>
                           <a:spcPts val="0"/>
                         </a:spcBef>
@@ -2441,6 +2452,7 @@
                     <a:bodyPr/>
                     <a:lstStyle/>
                     <a:p>
+                      <a:pPr algn="l"/>
                       <a:r>
                         <a:rPr lang="en-US" sz="1200" b="0" i="0" u="none" strike="noStrike" kern="1200" dirty="0">
                           <a:solidFill>
@@ -2515,27 +2527,8 @@
                           <a:ea typeface="+mn-ea"/>
                           <a:cs typeface="+mn-cs"/>
                         </a:rPr>
-                        <a:t>Staging Info provided  </a:t>
-                      </a:r>
-                      <a:r>
-                        <a:rPr lang="en-US" sz="900" b="0" kern="1200">
-                          <a:solidFill>
-                            <a:schemeClr val="dk1"/>
-                          </a:solidFill>
-                          <a:latin typeface="+mn-lt"/>
-                          <a:ea typeface="+mn-ea"/>
-                          <a:cs typeface="+mn-cs"/>
-                        </a:rPr>
-                        <a:t>and abbreviation added</a:t>
-                      </a:r>
-                      <a:endParaRPr lang="en-US" sz="900" b="0" kern="1200" dirty="0">
-                        <a:solidFill>
-                          <a:schemeClr val="dk1"/>
-                        </a:solidFill>
-                        <a:latin typeface="+mn-lt"/>
-                        <a:ea typeface="+mn-ea"/>
-                        <a:cs typeface="+mn-cs"/>
-                      </a:endParaRPr>
+                        <a:t>Staging Info provided  and abbreviation added</a:t>
+                      </a:r>
                     </a:p>
                   </a:txBody>
                   <a:tcPr/>
@@ -2546,13 +2539,13 @@
                   </a:ext>
                 </a:extLst>
               </a:tr>
-              <a:tr h="225965">
+              <a:tr h="257338">
                 <a:tc>
                   <a:txBody>
                     <a:bodyPr/>
                     <a:lstStyle/>
                     <a:p>
-                      <a:pPr marL="0" algn="r" defTabSz="914400" rtl="0" eaLnBrk="1" fontAlgn="t" latinLnBrk="0" hangingPunct="1">
+                      <a:pPr marL="0" algn="l" defTabSz="914400" rtl="0" eaLnBrk="1" fontAlgn="t" latinLnBrk="0" hangingPunct="1">
                         <a:spcBef>
                           <a:spcPts val="0"/>
                         </a:spcBef>
@@ -2581,7 +2574,7 @@
                     <a:bodyPr/>
                     <a:lstStyle/>
                     <a:p>
-                      <a:pPr marL="0" algn="r" defTabSz="914400" rtl="0" eaLnBrk="1" fontAlgn="t" latinLnBrk="0" hangingPunct="1">
+                      <a:pPr marL="0" algn="l" defTabSz="914400" rtl="0" eaLnBrk="1" fontAlgn="t" latinLnBrk="0" hangingPunct="1">
                         <a:spcBef>
                           <a:spcPts val="0"/>
                         </a:spcBef>
@@ -2610,6 +2603,7 @@
                     <a:bodyPr/>
                     <a:lstStyle/>
                     <a:p>
+                      <a:pPr algn="l"/>
                       <a:r>
                         <a:rPr lang="en-US" sz="1200" b="0" i="0" u="none" strike="noStrike" kern="1200" dirty="0" err="1">
                           <a:solidFill>
@@ -2646,6 +2640,7 @@
                     <a:bodyPr/>
                     <a:lstStyle/>
                     <a:p>
+                      <a:pPr algn="l"/>
                       <a:r>
                         <a:rPr lang="en-US" sz="900" b="0" dirty="0">
                           <a:latin typeface="+mj-lt"/>
@@ -2662,13 +2657,13 @@
                   </a:ext>
                 </a:extLst>
               </a:tr>
-              <a:tr h="376608">
+              <a:tr h="324645">
                 <a:tc>
                   <a:txBody>
                     <a:bodyPr/>
                     <a:lstStyle/>
                     <a:p>
-                      <a:pPr marL="0" algn="r" defTabSz="914400" rtl="0" eaLnBrk="1" fontAlgn="t" latinLnBrk="0" hangingPunct="1">
+                      <a:pPr marL="0" algn="l" defTabSz="914400" rtl="0" eaLnBrk="1" fontAlgn="t" latinLnBrk="0" hangingPunct="1">
                         <a:spcBef>
                           <a:spcPts val="0"/>
                         </a:spcBef>
@@ -2697,7 +2692,7 @@
                     <a:bodyPr/>
                     <a:lstStyle/>
                     <a:p>
-                      <a:pPr marL="0" algn="r" defTabSz="914400" rtl="0" eaLnBrk="1" fontAlgn="t" latinLnBrk="0" hangingPunct="1">
+                      <a:pPr marL="0" algn="l" defTabSz="914400" rtl="0" eaLnBrk="1" fontAlgn="t" latinLnBrk="0" hangingPunct="1">
                         <a:spcBef>
                           <a:spcPts val="0"/>
                         </a:spcBef>
@@ -2726,6 +2721,7 @@
                     <a:bodyPr/>
                     <a:lstStyle/>
                     <a:p>
+                      <a:pPr algn="l"/>
                       <a:r>
                         <a:rPr lang="en-US" sz="1200" b="0" i="0" u="none" strike="noStrike" kern="1200" dirty="0" err="1">
                           <a:solidFill>
@@ -2774,6 +2770,7 @@
                     <a:bodyPr/>
                     <a:lstStyle/>
                     <a:p>
+                      <a:pPr algn="l"/>
                       <a:r>
                         <a:rPr lang="en-US" sz="900" b="0" dirty="0">
                           <a:latin typeface="+mj-lt"/>
@@ -2790,13 +2787,13 @@
                   </a:ext>
                 </a:extLst>
               </a:tr>
-              <a:tr h="527251">
+              <a:tr h="454503">
                 <a:tc>
                   <a:txBody>
                     <a:bodyPr/>
                     <a:lstStyle/>
                     <a:p>
-                      <a:pPr marL="0" algn="r" defTabSz="914400" rtl="0" eaLnBrk="1" fontAlgn="t" latinLnBrk="0" hangingPunct="1">
+                      <a:pPr marL="0" algn="l" defTabSz="914400" rtl="0" eaLnBrk="1" fontAlgn="t" latinLnBrk="0" hangingPunct="1">
                         <a:spcBef>
                           <a:spcPts val="0"/>
                         </a:spcBef>
@@ -2825,7 +2822,7 @@
                     <a:bodyPr/>
                     <a:lstStyle/>
                     <a:p>
-                      <a:pPr marL="0" algn="r" defTabSz="914400" rtl="0" eaLnBrk="1" fontAlgn="t" latinLnBrk="0" hangingPunct="1">
+                      <a:pPr marL="0" algn="l" defTabSz="914400" rtl="0" eaLnBrk="1" fontAlgn="t" latinLnBrk="0" hangingPunct="1">
                         <a:spcBef>
                           <a:spcPts val="0"/>
                         </a:spcBef>
@@ -2854,6 +2851,7 @@
                     <a:bodyPr/>
                     <a:lstStyle/>
                     <a:p>
+                      <a:pPr algn="l"/>
                       <a:r>
                         <a:rPr lang="en-US" sz="1200" b="0" i="0" u="none" strike="noStrike" kern="1200" dirty="0">
                           <a:solidFill>
@@ -2902,6 +2900,7 @@
                     <a:bodyPr/>
                     <a:lstStyle/>
                     <a:p>
+                      <a:pPr algn="l"/>
                       <a:r>
                         <a:rPr lang="en-US" sz="900" b="0" kern="1200" dirty="0">
                           <a:solidFill>
@@ -2923,13 +2922,13 @@
                   </a:ext>
                 </a:extLst>
               </a:tr>
-              <a:tr h="225965">
+              <a:tr h="257338">
                 <a:tc>
                   <a:txBody>
                     <a:bodyPr/>
                     <a:lstStyle/>
                     <a:p>
-                      <a:pPr marL="0" algn="r" defTabSz="914400" rtl="0" eaLnBrk="1" fontAlgn="t" latinLnBrk="0" hangingPunct="1">
+                      <a:pPr marL="0" algn="l" defTabSz="914400" rtl="0" eaLnBrk="1" fontAlgn="t" latinLnBrk="0" hangingPunct="1">
                         <a:spcBef>
                           <a:spcPts val="0"/>
                         </a:spcBef>
@@ -2958,7 +2957,7 @@
                     <a:bodyPr/>
                     <a:lstStyle/>
                     <a:p>
-                      <a:pPr marL="0" algn="r" defTabSz="914400" rtl="0" eaLnBrk="1" fontAlgn="t" latinLnBrk="0" hangingPunct="1">
+                      <a:pPr marL="0" algn="l" defTabSz="914400" rtl="0" eaLnBrk="1" fontAlgn="t" latinLnBrk="0" hangingPunct="1">
                         <a:spcBef>
                           <a:spcPts val="0"/>
                         </a:spcBef>
@@ -2987,6 +2986,7 @@
                     <a:bodyPr/>
                     <a:lstStyle/>
                     <a:p>
+                      <a:pPr algn="l"/>
                       <a:r>
                         <a:rPr lang="en-US" sz="1200" b="0" i="0" u="none" strike="noStrike" kern="1200" dirty="0">
                           <a:solidFill>
@@ -3023,6 +3023,7 @@
                     <a:bodyPr/>
                     <a:lstStyle/>
                     <a:p>
+                      <a:pPr algn="l"/>
                       <a:r>
                         <a:rPr lang="en-US" sz="900" b="0" dirty="0">
                           <a:latin typeface="+mj-lt"/>
@@ -3039,13 +3040,13 @@
                   </a:ext>
                 </a:extLst>
               </a:tr>
-              <a:tr h="310855">
+              <a:tr h="267965">
                 <a:tc>
                   <a:txBody>
                     <a:bodyPr/>
                     <a:lstStyle/>
                     <a:p>
-                      <a:pPr marL="0" algn="r" defTabSz="914400" rtl="0" eaLnBrk="1" fontAlgn="t" latinLnBrk="0" hangingPunct="1">
+                      <a:pPr marL="0" algn="l" defTabSz="914400" rtl="0" eaLnBrk="1" fontAlgn="t" latinLnBrk="0" hangingPunct="1">
                         <a:spcBef>
                           <a:spcPts val="0"/>
                         </a:spcBef>
@@ -3074,7 +3075,7 @@
                     <a:bodyPr/>
                     <a:lstStyle/>
                     <a:p>
-                      <a:pPr marL="0" algn="r" defTabSz="914400" rtl="0" eaLnBrk="1" fontAlgn="t" latinLnBrk="0" hangingPunct="1">
+                      <a:pPr marL="0" algn="l" defTabSz="914400" rtl="0" eaLnBrk="1" fontAlgn="t" latinLnBrk="0" hangingPunct="1">
                         <a:spcBef>
                           <a:spcPts val="0"/>
                         </a:spcBef>
@@ -3103,6 +3104,7 @@
                     <a:bodyPr/>
                     <a:lstStyle/>
                     <a:p>
+                      <a:pPr algn="l"/>
                       <a:r>
                         <a:rPr lang="en-US" sz="1200" b="0" i="0" u="none" strike="noStrike" kern="1200" dirty="0">
                           <a:solidFill>
@@ -3127,6 +3129,7 @@
                     <a:bodyPr/>
                     <a:lstStyle/>
                     <a:p>
+                      <a:pPr algn="l"/>
                       <a:r>
                         <a:rPr lang="en-US" sz="900" b="0" dirty="0">
                           <a:latin typeface="+mj-lt"/>
@@ -3143,13 +3146,13 @@
                   </a:ext>
                 </a:extLst>
               </a:tr>
-              <a:tr h="225965">
+              <a:tr h="257338">
                 <a:tc>
                   <a:txBody>
                     <a:bodyPr/>
                     <a:lstStyle/>
                     <a:p>
-                      <a:pPr marL="0" algn="r" defTabSz="914400" rtl="0" eaLnBrk="1" fontAlgn="t" latinLnBrk="0" hangingPunct="1">
+                      <a:pPr marL="0" algn="l" defTabSz="914400" rtl="0" eaLnBrk="1" fontAlgn="t" latinLnBrk="0" hangingPunct="1">
                         <a:spcBef>
                           <a:spcPts val="0"/>
                         </a:spcBef>
@@ -3178,7 +3181,7 @@
                     <a:bodyPr/>
                     <a:lstStyle/>
                     <a:p>
-                      <a:pPr marL="0" algn="r" defTabSz="914400" rtl="0" eaLnBrk="1" fontAlgn="t" latinLnBrk="0" hangingPunct="1">
+                      <a:pPr marL="0" algn="l" defTabSz="914400" rtl="0" eaLnBrk="1" fontAlgn="t" latinLnBrk="0" hangingPunct="1">
                         <a:spcBef>
                           <a:spcPts val="0"/>
                         </a:spcBef>
@@ -3207,6 +3210,7 @@
                     <a:bodyPr/>
                     <a:lstStyle/>
                     <a:p>
+                      <a:pPr algn="l"/>
                       <a:r>
                         <a:rPr lang="en-US" sz="1200" b="0" i="0" u="none" strike="noStrike" kern="1200" dirty="0">
                           <a:solidFill>
@@ -3231,6 +3235,7 @@
                     <a:bodyPr/>
                     <a:lstStyle/>
                     <a:p>
+                      <a:pPr algn="l"/>
                       <a:r>
                         <a:rPr lang="en-US" sz="900" b="0" dirty="0">
                           <a:latin typeface="+mj-lt"/>
@@ -3247,13 +3252,13 @@
                   </a:ext>
                 </a:extLst>
               </a:tr>
-              <a:tr h="301286">
+              <a:tr h="343117">
                 <a:tc>
                   <a:txBody>
                     <a:bodyPr/>
                     <a:lstStyle/>
                     <a:p>
-                      <a:pPr marL="0" algn="r" defTabSz="914400" rtl="0" eaLnBrk="1" fontAlgn="t" latinLnBrk="0" hangingPunct="1">
+                      <a:pPr marL="0" algn="l" defTabSz="914400" rtl="0" eaLnBrk="1" fontAlgn="t" latinLnBrk="0" hangingPunct="1">
                         <a:spcBef>
                           <a:spcPts val="0"/>
                         </a:spcBef>
@@ -3282,7 +3287,7 @@
                     <a:bodyPr/>
                     <a:lstStyle/>
                     <a:p>
-                      <a:pPr marL="0" algn="r" defTabSz="914400" rtl="0" eaLnBrk="1" fontAlgn="t" latinLnBrk="0" hangingPunct="1">
+                      <a:pPr marL="0" algn="l" defTabSz="914400" rtl="0" eaLnBrk="1" fontAlgn="t" latinLnBrk="0" hangingPunct="1">
                         <a:spcBef>
                           <a:spcPts val="0"/>
                         </a:spcBef>
@@ -3311,6 +3316,7 @@
                     <a:bodyPr/>
                     <a:lstStyle/>
                     <a:p>
+                      <a:pPr algn="l"/>
                       <a:r>
                         <a:rPr lang="en-US" sz="1200" b="0" i="0" u="none" strike="noStrike" kern="1200" dirty="0" err="1">
                           <a:solidFill>
@@ -3365,6 +3371,7 @@
                       </a:r>
                     </a:p>
                     <a:p>
+                      <a:pPr algn="l"/>
                       <a:endParaRPr lang="en-US" sz="900" b="0" dirty="0">
                         <a:latin typeface="+mj-lt"/>
                       </a:endParaRPr>
@@ -3378,13 +3385,16 @@
                   </a:ext>
                 </a:extLst>
               </a:tr>
-              <a:tr h="677894">
+              <a:tr h="772013">
                 <a:tc>
                   <a:txBody>
                     <a:bodyPr/>
                     <a:lstStyle/>
                     <a:p>
-                      <a:pPr marL="0" algn="r" defTabSz="914400" rtl="0" eaLnBrk="1" fontAlgn="t" latinLnBrk="0" hangingPunct="1">
+                      <a:pPr marL="0" algn="l" defTabSz="914400" rtl="0" eaLnBrk="1" fontAlgn="t" latinLnBrk="0" hangingPunct="1">
+                        <a:lnSpc>
+                          <a:spcPct val="100000"/>
+                        </a:lnSpc>
                         <a:spcBef>
                           <a:spcPts val="0"/>
                         </a:spcBef>
@@ -3413,7 +3423,10 @@
                     <a:bodyPr/>
                     <a:lstStyle/>
                     <a:p>
-                      <a:pPr marL="0" algn="r" defTabSz="914400" rtl="0" eaLnBrk="1" fontAlgn="t" latinLnBrk="0" hangingPunct="1">
+                      <a:pPr marL="0" algn="l" defTabSz="914400" rtl="0" eaLnBrk="1" fontAlgn="t" latinLnBrk="0" hangingPunct="1">
+                        <a:lnSpc>
+                          <a:spcPct val="100000"/>
+                        </a:lnSpc>
                         <a:spcBef>
                           <a:spcPts val="0"/>
                         </a:spcBef>
@@ -3442,7 +3455,11 @@
                     <a:bodyPr/>
                     <a:lstStyle/>
                     <a:p>
-                      <a:pPr rtl="0"/>
+                      <a:pPr algn="l" rtl="0">
+                        <a:lnSpc>
+                          <a:spcPct val="100000"/>
+                        </a:lnSpc>
+                      </a:pPr>
                       <a:r>
                         <a:rPr lang="en-US" sz="1200" b="0" i="0" u="none" strike="noStrike" kern="1200" dirty="0" err="1">
                           <a:solidFill>
@@ -3473,6 +3490,11 @@
                       </a:endParaRPr>
                     </a:p>
                     <a:p>
+                      <a:pPr algn="l">
+                        <a:lnSpc>
+                          <a:spcPct val="100000"/>
+                        </a:lnSpc>
+                      </a:pPr>
                       <a:br>
                         <a:rPr lang="en-US" sz="1200" b="0" dirty="0">
                           <a:latin typeface="+mj-lt"/>
@@ -3490,11 +3512,28 @@
                     <a:bodyPr/>
                     <a:lstStyle/>
                     <a:p>
+                      <a:pPr algn="l">
+                        <a:lnSpc>
+                          <a:spcPct val="100000"/>
+                        </a:lnSpc>
+                      </a:pPr>
                       <a:r>
                         <a:rPr lang="en-US" sz="900" b="0" dirty="0">
                           <a:latin typeface="+mj-lt"/>
                         </a:rPr>
-                        <a:t>Patient description, and medicine name provided. </a:t>
+                        <a:t>Demographics of  patient </a:t>
+                      </a:r>
+                      <a:r>
+                        <a:rPr lang="en-US" sz="900" b="0" dirty="0" err="1">
+                          <a:latin typeface="+mj-lt"/>
+                        </a:rPr>
+                        <a:t>cohoty</a:t>
+                      </a:r>
+                      <a:r>
+                        <a:rPr lang="en-US" sz="900" b="0" dirty="0">
+                          <a:latin typeface="+mj-lt"/>
+                        </a:rPr>
+                        <a:t>, and medicine name provided. </a:t>
                       </a:r>
                     </a:p>
                   </a:txBody>
@@ -3574,7 +3613,7 @@
           <a:p>
             <a:r>
               <a:rPr lang="en-US" dirty="0"/>
-              <a:t>Clinical Trials: Edit Distances </a:t>
+              <a:t>Clinical Trials: Standardizing Tumor Names</a:t>
             </a:r>
           </a:p>
         </p:txBody>
@@ -3603,7 +3642,7 @@
         </p:spPr>
         <p:txBody>
           <a:bodyPr>
-            <a:normAutofit/>
+            <a:normAutofit fontScale="92500" lnSpcReduction="10000"/>
           </a:bodyPr>
           <a:lstStyle/>
           <a:p>
@@ -3615,8 +3654,108 @@
                   </a:schemeClr>
                 </a:solidFill>
               </a:rPr>
-              <a:t>Tumors in clinical trials can be obtains from the “conditions” table. </a:t>
+              <a:t>Retrieved ~ 13k unique tumors form clinical trials database. </a:t>
             </a:r>
+          </a:p>
+          <a:p>
+            <a:endParaRPr lang="en-US" dirty="0">
+              <a:solidFill>
+                <a:schemeClr val="tx2">
+                  <a:lumMod val="10000"/>
+                </a:schemeClr>
+              </a:solidFill>
+            </a:endParaRPr>
+          </a:p>
+          <a:p>
+            <a:r>
+              <a:rPr lang="en-US" dirty="0">
+                <a:solidFill>
+                  <a:schemeClr val="tx2">
+                    <a:lumMod val="10000"/>
+                  </a:schemeClr>
+                </a:solidFill>
+              </a:rPr>
+              <a:t>WHO tumor database (5</a:t>
+            </a:r>
+            <a:r>
+              <a:rPr lang="en-US" baseline="30000" dirty="0">
+                <a:solidFill>
+                  <a:schemeClr val="tx2">
+                    <a:lumMod val="10000"/>
+                  </a:schemeClr>
+                </a:solidFill>
+              </a:rPr>
+              <a:t>th</a:t>
+            </a:r>
+            <a:r>
+              <a:rPr lang="en-US" dirty="0">
+                <a:solidFill>
+                  <a:schemeClr val="tx2">
+                    <a:lumMod val="10000"/>
+                  </a:schemeClr>
+                </a:solidFill>
+              </a:rPr>
+              <a:t> edition) contains 2390 standardized unique tumors.</a:t>
+            </a:r>
+          </a:p>
+          <a:p>
+            <a:endParaRPr lang="en-US" dirty="0">
+              <a:solidFill>
+                <a:schemeClr val="tx2">
+                  <a:lumMod val="10000"/>
+                </a:schemeClr>
+              </a:solidFill>
+            </a:endParaRPr>
+          </a:p>
+          <a:p>
+            <a:r>
+              <a:rPr lang="en-US" dirty="0">
+                <a:solidFill>
+                  <a:schemeClr val="tx2">
+                    <a:lumMod val="10000"/>
+                  </a:schemeClr>
+                </a:solidFill>
+              </a:rPr>
+              <a:t>NCIT tumor database contains 1395 standardized unique tumors.</a:t>
+            </a:r>
+          </a:p>
+          <a:p>
+            <a:endParaRPr lang="en-US" dirty="0">
+              <a:solidFill>
+                <a:schemeClr val="tx2">
+                  <a:lumMod val="10000"/>
+                </a:schemeClr>
+              </a:solidFill>
+            </a:endParaRPr>
+          </a:p>
+          <a:p>
+            <a:r>
+              <a:rPr lang="en-US" b="1" dirty="0">
+                <a:solidFill>
+                  <a:srgbClr val="C00000"/>
+                </a:solidFill>
+              </a:rPr>
+              <a:t>Objective</a:t>
+            </a:r>
+            <a:r>
+              <a:rPr lang="en-US" dirty="0">
+                <a:solidFill>
+                  <a:schemeClr val="tx2">
+                    <a:lumMod val="10000"/>
+                  </a:schemeClr>
+                </a:solidFill>
+              </a:rPr>
+              <a:t>: Map unstandardized clinical trials tumors to WHO or NCIT tumors. </a:t>
+            </a:r>
+          </a:p>
+          <a:p>
+            <a:endParaRPr lang="en-US" dirty="0">
+              <a:solidFill>
+                <a:schemeClr val="tx2">
+                  <a:lumMod val="10000"/>
+                </a:schemeClr>
+              </a:solidFill>
+            </a:endParaRPr>
           </a:p>
           <a:p>
             <a:endParaRPr lang="en-US" dirty="0">
@@ -3878,6 +4017,220 @@
     <p:extLst>
       <p:ext uri="{BB962C8B-B14F-4D97-AF65-F5344CB8AC3E}">
         <p14:creationId xmlns:p14="http://schemas.microsoft.com/office/powerpoint/2010/main" val="294223749"/>
+      </p:ext>
+    </p:extLst>
+  </p:cSld>
+  <p:clrMapOvr>
+    <a:masterClrMapping/>
+  </p:clrMapOvr>
+</p:sld>
+</file>
+
+<file path=ppt/slides/slide13.xml><?xml version="1.0" encoding="utf-8"?>
+<p:sld xmlns:a="http://schemas.openxmlformats.org/drawingml/2006/main" xmlns:r="http://schemas.openxmlformats.org/officeDocument/2006/relationships" xmlns:p="http://schemas.openxmlformats.org/presentationml/2006/main">
+  <p:cSld>
+    <p:spTree>
+      <p:nvGrpSpPr>
+        <p:cNvPr id="1" name="">
+          <a:extLst>
+            <a:ext uri="{FF2B5EF4-FFF2-40B4-BE49-F238E27FC236}">
+              <a16:creationId xmlns:a16="http://schemas.microsoft.com/office/drawing/2014/main" id="{DA826CB7-5C2E-AC1D-3C0E-9248AB93F554}"/>
+            </a:ext>
+          </a:extLst>
+        </p:cNvPr>
+        <p:cNvGrpSpPr/>
+        <p:nvPr/>
+      </p:nvGrpSpPr>
+      <p:grpSpPr>
+        <a:xfrm>
+          <a:off x="0" y="0"/>
+          <a:ext cx="0" cy="0"/>
+          <a:chOff x="0" y="0"/>
+          <a:chExt cx="0" cy="0"/>
+        </a:xfrm>
+      </p:grpSpPr>
+      <p:sp>
+        <p:nvSpPr>
+          <p:cNvPr id="2" name="Title 1">
+            <a:extLst>
+              <a:ext uri="{FF2B5EF4-FFF2-40B4-BE49-F238E27FC236}">
+                <a16:creationId xmlns:a16="http://schemas.microsoft.com/office/drawing/2014/main" id="{48D1D18F-9E4B-E162-D89D-E904DC408250}"/>
+              </a:ext>
+            </a:extLst>
+          </p:cNvPr>
+          <p:cNvSpPr>
+            <a:spLocks noGrp="1"/>
+          </p:cNvSpPr>
+          <p:nvPr>
+            <p:ph type="title"/>
+          </p:nvPr>
+        </p:nvSpPr>
+        <p:spPr>
+          <a:xfrm>
+            <a:off x="97340" y="83425"/>
+            <a:ext cx="11010595" cy="1143000"/>
+          </a:xfrm>
+        </p:spPr>
+        <p:txBody>
+          <a:bodyPr/>
+          <a:lstStyle/>
+          <a:p>
+            <a:r>
+              <a:rPr lang="en-US" dirty="0"/>
+              <a:t>Clinical Trials: Standardization Method</a:t>
+            </a:r>
+          </a:p>
+        </p:txBody>
+      </p:sp>
+      <p:sp>
+        <p:nvSpPr>
+          <p:cNvPr id="3" name="Content Placeholder 2">
+            <a:extLst>
+              <a:ext uri="{FF2B5EF4-FFF2-40B4-BE49-F238E27FC236}">
+                <a16:creationId xmlns:a16="http://schemas.microsoft.com/office/drawing/2014/main" id="{F6573F09-553F-8ED0-5FA0-87424F9EC865}"/>
+              </a:ext>
+            </a:extLst>
+          </p:cNvPr>
+          <p:cNvSpPr>
+            <a:spLocks noGrp="1"/>
+          </p:cNvSpPr>
+          <p:nvPr>
+            <p:ph idx="1"/>
+          </p:nvPr>
+        </p:nvSpPr>
+        <p:spPr>
+          <a:xfrm>
+            <a:off x="216212" y="1481328"/>
+            <a:ext cx="11010595" cy="3895344"/>
+          </a:xfrm>
+        </p:spPr>
+        <p:txBody>
+          <a:bodyPr>
+            <a:normAutofit/>
+          </a:bodyPr>
+          <a:lstStyle/>
+          <a:p>
+            <a:r>
+              <a:rPr lang="en-US" dirty="0">
+                <a:solidFill>
+                  <a:schemeClr val="tx2">
+                    <a:lumMod val="10000"/>
+                  </a:schemeClr>
+                </a:solidFill>
+              </a:rPr>
+              <a:t>Tumors in clinical trials can be obtains from the “conditions” table. </a:t>
+            </a:r>
+          </a:p>
+          <a:p>
+            <a:endParaRPr lang="en-US" dirty="0">
+              <a:solidFill>
+                <a:schemeClr val="tx2">
+                  <a:lumMod val="10000"/>
+                </a:schemeClr>
+              </a:solidFill>
+            </a:endParaRPr>
+          </a:p>
+          <a:p>
+            <a:pPr marL="0" indent="0">
+              <a:buNone/>
+            </a:pPr>
+            <a:endParaRPr lang="en-US" dirty="0">
+              <a:solidFill>
+                <a:schemeClr val="tx2">
+                  <a:lumMod val="10000"/>
+                </a:schemeClr>
+              </a:solidFill>
+            </a:endParaRPr>
+          </a:p>
+          <a:p>
+            <a:endParaRPr lang="en-US" dirty="0">
+              <a:solidFill>
+                <a:schemeClr val="tx2">
+                  <a:lumMod val="10000"/>
+                </a:schemeClr>
+              </a:solidFill>
+            </a:endParaRPr>
+          </a:p>
+          <a:p>
+            <a:pPr marL="0" indent="0">
+              <a:buNone/>
+            </a:pPr>
+            <a:endParaRPr lang="en-US" dirty="0">
+              <a:solidFill>
+                <a:schemeClr val="tx2">
+                  <a:lumMod val="10000"/>
+                </a:schemeClr>
+              </a:solidFill>
+            </a:endParaRPr>
+          </a:p>
+        </p:txBody>
+      </p:sp>
+      <p:sp>
+        <p:nvSpPr>
+          <p:cNvPr id="4" name="Slide Number Placeholder 3">
+            <a:extLst>
+              <a:ext uri="{FF2B5EF4-FFF2-40B4-BE49-F238E27FC236}">
+                <a16:creationId xmlns:a16="http://schemas.microsoft.com/office/drawing/2014/main" id="{58F60613-4599-BCCD-E7FC-56F88186AC91}"/>
+              </a:ext>
+            </a:extLst>
+          </p:cNvPr>
+          <p:cNvSpPr>
+            <a:spLocks noGrp="1"/>
+          </p:cNvSpPr>
+          <p:nvPr>
+            <p:ph type="sldNum" sz="quarter" idx="12"/>
+          </p:nvPr>
+        </p:nvSpPr>
+        <p:spPr/>
+        <p:txBody>
+          <a:bodyPr/>
+          <a:lstStyle/>
+          <a:p>
+            <a:fld id="{AD40181A-01B0-4CB8-8614-1473649F6741}" type="slidenum">
+              <a:rPr lang="en-US" smtClean="0"/>
+              <a:pPr/>
+              <a:t>13</a:t>
+            </a:fld>
+            <a:endParaRPr lang="en-US" dirty="0"/>
+          </a:p>
+        </p:txBody>
+      </p:sp>
+      <p:sp>
+        <p:nvSpPr>
+          <p:cNvPr id="5" name="TextBox 4">
+            <a:extLst>
+              <a:ext uri="{FF2B5EF4-FFF2-40B4-BE49-F238E27FC236}">
+                <a16:creationId xmlns:a16="http://schemas.microsoft.com/office/drawing/2014/main" id="{8FC2D7A0-DD32-5371-C352-BF87A8C6892E}"/>
+              </a:ext>
+            </a:extLst>
+          </p:cNvPr>
+          <p:cNvSpPr txBox="1"/>
+          <p:nvPr/>
+        </p:nvSpPr>
+        <p:spPr>
+          <a:xfrm>
+            <a:off x="5112327" y="947651"/>
+            <a:ext cx="184731" cy="369332"/>
+          </a:xfrm>
+          <a:prstGeom prst="rect">
+            <a:avLst/>
+          </a:prstGeom>
+          <a:noFill/>
+        </p:spPr>
+        <p:txBody>
+          <a:bodyPr wrap="none" rtlCol="0">
+            <a:spAutoFit/>
+          </a:bodyPr>
+          <a:lstStyle/>
+          <a:p>
+            <a:endParaRPr lang="en-US"/>
+          </a:p>
+        </p:txBody>
+      </p:sp>
+    </p:spTree>
+    <p:extLst>
+      <p:ext uri="{BB962C8B-B14F-4D97-AF65-F5344CB8AC3E}">
+        <p14:creationId xmlns:p14="http://schemas.microsoft.com/office/powerpoint/2010/main" val="1793706748"/>
       </p:ext>
     </p:extLst>
   </p:cSld>

</xml_diff>

<commit_message>
adding method 2 pipeline
</commit_message>
<xml_diff>
--- a/presentations/BIG_2024.pptx
+++ b/presentations/BIG_2024.pptx
@@ -5,7 +5,7 @@
     <p:sldMasterId id="2147483672" r:id="rId4"/>
   </p:sldMasterIdLst>
   <p:notesMasterIdLst>
-    <p:notesMasterId r:id="rId22"/>
+    <p:notesMasterId r:id="rId24"/>
   </p:notesMasterIdLst>
   <p:sldIdLst>
     <p:sldId id="256" r:id="rId5"/>
@@ -19,12 +19,14 @@
     <p:sldId id="264" r:id="rId13"/>
     <p:sldId id="266" r:id="rId14"/>
     <p:sldId id="267" r:id="rId15"/>
-    <p:sldId id="268" r:id="rId16"/>
-    <p:sldId id="270" r:id="rId17"/>
+    <p:sldId id="270" r:id="rId16"/>
+    <p:sldId id="278" r:id="rId17"/>
     <p:sldId id="271" r:id="rId18"/>
     <p:sldId id="273" r:id="rId19"/>
-    <p:sldId id="272" r:id="rId20"/>
-    <p:sldId id="274" r:id="rId21"/>
+    <p:sldId id="275" r:id="rId20"/>
+    <p:sldId id="272" r:id="rId21"/>
+    <p:sldId id="277" r:id="rId22"/>
+    <p:sldId id="274" r:id="rId23"/>
   </p:sldIdLst>
   <p:sldSz cx="12192000" cy="6858000"/>
   <p:notesSz cx="6858000" cy="9144000"/>
@@ -3856,212 +3858,6 @@
         <p:cNvPr id="1" name="">
           <a:extLst>
             <a:ext uri="{FF2B5EF4-FFF2-40B4-BE49-F238E27FC236}">
-              <a16:creationId xmlns:a16="http://schemas.microsoft.com/office/drawing/2014/main" id="{2243D97C-25D5-9802-2332-165BDAF02E83}"/>
-            </a:ext>
-          </a:extLst>
-        </p:cNvPr>
-        <p:cNvGrpSpPr/>
-        <p:nvPr/>
-      </p:nvGrpSpPr>
-      <p:grpSpPr>
-        <a:xfrm>
-          <a:off x="0" y="0"/>
-          <a:ext cx="0" cy="0"/>
-          <a:chOff x="0" y="0"/>
-          <a:chExt cx="0" cy="0"/>
-        </a:xfrm>
-      </p:grpSpPr>
-      <p:sp>
-        <p:nvSpPr>
-          <p:cNvPr id="2" name="Title 1">
-            <a:extLst>
-              <a:ext uri="{FF2B5EF4-FFF2-40B4-BE49-F238E27FC236}">
-                <a16:creationId xmlns:a16="http://schemas.microsoft.com/office/drawing/2014/main" id="{31AC42B2-E5C1-D5CB-733C-2DC345AA37B9}"/>
-              </a:ext>
-            </a:extLst>
-          </p:cNvPr>
-          <p:cNvSpPr>
-            <a:spLocks noGrp="1"/>
-          </p:cNvSpPr>
-          <p:nvPr>
-            <p:ph type="title"/>
-          </p:nvPr>
-        </p:nvSpPr>
-        <p:spPr>
-          <a:xfrm>
-            <a:off x="97340" y="83425"/>
-            <a:ext cx="11010595" cy="1143000"/>
-          </a:xfrm>
-        </p:spPr>
-        <p:txBody>
-          <a:bodyPr/>
-          <a:lstStyle/>
-          <a:p>
-            <a:r>
-              <a:rPr lang="en-US" sz="3200" dirty="0"/>
-              <a:t>Standardization Method : Edit distance</a:t>
-            </a:r>
-          </a:p>
-        </p:txBody>
-      </p:sp>
-      <p:sp>
-        <p:nvSpPr>
-          <p:cNvPr id="3" name="Content Placeholder 2">
-            <a:extLst>
-              <a:ext uri="{FF2B5EF4-FFF2-40B4-BE49-F238E27FC236}">
-                <a16:creationId xmlns:a16="http://schemas.microsoft.com/office/drawing/2014/main" id="{5EA8304E-E5E1-D7FA-ACFE-D4CB48AC7757}"/>
-              </a:ext>
-            </a:extLst>
-          </p:cNvPr>
-          <p:cNvSpPr>
-            <a:spLocks noGrp="1"/>
-          </p:cNvSpPr>
-          <p:nvPr>
-            <p:ph idx="1"/>
-          </p:nvPr>
-        </p:nvSpPr>
-        <p:spPr>
-          <a:xfrm>
-            <a:off x="216212" y="1481328"/>
-            <a:ext cx="11010595" cy="3895344"/>
-          </a:xfrm>
-        </p:spPr>
-        <p:txBody>
-          <a:bodyPr>
-            <a:normAutofit/>
-          </a:bodyPr>
-          <a:lstStyle/>
-          <a:p>
-            <a:endParaRPr lang="en-US" dirty="0">
-              <a:solidFill>
-                <a:schemeClr val="tx2">
-                  <a:lumMod val="10000"/>
-                </a:schemeClr>
-              </a:solidFill>
-            </a:endParaRPr>
-          </a:p>
-          <a:p>
-            <a:pPr marL="0" indent="0">
-              <a:buNone/>
-            </a:pPr>
-            <a:endParaRPr lang="en-US" dirty="0">
-              <a:solidFill>
-                <a:schemeClr val="tx2">
-                  <a:lumMod val="10000"/>
-                </a:schemeClr>
-              </a:solidFill>
-            </a:endParaRPr>
-          </a:p>
-          <a:p>
-            <a:endParaRPr lang="en-US" dirty="0">
-              <a:solidFill>
-                <a:schemeClr val="tx2">
-                  <a:lumMod val="10000"/>
-                </a:schemeClr>
-              </a:solidFill>
-            </a:endParaRPr>
-          </a:p>
-          <a:p>
-            <a:pPr marL="0" indent="0">
-              <a:buNone/>
-            </a:pPr>
-            <a:endParaRPr lang="en-US" dirty="0">
-              <a:solidFill>
-                <a:schemeClr val="tx2">
-                  <a:lumMod val="10000"/>
-                </a:schemeClr>
-              </a:solidFill>
-            </a:endParaRPr>
-          </a:p>
-        </p:txBody>
-      </p:sp>
-      <p:sp>
-        <p:nvSpPr>
-          <p:cNvPr id="4" name="Slide Number Placeholder 3">
-            <a:extLst>
-              <a:ext uri="{FF2B5EF4-FFF2-40B4-BE49-F238E27FC236}">
-                <a16:creationId xmlns:a16="http://schemas.microsoft.com/office/drawing/2014/main" id="{B307A125-0705-7F00-5FDF-D1E61D13F2BB}"/>
-              </a:ext>
-            </a:extLst>
-          </p:cNvPr>
-          <p:cNvSpPr>
-            <a:spLocks noGrp="1"/>
-          </p:cNvSpPr>
-          <p:nvPr>
-            <p:ph type="sldNum" sz="quarter" idx="12"/>
-          </p:nvPr>
-        </p:nvSpPr>
-        <p:spPr/>
-        <p:txBody>
-          <a:bodyPr/>
-          <a:lstStyle/>
-          <a:p>
-            <a:fld id="{AD40181A-01B0-4CB8-8614-1473649F6741}" type="slidenum">
-              <a:rPr lang="en-US" smtClean="0"/>
-              <a:pPr/>
-              <a:t>12</a:t>
-            </a:fld>
-            <a:endParaRPr lang="en-US" dirty="0"/>
-          </a:p>
-        </p:txBody>
-      </p:sp>
-      <p:pic>
-        <p:nvPicPr>
-          <p:cNvPr id="8" name="Picture 7" descr="A diagram of a few cylinder&#10;&#10;Description automatically generated with medium confidence">
-            <a:extLst>
-              <a:ext uri="{FF2B5EF4-FFF2-40B4-BE49-F238E27FC236}">
-                <a16:creationId xmlns:a16="http://schemas.microsoft.com/office/drawing/2014/main" id="{415B3EEA-B764-397D-6502-9DFADFE6D6DC}"/>
-              </a:ext>
-            </a:extLst>
-          </p:cNvPr>
-          <p:cNvPicPr>
-            <a:picLocks noChangeAspect="1"/>
-          </p:cNvPicPr>
-          <p:nvPr/>
-        </p:nvPicPr>
-        <p:blipFill>
-          <a:blip r:embed="rId2">
-            <a:extLst>
-              <a:ext uri="{28A0092B-C50C-407E-A947-70E740481C1C}">
-                <a14:useLocalDpi xmlns:a14="http://schemas.microsoft.com/office/drawing/2010/main" val="0"/>
-              </a:ext>
-            </a:extLst>
-          </a:blip>
-          <a:stretch>
-            <a:fillRect/>
-          </a:stretch>
-        </p:blipFill>
-        <p:spPr>
-          <a:xfrm>
-            <a:off x="216212" y="1159923"/>
-            <a:ext cx="7033260" cy="4137212"/>
-          </a:xfrm>
-          <a:prstGeom prst="rect">
-            <a:avLst/>
-          </a:prstGeom>
-        </p:spPr>
-      </p:pic>
-    </p:spTree>
-    <p:extLst>
-      <p:ext uri="{BB962C8B-B14F-4D97-AF65-F5344CB8AC3E}">
-        <p14:creationId xmlns:p14="http://schemas.microsoft.com/office/powerpoint/2010/main" val="294223749"/>
-      </p:ext>
-    </p:extLst>
-  </p:cSld>
-  <p:clrMapOvr>
-    <a:masterClrMapping/>
-  </p:clrMapOvr>
-</p:sld>
-</file>
-
-<file path=ppt/slides/slide13.xml><?xml version="1.0" encoding="utf-8"?>
-<p:sld xmlns:a="http://schemas.openxmlformats.org/drawingml/2006/main" xmlns:r="http://schemas.openxmlformats.org/officeDocument/2006/relationships" xmlns:p="http://schemas.openxmlformats.org/presentationml/2006/main">
-  <p:cSld>
-    <p:spTree>
-      <p:nvGrpSpPr>
-        <p:cNvPr id="1" name="">
-          <a:extLst>
-            <a:ext uri="{FF2B5EF4-FFF2-40B4-BE49-F238E27FC236}">
               <a16:creationId xmlns:a16="http://schemas.microsoft.com/office/drawing/2014/main" id="{8398F2B3-FCF1-2AC8-DAF9-2AB9D0CC6F2B}"/>
             </a:ext>
           </a:extLst>
@@ -4095,7 +3891,7 @@
         </p:nvSpPr>
         <p:spPr>
           <a:xfrm>
-            <a:off x="97340" y="83425"/>
+            <a:off x="72402" y="-54981"/>
             <a:ext cx="11010595" cy="1143000"/>
           </a:xfrm>
         </p:spPr>
@@ -4205,179 +4001,18 @@
             <a:fld id="{AD40181A-01B0-4CB8-8614-1473649F6741}" type="slidenum">
               <a:rPr lang="en-US" smtClean="0"/>
               <a:pPr/>
-              <a:t>13</a:t>
+              <a:t>12</a:t>
             </a:fld>
             <a:endParaRPr lang="en-US" dirty="0"/>
           </a:p>
         </p:txBody>
       </p:sp>
-      <p:sp>
-        <p:nvSpPr>
-          <p:cNvPr id="5" name="TextBox 4">
+      <p:pic>
+        <p:nvPicPr>
+          <p:cNvPr id="10" name="Picture 9" descr="A screenshot of a computer&#10;&#10;Description automatically generated">
             <a:extLst>
               <a:ext uri="{FF2B5EF4-FFF2-40B4-BE49-F238E27FC236}">
-                <a16:creationId xmlns:a16="http://schemas.microsoft.com/office/drawing/2014/main" id="{B202FB3A-6989-77D3-F607-94537F46A6EB}"/>
-              </a:ext>
-            </a:extLst>
-          </p:cNvPr>
-          <p:cNvSpPr txBox="1"/>
-          <p:nvPr/>
-        </p:nvSpPr>
-        <p:spPr>
-          <a:xfrm>
-            <a:off x="7834015" y="1481328"/>
-            <a:ext cx="2808248" cy="2031325"/>
-          </a:xfrm>
-          <a:prstGeom prst="rect">
-            <a:avLst/>
-          </a:prstGeom>
-          <a:noFill/>
-        </p:spPr>
-        <p:txBody>
-          <a:bodyPr wrap="square" rtlCol="0">
-            <a:spAutoFit/>
-          </a:bodyPr>
-          <a:lstStyle/>
-          <a:p>
-            <a:r>
-              <a:rPr lang="en-US" dirty="0">
-                <a:solidFill>
-                  <a:schemeClr val="bg2">
-                    <a:lumMod val="50000"/>
-                  </a:schemeClr>
-                </a:solidFill>
-              </a:rPr>
-              <a:t>Distance Metrics used:</a:t>
-            </a:r>
-            <a:br>
-              <a:rPr lang="en-US" dirty="0">
-                <a:solidFill>
-                  <a:schemeClr val="bg2">
-                    <a:lumMod val="50000"/>
-                  </a:schemeClr>
-                </a:solidFill>
-              </a:rPr>
-            </a:br>
-            <a:br>
-              <a:rPr lang="en-US" dirty="0">
-                <a:solidFill>
-                  <a:schemeClr val="bg2">
-                    <a:lumMod val="50000"/>
-                  </a:schemeClr>
-                </a:solidFill>
-              </a:rPr>
-            </a:br>
-            <a:r>
-              <a:rPr lang="en-US" dirty="0">
-                <a:solidFill>
-                  <a:schemeClr val="bg2">
-                    <a:lumMod val="50000"/>
-                  </a:schemeClr>
-                </a:solidFill>
-              </a:rPr>
-              <a:t>1. </a:t>
-            </a:r>
-            <a:r>
-              <a:rPr lang="en-US" dirty="0" err="1">
-                <a:solidFill>
-                  <a:schemeClr val="bg2">
-                    <a:lumMod val="50000"/>
-                  </a:schemeClr>
-                </a:solidFill>
-              </a:rPr>
-              <a:t>Levenshtein</a:t>
-            </a:r>
-            <a:r>
-              <a:rPr lang="en-US" b="0" i="0" dirty="0">
-                <a:solidFill>
-                  <a:srgbClr val="E8E8E8"/>
-                </a:solidFill>
-                <a:effectLst/>
-                <a:latin typeface="Google Sans"/>
-              </a:rPr>
-              <a:t> </a:t>
-            </a:r>
-            <a:r>
-              <a:rPr lang="en-US" dirty="0">
-                <a:solidFill>
-                  <a:schemeClr val="bg2">
-                    <a:lumMod val="50000"/>
-                  </a:schemeClr>
-                </a:solidFill>
-              </a:rPr>
-              <a:t>distance</a:t>
-            </a:r>
-          </a:p>
-          <a:p>
-            <a:endParaRPr lang="en-US" dirty="0">
-              <a:solidFill>
-                <a:schemeClr val="bg2">
-                  <a:lumMod val="50000"/>
-                </a:schemeClr>
-              </a:solidFill>
-            </a:endParaRPr>
-          </a:p>
-          <a:p>
-            <a:r>
-              <a:rPr lang="en-US" dirty="0">
-                <a:solidFill>
-                  <a:schemeClr val="bg2">
-                    <a:lumMod val="50000"/>
-                  </a:schemeClr>
-                </a:solidFill>
-              </a:rPr>
-              <a:t>2. </a:t>
-            </a:r>
-            <a:r>
-              <a:rPr lang="en-US" dirty="0" err="1">
-                <a:solidFill>
-                  <a:schemeClr val="bg2">
-                    <a:lumMod val="50000"/>
-                  </a:schemeClr>
-                </a:solidFill>
-              </a:rPr>
-              <a:t>Jarro</a:t>
-            </a:r>
-            <a:r>
-              <a:rPr lang="en-US" dirty="0">
-                <a:solidFill>
-                  <a:schemeClr val="bg2">
-                    <a:lumMod val="50000"/>
-                  </a:schemeClr>
-                </a:solidFill>
-              </a:rPr>
-              <a:t>-Winkler distance</a:t>
-            </a:r>
-          </a:p>
-          <a:p>
-            <a:endParaRPr lang="en-US" dirty="0">
-              <a:solidFill>
-                <a:schemeClr val="bg2">
-                  <a:lumMod val="50000"/>
-                </a:schemeClr>
-              </a:solidFill>
-            </a:endParaRPr>
-          </a:p>
-          <a:p>
-            <a:r>
-              <a:rPr lang="en-US" dirty="0">
-                <a:solidFill>
-                  <a:schemeClr val="bg2">
-                    <a:lumMod val="50000"/>
-                  </a:schemeClr>
-                </a:solidFill>
-              </a:rPr>
-              <a:t>3. Cosine distance </a:t>
-            </a:r>
-          </a:p>
-        </p:txBody>
-      </p:sp>
-      <p:pic>
-        <p:nvPicPr>
-          <p:cNvPr id="7" name="Picture 6" descr="A diagram of a few cylinder&#10;&#10;Description automatically generated with medium confidence">
-            <a:extLst>
-              <a:ext uri="{FF2B5EF4-FFF2-40B4-BE49-F238E27FC236}">
-                <a16:creationId xmlns:a16="http://schemas.microsoft.com/office/drawing/2014/main" id="{472C9329-1152-ED10-D122-93BA848F5115}"/>
+                <a16:creationId xmlns:a16="http://schemas.microsoft.com/office/drawing/2014/main" id="{58E70648-14AB-85C5-25D0-8C29BBBFC97E}"/>
               </a:ext>
             </a:extLst>
           </p:cNvPr>
@@ -4400,8 +4035,8 @@
         </p:blipFill>
         <p:spPr>
           <a:xfrm>
-            <a:off x="216212" y="1159923"/>
-            <a:ext cx="7033260" cy="4137212"/>
+            <a:off x="-66017" y="1078713"/>
+            <a:ext cx="9824696" cy="4965283"/>
           </a:xfrm>
           <a:prstGeom prst="rect">
             <a:avLst/>
@@ -4412,6 +4047,373 @@
     <p:extLst>
       <p:ext uri="{BB962C8B-B14F-4D97-AF65-F5344CB8AC3E}">
         <p14:creationId xmlns:p14="http://schemas.microsoft.com/office/powerpoint/2010/main" val="1140904793"/>
+      </p:ext>
+    </p:extLst>
+  </p:cSld>
+  <p:clrMapOvr>
+    <a:masterClrMapping/>
+  </p:clrMapOvr>
+</p:sld>
+</file>
+
+<file path=ppt/slides/slide13.xml><?xml version="1.0" encoding="utf-8"?>
+<p:sld xmlns:a="http://schemas.openxmlformats.org/drawingml/2006/main" xmlns:r="http://schemas.openxmlformats.org/officeDocument/2006/relationships" xmlns:p="http://schemas.openxmlformats.org/presentationml/2006/main">
+  <p:cSld>
+    <p:spTree>
+      <p:nvGrpSpPr>
+        <p:cNvPr id="1" name="">
+          <a:extLst>
+            <a:ext uri="{FF2B5EF4-FFF2-40B4-BE49-F238E27FC236}">
+              <a16:creationId xmlns:a16="http://schemas.microsoft.com/office/drawing/2014/main" id="{992FFAE6-0C60-02DC-EAFB-075B63CAC4D9}"/>
+            </a:ext>
+          </a:extLst>
+        </p:cNvPr>
+        <p:cNvGrpSpPr/>
+        <p:nvPr/>
+      </p:nvGrpSpPr>
+      <p:grpSpPr>
+        <a:xfrm>
+          <a:off x="0" y="0"/>
+          <a:ext cx="0" cy="0"/>
+          <a:chOff x="0" y="0"/>
+          <a:chExt cx="0" cy="0"/>
+        </a:xfrm>
+      </p:grpSpPr>
+      <p:sp>
+        <p:nvSpPr>
+          <p:cNvPr id="2" name="Title 1">
+            <a:extLst>
+              <a:ext uri="{FF2B5EF4-FFF2-40B4-BE49-F238E27FC236}">
+                <a16:creationId xmlns:a16="http://schemas.microsoft.com/office/drawing/2014/main" id="{76AF6C71-13F8-FC5D-5B55-E4FA7859451E}"/>
+              </a:ext>
+            </a:extLst>
+          </p:cNvPr>
+          <p:cNvSpPr>
+            <a:spLocks noGrp="1"/>
+          </p:cNvSpPr>
+          <p:nvPr>
+            <p:ph type="title"/>
+          </p:nvPr>
+        </p:nvSpPr>
+        <p:spPr>
+          <a:xfrm>
+            <a:off x="72402" y="-54981"/>
+            <a:ext cx="11010595" cy="1143000"/>
+          </a:xfrm>
+        </p:spPr>
+        <p:txBody>
+          <a:bodyPr/>
+          <a:lstStyle/>
+          <a:p>
+            <a:r>
+              <a:rPr lang="en-US" sz="3200" dirty="0"/>
+              <a:t>Standardization Method 1 : Edit distance</a:t>
+            </a:r>
+          </a:p>
+        </p:txBody>
+      </p:sp>
+      <p:sp>
+        <p:nvSpPr>
+          <p:cNvPr id="3" name="Content Placeholder 2">
+            <a:extLst>
+              <a:ext uri="{FF2B5EF4-FFF2-40B4-BE49-F238E27FC236}">
+                <a16:creationId xmlns:a16="http://schemas.microsoft.com/office/drawing/2014/main" id="{DC49F671-39F5-E6CF-00F9-136B11F86C2C}"/>
+              </a:ext>
+            </a:extLst>
+          </p:cNvPr>
+          <p:cNvSpPr>
+            <a:spLocks noGrp="1"/>
+          </p:cNvSpPr>
+          <p:nvPr>
+            <p:ph idx="1"/>
+          </p:nvPr>
+        </p:nvSpPr>
+        <p:spPr>
+          <a:xfrm>
+            <a:off x="216212" y="1481328"/>
+            <a:ext cx="11010595" cy="3895344"/>
+          </a:xfrm>
+        </p:spPr>
+        <p:txBody>
+          <a:bodyPr>
+            <a:normAutofit/>
+          </a:bodyPr>
+          <a:lstStyle/>
+          <a:p>
+            <a:endParaRPr lang="en-US" dirty="0">
+              <a:solidFill>
+                <a:schemeClr val="tx2">
+                  <a:lumMod val="10000"/>
+                </a:schemeClr>
+              </a:solidFill>
+            </a:endParaRPr>
+          </a:p>
+          <a:p>
+            <a:pPr marL="0" indent="0">
+              <a:buNone/>
+            </a:pPr>
+            <a:endParaRPr lang="en-US" dirty="0">
+              <a:solidFill>
+                <a:schemeClr val="tx2">
+                  <a:lumMod val="10000"/>
+                </a:schemeClr>
+              </a:solidFill>
+            </a:endParaRPr>
+          </a:p>
+          <a:p>
+            <a:endParaRPr lang="en-US" dirty="0">
+              <a:solidFill>
+                <a:schemeClr val="tx2">
+                  <a:lumMod val="10000"/>
+                </a:schemeClr>
+              </a:solidFill>
+            </a:endParaRPr>
+          </a:p>
+          <a:p>
+            <a:pPr marL="0" indent="0">
+              <a:buNone/>
+            </a:pPr>
+            <a:endParaRPr lang="en-US" dirty="0">
+              <a:solidFill>
+                <a:schemeClr val="tx2">
+                  <a:lumMod val="10000"/>
+                </a:schemeClr>
+              </a:solidFill>
+            </a:endParaRPr>
+          </a:p>
+        </p:txBody>
+      </p:sp>
+      <p:sp>
+        <p:nvSpPr>
+          <p:cNvPr id="4" name="Slide Number Placeholder 3">
+            <a:extLst>
+              <a:ext uri="{FF2B5EF4-FFF2-40B4-BE49-F238E27FC236}">
+                <a16:creationId xmlns:a16="http://schemas.microsoft.com/office/drawing/2014/main" id="{C9F10198-6D2F-FA30-7607-43AD6999FCEB}"/>
+              </a:ext>
+            </a:extLst>
+          </p:cNvPr>
+          <p:cNvSpPr>
+            <a:spLocks noGrp="1"/>
+          </p:cNvSpPr>
+          <p:nvPr>
+            <p:ph type="sldNum" sz="quarter" idx="12"/>
+          </p:nvPr>
+        </p:nvSpPr>
+        <p:spPr/>
+        <p:txBody>
+          <a:bodyPr/>
+          <a:lstStyle/>
+          <a:p>
+            <a:fld id="{AD40181A-01B0-4CB8-8614-1473649F6741}" type="slidenum">
+              <a:rPr lang="en-US" smtClean="0"/>
+              <a:pPr/>
+              <a:t>13</a:t>
+            </a:fld>
+            <a:endParaRPr lang="en-US" dirty="0"/>
+          </a:p>
+        </p:txBody>
+      </p:sp>
+      <p:sp>
+        <p:nvSpPr>
+          <p:cNvPr id="5" name="TextBox 4">
+            <a:extLst>
+              <a:ext uri="{FF2B5EF4-FFF2-40B4-BE49-F238E27FC236}">
+                <a16:creationId xmlns:a16="http://schemas.microsoft.com/office/drawing/2014/main" id="{44C6E343-C1CA-25FA-98F0-906E5FF9CAEA}"/>
+              </a:ext>
+            </a:extLst>
+          </p:cNvPr>
+          <p:cNvSpPr txBox="1"/>
+          <p:nvPr/>
+        </p:nvSpPr>
+        <p:spPr>
+          <a:xfrm>
+            <a:off x="8020920" y="1088019"/>
+            <a:ext cx="4039975" cy="1384995"/>
+          </a:xfrm>
+          <a:prstGeom prst="rect">
+            <a:avLst/>
+          </a:prstGeom>
+          <a:noFill/>
+        </p:spPr>
+        <p:txBody>
+          <a:bodyPr wrap="square" rtlCol="0">
+            <a:spAutoFit/>
+          </a:bodyPr>
+          <a:lstStyle/>
+          <a:p>
+            <a:r>
+              <a:rPr lang="en-US" sz="1200" dirty="0">
+                <a:solidFill>
+                  <a:schemeClr val="bg2">
+                    <a:lumMod val="50000"/>
+                  </a:schemeClr>
+                </a:solidFill>
+              </a:rPr>
+              <a:t>Distance Metrics used:</a:t>
+            </a:r>
+            <a:br>
+              <a:rPr lang="en-US" sz="1200" dirty="0">
+                <a:solidFill>
+                  <a:schemeClr val="bg2">
+                    <a:lumMod val="50000"/>
+                  </a:schemeClr>
+                </a:solidFill>
+              </a:rPr>
+            </a:br>
+            <a:br>
+              <a:rPr lang="en-US" sz="1200" dirty="0">
+                <a:solidFill>
+                  <a:schemeClr val="bg2">
+                    <a:lumMod val="50000"/>
+                  </a:schemeClr>
+                </a:solidFill>
+              </a:rPr>
+            </a:br>
+            <a:r>
+              <a:rPr lang="en-US" sz="1200" dirty="0">
+                <a:solidFill>
+                  <a:schemeClr val="bg2">
+                    <a:lumMod val="50000"/>
+                  </a:schemeClr>
+                </a:solidFill>
+              </a:rPr>
+              <a:t>1. </a:t>
+            </a:r>
+            <a:r>
+              <a:rPr lang="en-US" sz="1200" dirty="0" err="1">
+                <a:solidFill>
+                  <a:schemeClr val="bg2">
+                    <a:lumMod val="50000"/>
+                  </a:schemeClr>
+                </a:solidFill>
+              </a:rPr>
+              <a:t>Levenshtein</a:t>
+            </a:r>
+            <a:r>
+              <a:rPr lang="en-US" sz="1200" b="0" i="0" dirty="0">
+                <a:solidFill>
+                  <a:srgbClr val="E8E8E8"/>
+                </a:solidFill>
+                <a:effectLst/>
+                <a:latin typeface="Google Sans"/>
+              </a:rPr>
+              <a:t> </a:t>
+            </a:r>
+            <a:r>
+              <a:rPr lang="en-US" sz="1200" dirty="0">
+                <a:solidFill>
+                  <a:schemeClr val="bg2">
+                    <a:lumMod val="50000"/>
+                  </a:schemeClr>
+                </a:solidFill>
+              </a:rPr>
+              <a:t>distance</a:t>
+            </a:r>
+          </a:p>
+          <a:p>
+            <a:endParaRPr lang="en-US" sz="1200" dirty="0">
+              <a:solidFill>
+                <a:schemeClr val="bg2">
+                  <a:lumMod val="50000"/>
+                </a:schemeClr>
+              </a:solidFill>
+            </a:endParaRPr>
+          </a:p>
+          <a:p>
+            <a:r>
+              <a:rPr lang="en-US" sz="1200" dirty="0">
+                <a:solidFill>
+                  <a:schemeClr val="bg2">
+                    <a:lumMod val="50000"/>
+                  </a:schemeClr>
+                </a:solidFill>
+              </a:rPr>
+              <a:t>2. </a:t>
+            </a:r>
+            <a:r>
+              <a:rPr lang="en-US" sz="1200" dirty="0" err="1">
+                <a:solidFill>
+                  <a:schemeClr val="bg2">
+                    <a:lumMod val="50000"/>
+                  </a:schemeClr>
+                </a:solidFill>
+              </a:rPr>
+              <a:t>Jarro</a:t>
+            </a:r>
+            <a:r>
+              <a:rPr lang="en-US" sz="1200" dirty="0">
+                <a:solidFill>
+                  <a:schemeClr val="bg2">
+                    <a:lumMod val="50000"/>
+                  </a:schemeClr>
+                </a:solidFill>
+              </a:rPr>
+              <a:t>-Winkler distance</a:t>
+            </a:r>
+          </a:p>
+          <a:p>
+            <a:endParaRPr lang="en-US" sz="1200" dirty="0">
+              <a:solidFill>
+                <a:schemeClr val="bg2">
+                  <a:lumMod val="50000"/>
+                </a:schemeClr>
+              </a:solidFill>
+            </a:endParaRPr>
+          </a:p>
+          <a:p>
+            <a:r>
+              <a:rPr lang="en-US" sz="1200" dirty="0">
+                <a:solidFill>
+                  <a:schemeClr val="bg2">
+                    <a:lumMod val="50000"/>
+                  </a:schemeClr>
+                </a:solidFill>
+              </a:rPr>
+              <a:t>3. Cosine distance </a:t>
+            </a:r>
+          </a:p>
+        </p:txBody>
+      </p:sp>
+      <p:pic>
+        <p:nvPicPr>
+          <p:cNvPr id="10" name="Picture 9" descr="A screenshot of a computer&#10;&#10;Description automatically generated">
+            <a:extLst>
+              <a:ext uri="{FF2B5EF4-FFF2-40B4-BE49-F238E27FC236}">
+                <a16:creationId xmlns:a16="http://schemas.microsoft.com/office/drawing/2014/main" id="{C86BCC0C-9219-5FC9-872E-7A566D25D753}"/>
+              </a:ext>
+            </a:extLst>
+          </p:cNvPr>
+          <p:cNvPicPr>
+            <a:picLocks noChangeAspect="1"/>
+          </p:cNvPicPr>
+          <p:nvPr/>
+        </p:nvPicPr>
+        <p:blipFill>
+          <a:blip r:embed="rId2">
+            <a:extLst>
+              <a:ext uri="{28A0092B-C50C-407E-A947-70E740481C1C}">
+                <a14:useLocalDpi xmlns:a14="http://schemas.microsoft.com/office/drawing/2010/main" val="0"/>
+              </a:ext>
+            </a:extLst>
+          </a:blip>
+          <a:stretch>
+            <a:fillRect/>
+          </a:stretch>
+        </p:blipFill>
+        <p:spPr>
+          <a:xfrm>
+            <a:off x="-66017" y="1078713"/>
+            <a:ext cx="9824696" cy="4965283"/>
+          </a:xfrm>
+          <a:prstGeom prst="rect">
+            <a:avLst/>
+          </a:prstGeom>
+        </p:spPr>
+      </p:pic>
+    </p:spTree>
+    <p:extLst>
+      <p:ext uri="{BB962C8B-B14F-4D97-AF65-F5344CB8AC3E}">
+        <p14:creationId xmlns:p14="http://schemas.microsoft.com/office/powerpoint/2010/main" val="2576270052"/>
       </p:ext>
     </p:extLst>
   </p:cSld>
@@ -7171,7 +7173,7 @@
           <a:p>
             <a:r>
               <a:rPr lang="en-US" sz="2400" dirty="0"/>
-              <a:t>Standardization Method : Edit distance Benchmark Results</a:t>
+              <a:t>Standardization Method 1 : Benchmark Results</a:t>
             </a:r>
           </a:p>
         </p:txBody>
@@ -9876,6 +9878,212 @@
         <p:cNvPr id="1" name="">
           <a:extLst>
             <a:ext uri="{FF2B5EF4-FFF2-40B4-BE49-F238E27FC236}">
+              <a16:creationId xmlns:a16="http://schemas.microsoft.com/office/drawing/2014/main" id="{DDFA0249-62E3-2F26-6BA6-602A8F964568}"/>
+            </a:ext>
+          </a:extLst>
+        </p:cNvPr>
+        <p:cNvGrpSpPr/>
+        <p:nvPr/>
+      </p:nvGrpSpPr>
+      <p:grpSpPr>
+        <a:xfrm>
+          <a:off x="0" y="0"/>
+          <a:ext cx="0" cy="0"/>
+          <a:chOff x="0" y="0"/>
+          <a:chExt cx="0" cy="0"/>
+        </a:xfrm>
+      </p:grpSpPr>
+      <p:sp>
+        <p:nvSpPr>
+          <p:cNvPr id="2" name="Title 1">
+            <a:extLst>
+              <a:ext uri="{FF2B5EF4-FFF2-40B4-BE49-F238E27FC236}">
+                <a16:creationId xmlns:a16="http://schemas.microsoft.com/office/drawing/2014/main" id="{6E6DBDF9-1166-18CA-0349-57322F57181D}"/>
+              </a:ext>
+            </a:extLst>
+          </p:cNvPr>
+          <p:cNvSpPr>
+            <a:spLocks noGrp="1"/>
+          </p:cNvSpPr>
+          <p:nvPr>
+            <p:ph type="title"/>
+          </p:nvPr>
+        </p:nvSpPr>
+        <p:spPr>
+          <a:xfrm>
+            <a:off x="97340" y="83425"/>
+            <a:ext cx="11010595" cy="1143000"/>
+          </a:xfrm>
+        </p:spPr>
+        <p:txBody>
+          <a:bodyPr/>
+          <a:lstStyle/>
+          <a:p>
+            <a:r>
+              <a:rPr lang="en-US" sz="2400" dirty="0"/>
+              <a:t>Standardization Method 1 : Edit distance</a:t>
+            </a:r>
+          </a:p>
+        </p:txBody>
+      </p:sp>
+      <p:sp>
+        <p:nvSpPr>
+          <p:cNvPr id="3" name="Content Placeholder 2">
+            <a:extLst>
+              <a:ext uri="{FF2B5EF4-FFF2-40B4-BE49-F238E27FC236}">
+                <a16:creationId xmlns:a16="http://schemas.microsoft.com/office/drawing/2014/main" id="{D09E6400-3FF8-F4A0-220B-DF29D26A5165}"/>
+              </a:ext>
+            </a:extLst>
+          </p:cNvPr>
+          <p:cNvSpPr>
+            <a:spLocks noGrp="1"/>
+          </p:cNvSpPr>
+          <p:nvPr>
+            <p:ph idx="1"/>
+          </p:nvPr>
+        </p:nvSpPr>
+        <p:spPr>
+          <a:xfrm>
+            <a:off x="216212" y="1481328"/>
+            <a:ext cx="11010595" cy="3895344"/>
+          </a:xfrm>
+        </p:spPr>
+        <p:txBody>
+          <a:bodyPr>
+            <a:normAutofit/>
+          </a:bodyPr>
+          <a:lstStyle/>
+          <a:p>
+            <a:endParaRPr lang="en-US" dirty="0">
+              <a:solidFill>
+                <a:schemeClr val="tx2">
+                  <a:lumMod val="10000"/>
+                </a:schemeClr>
+              </a:solidFill>
+            </a:endParaRPr>
+          </a:p>
+          <a:p>
+            <a:pPr marL="0" indent="0">
+              <a:buNone/>
+            </a:pPr>
+            <a:endParaRPr lang="en-US" dirty="0">
+              <a:solidFill>
+                <a:schemeClr val="tx2">
+                  <a:lumMod val="10000"/>
+                </a:schemeClr>
+              </a:solidFill>
+            </a:endParaRPr>
+          </a:p>
+          <a:p>
+            <a:endParaRPr lang="en-US" dirty="0">
+              <a:solidFill>
+                <a:schemeClr val="tx2">
+                  <a:lumMod val="10000"/>
+                </a:schemeClr>
+              </a:solidFill>
+            </a:endParaRPr>
+          </a:p>
+          <a:p>
+            <a:pPr marL="0" indent="0">
+              <a:buNone/>
+            </a:pPr>
+            <a:endParaRPr lang="en-US" dirty="0">
+              <a:solidFill>
+                <a:schemeClr val="tx2">
+                  <a:lumMod val="10000"/>
+                </a:schemeClr>
+              </a:solidFill>
+            </a:endParaRPr>
+          </a:p>
+        </p:txBody>
+      </p:sp>
+      <p:sp>
+        <p:nvSpPr>
+          <p:cNvPr id="4" name="Slide Number Placeholder 3">
+            <a:extLst>
+              <a:ext uri="{FF2B5EF4-FFF2-40B4-BE49-F238E27FC236}">
+                <a16:creationId xmlns:a16="http://schemas.microsoft.com/office/drawing/2014/main" id="{36607B62-1AAC-D765-454B-00AD54EE0165}"/>
+              </a:ext>
+            </a:extLst>
+          </p:cNvPr>
+          <p:cNvSpPr>
+            <a:spLocks noGrp="1"/>
+          </p:cNvSpPr>
+          <p:nvPr>
+            <p:ph type="sldNum" sz="quarter" idx="12"/>
+          </p:nvPr>
+        </p:nvSpPr>
+        <p:spPr/>
+        <p:txBody>
+          <a:bodyPr/>
+          <a:lstStyle/>
+          <a:p>
+            <a:fld id="{AD40181A-01B0-4CB8-8614-1473649F6741}" type="slidenum">
+              <a:rPr lang="en-US" smtClean="0"/>
+              <a:pPr/>
+              <a:t>16</a:t>
+            </a:fld>
+            <a:endParaRPr lang="en-US" dirty="0"/>
+          </a:p>
+        </p:txBody>
+      </p:sp>
+      <p:pic>
+        <p:nvPicPr>
+          <p:cNvPr id="5" name="Picture 4" descr="A screenshot of a computer&#10;&#10;Description automatically generated">
+            <a:extLst>
+              <a:ext uri="{FF2B5EF4-FFF2-40B4-BE49-F238E27FC236}">
+                <a16:creationId xmlns:a16="http://schemas.microsoft.com/office/drawing/2014/main" id="{25E813A0-89D2-DF06-A388-F37E0A477CAB}"/>
+              </a:ext>
+            </a:extLst>
+          </p:cNvPr>
+          <p:cNvPicPr>
+            <a:picLocks noChangeAspect="1"/>
+          </p:cNvPicPr>
+          <p:nvPr/>
+        </p:nvPicPr>
+        <p:blipFill>
+          <a:blip r:embed="rId2">
+            <a:extLst>
+              <a:ext uri="{28A0092B-C50C-407E-A947-70E740481C1C}">
+                <a14:useLocalDpi xmlns:a14="http://schemas.microsoft.com/office/drawing/2010/main" val="0"/>
+              </a:ext>
+            </a:extLst>
+          </a:blip>
+          <a:stretch>
+            <a:fillRect/>
+          </a:stretch>
+        </p:blipFill>
+        <p:spPr>
+          <a:xfrm>
+            <a:off x="-66017" y="1078713"/>
+            <a:ext cx="9824696" cy="4965283"/>
+          </a:xfrm>
+          <a:prstGeom prst="rect">
+            <a:avLst/>
+          </a:prstGeom>
+        </p:spPr>
+      </p:pic>
+    </p:spTree>
+    <p:extLst>
+      <p:ext uri="{BB962C8B-B14F-4D97-AF65-F5344CB8AC3E}">
+        <p14:creationId xmlns:p14="http://schemas.microsoft.com/office/powerpoint/2010/main" val="4176389764"/>
+      </p:ext>
+    </p:extLst>
+  </p:cSld>
+  <p:clrMapOvr>
+    <a:masterClrMapping/>
+  </p:clrMapOvr>
+</p:sld>
+</file>
+
+<file path=ppt/slides/slide17.xml><?xml version="1.0" encoding="utf-8"?>
+<p:sld xmlns:a="http://schemas.openxmlformats.org/drawingml/2006/main" xmlns:r="http://schemas.openxmlformats.org/officeDocument/2006/relationships" xmlns:p="http://schemas.openxmlformats.org/presentationml/2006/main">
+  <p:cSld>
+    <p:spTree>
+      <p:nvGrpSpPr>
+        <p:cNvPr id="1" name="">
+          <a:extLst>
+            <a:ext uri="{FF2B5EF4-FFF2-40B4-BE49-F238E27FC236}">
               <a16:creationId xmlns:a16="http://schemas.microsoft.com/office/drawing/2014/main" id="{917DD60F-7732-79E6-B20E-B2B7258FFB6E}"/>
             </a:ext>
           </a:extLst>
@@ -10019,12 +10227,48 @@
             <a:fld id="{AD40181A-01B0-4CB8-8614-1473649F6741}" type="slidenum">
               <a:rPr lang="en-US" smtClean="0"/>
               <a:pPr/>
-              <a:t>16</a:t>
+              <a:t>17</a:t>
             </a:fld>
             <a:endParaRPr lang="en-US" dirty="0"/>
           </a:p>
         </p:txBody>
       </p:sp>
+      <p:pic>
+        <p:nvPicPr>
+          <p:cNvPr id="11" name="Picture 10" descr="A screenshot of a computer screen&#10;&#10;Description automatically generated">
+            <a:extLst>
+              <a:ext uri="{FF2B5EF4-FFF2-40B4-BE49-F238E27FC236}">
+                <a16:creationId xmlns:a16="http://schemas.microsoft.com/office/drawing/2014/main" id="{6CFB0D99-FD18-2C55-9037-64EEDCB61B28}"/>
+              </a:ext>
+            </a:extLst>
+          </p:cNvPr>
+          <p:cNvPicPr>
+            <a:picLocks noChangeAspect="1"/>
+          </p:cNvPicPr>
+          <p:nvPr/>
+        </p:nvPicPr>
+        <p:blipFill>
+          <a:blip r:embed="rId2">
+            <a:extLst>
+              <a:ext uri="{28A0092B-C50C-407E-A947-70E740481C1C}">
+                <a14:useLocalDpi xmlns:a14="http://schemas.microsoft.com/office/drawing/2010/main" val="0"/>
+              </a:ext>
+            </a:extLst>
+          </a:blip>
+          <a:stretch>
+            <a:fillRect/>
+          </a:stretch>
+        </p:blipFill>
+        <p:spPr>
+          <a:xfrm>
+            <a:off x="-66420" y="1134063"/>
+            <a:ext cx="9820656" cy="4589874"/>
+          </a:xfrm>
+          <a:prstGeom prst="rect">
+            <a:avLst/>
+          </a:prstGeom>
+        </p:spPr>
+      </p:pic>
     </p:spTree>
     <p:extLst>
       <p:ext uri="{BB962C8B-B14F-4D97-AF65-F5344CB8AC3E}">
@@ -10038,7 +10282,1985 @@
 </p:sld>
 </file>
 
-<file path=ppt/slides/slide17.xml><?xml version="1.0" encoding="utf-8"?>
+<file path=ppt/slides/slide18.xml><?xml version="1.0" encoding="utf-8"?>
+<p:sld xmlns:a="http://schemas.openxmlformats.org/drawingml/2006/main" xmlns:r="http://schemas.openxmlformats.org/officeDocument/2006/relationships" xmlns:p="http://schemas.openxmlformats.org/presentationml/2006/main">
+  <p:cSld>
+    <p:spTree>
+      <p:nvGrpSpPr>
+        <p:cNvPr id="1" name="">
+          <a:extLst>
+            <a:ext uri="{FF2B5EF4-FFF2-40B4-BE49-F238E27FC236}">
+              <a16:creationId xmlns:a16="http://schemas.microsoft.com/office/drawing/2014/main" id="{25DAE792-44D1-2EFC-560E-DBB1C22CFC93}"/>
+            </a:ext>
+          </a:extLst>
+        </p:cNvPr>
+        <p:cNvGrpSpPr/>
+        <p:nvPr/>
+      </p:nvGrpSpPr>
+      <p:grpSpPr>
+        <a:xfrm>
+          <a:off x="0" y="0"/>
+          <a:ext cx="0" cy="0"/>
+          <a:chOff x="0" y="0"/>
+          <a:chExt cx="0" cy="0"/>
+        </a:xfrm>
+      </p:grpSpPr>
+      <p:sp>
+        <p:nvSpPr>
+          <p:cNvPr id="2" name="Title 1">
+            <a:extLst>
+              <a:ext uri="{FF2B5EF4-FFF2-40B4-BE49-F238E27FC236}">
+                <a16:creationId xmlns:a16="http://schemas.microsoft.com/office/drawing/2014/main" id="{FC2B5168-934D-2EA9-8056-AACAFFDDA94A}"/>
+              </a:ext>
+            </a:extLst>
+          </p:cNvPr>
+          <p:cNvSpPr>
+            <a:spLocks noGrp="1"/>
+          </p:cNvSpPr>
+          <p:nvPr>
+            <p:ph type="title"/>
+          </p:nvPr>
+        </p:nvSpPr>
+        <p:spPr>
+          <a:xfrm>
+            <a:off x="0" y="-82829"/>
+            <a:ext cx="11010595" cy="1143000"/>
+          </a:xfrm>
+        </p:spPr>
+        <p:txBody>
+          <a:bodyPr/>
+          <a:lstStyle/>
+          <a:p>
+            <a:r>
+              <a:rPr lang="en-US" sz="2400" dirty="0"/>
+              <a:t>Standardization Method 2 : Benchmark Results</a:t>
+            </a:r>
+          </a:p>
+        </p:txBody>
+      </p:sp>
+      <p:sp>
+        <p:nvSpPr>
+          <p:cNvPr id="3" name="Content Placeholder 2">
+            <a:extLst>
+              <a:ext uri="{FF2B5EF4-FFF2-40B4-BE49-F238E27FC236}">
+                <a16:creationId xmlns:a16="http://schemas.microsoft.com/office/drawing/2014/main" id="{AD3E1779-1F3D-BF8E-51F3-0F8778571BBA}"/>
+              </a:ext>
+            </a:extLst>
+          </p:cNvPr>
+          <p:cNvSpPr>
+            <a:spLocks noGrp="1"/>
+          </p:cNvSpPr>
+          <p:nvPr>
+            <p:ph idx="1"/>
+          </p:nvPr>
+        </p:nvSpPr>
+        <p:spPr>
+          <a:xfrm>
+            <a:off x="216213" y="1481328"/>
+            <a:ext cx="8952726" cy="3895344"/>
+          </a:xfrm>
+        </p:spPr>
+        <p:txBody>
+          <a:bodyPr>
+            <a:normAutofit/>
+          </a:bodyPr>
+          <a:lstStyle/>
+          <a:p>
+            <a:endParaRPr lang="en-US" dirty="0">
+              <a:solidFill>
+                <a:schemeClr val="tx2">
+                  <a:lumMod val="10000"/>
+                </a:schemeClr>
+              </a:solidFill>
+            </a:endParaRPr>
+          </a:p>
+          <a:p>
+            <a:pPr marL="0" indent="0">
+              <a:buNone/>
+            </a:pPr>
+            <a:endParaRPr lang="en-US" dirty="0">
+              <a:solidFill>
+                <a:schemeClr val="tx2">
+                  <a:lumMod val="10000"/>
+                </a:schemeClr>
+              </a:solidFill>
+            </a:endParaRPr>
+          </a:p>
+          <a:p>
+            <a:endParaRPr lang="en-US" dirty="0">
+              <a:solidFill>
+                <a:schemeClr val="tx2">
+                  <a:lumMod val="10000"/>
+                </a:schemeClr>
+              </a:solidFill>
+            </a:endParaRPr>
+          </a:p>
+          <a:p>
+            <a:pPr marL="0" indent="0">
+              <a:buNone/>
+            </a:pPr>
+            <a:endParaRPr lang="en-US" dirty="0">
+              <a:solidFill>
+                <a:schemeClr val="tx2">
+                  <a:lumMod val="10000"/>
+                </a:schemeClr>
+              </a:solidFill>
+            </a:endParaRPr>
+          </a:p>
+        </p:txBody>
+      </p:sp>
+      <p:sp>
+        <p:nvSpPr>
+          <p:cNvPr id="4" name="Slide Number Placeholder 3">
+            <a:extLst>
+              <a:ext uri="{FF2B5EF4-FFF2-40B4-BE49-F238E27FC236}">
+                <a16:creationId xmlns:a16="http://schemas.microsoft.com/office/drawing/2014/main" id="{9808A215-B293-390A-66D1-FBCFD49D0014}"/>
+              </a:ext>
+            </a:extLst>
+          </p:cNvPr>
+          <p:cNvSpPr>
+            <a:spLocks noGrp="1"/>
+          </p:cNvSpPr>
+          <p:nvPr>
+            <p:ph type="sldNum" sz="quarter" idx="12"/>
+          </p:nvPr>
+        </p:nvSpPr>
+        <p:spPr/>
+        <p:txBody>
+          <a:bodyPr/>
+          <a:lstStyle/>
+          <a:p>
+            <a:fld id="{AD40181A-01B0-4CB8-8614-1473649F6741}" type="slidenum">
+              <a:rPr lang="en-US" smtClean="0"/>
+              <a:pPr/>
+              <a:t>18</a:t>
+            </a:fld>
+            <a:endParaRPr lang="en-US" dirty="0"/>
+          </a:p>
+        </p:txBody>
+      </p:sp>
+      <p:graphicFrame>
+        <p:nvGraphicFramePr>
+          <p:cNvPr id="5" name="Table 4">
+            <a:extLst>
+              <a:ext uri="{FF2B5EF4-FFF2-40B4-BE49-F238E27FC236}">
+                <a16:creationId xmlns:a16="http://schemas.microsoft.com/office/drawing/2014/main" id="{76613529-BC79-20F9-06B4-657AA805DF47}"/>
+              </a:ext>
+            </a:extLst>
+          </p:cNvPr>
+          <p:cNvGraphicFramePr>
+            <a:graphicFrameLocks noGrp="1"/>
+          </p:cNvGraphicFramePr>
+          <p:nvPr>
+            <p:extLst>
+              <p:ext uri="{D42A27DB-BD31-4B8C-83A1-F6EECF244321}">
+                <p14:modId xmlns:p14="http://schemas.microsoft.com/office/powerpoint/2010/main" val="3280613273"/>
+              </p:ext>
+            </p:extLst>
+          </p:nvPr>
+        </p:nvGraphicFramePr>
+        <p:xfrm>
+          <a:off x="216213" y="656705"/>
+          <a:ext cx="8128002" cy="5149215"/>
+        </p:xfrm>
+        <a:graphic>
+          <a:graphicData uri="http://schemas.openxmlformats.org/drawingml/2006/table">
+            <a:tbl>
+              <a:tblPr firstRow="1" bandRow="1">
+                <a:tableStyleId>{5C22544A-7EE6-4342-B048-85BDC9FD1C3A}</a:tableStyleId>
+              </a:tblPr>
+              <a:tblGrid>
+                <a:gridCol w="2059940">
+                  <a:extLst>
+                    <a:ext uri="{9D8B030D-6E8A-4147-A177-3AD203B41FA5}">
+                      <a16:colId xmlns:a16="http://schemas.microsoft.com/office/drawing/2014/main" val="1643565107"/>
+                    </a:ext>
+                  </a:extLst>
+                </a:gridCol>
+                <a:gridCol w="765471">
+                  <a:extLst>
+                    <a:ext uri="{9D8B030D-6E8A-4147-A177-3AD203B41FA5}">
+                      <a16:colId xmlns:a16="http://schemas.microsoft.com/office/drawing/2014/main" val="731584528"/>
+                    </a:ext>
+                  </a:extLst>
+                </a:gridCol>
+                <a:gridCol w="1238590">
+                  <a:extLst>
+                    <a:ext uri="{9D8B030D-6E8A-4147-A177-3AD203B41FA5}">
+                      <a16:colId xmlns:a16="http://schemas.microsoft.com/office/drawing/2014/main" val="3887048142"/>
+                    </a:ext>
+                  </a:extLst>
+                </a:gridCol>
+                <a:gridCol w="888768">
+                  <a:extLst>
+                    <a:ext uri="{9D8B030D-6E8A-4147-A177-3AD203B41FA5}">
+                      <a16:colId xmlns:a16="http://schemas.microsoft.com/office/drawing/2014/main" val="3285545827"/>
+                    </a:ext>
+                  </a:extLst>
+                </a:gridCol>
+                <a:gridCol w="1820566">
+                  <a:extLst>
+                    <a:ext uri="{9D8B030D-6E8A-4147-A177-3AD203B41FA5}">
+                      <a16:colId xmlns:a16="http://schemas.microsoft.com/office/drawing/2014/main" val="1729305009"/>
+                    </a:ext>
+                  </a:extLst>
+                </a:gridCol>
+                <a:gridCol w="1354667">
+                  <a:extLst>
+                    <a:ext uri="{9D8B030D-6E8A-4147-A177-3AD203B41FA5}">
+                      <a16:colId xmlns:a16="http://schemas.microsoft.com/office/drawing/2014/main" val="4138275225"/>
+                    </a:ext>
+                  </a:extLst>
+                </a:gridCol>
+              </a:tblGrid>
+              <a:tr h="370840">
+                <a:tc>
+                  <a:txBody>
+                    <a:bodyPr/>
+                    <a:lstStyle/>
+                    <a:p>
+                      <a:pPr marL="0" marR="0" lvl="0" indent="0" algn="l" defTabSz="914400" rtl="0" eaLnBrk="1" fontAlgn="auto" latinLnBrk="0" hangingPunct="1">
+                        <a:lnSpc>
+                          <a:spcPct val="100000"/>
+                        </a:lnSpc>
+                        <a:spcBef>
+                          <a:spcPts val="0"/>
+                        </a:spcBef>
+                        <a:spcAft>
+                          <a:spcPts val="0"/>
+                        </a:spcAft>
+                        <a:buClrTx/>
+                        <a:buSzTx/>
+                        <a:buFontTx/>
+                        <a:buNone/>
+                        <a:tabLst/>
+                        <a:defRPr/>
+                      </a:pPr>
+                      <a:r>
+                        <a:rPr lang="en-US" dirty="0"/>
+                        <a:t>LV + AF</a:t>
+                      </a:r>
+                    </a:p>
+                    <a:p>
+                      <a:endParaRPr lang="en-US" dirty="0"/>
+                    </a:p>
+                  </a:txBody>
+                  <a:tcPr/>
+                </a:tc>
+                <a:tc>
+                  <a:txBody>
+                    <a:bodyPr/>
+                    <a:lstStyle/>
+                    <a:p>
+                      <a:r>
+                        <a:rPr lang="en-US" dirty="0"/>
+                        <a:t>MSS</a:t>
+                      </a:r>
+                    </a:p>
+                  </a:txBody>
+                  <a:tcPr/>
+                </a:tc>
+                <a:tc>
+                  <a:txBody>
+                    <a:bodyPr/>
+                    <a:lstStyle/>
+                    <a:p>
+                      <a:r>
+                        <a:rPr lang="en-US" dirty="0"/>
+                        <a:t>JW +AF</a:t>
+                      </a:r>
+                    </a:p>
+                  </a:txBody>
+                  <a:tcPr/>
+                </a:tc>
+                <a:tc>
+                  <a:txBody>
+                    <a:bodyPr/>
+                    <a:lstStyle/>
+                    <a:p>
+                      <a:pPr marL="0" marR="0" lvl="0" indent="0" algn="l" defTabSz="914400" rtl="0" eaLnBrk="1" fontAlgn="auto" latinLnBrk="0" hangingPunct="1">
+                        <a:lnSpc>
+                          <a:spcPct val="100000"/>
+                        </a:lnSpc>
+                        <a:spcBef>
+                          <a:spcPts val="0"/>
+                        </a:spcBef>
+                        <a:spcAft>
+                          <a:spcPts val="0"/>
+                        </a:spcAft>
+                        <a:buClrTx/>
+                        <a:buSzTx/>
+                        <a:buFontTx/>
+                        <a:buNone/>
+                        <a:tabLst/>
+                        <a:defRPr/>
+                      </a:pPr>
+                      <a:r>
+                        <a:rPr lang="en-US" dirty="0"/>
+                        <a:t>MSS</a:t>
+                      </a:r>
+                    </a:p>
+                    <a:p>
+                      <a:endParaRPr lang="en-US" dirty="0"/>
+                    </a:p>
+                  </a:txBody>
+                  <a:tcPr/>
+                </a:tc>
+                <a:tc>
+                  <a:txBody>
+                    <a:bodyPr/>
+                    <a:lstStyle/>
+                    <a:p>
+                      <a:r>
+                        <a:rPr lang="en-US" dirty="0"/>
+                        <a:t>Cosine + AF</a:t>
+                      </a:r>
+                    </a:p>
+                  </a:txBody>
+                  <a:tcPr/>
+                </a:tc>
+                <a:tc>
+                  <a:txBody>
+                    <a:bodyPr/>
+                    <a:lstStyle/>
+                    <a:p>
+                      <a:r>
+                        <a:rPr lang="en-US" dirty="0"/>
+                        <a:t>MSS</a:t>
+                      </a:r>
+                    </a:p>
+                  </a:txBody>
+                  <a:tcPr/>
+                </a:tc>
+                <a:extLst>
+                  <a:ext uri="{0D108BD9-81ED-4DB2-BD59-A6C34878D82A}">
+                    <a16:rowId xmlns:a16="http://schemas.microsoft.com/office/drawing/2014/main" val="3873200293"/>
+                  </a:ext>
+                </a:extLst>
+              </a:tr>
+              <a:tr h="0">
+                <a:tc>
+                  <a:txBody>
+                    <a:bodyPr/>
+                    <a:lstStyle/>
+                    <a:p>
+                      <a:pPr marL="0" marR="0" lvl="0" indent="0" algn="l" defTabSz="914400" rtl="0" eaLnBrk="1" fontAlgn="auto" latinLnBrk="0" hangingPunct="1">
+                        <a:lnSpc>
+                          <a:spcPct val="100000"/>
+                        </a:lnSpc>
+                        <a:spcBef>
+                          <a:spcPts val="0"/>
+                        </a:spcBef>
+                        <a:spcAft>
+                          <a:spcPts val="0"/>
+                        </a:spcAft>
+                        <a:buClrTx/>
+                        <a:buSzTx/>
+                        <a:buFontTx/>
+                        <a:buNone/>
+                        <a:tabLst/>
+                        <a:defRPr/>
+                      </a:pPr>
+                      <a:r>
+                        <a:rPr lang="en-US" sz="1000" b="0" i="0" u="none" strike="noStrike" dirty="0">
+                          <a:solidFill>
+                            <a:schemeClr val="bg2">
+                              <a:lumMod val="50000"/>
+                            </a:schemeClr>
+                          </a:solidFill>
+                          <a:effectLst/>
+                          <a:latin typeface="Aptos Narrow" panose="020B0004020202020204" pitchFamily="34" charset="0"/>
+                        </a:rPr>
+                        <a:t>b-cell lymphomas</a:t>
+                      </a:r>
+                    </a:p>
+                    <a:p>
+                      <a:pPr marL="0" marR="0" lvl="0" indent="0" algn="l" defTabSz="914400" rtl="0" eaLnBrk="1" fontAlgn="auto" latinLnBrk="0" hangingPunct="1">
+                        <a:lnSpc>
+                          <a:spcPct val="100000"/>
+                        </a:lnSpc>
+                        <a:spcBef>
+                          <a:spcPts val="0"/>
+                        </a:spcBef>
+                        <a:spcAft>
+                          <a:spcPts val="0"/>
+                        </a:spcAft>
+                        <a:buClrTx/>
+                        <a:buSzTx/>
+                        <a:buFontTx/>
+                        <a:buNone/>
+                        <a:tabLst/>
+                        <a:defRPr/>
+                      </a:pPr>
+                      <a:r>
+                        <a:rPr lang="en-US" sz="1000" dirty="0">
+                          <a:solidFill>
+                            <a:schemeClr val="bg2">
+                              <a:lumMod val="50000"/>
+                            </a:schemeClr>
+                          </a:solidFill>
+                        </a:rPr>
+                        <a:t>;</a:t>
+                      </a:r>
+                      <a:r>
+                        <a:rPr lang="en-US" sz="1000" b="0" i="0" u="none" strike="noStrike" dirty="0">
+                          <a:solidFill>
+                            <a:schemeClr val="bg2">
+                              <a:lumMod val="50000"/>
+                            </a:schemeClr>
+                          </a:solidFill>
+                          <a:effectLst/>
+                          <a:latin typeface="Aptos Narrow" panose="020B0004020202020204" pitchFamily="34" charset="0"/>
+                        </a:rPr>
+                        <a:t> b cell lymphoma</a:t>
+                      </a:r>
+                    </a:p>
+                    <a:p>
+                      <a:pPr marL="0" marR="0" lvl="0" indent="0" algn="l" defTabSz="914400" rtl="0" eaLnBrk="1" fontAlgn="auto" latinLnBrk="0" hangingPunct="1">
+                        <a:lnSpc>
+                          <a:spcPct val="100000"/>
+                        </a:lnSpc>
+                        <a:spcBef>
+                          <a:spcPts val="0"/>
+                        </a:spcBef>
+                        <a:spcAft>
+                          <a:spcPts val="0"/>
+                        </a:spcAft>
+                        <a:buClrTx/>
+                        <a:buSzTx/>
+                        <a:buFontTx/>
+                        <a:buNone/>
+                        <a:tabLst/>
+                        <a:defRPr/>
+                      </a:pPr>
+                      <a:r>
+                        <a:rPr lang="en-US" sz="1000" dirty="0">
+                          <a:solidFill>
+                            <a:schemeClr val="bg2">
+                              <a:lumMod val="50000"/>
+                            </a:schemeClr>
+                          </a:solidFill>
+                        </a:rPr>
+                        <a:t>;</a:t>
+                      </a:r>
+                      <a:r>
+                        <a:rPr lang="en-US" sz="1000" b="0" i="0" u="none" strike="noStrike" dirty="0">
+                          <a:solidFill>
+                            <a:schemeClr val="bg2">
+                              <a:lumMod val="50000"/>
+                            </a:schemeClr>
+                          </a:solidFill>
+                          <a:effectLst/>
+                          <a:latin typeface="Aptos Narrow" panose="020B0004020202020204" pitchFamily="34" charset="0"/>
+                        </a:rPr>
+                        <a:t> b cell lymphomas</a:t>
+                      </a:r>
+                    </a:p>
+                    <a:p>
+                      <a:pPr marL="0" marR="0" lvl="0" indent="0" algn="l" defTabSz="914400" rtl="0" eaLnBrk="1" fontAlgn="auto" latinLnBrk="0" hangingPunct="1">
+                        <a:lnSpc>
+                          <a:spcPct val="100000"/>
+                        </a:lnSpc>
+                        <a:spcBef>
+                          <a:spcPts val="0"/>
+                        </a:spcBef>
+                        <a:spcAft>
+                          <a:spcPts val="0"/>
+                        </a:spcAft>
+                        <a:buClrTx/>
+                        <a:buSzTx/>
+                        <a:buFontTx/>
+                        <a:buNone/>
+                        <a:tabLst/>
+                        <a:defRPr/>
+                      </a:pPr>
+                      <a:r>
+                        <a:rPr lang="en-US" sz="1000" dirty="0">
+                          <a:solidFill>
+                            <a:schemeClr val="bg2">
+                              <a:lumMod val="50000"/>
+                            </a:schemeClr>
+                          </a:solidFill>
+                        </a:rPr>
+                        <a:t>;</a:t>
+                      </a:r>
+                      <a:r>
+                        <a:rPr lang="en-US" sz="1000" b="0" i="0" u="none" strike="noStrike" dirty="0">
+                          <a:solidFill>
+                            <a:schemeClr val="bg2">
+                              <a:lumMod val="50000"/>
+                            </a:schemeClr>
+                          </a:solidFill>
+                          <a:effectLst/>
+                          <a:latin typeface="Aptos Narrow" panose="020B0004020202020204" pitchFamily="34" charset="0"/>
+                        </a:rPr>
+                        <a:t> t cell lymphomas</a:t>
+                      </a:r>
+                    </a:p>
+                    <a:p>
+                      <a:endParaRPr lang="en-US" sz="1000" dirty="0">
+                        <a:solidFill>
+                          <a:schemeClr val="bg2">
+                            <a:lumMod val="50000"/>
+                          </a:schemeClr>
+                        </a:solidFill>
+                      </a:endParaRPr>
+                    </a:p>
+                  </a:txBody>
+                  <a:tcPr/>
+                </a:tc>
+                <a:tc>
+                  <a:txBody>
+                    <a:bodyPr/>
+                    <a:lstStyle/>
+                    <a:p>
+                      <a:pPr algn="r" fontAlgn="b"/>
+                      <a:r>
+                        <a:rPr lang="en-US" sz="1000" b="0" i="0" u="none" strike="noStrike" dirty="0">
+                          <a:solidFill>
+                            <a:schemeClr val="bg2">
+                              <a:lumMod val="50000"/>
+                            </a:schemeClr>
+                          </a:solidFill>
+                          <a:effectLst/>
+                          <a:latin typeface="Aptos Narrow" panose="020B0004020202020204" pitchFamily="34" charset="0"/>
+                        </a:rPr>
+                        <a:t>0.17460317</a:t>
+                      </a:r>
+                    </a:p>
+                  </a:txBody>
+                  <a:tcPr marL="9525" marR="9525" marT="9525" marB="0"/>
+                </a:tc>
+                <a:tc>
+                  <a:txBody>
+                    <a:bodyPr/>
+                    <a:lstStyle/>
+                    <a:p>
+                      <a:endParaRPr lang="en-US" sz="1000" dirty="0">
+                        <a:solidFill>
+                          <a:schemeClr val="bg2">
+                            <a:lumMod val="50000"/>
+                          </a:schemeClr>
+                        </a:solidFill>
+                      </a:endParaRPr>
+                    </a:p>
+                  </a:txBody>
+                  <a:tcPr/>
+                </a:tc>
+                <a:tc>
+                  <a:txBody>
+                    <a:bodyPr/>
+                    <a:lstStyle/>
+                    <a:p>
+                      <a:endParaRPr lang="en-US" sz="1000" dirty="0">
+                        <a:solidFill>
+                          <a:schemeClr val="bg2">
+                            <a:lumMod val="50000"/>
+                          </a:schemeClr>
+                        </a:solidFill>
+                      </a:endParaRPr>
+                    </a:p>
+                  </a:txBody>
+                  <a:tcPr/>
+                </a:tc>
+                <a:tc>
+                  <a:txBody>
+                    <a:bodyPr/>
+                    <a:lstStyle/>
+                    <a:p>
+                      <a:endParaRPr lang="en-US" sz="1000" dirty="0">
+                        <a:solidFill>
+                          <a:schemeClr val="bg2">
+                            <a:lumMod val="50000"/>
+                          </a:schemeClr>
+                        </a:solidFill>
+                      </a:endParaRPr>
+                    </a:p>
+                  </a:txBody>
+                  <a:tcPr/>
+                </a:tc>
+                <a:tc>
+                  <a:txBody>
+                    <a:bodyPr/>
+                    <a:lstStyle/>
+                    <a:p>
+                      <a:endParaRPr lang="en-US" sz="1000" dirty="0">
+                        <a:solidFill>
+                          <a:schemeClr val="bg2">
+                            <a:lumMod val="50000"/>
+                          </a:schemeClr>
+                        </a:solidFill>
+                      </a:endParaRPr>
+                    </a:p>
+                  </a:txBody>
+                  <a:tcPr/>
+                </a:tc>
+                <a:extLst>
+                  <a:ext uri="{0D108BD9-81ED-4DB2-BD59-A6C34878D82A}">
+                    <a16:rowId xmlns:a16="http://schemas.microsoft.com/office/drawing/2014/main" val="4135079416"/>
+                  </a:ext>
+                </a:extLst>
+              </a:tr>
+              <a:tr h="370840">
+                <a:tc>
+                  <a:txBody>
+                    <a:bodyPr/>
+                    <a:lstStyle/>
+                    <a:p>
+                      <a:pPr marL="0" marR="0" lvl="0" indent="0" algn="l" defTabSz="914400" rtl="0" eaLnBrk="1" fontAlgn="auto" latinLnBrk="0" hangingPunct="1">
+                        <a:lnSpc>
+                          <a:spcPct val="100000"/>
+                        </a:lnSpc>
+                        <a:spcBef>
+                          <a:spcPts val="0"/>
+                        </a:spcBef>
+                        <a:spcAft>
+                          <a:spcPts val="0"/>
+                        </a:spcAft>
+                        <a:buClrTx/>
+                        <a:buSzTx/>
+                        <a:buFontTx/>
+                        <a:buNone/>
+                        <a:tabLst/>
+                        <a:defRPr/>
+                      </a:pPr>
+                      <a:r>
+                        <a:rPr lang="en-US" sz="1000" b="0" i="0" u="none" strike="noStrike" dirty="0">
+                          <a:solidFill>
+                            <a:schemeClr val="bg2">
+                              <a:lumMod val="50000"/>
+                            </a:schemeClr>
+                          </a:solidFill>
+                          <a:effectLst/>
+                          <a:latin typeface="Aptos Narrow" panose="020B0004020202020204" pitchFamily="34" charset="0"/>
+                        </a:rPr>
+                        <a:t>unresectable lung carcinoma; prostate carcinoma; unresectable melanoma; unresectable nut carcinoma ;unresectable paraganglioma; </a:t>
+                      </a:r>
+                      <a:r>
+                        <a:rPr lang="en-US" sz="1000" b="0" i="0" u="none" strike="noStrike" dirty="0" err="1">
+                          <a:solidFill>
+                            <a:schemeClr val="bg2">
+                              <a:lumMod val="50000"/>
+                            </a:schemeClr>
+                          </a:solidFill>
+                          <a:effectLst/>
+                          <a:latin typeface="Aptos Narrow" panose="020B0004020202020204" pitchFamily="34" charset="0"/>
+                        </a:rPr>
+                        <a:t>resectable</a:t>
+                      </a:r>
+                      <a:r>
+                        <a:rPr lang="en-US" sz="1000" b="0" i="0" u="none" strike="noStrike" dirty="0">
+                          <a:solidFill>
+                            <a:schemeClr val="bg2">
+                              <a:lumMod val="50000"/>
+                            </a:schemeClr>
+                          </a:solidFill>
+                          <a:effectLst/>
+                          <a:latin typeface="Aptos Narrow" panose="020B0004020202020204" pitchFamily="34" charset="0"/>
+                        </a:rPr>
+                        <a:t> carcinoma; unresectable carcinoma; </a:t>
+                      </a:r>
+                      <a:r>
+                        <a:rPr lang="en-US" sz="1000" b="0" i="0" u="none" strike="noStrike" dirty="0" err="1">
+                          <a:solidFill>
+                            <a:schemeClr val="bg2">
+                              <a:lumMod val="50000"/>
+                            </a:schemeClr>
+                          </a:solidFill>
+                          <a:effectLst/>
+                          <a:latin typeface="Aptos Narrow" panose="020B0004020202020204" pitchFamily="34" charset="0"/>
+                        </a:rPr>
+                        <a:t>resectable</a:t>
+                      </a:r>
+                      <a:r>
+                        <a:rPr lang="en-US" sz="1000" b="0" i="0" u="none" strike="noStrike" dirty="0">
+                          <a:solidFill>
+                            <a:schemeClr val="bg2">
+                              <a:lumMod val="50000"/>
+                            </a:schemeClr>
+                          </a:solidFill>
+                          <a:effectLst/>
+                          <a:latin typeface="Aptos Narrow" panose="020B0004020202020204" pitchFamily="34" charset="0"/>
+                        </a:rPr>
+                        <a:t> sarcoma; unresectable sarcoma; unresectable cancer; intraductal carcinoma</a:t>
+                      </a:r>
+                    </a:p>
+                    <a:p>
+                      <a:endParaRPr lang="en-US" sz="1000" dirty="0">
+                        <a:solidFill>
+                          <a:schemeClr val="bg2">
+                            <a:lumMod val="50000"/>
+                          </a:schemeClr>
+                        </a:solidFill>
+                      </a:endParaRPr>
+                    </a:p>
+                  </a:txBody>
+                  <a:tcPr/>
+                </a:tc>
+                <a:tc>
+                  <a:txBody>
+                    <a:bodyPr/>
+                    <a:lstStyle/>
+                    <a:p>
+                      <a:pPr algn="r" fontAlgn="b"/>
+                      <a:r>
+                        <a:rPr lang="en-US" sz="1000" b="0" i="0" u="none" strike="noStrike" dirty="0">
+                          <a:solidFill>
+                            <a:schemeClr val="bg2">
+                              <a:lumMod val="50000"/>
+                            </a:schemeClr>
+                          </a:solidFill>
+                          <a:effectLst/>
+                          <a:latin typeface="Aptos Narrow" panose="020B0004020202020204" pitchFamily="34" charset="0"/>
+                        </a:rPr>
+                        <a:t>-0.1950234</a:t>
+                      </a:r>
+                    </a:p>
+                  </a:txBody>
+                  <a:tcPr marL="9525" marR="9525" marT="9525" marB="0"/>
+                </a:tc>
+                <a:tc>
+                  <a:txBody>
+                    <a:bodyPr/>
+                    <a:lstStyle/>
+                    <a:p>
+                      <a:endParaRPr lang="en-US" sz="1000" dirty="0">
+                        <a:solidFill>
+                          <a:schemeClr val="bg2">
+                            <a:lumMod val="50000"/>
+                          </a:schemeClr>
+                        </a:solidFill>
+                      </a:endParaRPr>
+                    </a:p>
+                  </a:txBody>
+                  <a:tcPr/>
+                </a:tc>
+                <a:tc>
+                  <a:txBody>
+                    <a:bodyPr/>
+                    <a:lstStyle/>
+                    <a:p>
+                      <a:endParaRPr lang="en-US" sz="1000" dirty="0">
+                        <a:solidFill>
+                          <a:schemeClr val="bg2">
+                            <a:lumMod val="50000"/>
+                          </a:schemeClr>
+                        </a:solidFill>
+                      </a:endParaRPr>
+                    </a:p>
+                  </a:txBody>
+                  <a:tcPr/>
+                </a:tc>
+                <a:tc>
+                  <a:txBody>
+                    <a:bodyPr/>
+                    <a:lstStyle/>
+                    <a:p>
+                      <a:endParaRPr lang="en-US" sz="1000">
+                        <a:solidFill>
+                          <a:schemeClr val="bg2">
+                            <a:lumMod val="50000"/>
+                          </a:schemeClr>
+                        </a:solidFill>
+                      </a:endParaRPr>
+                    </a:p>
+                  </a:txBody>
+                  <a:tcPr/>
+                </a:tc>
+                <a:tc>
+                  <a:txBody>
+                    <a:bodyPr/>
+                    <a:lstStyle/>
+                    <a:p>
+                      <a:endParaRPr lang="en-US" sz="1000">
+                        <a:solidFill>
+                          <a:schemeClr val="bg2">
+                            <a:lumMod val="50000"/>
+                          </a:schemeClr>
+                        </a:solidFill>
+                      </a:endParaRPr>
+                    </a:p>
+                  </a:txBody>
+                  <a:tcPr/>
+                </a:tc>
+                <a:extLst>
+                  <a:ext uri="{0D108BD9-81ED-4DB2-BD59-A6C34878D82A}">
+                    <a16:rowId xmlns:a16="http://schemas.microsoft.com/office/drawing/2014/main" val="2849662892"/>
+                  </a:ext>
+                </a:extLst>
+              </a:tr>
+              <a:tr h="370840">
+                <a:tc>
+                  <a:txBody>
+                    <a:bodyPr/>
+                    <a:lstStyle/>
+                    <a:p>
+                      <a:pPr marL="0" marR="0" lvl="0" indent="0" algn="l" defTabSz="914400" rtl="0" eaLnBrk="1" fontAlgn="b" latinLnBrk="0" hangingPunct="1">
+                        <a:lnSpc>
+                          <a:spcPct val="100000"/>
+                        </a:lnSpc>
+                        <a:spcBef>
+                          <a:spcPts val="0"/>
+                        </a:spcBef>
+                        <a:spcAft>
+                          <a:spcPts val="0"/>
+                        </a:spcAft>
+                        <a:buClrTx/>
+                        <a:buSzTx/>
+                        <a:buFontTx/>
+                        <a:buNone/>
+                        <a:tabLst/>
+                        <a:defRPr/>
+                      </a:pPr>
+                      <a:r>
+                        <a:rPr lang="en-US" sz="1200" b="0" i="0" u="none" strike="noStrike" dirty="0">
+                          <a:solidFill>
+                            <a:schemeClr val="bg2">
+                              <a:lumMod val="50000"/>
+                            </a:schemeClr>
+                          </a:solidFill>
+                          <a:effectLst/>
+                          <a:latin typeface="Aptos Narrow" panose="020B0004020202020204" pitchFamily="34" charset="0"/>
+                        </a:rPr>
+                        <a:t>liposarcoma ;fibrosarcoma; </a:t>
+                      </a:r>
+                      <a:r>
+                        <a:rPr lang="en-US" sz="1200" b="0" i="0" u="none" strike="noStrike" dirty="0" err="1">
+                          <a:solidFill>
+                            <a:schemeClr val="bg2">
+                              <a:lumMod val="50000"/>
+                            </a:schemeClr>
+                          </a:solidFill>
+                          <a:effectLst/>
+                          <a:latin typeface="Aptos Narrow" panose="020B0004020202020204" pitchFamily="34" charset="0"/>
+                        </a:rPr>
+                        <a:t>gliosarcoma</a:t>
+                      </a:r>
+                      <a:r>
+                        <a:rPr lang="en-US" sz="1200" b="0" i="0" u="none" strike="noStrike" dirty="0">
+                          <a:solidFill>
+                            <a:schemeClr val="bg2">
+                              <a:lumMod val="50000"/>
+                            </a:schemeClr>
+                          </a:solidFill>
+                          <a:effectLst/>
+                          <a:latin typeface="Aptos Narrow" panose="020B0004020202020204" pitchFamily="34" charset="0"/>
+                        </a:rPr>
+                        <a:t>; myosarcoma; liposarcomas</a:t>
+                      </a:r>
+                    </a:p>
+                    <a:p>
+                      <a:pPr algn="l" fontAlgn="b"/>
+                      <a:endParaRPr lang="en-US" sz="1200" b="0" i="0" u="none" strike="noStrike" dirty="0">
+                        <a:solidFill>
+                          <a:schemeClr val="bg2">
+                            <a:lumMod val="50000"/>
+                          </a:schemeClr>
+                        </a:solidFill>
+                        <a:effectLst/>
+                        <a:latin typeface="Aptos Narrow" panose="020B0004020202020204" pitchFamily="34" charset="0"/>
+                      </a:endParaRPr>
+                    </a:p>
+                  </a:txBody>
+                  <a:tcPr marL="9525" marR="9525" marT="9525" marB="0"/>
+                </a:tc>
+                <a:tc>
+                  <a:txBody>
+                    <a:bodyPr/>
+                    <a:lstStyle/>
+                    <a:p>
+                      <a:r>
+                        <a:rPr lang="en-US" sz="1000" dirty="0">
+                          <a:solidFill>
+                            <a:schemeClr val="bg2">
+                              <a:lumMod val="50000"/>
+                            </a:schemeClr>
+                          </a:solidFill>
+                        </a:rPr>
+                        <a:t>0.3225</a:t>
+                      </a:r>
+                    </a:p>
+                  </a:txBody>
+                  <a:tcPr/>
+                </a:tc>
+                <a:tc>
+                  <a:txBody>
+                    <a:bodyPr/>
+                    <a:lstStyle/>
+                    <a:p>
+                      <a:endParaRPr lang="en-US" sz="1000">
+                        <a:solidFill>
+                          <a:schemeClr val="bg2">
+                            <a:lumMod val="50000"/>
+                          </a:schemeClr>
+                        </a:solidFill>
+                      </a:endParaRPr>
+                    </a:p>
+                  </a:txBody>
+                  <a:tcPr/>
+                </a:tc>
+                <a:tc>
+                  <a:txBody>
+                    <a:bodyPr/>
+                    <a:lstStyle/>
+                    <a:p>
+                      <a:endParaRPr lang="en-US" sz="1000" dirty="0">
+                        <a:solidFill>
+                          <a:schemeClr val="bg2">
+                            <a:lumMod val="50000"/>
+                          </a:schemeClr>
+                        </a:solidFill>
+                      </a:endParaRPr>
+                    </a:p>
+                  </a:txBody>
+                  <a:tcPr/>
+                </a:tc>
+                <a:tc>
+                  <a:txBody>
+                    <a:bodyPr/>
+                    <a:lstStyle/>
+                    <a:p>
+                      <a:endParaRPr lang="en-US" sz="1000" dirty="0">
+                        <a:solidFill>
+                          <a:schemeClr val="bg2">
+                            <a:lumMod val="50000"/>
+                          </a:schemeClr>
+                        </a:solidFill>
+                      </a:endParaRPr>
+                    </a:p>
+                  </a:txBody>
+                  <a:tcPr/>
+                </a:tc>
+                <a:tc>
+                  <a:txBody>
+                    <a:bodyPr/>
+                    <a:lstStyle/>
+                    <a:p>
+                      <a:endParaRPr lang="en-US" sz="1000">
+                        <a:solidFill>
+                          <a:schemeClr val="bg2">
+                            <a:lumMod val="50000"/>
+                          </a:schemeClr>
+                        </a:solidFill>
+                      </a:endParaRPr>
+                    </a:p>
+                  </a:txBody>
+                  <a:tcPr/>
+                </a:tc>
+                <a:extLst>
+                  <a:ext uri="{0D108BD9-81ED-4DB2-BD59-A6C34878D82A}">
+                    <a16:rowId xmlns:a16="http://schemas.microsoft.com/office/drawing/2014/main" val="808363429"/>
+                  </a:ext>
+                </a:extLst>
+              </a:tr>
+              <a:tr h="370840">
+                <a:tc>
+                  <a:txBody>
+                    <a:bodyPr/>
+                    <a:lstStyle/>
+                    <a:p>
+                      <a:pPr marL="0" marR="0" lvl="0" indent="0" algn="l" defTabSz="914400" rtl="0" eaLnBrk="1" fontAlgn="b" latinLnBrk="0" hangingPunct="1">
+                        <a:lnSpc>
+                          <a:spcPct val="100000"/>
+                        </a:lnSpc>
+                        <a:spcBef>
+                          <a:spcPts val="0"/>
+                        </a:spcBef>
+                        <a:spcAft>
+                          <a:spcPts val="0"/>
+                        </a:spcAft>
+                        <a:buClrTx/>
+                        <a:buSzTx/>
+                        <a:buFontTx/>
+                        <a:buNone/>
+                        <a:tabLst/>
+                        <a:defRPr/>
+                      </a:pPr>
+                      <a:r>
+                        <a:rPr lang="en-US" sz="1200" b="0" i="0" u="none" strike="noStrike" dirty="0">
+                          <a:solidFill>
+                            <a:schemeClr val="bg2">
+                              <a:lumMod val="50000"/>
+                            </a:schemeClr>
+                          </a:solidFill>
+                          <a:effectLst/>
+                          <a:latin typeface="Aptos Narrow" panose="020B0004020202020204" pitchFamily="34" charset="0"/>
+                        </a:rPr>
+                        <a:t>cancer of the liver; cancer of the ureter; cancer of the kidney</a:t>
+                      </a:r>
+                    </a:p>
+                    <a:p>
+                      <a:pPr marL="0" marR="0" lvl="0" indent="0" algn="l" defTabSz="914400" rtl="0" eaLnBrk="1" fontAlgn="b" latinLnBrk="0" hangingPunct="1">
+                        <a:lnSpc>
+                          <a:spcPct val="100000"/>
+                        </a:lnSpc>
+                        <a:spcBef>
+                          <a:spcPts val="0"/>
+                        </a:spcBef>
+                        <a:spcAft>
+                          <a:spcPts val="0"/>
+                        </a:spcAft>
+                        <a:buClrTx/>
+                        <a:buSzTx/>
+                        <a:buFontTx/>
+                        <a:buNone/>
+                        <a:tabLst/>
+                        <a:defRPr/>
+                      </a:pPr>
+                      <a:endParaRPr lang="en-US" sz="1200" b="0" i="0" u="none" strike="noStrike" dirty="0">
+                        <a:solidFill>
+                          <a:schemeClr val="bg2">
+                            <a:lumMod val="50000"/>
+                          </a:schemeClr>
+                        </a:solidFill>
+                        <a:effectLst/>
+                        <a:latin typeface="Aptos Narrow" panose="020B0004020202020204" pitchFamily="34" charset="0"/>
+                      </a:endParaRPr>
+                    </a:p>
+                    <a:p>
+                      <a:pPr algn="l" fontAlgn="b"/>
+                      <a:endParaRPr lang="en-US" sz="1200" b="0" i="0" u="none" strike="noStrike" dirty="0">
+                        <a:solidFill>
+                          <a:schemeClr val="bg2">
+                            <a:lumMod val="50000"/>
+                          </a:schemeClr>
+                        </a:solidFill>
+                        <a:effectLst/>
+                        <a:latin typeface="Aptos Narrow" panose="020B0004020202020204" pitchFamily="34" charset="0"/>
+                      </a:endParaRPr>
+                    </a:p>
+                  </a:txBody>
+                  <a:tcPr marL="9525" marR="9525" marT="9525" marB="0"/>
+                </a:tc>
+                <a:tc>
+                  <a:txBody>
+                    <a:bodyPr/>
+                    <a:lstStyle/>
+                    <a:p>
+                      <a:pPr algn="r" fontAlgn="b"/>
+                      <a:r>
+                        <a:rPr lang="en-US" sz="1200" b="0" i="0" u="none" strike="noStrike" dirty="0">
+                          <a:solidFill>
+                            <a:schemeClr val="bg2">
+                              <a:lumMod val="50000"/>
+                            </a:schemeClr>
+                          </a:solidFill>
+                          <a:effectLst/>
+                          <a:latin typeface="Aptos Narrow" panose="020B0004020202020204" pitchFamily="34" charset="0"/>
+                        </a:rPr>
+                        <a:t>0.09780815</a:t>
+                      </a:r>
+                    </a:p>
+                  </a:txBody>
+                  <a:tcPr marL="9525" marR="9525" marT="9525" marB="0"/>
+                </a:tc>
+                <a:tc>
+                  <a:txBody>
+                    <a:bodyPr/>
+                    <a:lstStyle/>
+                    <a:p>
+                      <a:endParaRPr lang="en-US" sz="1000">
+                        <a:solidFill>
+                          <a:schemeClr val="bg2">
+                            <a:lumMod val="50000"/>
+                          </a:schemeClr>
+                        </a:solidFill>
+                      </a:endParaRPr>
+                    </a:p>
+                  </a:txBody>
+                  <a:tcPr/>
+                </a:tc>
+                <a:tc>
+                  <a:txBody>
+                    <a:bodyPr/>
+                    <a:lstStyle/>
+                    <a:p>
+                      <a:endParaRPr lang="en-US" sz="1000" dirty="0">
+                        <a:solidFill>
+                          <a:schemeClr val="bg2">
+                            <a:lumMod val="50000"/>
+                          </a:schemeClr>
+                        </a:solidFill>
+                      </a:endParaRPr>
+                    </a:p>
+                  </a:txBody>
+                  <a:tcPr/>
+                </a:tc>
+                <a:tc>
+                  <a:txBody>
+                    <a:bodyPr/>
+                    <a:lstStyle/>
+                    <a:p>
+                      <a:endParaRPr lang="en-US" sz="1000" dirty="0">
+                        <a:solidFill>
+                          <a:schemeClr val="bg2">
+                            <a:lumMod val="50000"/>
+                          </a:schemeClr>
+                        </a:solidFill>
+                      </a:endParaRPr>
+                    </a:p>
+                  </a:txBody>
+                  <a:tcPr/>
+                </a:tc>
+                <a:tc>
+                  <a:txBody>
+                    <a:bodyPr/>
+                    <a:lstStyle/>
+                    <a:p>
+                      <a:endParaRPr lang="en-US" sz="1000" dirty="0">
+                        <a:solidFill>
+                          <a:schemeClr val="bg2">
+                            <a:lumMod val="50000"/>
+                          </a:schemeClr>
+                        </a:solidFill>
+                      </a:endParaRPr>
+                    </a:p>
+                  </a:txBody>
+                  <a:tcPr/>
+                </a:tc>
+                <a:extLst>
+                  <a:ext uri="{0D108BD9-81ED-4DB2-BD59-A6C34878D82A}">
+                    <a16:rowId xmlns:a16="http://schemas.microsoft.com/office/drawing/2014/main" val="493799710"/>
+                  </a:ext>
+                </a:extLst>
+              </a:tr>
+              <a:tr h="370840">
+                <a:tc>
+                  <a:txBody>
+                    <a:bodyPr/>
+                    <a:lstStyle/>
+                    <a:p>
+                      <a:pPr marL="0" marR="0" lvl="0" indent="0" algn="l" defTabSz="914400" rtl="0" eaLnBrk="1" fontAlgn="b" latinLnBrk="0" hangingPunct="1">
+                        <a:lnSpc>
+                          <a:spcPct val="100000"/>
+                        </a:lnSpc>
+                        <a:spcBef>
+                          <a:spcPts val="0"/>
+                        </a:spcBef>
+                        <a:spcAft>
+                          <a:spcPts val="0"/>
+                        </a:spcAft>
+                        <a:buClrTx/>
+                        <a:buSzTx/>
+                        <a:buFontTx/>
+                        <a:buNone/>
+                        <a:tabLst/>
+                        <a:defRPr/>
+                      </a:pPr>
+                      <a:r>
+                        <a:rPr lang="en-US" sz="1200" b="0" i="0" u="none" strike="noStrike" dirty="0">
+                          <a:solidFill>
+                            <a:schemeClr val="bg2">
+                              <a:lumMod val="50000"/>
+                            </a:schemeClr>
+                          </a:solidFill>
+                          <a:effectLst/>
+                          <a:latin typeface="Aptos Narrow" panose="020B0004020202020204" pitchFamily="34" charset="0"/>
+                        </a:rPr>
+                        <a:t>smoldering myeloma; </a:t>
+                      </a:r>
+                      <a:r>
+                        <a:rPr lang="en-US" sz="1200" b="0" i="0" u="none" strike="noStrike" dirty="0" err="1">
+                          <a:solidFill>
+                            <a:schemeClr val="bg2">
+                              <a:lumMod val="50000"/>
+                            </a:schemeClr>
+                          </a:solidFill>
+                          <a:effectLst/>
+                          <a:latin typeface="Aptos Narrow" panose="020B0004020202020204" pitchFamily="34" charset="0"/>
+                        </a:rPr>
+                        <a:t>smouldering</a:t>
+                      </a:r>
+                      <a:r>
+                        <a:rPr lang="en-US" sz="1200" b="0" i="0" u="none" strike="noStrike" dirty="0">
+                          <a:solidFill>
+                            <a:schemeClr val="bg2">
+                              <a:lumMod val="50000"/>
+                            </a:schemeClr>
+                          </a:solidFill>
+                          <a:effectLst/>
+                          <a:latin typeface="Aptos Narrow" panose="020B0004020202020204" pitchFamily="34" charset="0"/>
+                        </a:rPr>
+                        <a:t> myeloma</a:t>
+                      </a:r>
+                    </a:p>
+                    <a:p>
+                      <a:pPr algn="l" fontAlgn="b"/>
+                      <a:endParaRPr lang="en-US" sz="1200" b="0" i="0" u="none" strike="noStrike" dirty="0">
+                        <a:solidFill>
+                          <a:schemeClr val="bg2">
+                            <a:lumMod val="50000"/>
+                          </a:schemeClr>
+                        </a:solidFill>
+                        <a:effectLst/>
+                        <a:latin typeface="Aptos Narrow" panose="020B0004020202020204" pitchFamily="34" charset="0"/>
+                      </a:endParaRPr>
+                    </a:p>
+                  </a:txBody>
+                  <a:tcPr marL="9525" marR="9525" marT="9525" marB="0"/>
+                </a:tc>
+                <a:tc>
+                  <a:txBody>
+                    <a:bodyPr/>
+                    <a:lstStyle/>
+                    <a:p>
+                      <a:pPr algn="r" fontAlgn="b"/>
+                      <a:r>
+                        <a:rPr lang="en-US" sz="1200" b="0" i="0" u="none" strike="noStrike" dirty="0">
+                          <a:solidFill>
+                            <a:schemeClr val="bg2">
+                              <a:lumMod val="50000"/>
+                            </a:schemeClr>
+                          </a:solidFill>
+                          <a:effectLst/>
+                          <a:latin typeface="Aptos Narrow" panose="020B0004020202020204" pitchFamily="34" charset="0"/>
+                        </a:rPr>
+                        <a:t>0.88235294</a:t>
+                      </a:r>
+                    </a:p>
+                  </a:txBody>
+                  <a:tcPr marL="9525" marR="9525" marT="9525" marB="0"/>
+                </a:tc>
+                <a:tc>
+                  <a:txBody>
+                    <a:bodyPr/>
+                    <a:lstStyle/>
+                    <a:p>
+                      <a:endParaRPr lang="en-US" sz="1000" dirty="0">
+                        <a:solidFill>
+                          <a:schemeClr val="bg2">
+                            <a:lumMod val="50000"/>
+                          </a:schemeClr>
+                        </a:solidFill>
+                      </a:endParaRPr>
+                    </a:p>
+                  </a:txBody>
+                  <a:tcPr/>
+                </a:tc>
+                <a:tc>
+                  <a:txBody>
+                    <a:bodyPr/>
+                    <a:lstStyle/>
+                    <a:p>
+                      <a:endParaRPr lang="en-US" sz="1000" dirty="0">
+                        <a:solidFill>
+                          <a:schemeClr val="bg2">
+                            <a:lumMod val="50000"/>
+                          </a:schemeClr>
+                        </a:solidFill>
+                      </a:endParaRPr>
+                    </a:p>
+                  </a:txBody>
+                  <a:tcPr/>
+                </a:tc>
+                <a:tc>
+                  <a:txBody>
+                    <a:bodyPr/>
+                    <a:lstStyle/>
+                    <a:p>
+                      <a:endParaRPr lang="en-US" sz="1000">
+                        <a:solidFill>
+                          <a:schemeClr val="bg2">
+                            <a:lumMod val="50000"/>
+                          </a:schemeClr>
+                        </a:solidFill>
+                      </a:endParaRPr>
+                    </a:p>
+                  </a:txBody>
+                  <a:tcPr/>
+                </a:tc>
+                <a:tc>
+                  <a:txBody>
+                    <a:bodyPr/>
+                    <a:lstStyle/>
+                    <a:p>
+                      <a:endParaRPr lang="en-US" sz="1000" dirty="0">
+                        <a:solidFill>
+                          <a:schemeClr val="bg2">
+                            <a:lumMod val="50000"/>
+                          </a:schemeClr>
+                        </a:solidFill>
+                      </a:endParaRPr>
+                    </a:p>
+                  </a:txBody>
+                  <a:tcPr/>
+                </a:tc>
+                <a:extLst>
+                  <a:ext uri="{0D108BD9-81ED-4DB2-BD59-A6C34878D82A}">
+                    <a16:rowId xmlns:a16="http://schemas.microsoft.com/office/drawing/2014/main" val="2596835873"/>
+                  </a:ext>
+                </a:extLst>
+              </a:tr>
+            </a:tbl>
+          </a:graphicData>
+        </a:graphic>
+      </p:graphicFrame>
+      <p:graphicFrame>
+        <p:nvGraphicFramePr>
+          <p:cNvPr id="7" name="Table 6">
+            <a:extLst>
+              <a:ext uri="{FF2B5EF4-FFF2-40B4-BE49-F238E27FC236}">
+                <a16:creationId xmlns:a16="http://schemas.microsoft.com/office/drawing/2014/main" id="{3BBA0D72-1D0A-8873-7107-8D9243765448}"/>
+              </a:ext>
+            </a:extLst>
+          </p:cNvPr>
+          <p:cNvGraphicFramePr>
+            <a:graphicFrameLocks noGrp="1"/>
+          </p:cNvGraphicFramePr>
+          <p:nvPr>
+            <p:extLst>
+              <p:ext uri="{D42A27DB-BD31-4B8C-83A1-F6EECF244321}">
+                <p14:modId xmlns:p14="http://schemas.microsoft.com/office/powerpoint/2010/main" val="1798436339"/>
+              </p:ext>
+            </p:extLst>
+          </p:nvPr>
+        </p:nvGraphicFramePr>
+        <p:xfrm>
+          <a:off x="9576262" y="1550939"/>
+          <a:ext cx="2273300" cy="812800"/>
+        </p:xfrm>
+        <a:graphic>
+          <a:graphicData uri="http://schemas.openxmlformats.org/drawingml/2006/table">
+            <a:tbl>
+              <a:tblPr/>
+              <a:tblGrid>
+                <a:gridCol w="2273300">
+                  <a:extLst>
+                    <a:ext uri="{9D8B030D-6E8A-4147-A177-3AD203B41FA5}">
+                      <a16:colId xmlns:a16="http://schemas.microsoft.com/office/drawing/2014/main" val="3453916462"/>
+                    </a:ext>
+                  </a:extLst>
+                </a:gridCol>
+              </a:tblGrid>
+              <a:tr h="203200">
+                <a:tc>
+                  <a:txBody>
+                    <a:bodyPr/>
+                    <a:lstStyle/>
+                    <a:p>
+                      <a:pPr algn="l" fontAlgn="b"/>
+                      <a:endParaRPr lang="en-US" sz="1200" b="0" i="0" u="none" strike="noStrike" dirty="0">
+                        <a:solidFill>
+                          <a:srgbClr val="000000"/>
+                        </a:solidFill>
+                        <a:effectLst/>
+                        <a:latin typeface="Aptos Narrow" panose="020B0004020202020204" pitchFamily="34" charset="0"/>
+                      </a:endParaRPr>
+                    </a:p>
+                  </a:txBody>
+                  <a:tcPr marL="9525" marR="9525" marT="9525" marB="0" anchor="b">
+                    <a:lnL>
+                      <a:noFill/>
+                    </a:lnL>
+                    <a:lnR>
+                      <a:noFill/>
+                    </a:lnR>
+                    <a:lnT>
+                      <a:noFill/>
+                    </a:lnT>
+                    <a:lnB>
+                      <a:noFill/>
+                    </a:lnB>
+                    <a:noFill/>
+                  </a:tcPr>
+                </a:tc>
+                <a:extLst>
+                  <a:ext uri="{0D108BD9-81ED-4DB2-BD59-A6C34878D82A}">
+                    <a16:rowId xmlns:a16="http://schemas.microsoft.com/office/drawing/2014/main" val="752652226"/>
+                  </a:ext>
+                </a:extLst>
+              </a:tr>
+              <a:tr h="203200">
+                <a:tc>
+                  <a:txBody>
+                    <a:bodyPr/>
+                    <a:lstStyle/>
+                    <a:p>
+                      <a:pPr algn="l" fontAlgn="b"/>
+                      <a:endParaRPr lang="en-US" sz="1200" b="0" i="0" u="none" strike="noStrike" dirty="0">
+                        <a:solidFill>
+                          <a:srgbClr val="000000"/>
+                        </a:solidFill>
+                        <a:effectLst/>
+                        <a:latin typeface="Aptos Narrow" panose="020B0004020202020204" pitchFamily="34" charset="0"/>
+                      </a:endParaRPr>
+                    </a:p>
+                  </a:txBody>
+                  <a:tcPr marL="9525" marR="9525" marT="9525" marB="0" anchor="b">
+                    <a:lnL>
+                      <a:noFill/>
+                    </a:lnL>
+                    <a:lnR>
+                      <a:noFill/>
+                    </a:lnR>
+                    <a:lnT>
+                      <a:noFill/>
+                    </a:lnT>
+                    <a:lnB>
+                      <a:noFill/>
+                    </a:lnB>
+                    <a:noFill/>
+                  </a:tcPr>
+                </a:tc>
+                <a:extLst>
+                  <a:ext uri="{0D108BD9-81ED-4DB2-BD59-A6C34878D82A}">
+                    <a16:rowId xmlns:a16="http://schemas.microsoft.com/office/drawing/2014/main" val="395114167"/>
+                  </a:ext>
+                </a:extLst>
+              </a:tr>
+              <a:tr h="203200">
+                <a:tc>
+                  <a:txBody>
+                    <a:bodyPr/>
+                    <a:lstStyle/>
+                    <a:p>
+                      <a:pPr algn="l" fontAlgn="b"/>
+                      <a:endParaRPr lang="en-US" sz="1200" b="0" i="0" u="none" strike="noStrike" dirty="0">
+                        <a:solidFill>
+                          <a:srgbClr val="000000"/>
+                        </a:solidFill>
+                        <a:effectLst/>
+                        <a:latin typeface="Aptos Narrow" panose="020B0004020202020204" pitchFamily="34" charset="0"/>
+                      </a:endParaRPr>
+                    </a:p>
+                  </a:txBody>
+                  <a:tcPr marL="9525" marR="9525" marT="9525" marB="0" anchor="b">
+                    <a:lnL>
+                      <a:noFill/>
+                    </a:lnL>
+                    <a:lnR>
+                      <a:noFill/>
+                    </a:lnR>
+                    <a:lnT>
+                      <a:noFill/>
+                    </a:lnT>
+                    <a:lnB>
+                      <a:noFill/>
+                    </a:lnB>
+                    <a:noFill/>
+                  </a:tcPr>
+                </a:tc>
+                <a:extLst>
+                  <a:ext uri="{0D108BD9-81ED-4DB2-BD59-A6C34878D82A}">
+                    <a16:rowId xmlns:a16="http://schemas.microsoft.com/office/drawing/2014/main" val="3064603406"/>
+                  </a:ext>
+                </a:extLst>
+              </a:tr>
+              <a:tr h="203200">
+                <a:tc>
+                  <a:txBody>
+                    <a:bodyPr/>
+                    <a:lstStyle/>
+                    <a:p>
+                      <a:pPr algn="l" fontAlgn="b"/>
+                      <a:endParaRPr lang="en-US" sz="1200" b="0" i="0" u="none" strike="noStrike" dirty="0">
+                        <a:solidFill>
+                          <a:srgbClr val="000000"/>
+                        </a:solidFill>
+                        <a:effectLst/>
+                        <a:latin typeface="Aptos Narrow" panose="020B0004020202020204" pitchFamily="34" charset="0"/>
+                      </a:endParaRPr>
+                    </a:p>
+                  </a:txBody>
+                  <a:tcPr marL="9525" marR="9525" marT="9525" marB="0" anchor="b">
+                    <a:lnL>
+                      <a:noFill/>
+                    </a:lnL>
+                    <a:lnR>
+                      <a:noFill/>
+                    </a:lnR>
+                    <a:lnT>
+                      <a:noFill/>
+                    </a:lnT>
+                    <a:lnB>
+                      <a:noFill/>
+                    </a:lnB>
+                    <a:noFill/>
+                  </a:tcPr>
+                </a:tc>
+                <a:extLst>
+                  <a:ext uri="{0D108BD9-81ED-4DB2-BD59-A6C34878D82A}">
+                    <a16:rowId xmlns:a16="http://schemas.microsoft.com/office/drawing/2014/main" val="3498401855"/>
+                  </a:ext>
+                </a:extLst>
+              </a:tr>
+            </a:tbl>
+          </a:graphicData>
+        </a:graphic>
+      </p:graphicFrame>
+      <p:graphicFrame>
+        <p:nvGraphicFramePr>
+          <p:cNvPr id="10" name="Table 9">
+            <a:extLst>
+              <a:ext uri="{FF2B5EF4-FFF2-40B4-BE49-F238E27FC236}">
+                <a16:creationId xmlns:a16="http://schemas.microsoft.com/office/drawing/2014/main" id="{FB8AF258-FD2A-7955-3C10-9F7685B592A2}"/>
+              </a:ext>
+            </a:extLst>
+          </p:cNvPr>
+          <p:cNvGraphicFramePr>
+            <a:graphicFrameLocks noGrp="1"/>
+          </p:cNvGraphicFramePr>
+          <p:nvPr>
+            <p:extLst>
+              <p:ext uri="{D42A27DB-BD31-4B8C-83A1-F6EECF244321}">
+                <p14:modId xmlns:p14="http://schemas.microsoft.com/office/powerpoint/2010/main" val="1969651073"/>
+              </p:ext>
+            </p:extLst>
+          </p:nvPr>
+        </p:nvGraphicFramePr>
+        <p:xfrm>
+          <a:off x="4959350" y="2883694"/>
+          <a:ext cx="2273300" cy="2235200"/>
+        </p:xfrm>
+        <a:graphic>
+          <a:graphicData uri="http://schemas.openxmlformats.org/drawingml/2006/table">
+            <a:tbl>
+              <a:tblPr/>
+              <a:tblGrid>
+                <a:gridCol w="2273300">
+                  <a:extLst>
+                    <a:ext uri="{9D8B030D-6E8A-4147-A177-3AD203B41FA5}">
+                      <a16:colId xmlns:a16="http://schemas.microsoft.com/office/drawing/2014/main" val="2720058215"/>
+                    </a:ext>
+                  </a:extLst>
+                </a:gridCol>
+              </a:tblGrid>
+              <a:tr h="203200">
+                <a:tc>
+                  <a:txBody>
+                    <a:bodyPr/>
+                    <a:lstStyle/>
+                    <a:p>
+                      <a:pPr algn="l" fontAlgn="b"/>
+                      <a:endParaRPr lang="en-US" sz="1200" b="0" i="0" u="none" strike="noStrike">
+                        <a:solidFill>
+                          <a:srgbClr val="000000"/>
+                        </a:solidFill>
+                        <a:effectLst/>
+                        <a:latin typeface="Aptos Narrow" panose="020B0004020202020204" pitchFamily="34" charset="0"/>
+                      </a:endParaRPr>
+                    </a:p>
+                  </a:txBody>
+                  <a:tcPr marL="9525" marR="9525" marT="9525" marB="0" anchor="b">
+                    <a:lnL>
+                      <a:noFill/>
+                    </a:lnL>
+                    <a:lnR>
+                      <a:noFill/>
+                    </a:lnR>
+                    <a:lnT>
+                      <a:noFill/>
+                    </a:lnT>
+                    <a:lnB>
+                      <a:noFill/>
+                    </a:lnB>
+                    <a:noFill/>
+                  </a:tcPr>
+                </a:tc>
+                <a:extLst>
+                  <a:ext uri="{0D108BD9-81ED-4DB2-BD59-A6C34878D82A}">
+                    <a16:rowId xmlns:a16="http://schemas.microsoft.com/office/drawing/2014/main" val="968940032"/>
+                  </a:ext>
+                </a:extLst>
+              </a:tr>
+              <a:tr h="203200">
+                <a:tc>
+                  <a:txBody>
+                    <a:bodyPr/>
+                    <a:lstStyle/>
+                    <a:p>
+                      <a:pPr algn="l" fontAlgn="b"/>
+                      <a:endParaRPr lang="en-US" sz="1200" b="0" i="0" u="none" strike="noStrike" dirty="0">
+                        <a:solidFill>
+                          <a:srgbClr val="000000"/>
+                        </a:solidFill>
+                        <a:effectLst/>
+                        <a:latin typeface="Aptos Narrow" panose="020B0004020202020204" pitchFamily="34" charset="0"/>
+                      </a:endParaRPr>
+                    </a:p>
+                  </a:txBody>
+                  <a:tcPr marL="9525" marR="9525" marT="9525" marB="0" anchor="b">
+                    <a:lnL>
+                      <a:noFill/>
+                    </a:lnL>
+                    <a:lnR>
+                      <a:noFill/>
+                    </a:lnR>
+                    <a:lnT>
+                      <a:noFill/>
+                    </a:lnT>
+                    <a:lnB>
+                      <a:noFill/>
+                    </a:lnB>
+                    <a:noFill/>
+                  </a:tcPr>
+                </a:tc>
+                <a:extLst>
+                  <a:ext uri="{0D108BD9-81ED-4DB2-BD59-A6C34878D82A}">
+                    <a16:rowId xmlns:a16="http://schemas.microsoft.com/office/drawing/2014/main" val="357269616"/>
+                  </a:ext>
+                </a:extLst>
+              </a:tr>
+              <a:tr h="203200">
+                <a:tc>
+                  <a:txBody>
+                    <a:bodyPr/>
+                    <a:lstStyle/>
+                    <a:p>
+                      <a:pPr algn="l" fontAlgn="b"/>
+                      <a:endParaRPr lang="en-US" sz="1200" b="0" i="0" u="none" strike="noStrike">
+                        <a:solidFill>
+                          <a:srgbClr val="000000"/>
+                        </a:solidFill>
+                        <a:effectLst/>
+                        <a:latin typeface="Aptos Narrow" panose="020B0004020202020204" pitchFamily="34" charset="0"/>
+                      </a:endParaRPr>
+                    </a:p>
+                  </a:txBody>
+                  <a:tcPr marL="9525" marR="9525" marT="9525" marB="0" anchor="b">
+                    <a:lnL>
+                      <a:noFill/>
+                    </a:lnL>
+                    <a:lnR>
+                      <a:noFill/>
+                    </a:lnR>
+                    <a:lnT>
+                      <a:noFill/>
+                    </a:lnT>
+                    <a:lnB>
+                      <a:noFill/>
+                    </a:lnB>
+                    <a:noFill/>
+                  </a:tcPr>
+                </a:tc>
+                <a:extLst>
+                  <a:ext uri="{0D108BD9-81ED-4DB2-BD59-A6C34878D82A}">
+                    <a16:rowId xmlns:a16="http://schemas.microsoft.com/office/drawing/2014/main" val="1493847368"/>
+                  </a:ext>
+                </a:extLst>
+              </a:tr>
+              <a:tr h="203200">
+                <a:tc>
+                  <a:txBody>
+                    <a:bodyPr/>
+                    <a:lstStyle/>
+                    <a:p>
+                      <a:pPr algn="l" fontAlgn="b"/>
+                      <a:endParaRPr lang="en-US" sz="1200" b="0" i="0" u="none" strike="noStrike" dirty="0">
+                        <a:solidFill>
+                          <a:srgbClr val="000000"/>
+                        </a:solidFill>
+                        <a:effectLst/>
+                        <a:latin typeface="Aptos Narrow" panose="020B0004020202020204" pitchFamily="34" charset="0"/>
+                      </a:endParaRPr>
+                    </a:p>
+                  </a:txBody>
+                  <a:tcPr marL="9525" marR="9525" marT="9525" marB="0" anchor="b">
+                    <a:lnL>
+                      <a:noFill/>
+                    </a:lnL>
+                    <a:lnR>
+                      <a:noFill/>
+                    </a:lnR>
+                    <a:lnT>
+                      <a:noFill/>
+                    </a:lnT>
+                    <a:lnB>
+                      <a:noFill/>
+                    </a:lnB>
+                    <a:noFill/>
+                  </a:tcPr>
+                </a:tc>
+                <a:extLst>
+                  <a:ext uri="{0D108BD9-81ED-4DB2-BD59-A6C34878D82A}">
+                    <a16:rowId xmlns:a16="http://schemas.microsoft.com/office/drawing/2014/main" val="466177873"/>
+                  </a:ext>
+                </a:extLst>
+              </a:tr>
+              <a:tr h="203200">
+                <a:tc>
+                  <a:txBody>
+                    <a:bodyPr/>
+                    <a:lstStyle/>
+                    <a:p>
+                      <a:pPr algn="l" fontAlgn="b"/>
+                      <a:endParaRPr lang="en-US" sz="1200" b="0" i="0" u="none" strike="noStrike">
+                        <a:solidFill>
+                          <a:srgbClr val="000000"/>
+                        </a:solidFill>
+                        <a:effectLst/>
+                        <a:latin typeface="Aptos Narrow" panose="020B0004020202020204" pitchFamily="34" charset="0"/>
+                      </a:endParaRPr>
+                    </a:p>
+                  </a:txBody>
+                  <a:tcPr marL="9525" marR="9525" marT="9525" marB="0" anchor="b">
+                    <a:lnL>
+                      <a:noFill/>
+                    </a:lnL>
+                    <a:lnR>
+                      <a:noFill/>
+                    </a:lnR>
+                    <a:lnT>
+                      <a:noFill/>
+                    </a:lnT>
+                    <a:lnB>
+                      <a:noFill/>
+                    </a:lnB>
+                    <a:noFill/>
+                  </a:tcPr>
+                </a:tc>
+                <a:extLst>
+                  <a:ext uri="{0D108BD9-81ED-4DB2-BD59-A6C34878D82A}">
+                    <a16:rowId xmlns:a16="http://schemas.microsoft.com/office/drawing/2014/main" val="2789183045"/>
+                  </a:ext>
+                </a:extLst>
+              </a:tr>
+              <a:tr h="203200">
+                <a:tc>
+                  <a:txBody>
+                    <a:bodyPr/>
+                    <a:lstStyle/>
+                    <a:p>
+                      <a:pPr algn="l" fontAlgn="b"/>
+                      <a:endParaRPr lang="en-US" sz="1200" b="0" i="0" u="none" strike="noStrike">
+                        <a:solidFill>
+                          <a:srgbClr val="000000"/>
+                        </a:solidFill>
+                        <a:effectLst/>
+                        <a:latin typeface="Aptos Narrow" panose="020B0004020202020204" pitchFamily="34" charset="0"/>
+                      </a:endParaRPr>
+                    </a:p>
+                  </a:txBody>
+                  <a:tcPr marL="9525" marR="9525" marT="9525" marB="0" anchor="b">
+                    <a:lnL>
+                      <a:noFill/>
+                    </a:lnL>
+                    <a:lnR>
+                      <a:noFill/>
+                    </a:lnR>
+                    <a:lnT>
+                      <a:noFill/>
+                    </a:lnT>
+                    <a:lnB>
+                      <a:noFill/>
+                    </a:lnB>
+                    <a:noFill/>
+                  </a:tcPr>
+                </a:tc>
+                <a:extLst>
+                  <a:ext uri="{0D108BD9-81ED-4DB2-BD59-A6C34878D82A}">
+                    <a16:rowId xmlns:a16="http://schemas.microsoft.com/office/drawing/2014/main" val="1127600472"/>
+                  </a:ext>
+                </a:extLst>
+              </a:tr>
+              <a:tr h="203200">
+                <a:tc>
+                  <a:txBody>
+                    <a:bodyPr/>
+                    <a:lstStyle/>
+                    <a:p>
+                      <a:pPr algn="l" fontAlgn="b"/>
+                      <a:endParaRPr lang="en-US" sz="1200" b="0" i="0" u="none" strike="noStrike">
+                        <a:solidFill>
+                          <a:srgbClr val="000000"/>
+                        </a:solidFill>
+                        <a:effectLst/>
+                        <a:latin typeface="Aptos Narrow" panose="020B0004020202020204" pitchFamily="34" charset="0"/>
+                      </a:endParaRPr>
+                    </a:p>
+                  </a:txBody>
+                  <a:tcPr marL="9525" marR="9525" marT="9525" marB="0" anchor="b">
+                    <a:lnL>
+                      <a:noFill/>
+                    </a:lnL>
+                    <a:lnR>
+                      <a:noFill/>
+                    </a:lnR>
+                    <a:lnT>
+                      <a:noFill/>
+                    </a:lnT>
+                    <a:lnB>
+                      <a:noFill/>
+                    </a:lnB>
+                    <a:noFill/>
+                  </a:tcPr>
+                </a:tc>
+                <a:extLst>
+                  <a:ext uri="{0D108BD9-81ED-4DB2-BD59-A6C34878D82A}">
+                    <a16:rowId xmlns:a16="http://schemas.microsoft.com/office/drawing/2014/main" val="1686309337"/>
+                  </a:ext>
+                </a:extLst>
+              </a:tr>
+              <a:tr h="203200">
+                <a:tc>
+                  <a:txBody>
+                    <a:bodyPr/>
+                    <a:lstStyle/>
+                    <a:p>
+                      <a:pPr algn="l" fontAlgn="b"/>
+                      <a:endParaRPr lang="en-US" sz="1200" b="0" i="0" u="none" strike="noStrike">
+                        <a:solidFill>
+                          <a:srgbClr val="000000"/>
+                        </a:solidFill>
+                        <a:effectLst/>
+                        <a:latin typeface="Aptos Narrow" panose="020B0004020202020204" pitchFamily="34" charset="0"/>
+                      </a:endParaRPr>
+                    </a:p>
+                  </a:txBody>
+                  <a:tcPr marL="9525" marR="9525" marT="9525" marB="0" anchor="b">
+                    <a:lnL>
+                      <a:noFill/>
+                    </a:lnL>
+                    <a:lnR>
+                      <a:noFill/>
+                    </a:lnR>
+                    <a:lnT>
+                      <a:noFill/>
+                    </a:lnT>
+                    <a:lnB>
+                      <a:noFill/>
+                    </a:lnB>
+                    <a:noFill/>
+                  </a:tcPr>
+                </a:tc>
+                <a:extLst>
+                  <a:ext uri="{0D108BD9-81ED-4DB2-BD59-A6C34878D82A}">
+                    <a16:rowId xmlns:a16="http://schemas.microsoft.com/office/drawing/2014/main" val="3556784299"/>
+                  </a:ext>
+                </a:extLst>
+              </a:tr>
+              <a:tr h="203200">
+                <a:tc>
+                  <a:txBody>
+                    <a:bodyPr/>
+                    <a:lstStyle/>
+                    <a:p>
+                      <a:pPr algn="l" fontAlgn="b"/>
+                      <a:endParaRPr lang="en-US" sz="1200" b="0" i="0" u="none" strike="noStrike">
+                        <a:solidFill>
+                          <a:srgbClr val="000000"/>
+                        </a:solidFill>
+                        <a:effectLst/>
+                        <a:latin typeface="Aptos Narrow" panose="020B0004020202020204" pitchFamily="34" charset="0"/>
+                      </a:endParaRPr>
+                    </a:p>
+                  </a:txBody>
+                  <a:tcPr marL="9525" marR="9525" marT="9525" marB="0" anchor="b">
+                    <a:lnL>
+                      <a:noFill/>
+                    </a:lnL>
+                    <a:lnR>
+                      <a:noFill/>
+                    </a:lnR>
+                    <a:lnT>
+                      <a:noFill/>
+                    </a:lnT>
+                    <a:lnB>
+                      <a:noFill/>
+                    </a:lnB>
+                    <a:noFill/>
+                  </a:tcPr>
+                </a:tc>
+                <a:extLst>
+                  <a:ext uri="{0D108BD9-81ED-4DB2-BD59-A6C34878D82A}">
+                    <a16:rowId xmlns:a16="http://schemas.microsoft.com/office/drawing/2014/main" val="2080094899"/>
+                  </a:ext>
+                </a:extLst>
+              </a:tr>
+              <a:tr h="203200">
+                <a:tc>
+                  <a:txBody>
+                    <a:bodyPr/>
+                    <a:lstStyle/>
+                    <a:p>
+                      <a:pPr algn="l" fontAlgn="b"/>
+                      <a:endParaRPr lang="en-US" sz="1200" b="0" i="0" u="none" strike="noStrike" dirty="0">
+                        <a:solidFill>
+                          <a:srgbClr val="000000"/>
+                        </a:solidFill>
+                        <a:effectLst/>
+                        <a:latin typeface="Aptos Narrow" panose="020B0004020202020204" pitchFamily="34" charset="0"/>
+                      </a:endParaRPr>
+                    </a:p>
+                  </a:txBody>
+                  <a:tcPr marL="9525" marR="9525" marT="9525" marB="0" anchor="b">
+                    <a:lnL>
+                      <a:noFill/>
+                    </a:lnL>
+                    <a:lnR>
+                      <a:noFill/>
+                    </a:lnR>
+                    <a:lnT>
+                      <a:noFill/>
+                    </a:lnT>
+                    <a:lnB>
+                      <a:noFill/>
+                    </a:lnB>
+                    <a:noFill/>
+                  </a:tcPr>
+                </a:tc>
+                <a:extLst>
+                  <a:ext uri="{0D108BD9-81ED-4DB2-BD59-A6C34878D82A}">
+                    <a16:rowId xmlns:a16="http://schemas.microsoft.com/office/drawing/2014/main" val="3512015513"/>
+                  </a:ext>
+                </a:extLst>
+              </a:tr>
+              <a:tr h="203200">
+                <a:tc>
+                  <a:txBody>
+                    <a:bodyPr/>
+                    <a:lstStyle/>
+                    <a:p>
+                      <a:pPr algn="l" fontAlgn="b"/>
+                      <a:endParaRPr lang="en-US" sz="1200" b="0" i="0" u="none" strike="noStrike" dirty="0">
+                        <a:solidFill>
+                          <a:srgbClr val="000000"/>
+                        </a:solidFill>
+                        <a:effectLst/>
+                        <a:latin typeface="Aptos Narrow" panose="020B0004020202020204" pitchFamily="34" charset="0"/>
+                      </a:endParaRPr>
+                    </a:p>
+                  </a:txBody>
+                  <a:tcPr marL="9525" marR="9525" marT="9525" marB="0" anchor="b">
+                    <a:lnL>
+                      <a:noFill/>
+                    </a:lnL>
+                    <a:lnR>
+                      <a:noFill/>
+                    </a:lnR>
+                    <a:lnT>
+                      <a:noFill/>
+                    </a:lnT>
+                    <a:lnB>
+                      <a:noFill/>
+                    </a:lnB>
+                    <a:noFill/>
+                  </a:tcPr>
+                </a:tc>
+                <a:extLst>
+                  <a:ext uri="{0D108BD9-81ED-4DB2-BD59-A6C34878D82A}">
+                    <a16:rowId xmlns:a16="http://schemas.microsoft.com/office/drawing/2014/main" val="3577544773"/>
+                  </a:ext>
+                </a:extLst>
+              </a:tr>
+            </a:tbl>
+          </a:graphicData>
+        </a:graphic>
+      </p:graphicFrame>
+    </p:spTree>
+    <p:extLst>
+      <p:ext uri="{BB962C8B-B14F-4D97-AF65-F5344CB8AC3E}">
+        <p14:creationId xmlns:p14="http://schemas.microsoft.com/office/powerpoint/2010/main" val="1629901189"/>
+      </p:ext>
+    </p:extLst>
+  </p:cSld>
+  <p:clrMapOvr>
+    <a:masterClrMapping/>
+  </p:clrMapOvr>
+</p:sld>
+</file>
+
+<file path=ppt/slides/slide19.xml><?xml version="1.0" encoding="utf-8"?>
 <p:sld xmlns:a="http://schemas.openxmlformats.org/drawingml/2006/main" xmlns:r="http://schemas.openxmlformats.org/officeDocument/2006/relationships" xmlns:p="http://schemas.openxmlformats.org/presentationml/2006/main">
   <p:cSld>
     <p:spTree>
@@ -10189,7 +12411,7 @@
             <a:fld id="{AD40181A-01B0-4CB8-8614-1473649F6741}" type="slidenum">
               <a:rPr lang="en-US" smtClean="0"/>
               <a:pPr/>
-              <a:t>17</a:t>
+              <a:t>19</a:t>
             </a:fld>
             <a:endParaRPr lang="en-US" dirty="0"/>
           </a:p>

</xml_diff>

<commit_message>
adding method 2 benchmark
</commit_message>
<xml_diff>
--- a/presentations/BIG_2024.pptx
+++ b/presentations/BIG_2024.pptx
@@ -10323,7 +10323,7 @@
         </p:nvSpPr>
         <p:spPr>
           <a:xfrm>
-            <a:off x="0" y="-82829"/>
+            <a:off x="0" y="-321064"/>
             <a:ext cx="11010595" cy="1143000"/>
           </a:xfrm>
         </p:spPr>
@@ -10454,14 +10454,14 @@
           <p:nvPr>
             <p:extLst>
               <p:ext uri="{D42A27DB-BD31-4B8C-83A1-F6EECF244321}">
-                <p14:modId xmlns:p14="http://schemas.microsoft.com/office/powerpoint/2010/main" val="3280613273"/>
+                <p14:modId xmlns:p14="http://schemas.microsoft.com/office/powerpoint/2010/main" val="2555406310"/>
               </p:ext>
             </p:extLst>
           </p:nvPr>
         </p:nvGraphicFramePr>
         <p:xfrm>
-          <a:off x="216213" y="656705"/>
-          <a:ext cx="8128002" cy="5149215"/>
+          <a:off x="194572" y="507076"/>
+          <a:ext cx="10886293" cy="5250180"/>
         </p:xfrm>
         <a:graphic>
           <a:graphicData uri="http://schemas.openxmlformats.org/drawingml/2006/table">
@@ -10470,42 +10470,42 @@
                 <a:tableStyleId>{5C22544A-7EE6-4342-B048-85BDC9FD1C3A}</a:tableStyleId>
               </a:tblPr>
               <a:tblGrid>
-                <a:gridCol w="2059940">
+                <a:gridCol w="2990481">
                   <a:extLst>
                     <a:ext uri="{9D8B030D-6E8A-4147-A177-3AD203B41FA5}">
                       <a16:colId xmlns:a16="http://schemas.microsoft.com/office/drawing/2014/main" val="1643565107"/>
                     </a:ext>
                   </a:extLst>
                 </a:gridCol>
-                <a:gridCol w="765471">
+                <a:gridCol w="793751">
                   <a:extLst>
                     <a:ext uri="{9D8B030D-6E8A-4147-A177-3AD203B41FA5}">
                       <a16:colId xmlns:a16="http://schemas.microsoft.com/office/drawing/2014/main" val="731584528"/>
                     </a:ext>
                   </a:extLst>
                 </a:gridCol>
-                <a:gridCol w="1238590">
+                <a:gridCol w="2243111">
                   <a:extLst>
                     <a:ext uri="{9D8B030D-6E8A-4147-A177-3AD203B41FA5}">
                       <a16:colId xmlns:a16="http://schemas.microsoft.com/office/drawing/2014/main" val="3887048142"/>
                     </a:ext>
                   </a:extLst>
                 </a:gridCol>
-                <a:gridCol w="888768">
+                <a:gridCol w="677717">
                   <a:extLst>
                     <a:ext uri="{9D8B030D-6E8A-4147-A177-3AD203B41FA5}">
                       <a16:colId xmlns:a16="http://schemas.microsoft.com/office/drawing/2014/main" val="3285545827"/>
                     </a:ext>
                   </a:extLst>
                 </a:gridCol>
-                <a:gridCol w="1820566">
+                <a:gridCol w="3516215">
                   <a:extLst>
                     <a:ext uri="{9D8B030D-6E8A-4147-A177-3AD203B41FA5}">
                       <a16:colId xmlns:a16="http://schemas.microsoft.com/office/drawing/2014/main" val="1729305009"/>
                     </a:ext>
                   </a:extLst>
                 </a:gridCol>
-                <a:gridCol w="1354667">
+                <a:gridCol w="665018">
                   <a:extLst>
                     <a:ext uri="{9D8B030D-6E8A-4147-A177-3AD203B41FA5}">
                       <a16:colId xmlns:a16="http://schemas.microsoft.com/office/drawing/2014/main" val="4138275225"/>
@@ -10537,12 +10537,13 @@
                         <a:defRPr/>
                       </a:pPr>
                       <a:r>
-                        <a:rPr lang="en-US" dirty="0"/>
+                        <a:rPr lang="en-US" sz="1000" dirty="0"/>
                         <a:t>LV + AF</a:t>
                       </a:r>
                     </a:p>
                     <a:p>
-                      <a:endParaRPr lang="en-US" dirty="0"/>
+                      <a:pPr algn="l"/>
+                      <a:endParaRPr lang="en-US" sz="1000" dirty="0"/>
                     </a:p>
                   </a:txBody>
                   <a:tcPr/>
@@ -10552,8 +10553,9 @@
                     <a:bodyPr/>
                     <a:lstStyle/>
                     <a:p>
-                      <a:r>
-                        <a:rPr lang="en-US" dirty="0"/>
+                      <a:pPr algn="l"/>
+                      <a:r>
+                        <a:rPr lang="en-US" sz="1000" dirty="0"/>
                         <a:t>MSS</a:t>
                       </a:r>
                     </a:p>
@@ -10565,8 +10567,9 @@
                     <a:bodyPr/>
                     <a:lstStyle/>
                     <a:p>
-                      <a:r>
-                        <a:rPr lang="en-US" dirty="0"/>
+                      <a:pPr algn="l"/>
+                      <a:r>
+                        <a:rPr lang="en-US" sz="1000" dirty="0"/>
                         <a:t>JW +AF</a:t>
                       </a:r>
                     </a:p>
@@ -10596,12 +10599,13 @@
                         <a:defRPr/>
                       </a:pPr>
                       <a:r>
-                        <a:rPr lang="en-US" dirty="0"/>
+                        <a:rPr lang="en-US" sz="1000" dirty="0"/>
                         <a:t>MSS</a:t>
                       </a:r>
                     </a:p>
                     <a:p>
-                      <a:endParaRPr lang="en-US" dirty="0"/>
+                      <a:pPr algn="l"/>
+                      <a:endParaRPr lang="en-US" sz="1000" dirty="0"/>
                     </a:p>
                   </a:txBody>
                   <a:tcPr/>
@@ -10611,8 +10615,9 @@
                     <a:bodyPr/>
                     <a:lstStyle/>
                     <a:p>
-                      <a:r>
-                        <a:rPr lang="en-US" dirty="0"/>
+                      <a:pPr algn="l"/>
+                      <a:r>
+                        <a:rPr lang="en-US" sz="1000" dirty="0"/>
                         <a:t>Cosine + AF</a:t>
                       </a:r>
                     </a:p>
@@ -10624,8 +10629,9 @@
                     <a:bodyPr/>
                     <a:lstStyle/>
                     <a:p>
-                      <a:r>
-                        <a:rPr lang="en-US" dirty="0"/>
+                      <a:pPr algn="l"/>
+                      <a:r>
+                        <a:rPr lang="en-US" sz="1000" dirty="0"/>
                         <a:t>MSS</a:t>
                       </a:r>
                     </a:p>
@@ -10673,7 +10679,102 @@
                         </a:rPr>
                         <a:t>b-cell lymphomas</a:t>
                       </a:r>
-                    </a:p>
+                      <a:r>
+                        <a:rPr lang="en-US" sz="1000" dirty="0">
+                          <a:solidFill>
+                            <a:schemeClr val="bg2">
+                              <a:lumMod val="50000"/>
+                            </a:schemeClr>
+                          </a:solidFill>
+                        </a:rPr>
+                        <a:t>;</a:t>
+                      </a:r>
+                      <a:r>
+                        <a:rPr lang="en-US" sz="1000" b="0" i="0" u="none" strike="noStrike" dirty="0">
+                          <a:solidFill>
+                            <a:schemeClr val="bg2">
+                              <a:lumMod val="50000"/>
+                            </a:schemeClr>
+                          </a:solidFill>
+                          <a:effectLst/>
+                          <a:latin typeface="Aptos Narrow" panose="020B0004020202020204" pitchFamily="34" charset="0"/>
+                        </a:rPr>
+                        <a:t> b cell lymphoma</a:t>
+                      </a:r>
+                      <a:r>
+                        <a:rPr lang="en-US" sz="1000" dirty="0">
+                          <a:solidFill>
+                            <a:schemeClr val="bg2">
+                              <a:lumMod val="50000"/>
+                            </a:schemeClr>
+                          </a:solidFill>
+                        </a:rPr>
+                        <a:t>;</a:t>
+                      </a:r>
+                      <a:r>
+                        <a:rPr lang="en-US" sz="1000" b="0" i="0" u="none" strike="noStrike" dirty="0">
+                          <a:solidFill>
+                            <a:schemeClr val="bg2">
+                              <a:lumMod val="50000"/>
+                            </a:schemeClr>
+                          </a:solidFill>
+                          <a:effectLst/>
+                          <a:latin typeface="Aptos Narrow" panose="020B0004020202020204" pitchFamily="34" charset="0"/>
+                        </a:rPr>
+                        <a:t> b cell lymphomas</a:t>
+                      </a:r>
+                      <a:r>
+                        <a:rPr lang="en-US" sz="1000" dirty="0">
+                          <a:solidFill>
+                            <a:schemeClr val="bg2">
+                              <a:lumMod val="50000"/>
+                            </a:schemeClr>
+                          </a:solidFill>
+                        </a:rPr>
+                        <a:t>;</a:t>
+                      </a:r>
+                      <a:r>
+                        <a:rPr lang="en-US" sz="1000" b="0" i="0" u="none" strike="noStrike" dirty="0">
+                          <a:solidFill>
+                            <a:schemeClr val="bg2">
+                              <a:lumMod val="50000"/>
+                            </a:schemeClr>
+                          </a:solidFill>
+                          <a:effectLst/>
+                          <a:latin typeface="Aptos Narrow" panose="020B0004020202020204" pitchFamily="34" charset="0"/>
+                        </a:rPr>
+                        <a:t> t cell lymphomas</a:t>
+                      </a:r>
+                    </a:p>
+                  </a:txBody>
+                  <a:tcPr/>
+                </a:tc>
+                <a:tc>
+                  <a:txBody>
+                    <a:bodyPr/>
+                    <a:lstStyle/>
+                    <a:p>
+                      <a:pPr algn="l" fontAlgn="b"/>
+                      <a:r>
+                        <a:rPr lang="en-US" sz="1000" b="0" i="0" u="none" strike="noStrike" dirty="0">
+                          <a:solidFill>
+                            <a:schemeClr val="bg2">
+                              <a:lumMod val="50000"/>
+                            </a:schemeClr>
+                          </a:solidFill>
+                          <a:effectLst/>
+                          <a:latin typeface="Aptos Narrow" panose="020B0004020202020204" pitchFamily="34" charset="0"/>
+                        </a:rPr>
+                        <a:t>0.17460317</a:t>
+                      </a:r>
+                    </a:p>
+                  </a:txBody>
+                  <a:tcPr marL="9525" marR="9525" marT="9525" marB="0"/>
+                </a:tc>
+                <a:tc>
+                  <a:txBody>
+                    <a:bodyPr/>
+                    <a:lstStyle/>
                     <a:p>
                       <a:pPr marL="0" marR="0" lvl="0" indent="0" algn="l" defTabSz="914400" rtl="0" eaLnBrk="1" fontAlgn="auto" latinLnBrk="0" hangingPunct="1">
                         <a:lnSpc>
@@ -10693,26 +10794,14 @@
                         <a:defRPr/>
                       </a:pPr>
                       <a:r>
-                        <a:rPr lang="en-US" sz="1000" dirty="0">
-                          <a:solidFill>
-                            <a:schemeClr val="bg2">
-                              <a:lumMod val="50000"/>
-                            </a:schemeClr>
-                          </a:solidFill>
-                        </a:rPr>
-                        <a:t>;</a:t>
-                      </a:r>
-                      <a:r>
                         <a:rPr lang="en-US" sz="1000" b="0" i="0" u="none" strike="noStrike" dirty="0">
                           <a:solidFill>
-                            <a:schemeClr val="bg2">
-                              <a:lumMod val="50000"/>
-                            </a:schemeClr>
-                          </a:solidFill>
-                          <a:effectLst/>
-                          <a:latin typeface="Aptos Narrow" panose="020B0004020202020204" pitchFamily="34" charset="0"/>
-                        </a:rPr>
-                        <a:t> b cell lymphoma</a:t>
+                            <a:srgbClr val="000000"/>
+                          </a:solidFill>
+                          <a:effectLst/>
+                          <a:latin typeface="Aptos Narrow" panose="020B0004020202020204" pitchFamily="34" charset="0"/>
+                        </a:rPr>
+                        <a:t>b cell lymphoma;</a:t>
                       </a:r>
                     </a:p>
                     <a:p>
@@ -10734,26 +10823,14 @@
                         <a:defRPr/>
                       </a:pPr>
                       <a:r>
-                        <a:rPr lang="en-US" sz="1000" dirty="0">
-                          <a:solidFill>
-                            <a:schemeClr val="bg2">
-                              <a:lumMod val="50000"/>
-                            </a:schemeClr>
-                          </a:solidFill>
-                        </a:rPr>
-                        <a:t>;</a:t>
-                      </a:r>
-                      <a:r>
                         <a:rPr lang="en-US" sz="1000" b="0" i="0" u="none" strike="noStrike" dirty="0">
                           <a:solidFill>
-                            <a:schemeClr val="bg2">
-                              <a:lumMod val="50000"/>
-                            </a:schemeClr>
-                          </a:solidFill>
-                          <a:effectLst/>
-                          <a:latin typeface="Aptos Narrow" panose="020B0004020202020204" pitchFamily="34" charset="0"/>
-                        </a:rPr>
-                        <a:t> b cell lymphomas</a:t>
+                            <a:srgbClr val="000000"/>
+                          </a:solidFill>
+                          <a:effectLst/>
+                          <a:latin typeface="Aptos Narrow" panose="020B0004020202020204" pitchFamily="34" charset="0"/>
+                        </a:rPr>
+                        <a:t>b cell lymphomas</a:t>
                       </a:r>
                     </a:p>
                     <a:p>
@@ -10774,30 +10851,16 @@
                         <a:tabLst/>
                         <a:defRPr/>
                       </a:pPr>
-                      <a:r>
-                        <a:rPr lang="en-US" sz="1000" dirty="0">
-                          <a:solidFill>
-                            <a:schemeClr val="bg2">
-                              <a:lumMod val="50000"/>
-                            </a:schemeClr>
-                          </a:solidFill>
-                        </a:rPr>
-                        <a:t>;</a:t>
-                      </a:r>
-                      <a:r>
-                        <a:rPr lang="en-US" sz="1000" b="0" i="0" u="none" strike="noStrike" dirty="0">
-                          <a:solidFill>
-                            <a:schemeClr val="bg2">
-                              <a:lumMod val="50000"/>
-                            </a:schemeClr>
-                          </a:solidFill>
-                          <a:effectLst/>
-                          <a:latin typeface="Aptos Narrow" panose="020B0004020202020204" pitchFamily="34" charset="0"/>
-                        </a:rPr>
-                        <a:t> t cell lymphomas</a:t>
-                      </a:r>
-                    </a:p>
-                    <a:p>
+                      <a:endParaRPr lang="en-US" sz="1000" b="0" i="0" u="none" strike="noStrike" dirty="0">
+                        <a:solidFill>
+                          <a:srgbClr val="000000"/>
+                        </a:solidFill>
+                        <a:effectLst/>
+                        <a:latin typeface="Aptos Narrow" panose="020B0004020202020204" pitchFamily="34" charset="0"/>
+                      </a:endParaRPr>
+                    </a:p>
+                    <a:p>
+                      <a:pPr algn="l"/>
                       <a:endParaRPr lang="en-US" sz="1000" dirty="0">
                         <a:solidFill>
                           <a:schemeClr val="bg2">
@@ -10814,18 +10877,16 @@
                     <a:bodyPr/>
                     <a:lstStyle/>
                     <a:p>
-                      <a:pPr algn="r" fontAlgn="b"/>
+                      <a:pPr algn="l" fontAlgn="b"/>
                       <a:r>
                         <a:rPr lang="en-US" sz="1000" b="0" i="0" u="none" strike="noStrike" dirty="0">
                           <a:solidFill>
-                            <a:schemeClr val="bg2">
-                              <a:lumMod val="50000"/>
-                            </a:schemeClr>
-                          </a:solidFill>
-                          <a:effectLst/>
-                          <a:latin typeface="Aptos Narrow" panose="020B0004020202020204" pitchFamily="34" charset="0"/>
-                        </a:rPr>
-                        <a:t>0.17460317</a:t>
+                            <a:srgbClr val="000000"/>
+                          </a:solidFill>
+                          <a:effectLst/>
+                          <a:latin typeface="Aptos Narrow" panose="020B0004020202020204" pitchFamily="34" charset="0"/>
+                        </a:rPr>
+                        <a:t>0.61032389</a:t>
                       </a:r>
                     </a:p>
                   </a:txBody>
@@ -10836,64 +10897,82 @@
                     <a:bodyPr/>
                     <a:lstStyle/>
                     <a:p>
-                      <a:endParaRPr lang="en-US" sz="1000" dirty="0">
+                      <a:pPr marL="0" marR="0" lvl="0" indent="0" algn="l" defTabSz="914400" rtl="0" eaLnBrk="1" fontAlgn="b" latinLnBrk="0" hangingPunct="1">
+                        <a:lnSpc>
+                          <a:spcPct val="100000"/>
+                        </a:lnSpc>
+                        <a:spcBef>
+                          <a:spcPts val="0"/>
+                        </a:spcBef>
+                        <a:spcAft>
+                          <a:spcPts val="0"/>
+                        </a:spcAft>
+                        <a:buClrTx/>
+                        <a:buSzTx/>
+                        <a:buFontTx/>
+                        <a:buNone/>
+                        <a:tabLst/>
+                        <a:defRPr/>
+                      </a:pPr>
+                      <a:r>
+                        <a:rPr lang="en-US" sz="1000" b="0" i="0" u="none" strike="noStrike" dirty="0">
+                          <a:solidFill>
+                            <a:srgbClr val="000000"/>
+                          </a:solidFill>
+                          <a:effectLst/>
+                          <a:latin typeface="Aptos Narrow" panose="020B0004020202020204" pitchFamily="34" charset="0"/>
+                        </a:rPr>
+                        <a:t>b cell lymphoma; b cell lymphomas; lymphoma, b cell</a:t>
+                      </a:r>
+                    </a:p>
+                    <a:p>
+                      <a:pPr marL="0" marR="0" lvl="0" indent="0" algn="l" defTabSz="914400" rtl="0" eaLnBrk="1" fontAlgn="b" latinLnBrk="0" hangingPunct="1">
+                        <a:lnSpc>
+                          <a:spcPct val="100000"/>
+                        </a:lnSpc>
+                        <a:spcBef>
+                          <a:spcPts val="0"/>
+                        </a:spcBef>
+                        <a:spcAft>
+                          <a:spcPts val="0"/>
+                        </a:spcAft>
+                        <a:buClrTx/>
+                        <a:buSzTx/>
+                        <a:buFontTx/>
+                        <a:buNone/>
+                        <a:tabLst/>
+                        <a:defRPr/>
+                      </a:pPr>
+                      <a:endParaRPr lang="en-US" sz="1000" b="0" i="0" u="none" strike="noStrike" dirty="0">
                         <a:solidFill>
-                          <a:schemeClr val="bg2">
-                            <a:lumMod val="50000"/>
-                          </a:schemeClr>
+                          <a:srgbClr val="000000"/>
                         </a:solidFill>
+                        <a:effectLst/>
+                        <a:latin typeface="Aptos Narrow" panose="020B0004020202020204" pitchFamily="34" charset="0"/>
                       </a:endParaRPr>
                     </a:p>
                   </a:txBody>
-                  <a:tcPr/>
-                </a:tc>
-                <a:tc>
-                  <a:txBody>
-                    <a:bodyPr/>
-                    <a:lstStyle/>
-                    <a:p>
-                      <a:endParaRPr lang="en-US" sz="1000" dirty="0">
-                        <a:solidFill>
-                          <a:schemeClr val="bg2">
-                            <a:lumMod val="50000"/>
-                          </a:schemeClr>
-                        </a:solidFill>
-                      </a:endParaRPr>
-                    </a:p>
-                  </a:txBody>
-                  <a:tcPr/>
-                </a:tc>
-                <a:tc>
-                  <a:txBody>
-                    <a:bodyPr/>
-                    <a:lstStyle/>
-                    <a:p>
-                      <a:endParaRPr lang="en-US" sz="1000" dirty="0">
-                        <a:solidFill>
-                          <a:schemeClr val="bg2">
-                            <a:lumMod val="50000"/>
-                          </a:schemeClr>
-                        </a:solidFill>
-                      </a:endParaRPr>
-                    </a:p>
-                  </a:txBody>
-                  <a:tcPr/>
-                </a:tc>
-                <a:tc>
-                  <a:txBody>
-                    <a:bodyPr/>
-                    <a:lstStyle/>
-                    <a:p>
-                      <a:endParaRPr lang="en-US" sz="1000" dirty="0">
-                        <a:solidFill>
-                          <a:schemeClr val="bg2">
-                            <a:lumMod val="50000"/>
-                          </a:schemeClr>
-                        </a:solidFill>
-                      </a:endParaRPr>
-                    </a:p>
-                  </a:txBody>
-                  <a:tcPr/>
+                  <a:tcPr marL="9525" marR="9525" marT="9525" marB="0"/>
+                </a:tc>
+                <a:tc>
+                  <a:txBody>
+                    <a:bodyPr/>
+                    <a:lstStyle/>
+                    <a:p>
+                      <a:pPr algn="l" fontAlgn="b"/>
+                      <a:r>
+                        <a:rPr lang="en-US" sz="1000" b="0" i="0" u="none" strike="noStrike" dirty="0">
+                          <a:solidFill>
+                            <a:srgbClr val="000000"/>
+                          </a:solidFill>
+                          <a:effectLst/>
+                          <a:latin typeface="Aptos Narrow" panose="020B0004020202020204" pitchFamily="34" charset="0"/>
+                        </a:rPr>
+                        <a:t>0.4127977</a:t>
+                      </a:r>
+                    </a:p>
+                  </a:txBody>
+                  <a:tcPr marL="9525" marR="9525" marT="9525" marB="0"/>
                 </a:tc>
                 <a:extLst>
                   <a:ext uri="{0D108BD9-81ED-4DB2-BD59-A6C34878D82A}">
@@ -10901,7 +10980,7 @@
                   </a:ext>
                 </a:extLst>
               </a:tr>
-              <a:tr h="370840">
+              <a:tr h="225541">
                 <a:tc>
                   <a:txBody>
                     <a:bodyPr/>
@@ -10985,15 +11064,6 @@
                         <a:t> sarcoma; unresectable sarcoma; unresectable cancer; intraductal carcinoma</a:t>
                       </a:r>
                     </a:p>
-                    <a:p>
-                      <a:endParaRPr lang="en-US" sz="1000" dirty="0">
-                        <a:solidFill>
-                          <a:schemeClr val="bg2">
-                            <a:lumMod val="50000"/>
-                          </a:schemeClr>
-                        </a:solidFill>
-                      </a:endParaRPr>
-                    </a:p>
                   </a:txBody>
                   <a:tcPr/>
                 </a:tc>
@@ -11002,7 +11072,7 @@
                     <a:bodyPr/>
                     <a:lstStyle/>
                     <a:p>
-                      <a:pPr algn="r" fontAlgn="b"/>
+                      <a:pPr algn="l" fontAlgn="b"/>
                       <a:r>
                         <a:rPr lang="en-US" sz="1000" b="0" i="0" u="none" strike="noStrike" dirty="0">
                           <a:solidFill>
@@ -11019,77 +11089,6 @@
                   </a:txBody>
                   <a:tcPr marL="9525" marR="9525" marT="9525" marB="0"/>
                 </a:tc>
-                <a:tc>
-                  <a:txBody>
-                    <a:bodyPr/>
-                    <a:lstStyle/>
-                    <a:p>
-                      <a:endParaRPr lang="en-US" sz="1000" dirty="0">
-                        <a:solidFill>
-                          <a:schemeClr val="bg2">
-                            <a:lumMod val="50000"/>
-                          </a:schemeClr>
-                        </a:solidFill>
-                      </a:endParaRPr>
-                    </a:p>
-                  </a:txBody>
-                  <a:tcPr/>
-                </a:tc>
-                <a:tc>
-                  <a:txBody>
-                    <a:bodyPr/>
-                    <a:lstStyle/>
-                    <a:p>
-                      <a:endParaRPr lang="en-US" sz="1000" dirty="0">
-                        <a:solidFill>
-                          <a:schemeClr val="bg2">
-                            <a:lumMod val="50000"/>
-                          </a:schemeClr>
-                        </a:solidFill>
-                      </a:endParaRPr>
-                    </a:p>
-                  </a:txBody>
-                  <a:tcPr/>
-                </a:tc>
-                <a:tc>
-                  <a:txBody>
-                    <a:bodyPr/>
-                    <a:lstStyle/>
-                    <a:p>
-                      <a:endParaRPr lang="en-US" sz="1000">
-                        <a:solidFill>
-                          <a:schemeClr val="bg2">
-                            <a:lumMod val="50000"/>
-                          </a:schemeClr>
-                        </a:solidFill>
-                      </a:endParaRPr>
-                    </a:p>
-                  </a:txBody>
-                  <a:tcPr/>
-                </a:tc>
-                <a:tc>
-                  <a:txBody>
-                    <a:bodyPr/>
-                    <a:lstStyle/>
-                    <a:p>
-                      <a:endParaRPr lang="en-US" sz="1000">
-                        <a:solidFill>
-                          <a:schemeClr val="bg2">
-                            <a:lumMod val="50000"/>
-                          </a:schemeClr>
-                        </a:solidFill>
-                      </a:endParaRPr>
-                    </a:p>
-                  </a:txBody>
-                  <a:tcPr/>
-                </a:tc>
-                <a:extLst>
-                  <a:ext uri="{0D108BD9-81ED-4DB2-BD59-A6C34878D82A}">
-                    <a16:rowId xmlns:a16="http://schemas.microsoft.com/office/drawing/2014/main" val="2849662892"/>
-                  </a:ext>
-                </a:extLst>
-              </a:tr>
-              <a:tr h="370840">
                 <a:tc>
                   <a:txBody>
                     <a:bodyPr/>
@@ -11113,151 +11112,36 @@
                         <a:defRPr/>
                       </a:pPr>
                       <a:r>
-                        <a:rPr lang="en-US" sz="1200" b="0" i="0" u="none" strike="noStrike" dirty="0">
-                          <a:solidFill>
-                            <a:schemeClr val="bg2">
-                              <a:lumMod val="50000"/>
-                            </a:schemeClr>
-                          </a:solidFill>
-                          <a:effectLst/>
-                          <a:latin typeface="Aptos Narrow" panose="020B0004020202020204" pitchFamily="34" charset="0"/>
-                        </a:rPr>
-                        <a:t>liposarcoma ;fibrosarcoma; </a:t>
-                      </a:r>
-                      <a:r>
-                        <a:rPr lang="en-US" sz="1200" b="0" i="0" u="none" strike="noStrike" dirty="0" err="1">
-                          <a:solidFill>
-                            <a:schemeClr val="bg2">
-                              <a:lumMod val="50000"/>
-                            </a:schemeClr>
-                          </a:solidFill>
-                          <a:effectLst/>
-                          <a:latin typeface="Aptos Narrow" panose="020B0004020202020204" pitchFamily="34" charset="0"/>
-                        </a:rPr>
-                        <a:t>gliosarcoma</a:t>
-                      </a:r>
-                      <a:r>
-                        <a:rPr lang="en-US" sz="1200" b="0" i="0" u="none" strike="noStrike" dirty="0">
-                          <a:solidFill>
-                            <a:schemeClr val="bg2">
-                              <a:lumMod val="50000"/>
-                            </a:schemeClr>
-                          </a:solidFill>
-                          <a:effectLst/>
-                          <a:latin typeface="Aptos Narrow" panose="020B0004020202020204" pitchFamily="34" charset="0"/>
-                        </a:rPr>
-                        <a:t>; myosarcoma; liposarcomas</a:t>
-                      </a:r>
-                    </a:p>
-                    <a:p>
-                      <a:pPr algn="l" fontAlgn="b"/>
-                      <a:endParaRPr lang="en-US" sz="1200" b="0" i="0" u="none" strike="noStrike" dirty="0">
-                        <a:solidFill>
-                          <a:schemeClr val="bg2">
-                            <a:lumMod val="50000"/>
-                          </a:schemeClr>
-                        </a:solidFill>
-                        <a:effectLst/>
-                        <a:latin typeface="Aptos Narrow" panose="020B0004020202020204" pitchFamily="34" charset="0"/>
-                      </a:endParaRPr>
-                    </a:p>
-                  </a:txBody>
-                  <a:tcPr marL="9525" marR="9525" marT="9525" marB="0"/>
-                </a:tc>
-                <a:tc>
-                  <a:txBody>
-                    <a:bodyPr/>
-                    <a:lstStyle/>
-                    <a:p>
-                      <a:r>
-                        <a:rPr lang="en-US" sz="1000" dirty="0">
-                          <a:solidFill>
-                            <a:schemeClr val="bg2">
-                              <a:lumMod val="50000"/>
-                            </a:schemeClr>
-                          </a:solidFill>
-                        </a:rPr>
-                        <a:t>0.3225</a:t>
-                      </a:r>
-                    </a:p>
-                  </a:txBody>
-                  <a:tcPr/>
-                </a:tc>
-                <a:tc>
-                  <a:txBody>
-                    <a:bodyPr/>
-                    <a:lstStyle/>
-                    <a:p>
-                      <a:endParaRPr lang="en-US" sz="1000">
-                        <a:solidFill>
-                          <a:schemeClr val="bg2">
-                            <a:lumMod val="50000"/>
-                          </a:schemeClr>
-                        </a:solidFill>
-                      </a:endParaRPr>
-                    </a:p>
-                  </a:txBody>
-                  <a:tcPr/>
-                </a:tc>
-                <a:tc>
-                  <a:txBody>
-                    <a:bodyPr/>
-                    <a:lstStyle/>
-                    <a:p>
-                      <a:endParaRPr lang="en-US" sz="1000" dirty="0">
-                        <a:solidFill>
-                          <a:schemeClr val="bg2">
-                            <a:lumMod val="50000"/>
-                          </a:schemeClr>
-                        </a:solidFill>
-                      </a:endParaRPr>
-                    </a:p>
-                  </a:txBody>
-                  <a:tcPr/>
-                </a:tc>
-                <a:tc>
-                  <a:txBody>
-                    <a:bodyPr/>
-                    <a:lstStyle/>
-                    <a:p>
-                      <a:endParaRPr lang="en-US" sz="1000" dirty="0">
-                        <a:solidFill>
-                          <a:schemeClr val="bg2">
-                            <a:lumMod val="50000"/>
-                          </a:schemeClr>
-                        </a:solidFill>
-                      </a:endParaRPr>
-                    </a:p>
-                  </a:txBody>
-                  <a:tcPr/>
-                </a:tc>
-                <a:tc>
-                  <a:txBody>
-                    <a:bodyPr/>
-                    <a:lstStyle/>
-                    <a:p>
-                      <a:endParaRPr lang="en-US" sz="1000">
-                        <a:solidFill>
-                          <a:schemeClr val="bg2">
-                            <a:lumMod val="50000"/>
-                          </a:schemeClr>
-                        </a:solidFill>
-                      </a:endParaRPr>
-                    </a:p>
-                  </a:txBody>
-                  <a:tcPr/>
-                </a:tc>
-                <a:extLst>
-                  <a:ext uri="{0D108BD9-81ED-4DB2-BD59-A6C34878D82A}">
-                    <a16:rowId xmlns:a16="http://schemas.microsoft.com/office/drawing/2014/main" val="808363429"/>
-                  </a:ext>
-                </a:extLst>
-              </a:tr>
-              <a:tr h="370840">
-                <a:tc>
-                  <a:txBody>
-                    <a:bodyPr/>
-                    <a:lstStyle/>
+                        <a:rPr lang="en-US" sz="1000" b="0" i="0" u="none" strike="noStrike" dirty="0">
+                          <a:solidFill>
+                            <a:srgbClr val="000000"/>
+                          </a:solidFill>
+                          <a:effectLst/>
+                          <a:latin typeface="Aptos Narrow" panose="020B0004020202020204" pitchFamily="34" charset="0"/>
+                        </a:rPr>
+                        <a:t>unresectable lung carcinoma; unresectable nut carcinoma; unresectable vaginal </a:t>
+                      </a:r>
+                      <a:r>
+                        <a:rPr lang="en-US" sz="1000" b="0" i="0" u="none" strike="noStrike" dirty="0" err="1">
+                          <a:solidFill>
+                            <a:srgbClr val="000000"/>
+                          </a:solidFill>
+                          <a:effectLst/>
+                          <a:latin typeface="Aptos Narrow" panose="020B0004020202020204" pitchFamily="34" charset="0"/>
+                        </a:rPr>
+                        <a:t>carcinoma;unresectable</a:t>
+                      </a:r>
+                      <a:r>
+                        <a:rPr lang="en-US" sz="1000" b="0" i="0" u="none" strike="noStrike" dirty="0">
+                          <a:solidFill>
+                            <a:srgbClr val="000000"/>
+                          </a:solidFill>
+                          <a:effectLst/>
+                          <a:latin typeface="Aptos Narrow" panose="020B0004020202020204" pitchFamily="34" charset="0"/>
+                        </a:rPr>
+                        <a:t> lung carcinoid tumor</a:t>
+                      </a:r>
+                    </a:p>
                     <a:p>
                       <a:pPr marL="0" marR="0" lvl="0" indent="0" algn="l" defTabSz="914400" rtl="0" eaLnBrk="1" fontAlgn="b" latinLnBrk="0" hangingPunct="1">
                         <a:lnSpc>
@@ -11276,18 +11160,13 @@
                         <a:tabLst/>
                         <a:defRPr/>
                       </a:pPr>
-                      <a:r>
-                        <a:rPr lang="en-US" sz="1200" b="0" i="0" u="none" strike="noStrike" dirty="0">
-                          <a:solidFill>
-                            <a:schemeClr val="bg2">
-                              <a:lumMod val="50000"/>
-                            </a:schemeClr>
-                          </a:solidFill>
-                          <a:effectLst/>
-                          <a:latin typeface="Aptos Narrow" panose="020B0004020202020204" pitchFamily="34" charset="0"/>
-                        </a:rPr>
-                        <a:t>cancer of the liver; cancer of the ureter; cancer of the kidney</a:t>
-                      </a:r>
+                      <a:endParaRPr lang="en-US" sz="1000" b="0" i="0" u="none" strike="noStrike" dirty="0">
+                        <a:solidFill>
+                          <a:srgbClr val="000000"/>
+                        </a:solidFill>
+                        <a:effectLst/>
+                        <a:latin typeface="Aptos Narrow" panose="020B0004020202020204" pitchFamily="34" charset="0"/>
+                      </a:endParaRPr>
                     </a:p>
                     <a:p>
                       <a:pPr marL="0" marR="0" lvl="0" indent="0" algn="l" defTabSz="914400" rtl="0" eaLnBrk="1" fontAlgn="b" latinLnBrk="0" hangingPunct="1">
@@ -11307,11 +11186,9 @@
                         <a:tabLst/>
                         <a:defRPr/>
                       </a:pPr>
-                      <a:endParaRPr lang="en-US" sz="1200" b="0" i="0" u="none" strike="noStrike" dirty="0">
+                      <a:endParaRPr lang="en-US" sz="1000" b="0" i="0" u="none" strike="noStrike" dirty="0">
                         <a:solidFill>
-                          <a:schemeClr val="bg2">
-                            <a:lumMod val="50000"/>
-                          </a:schemeClr>
+                          <a:srgbClr val="000000"/>
                         </a:solidFill>
                         <a:effectLst/>
                         <a:latin typeface="Aptos Narrow" panose="020B0004020202020204" pitchFamily="34" charset="0"/>
@@ -11319,11 +11196,9 @@
                     </a:p>
                     <a:p>
                       <a:pPr algn="l" fontAlgn="b"/>
-                      <a:endParaRPr lang="en-US" sz="1200" b="0" i="0" u="none" strike="noStrike" dirty="0">
+                      <a:endParaRPr lang="en-US" sz="1000" b="0" i="0" u="none" strike="noStrike" dirty="0">
                         <a:solidFill>
-                          <a:schemeClr val="bg2">
-                            <a:lumMod val="50000"/>
-                          </a:schemeClr>
+                          <a:srgbClr val="000000"/>
                         </a:solidFill>
                         <a:effectLst/>
                         <a:latin typeface="Aptos Narrow" panose="020B0004020202020204" pitchFamily="34" charset="0"/>
@@ -11337,94 +11212,68 @@
                     <a:bodyPr/>
                     <a:lstStyle/>
                     <a:p>
-                      <a:pPr algn="r" fontAlgn="b"/>
-                      <a:r>
-                        <a:rPr lang="en-US" sz="1200" b="0" i="0" u="none" strike="noStrike" dirty="0">
+                      <a:pPr algn="l" fontAlgn="b"/>
+                      <a:r>
+                        <a:rPr lang="en-US" sz="1000" b="0" i="0" u="none" strike="noStrike" dirty="0">
+                          <a:solidFill>
+                            <a:srgbClr val="000000"/>
+                          </a:solidFill>
+                          <a:effectLst/>
+                          <a:latin typeface="Aptos Narrow" panose="020B0004020202020204" pitchFamily="34" charset="0"/>
+                        </a:rPr>
+                        <a:t>0.19074195</a:t>
+                      </a:r>
+                    </a:p>
+                  </a:txBody>
+                  <a:tcPr marL="9525" marR="9525" marT="9525" marB="0"/>
+                </a:tc>
+                <a:tc>
+                  <a:txBody>
+                    <a:bodyPr/>
+                    <a:lstStyle/>
+                    <a:p>
+                      <a:pPr algn="l" fontAlgn="b"/>
+                      <a:r>
+                        <a:rPr lang="en-US" sz="1000" b="0" i="0" u="none" strike="noStrike" dirty="0">
+                          <a:solidFill>
+                            <a:srgbClr val="000000"/>
+                          </a:solidFill>
+                          <a:effectLst/>
+                          <a:latin typeface="Aptos Narrow" panose="020B0004020202020204" pitchFamily="34" charset="0"/>
+                        </a:rPr>
+                        <a:t>unresectable lung carcinoma</a:t>
+                      </a:r>
+                    </a:p>
+                  </a:txBody>
+                  <a:tcPr marL="9525" marR="9525" marT="9525" marB="0"/>
+                </a:tc>
+                <a:tc>
+                  <a:txBody>
+                    <a:bodyPr/>
+                    <a:lstStyle/>
+                    <a:p>
+                      <a:pPr algn="l"/>
+                      <a:r>
+                        <a:rPr lang="en-US" sz="1000" dirty="0">
                           <a:solidFill>
                             <a:schemeClr val="bg2">
                               <a:lumMod val="50000"/>
                             </a:schemeClr>
                           </a:solidFill>
-                          <a:effectLst/>
-                          <a:latin typeface="Aptos Narrow" panose="020B0004020202020204" pitchFamily="34" charset="0"/>
-                        </a:rPr>
-                        <a:t>0.09780815</a:t>
-                      </a:r>
-                    </a:p>
-                  </a:txBody>
-                  <a:tcPr marL="9525" marR="9525" marT="9525" marB="0"/>
-                </a:tc>
-                <a:tc>
-                  <a:txBody>
-                    <a:bodyPr/>
-                    <a:lstStyle/>
-                    <a:p>
-                      <a:endParaRPr lang="en-US" sz="1000">
-                        <a:solidFill>
-                          <a:schemeClr val="bg2">
-                            <a:lumMod val="50000"/>
-                          </a:schemeClr>
-                        </a:solidFill>
-                      </a:endParaRPr>
-                    </a:p>
-                  </a:txBody>
-                  <a:tcPr/>
-                </a:tc>
-                <a:tc>
-                  <a:txBody>
-                    <a:bodyPr/>
-                    <a:lstStyle/>
-                    <a:p>
-                      <a:endParaRPr lang="en-US" sz="1000" dirty="0">
-                        <a:solidFill>
-                          <a:schemeClr val="bg2">
-                            <a:lumMod val="50000"/>
-                          </a:schemeClr>
-                        </a:solidFill>
-                      </a:endParaRPr>
-                    </a:p>
-                  </a:txBody>
-                  <a:tcPr/>
-                </a:tc>
-                <a:tc>
-                  <a:txBody>
-                    <a:bodyPr/>
-                    <a:lstStyle/>
-                    <a:p>
-                      <a:endParaRPr lang="en-US" sz="1000" dirty="0">
-                        <a:solidFill>
-                          <a:schemeClr val="bg2">
-                            <a:lumMod val="50000"/>
-                          </a:schemeClr>
-                        </a:solidFill>
-                      </a:endParaRPr>
-                    </a:p>
-                  </a:txBody>
-                  <a:tcPr/>
-                </a:tc>
-                <a:tc>
-                  <a:txBody>
-                    <a:bodyPr/>
-                    <a:lstStyle/>
-                    <a:p>
-                      <a:endParaRPr lang="en-US" sz="1000" dirty="0">
-                        <a:solidFill>
-                          <a:schemeClr val="bg2">
-                            <a:lumMod val="50000"/>
-                          </a:schemeClr>
-                        </a:solidFill>
-                      </a:endParaRPr>
+                        </a:rPr>
+                        <a:t>0</a:t>
+                      </a:r>
                     </a:p>
                   </a:txBody>
                   <a:tcPr/>
                 </a:tc>
                 <a:extLst>
                   <a:ext uri="{0D108BD9-81ED-4DB2-BD59-A6C34878D82A}">
-                    <a16:rowId xmlns:a16="http://schemas.microsoft.com/office/drawing/2014/main" val="493799710"/>
+                    <a16:rowId xmlns:a16="http://schemas.microsoft.com/office/drawing/2014/main" val="2849662892"/>
                   </a:ext>
                 </a:extLst>
               </a:tr>
-              <a:tr h="370840">
+              <a:tr h="0">
                 <a:tc>
                   <a:txBody>
                     <a:bodyPr/>
@@ -11448,7 +11297,7 @@
                         <a:defRPr/>
                       </a:pPr>
                       <a:r>
-                        <a:rPr lang="en-US" sz="1200" b="0" i="0" u="none" strike="noStrike" dirty="0">
+                        <a:rPr lang="en-US" sz="1000" b="0" i="0" u="none" strike="noStrike" dirty="0">
                           <a:solidFill>
                             <a:schemeClr val="bg2">
                               <a:lumMod val="50000"/>
@@ -11457,10 +11306,10 @@
                           <a:effectLst/>
                           <a:latin typeface="Aptos Narrow" panose="020B0004020202020204" pitchFamily="34" charset="0"/>
                         </a:rPr>
-                        <a:t>smoldering myeloma; </a:t>
-                      </a:r>
-                      <a:r>
-                        <a:rPr lang="en-US" sz="1200" b="0" i="0" u="none" strike="noStrike" dirty="0" err="1">
+                        <a:t>liposarcoma ;fibrosarcoma; </a:t>
+                      </a:r>
+                      <a:r>
+                        <a:rPr lang="en-US" sz="1000" b="0" i="0" u="none" strike="noStrike" dirty="0" err="1">
                           <a:solidFill>
                             <a:schemeClr val="bg2">
                               <a:lumMod val="50000"/>
@@ -11469,10 +11318,10 @@
                           <a:effectLst/>
                           <a:latin typeface="Aptos Narrow" panose="020B0004020202020204" pitchFamily="34" charset="0"/>
                         </a:rPr>
-                        <a:t>smouldering</a:t>
-                      </a:r>
-                      <a:r>
-                        <a:rPr lang="en-US" sz="1200" b="0" i="0" u="none" strike="noStrike" dirty="0">
+                        <a:t>gliosarcoma</a:t>
+                      </a:r>
+                      <a:r>
+                        <a:rPr lang="en-US" sz="1000" b="0" i="0" u="none" strike="noStrike" dirty="0">
                           <a:solidFill>
                             <a:schemeClr val="bg2">
                               <a:lumMod val="50000"/>
@@ -11481,12 +11330,12 @@
                           <a:effectLst/>
                           <a:latin typeface="Aptos Narrow" panose="020B0004020202020204" pitchFamily="34" charset="0"/>
                         </a:rPr>
-                        <a:t> myeloma</a:t>
+                        <a:t>; myosarcoma; liposarcomas</a:t>
                       </a:r>
                     </a:p>
                     <a:p>
                       <a:pPr algn="l" fontAlgn="b"/>
-                      <a:endParaRPr lang="en-US" sz="1200" b="0" i="0" u="none" strike="noStrike" dirty="0">
+                      <a:endParaRPr lang="en-US" sz="1000" b="0" i="0" u="none" strike="noStrike" dirty="0">
                         <a:solidFill>
                           <a:schemeClr val="bg2">
                             <a:lumMod val="50000"/>
@@ -11504,19 +11353,223 @@
                     <a:bodyPr/>
                     <a:lstStyle/>
                     <a:p>
-                      <a:pPr algn="r" fontAlgn="b"/>
-                      <a:r>
-                        <a:rPr lang="en-US" sz="1200" b="0" i="0" u="none" strike="noStrike" dirty="0">
+                      <a:pPr algn="l"/>
+                      <a:r>
+                        <a:rPr lang="en-US" sz="1000" dirty="0">
                           <a:solidFill>
                             <a:schemeClr val="bg2">
                               <a:lumMod val="50000"/>
                             </a:schemeClr>
                           </a:solidFill>
-                          <a:effectLst/>
-                          <a:latin typeface="Aptos Narrow" panose="020B0004020202020204" pitchFamily="34" charset="0"/>
-                        </a:rPr>
-                        <a:t>0.88235294</a:t>
-                      </a:r>
+                        </a:rPr>
+                        <a:t>0.3225</a:t>
+                      </a:r>
+                    </a:p>
+                  </a:txBody>
+                  <a:tcPr/>
+                </a:tc>
+                <a:tc>
+                  <a:txBody>
+                    <a:bodyPr/>
+                    <a:lstStyle/>
+                    <a:p>
+                      <a:pPr marL="0" marR="0" lvl="0" indent="0" algn="l" defTabSz="914400" rtl="0" eaLnBrk="1" fontAlgn="b" latinLnBrk="0" hangingPunct="1">
+                        <a:lnSpc>
+                          <a:spcPct val="100000"/>
+                        </a:lnSpc>
+                        <a:spcBef>
+                          <a:spcPts val="0"/>
+                        </a:spcBef>
+                        <a:spcAft>
+                          <a:spcPts val="0"/>
+                        </a:spcAft>
+                        <a:buClrTx/>
+                        <a:buSzTx/>
+                        <a:buFontTx/>
+                        <a:buNone/>
+                        <a:tabLst/>
+                        <a:defRPr/>
+                      </a:pPr>
+                      <a:r>
+                        <a:rPr lang="en-US" sz="1000" b="0" i="0" u="none" strike="noStrike" dirty="0">
+                          <a:solidFill>
+                            <a:srgbClr val="000000"/>
+                          </a:solidFill>
+                          <a:effectLst/>
+                          <a:latin typeface="Aptos Narrow" panose="020B0004020202020204" pitchFamily="34" charset="0"/>
+                        </a:rPr>
+                        <a:t>Liposarcoma; </a:t>
+                      </a:r>
+                      <a:r>
+                        <a:rPr lang="en-US" sz="1000" b="0" i="0" u="none" strike="noStrike" dirty="0" err="1">
+                          <a:solidFill>
+                            <a:srgbClr val="000000"/>
+                          </a:solidFill>
+                          <a:effectLst/>
+                          <a:latin typeface="Aptos Narrow" panose="020B0004020202020204" pitchFamily="34" charset="0"/>
+                        </a:rPr>
+                        <a:t>Gliosarcoma</a:t>
+                      </a:r>
+                      <a:r>
+                        <a:rPr lang="en-US" sz="1000" b="0" i="0" u="none" strike="noStrike" dirty="0">
+                          <a:solidFill>
+                            <a:srgbClr val="000000"/>
+                          </a:solidFill>
+                          <a:effectLst/>
+                          <a:latin typeface="Aptos Narrow" panose="020B0004020202020204" pitchFamily="34" charset="0"/>
+                        </a:rPr>
+                        <a:t>; Myosarcoma; liposarcoma, round cell; </a:t>
+                      </a:r>
+                      <a:r>
+                        <a:rPr lang="en-US" sz="1000" b="0" i="0" u="none" strike="noStrike" dirty="0" err="1">
+                          <a:solidFill>
+                            <a:srgbClr val="000000"/>
+                          </a:solidFill>
+                          <a:effectLst/>
+                          <a:latin typeface="Aptos Narrow" panose="020B0004020202020204" pitchFamily="34" charset="0"/>
+                        </a:rPr>
+                        <a:t>gliosarcoma</a:t>
+                      </a:r>
+                      <a:r>
+                        <a:rPr lang="en-US" sz="1000" b="0" i="0" u="none" strike="noStrike" dirty="0">
+                          <a:solidFill>
+                            <a:srgbClr val="000000"/>
+                          </a:solidFill>
+                          <a:effectLst/>
+                          <a:latin typeface="Aptos Narrow" panose="020B0004020202020204" pitchFamily="34" charset="0"/>
+                        </a:rPr>
+                        <a:t>, adult; mixed liposarcoma; liposarcomas</a:t>
+                      </a:r>
+                    </a:p>
+                    <a:p>
+                      <a:pPr marL="0" marR="0" lvl="0" indent="0" algn="l" defTabSz="914400" rtl="0" eaLnBrk="1" fontAlgn="b" latinLnBrk="0" hangingPunct="1">
+                        <a:lnSpc>
+                          <a:spcPct val="100000"/>
+                        </a:lnSpc>
+                        <a:spcBef>
+                          <a:spcPts val="0"/>
+                        </a:spcBef>
+                        <a:spcAft>
+                          <a:spcPts val="0"/>
+                        </a:spcAft>
+                        <a:buClrTx/>
+                        <a:buSzTx/>
+                        <a:buFontTx/>
+                        <a:buNone/>
+                        <a:tabLst/>
+                        <a:defRPr/>
+                      </a:pPr>
+                      <a:endParaRPr lang="en-US" sz="1000" b="0" i="0" u="none" strike="noStrike" dirty="0">
+                        <a:solidFill>
+                          <a:srgbClr val="000000"/>
+                        </a:solidFill>
+                        <a:effectLst/>
+                        <a:latin typeface="Aptos Narrow" panose="020B0004020202020204" pitchFamily="34" charset="0"/>
+                      </a:endParaRPr>
+                    </a:p>
+                    <a:p>
+                      <a:pPr marL="0" marR="0" lvl="0" indent="0" algn="l" defTabSz="914400" rtl="0" eaLnBrk="1" fontAlgn="b" latinLnBrk="0" hangingPunct="1">
+                        <a:lnSpc>
+                          <a:spcPct val="100000"/>
+                        </a:lnSpc>
+                        <a:spcBef>
+                          <a:spcPts val="0"/>
+                        </a:spcBef>
+                        <a:spcAft>
+                          <a:spcPts val="0"/>
+                        </a:spcAft>
+                        <a:buClrTx/>
+                        <a:buSzTx/>
+                        <a:buFontTx/>
+                        <a:buNone/>
+                        <a:tabLst/>
+                        <a:defRPr/>
+                      </a:pPr>
+                      <a:endParaRPr lang="en-US" sz="1000" b="0" i="0" u="none" strike="noStrike" dirty="0">
+                        <a:solidFill>
+                          <a:srgbClr val="000000"/>
+                        </a:solidFill>
+                        <a:effectLst/>
+                        <a:latin typeface="Aptos Narrow" panose="020B0004020202020204" pitchFamily="34" charset="0"/>
+                      </a:endParaRPr>
+                    </a:p>
+                    <a:p>
+                      <a:pPr marL="0" marR="0" lvl="0" indent="0" algn="l" defTabSz="914400" rtl="0" eaLnBrk="1" fontAlgn="b" latinLnBrk="0" hangingPunct="1">
+                        <a:lnSpc>
+                          <a:spcPct val="100000"/>
+                        </a:lnSpc>
+                        <a:spcBef>
+                          <a:spcPts val="0"/>
+                        </a:spcBef>
+                        <a:spcAft>
+                          <a:spcPts val="0"/>
+                        </a:spcAft>
+                        <a:buClrTx/>
+                        <a:buSzTx/>
+                        <a:buFontTx/>
+                        <a:buNone/>
+                        <a:tabLst/>
+                        <a:defRPr/>
+                      </a:pPr>
+                      <a:endParaRPr lang="en-US" sz="1000" b="0" i="0" u="none" strike="noStrike" dirty="0">
+                        <a:solidFill>
+                          <a:srgbClr val="000000"/>
+                        </a:solidFill>
+                        <a:effectLst/>
+                        <a:latin typeface="Aptos Narrow" panose="020B0004020202020204" pitchFamily="34" charset="0"/>
+                      </a:endParaRPr>
+                    </a:p>
+                    <a:p>
+                      <a:pPr marL="0" marR="0" lvl="0" indent="0" algn="l" defTabSz="914400" rtl="0" eaLnBrk="1" fontAlgn="b" latinLnBrk="0" hangingPunct="1">
+                        <a:lnSpc>
+                          <a:spcPct val="100000"/>
+                        </a:lnSpc>
+                        <a:spcBef>
+                          <a:spcPts val="0"/>
+                        </a:spcBef>
+                        <a:spcAft>
+                          <a:spcPts val="0"/>
+                        </a:spcAft>
+                        <a:buClrTx/>
+                        <a:buSzTx/>
+                        <a:buFontTx/>
+                        <a:buNone/>
+                        <a:tabLst/>
+                        <a:defRPr/>
+                      </a:pPr>
+                      <a:endParaRPr lang="en-US" sz="1000" b="0" i="0" u="none" strike="noStrike" dirty="0">
+                        <a:solidFill>
+                          <a:srgbClr val="000000"/>
+                        </a:solidFill>
+                        <a:effectLst/>
+                        <a:latin typeface="Aptos Narrow" panose="020B0004020202020204" pitchFamily="34" charset="0"/>
+                      </a:endParaRPr>
+                    </a:p>
+                    <a:p>
+                      <a:pPr marL="0" marR="0" lvl="0" indent="0" algn="l" defTabSz="914400" rtl="0" eaLnBrk="1" fontAlgn="b" latinLnBrk="0" hangingPunct="1">
+                        <a:lnSpc>
+                          <a:spcPct val="100000"/>
+                        </a:lnSpc>
+                        <a:spcBef>
+                          <a:spcPts val="0"/>
+                        </a:spcBef>
+                        <a:spcAft>
+                          <a:spcPts val="0"/>
+                        </a:spcAft>
+                        <a:buClrTx/>
+                        <a:buSzTx/>
+                        <a:buFontTx/>
+                        <a:buNone/>
+                        <a:tabLst/>
+                        <a:defRPr/>
+                      </a:pPr>
+                      <a:endParaRPr lang="en-US" sz="1000" b="0" i="0" u="none" strike="noStrike" dirty="0">
+                        <a:solidFill>
+                          <a:srgbClr val="000000"/>
+                        </a:solidFill>
+                        <a:effectLst/>
+                        <a:latin typeface="Aptos Narrow" panose="020B0004020202020204" pitchFamily="34" charset="0"/>
+                      </a:endParaRPr>
                     </a:p>
                   </a:txBody>
                   <a:tcPr marL="9525" marR="9525" marT="9525" marB="0"/>
@@ -11526,64 +11579,1002 @@
                     <a:bodyPr/>
                     <a:lstStyle/>
                     <a:p>
-                      <a:endParaRPr lang="en-US" sz="1000" dirty="0">
+                      <a:pPr algn="l" fontAlgn="b"/>
+                      <a:r>
+                        <a:rPr lang="en-US" sz="1000" b="0" i="0" u="none" strike="noStrike" dirty="0">
+                          <a:solidFill>
+                            <a:srgbClr val="000000"/>
+                          </a:solidFill>
+                          <a:effectLst/>
+                          <a:latin typeface="Aptos Narrow" panose="020B0004020202020204" pitchFamily="34" charset="0"/>
+                        </a:rPr>
+                        <a:t>-0.1295667</a:t>
+                      </a:r>
+                    </a:p>
+                  </a:txBody>
+                  <a:tcPr marL="9525" marR="9525" marT="9525" marB="0"/>
+                </a:tc>
+                <a:tc>
+                  <a:txBody>
+                    <a:bodyPr/>
+                    <a:lstStyle/>
+                    <a:p>
+                      <a:pPr algn="l" rtl="0"/>
+                      <a:r>
+                        <a:rPr lang="en-US" sz="1000" b="0" i="0" u="none" strike="noStrike" kern="1200" dirty="0" err="1">
+                          <a:solidFill>
+                            <a:srgbClr val="000000"/>
+                          </a:solidFill>
+                          <a:effectLst/>
+                          <a:latin typeface="Aptos Narrow" panose="020B0004020202020204" pitchFamily="34" charset="0"/>
+                          <a:ea typeface="+mn-ea"/>
+                          <a:cs typeface="+mn-cs"/>
+                        </a:rPr>
+                        <a:t>liposarcoma;synovial</a:t>
+                      </a:r>
+                      <a:r>
+                        <a:rPr lang="en-US" sz="1000" b="0" i="0" u="none" strike="noStrike" kern="1200" dirty="0">
+                          <a:solidFill>
+                            <a:srgbClr val="000000"/>
+                          </a:solidFill>
+                          <a:effectLst/>
+                          <a:latin typeface="Aptos Narrow" panose="020B0004020202020204" pitchFamily="34" charset="0"/>
+                          <a:ea typeface="+mn-ea"/>
+                          <a:cs typeface="+mn-cs"/>
+                        </a:rPr>
+                        <a:t> </a:t>
+                      </a:r>
+                      <a:r>
+                        <a:rPr lang="en-US" sz="1000" b="0" i="0" u="none" strike="noStrike" kern="1200" dirty="0" err="1">
+                          <a:solidFill>
+                            <a:srgbClr val="000000"/>
+                          </a:solidFill>
+                          <a:effectLst/>
+                          <a:latin typeface="Aptos Narrow" panose="020B0004020202020204" pitchFamily="34" charset="0"/>
+                          <a:ea typeface="+mn-ea"/>
+                          <a:cs typeface="+mn-cs"/>
+                        </a:rPr>
+                        <a:t>sarcoma;choroidal</a:t>
+                      </a:r>
+                      <a:r>
+                        <a:rPr lang="en-US" sz="1000" b="0" i="0" u="none" strike="noStrike" kern="1200" dirty="0">
+                          <a:solidFill>
+                            <a:srgbClr val="000000"/>
+                          </a:solidFill>
+                          <a:effectLst/>
+                          <a:latin typeface="Aptos Narrow" panose="020B0004020202020204" pitchFamily="34" charset="0"/>
+                          <a:ea typeface="+mn-ea"/>
+                          <a:cs typeface="+mn-cs"/>
+                        </a:rPr>
+                        <a:t> </a:t>
+                      </a:r>
+                      <a:r>
+                        <a:rPr lang="en-US" sz="1000" b="0" i="0" u="none" strike="noStrike" kern="1200" dirty="0" err="1">
+                          <a:solidFill>
+                            <a:srgbClr val="000000"/>
+                          </a:solidFill>
+                          <a:effectLst/>
+                          <a:latin typeface="Aptos Narrow" panose="020B0004020202020204" pitchFamily="34" charset="0"/>
+                          <a:ea typeface="+mn-ea"/>
+                          <a:cs typeface="+mn-cs"/>
+                        </a:rPr>
+                        <a:t>melanoma;myeloid</a:t>
+                      </a:r>
+                      <a:r>
+                        <a:rPr lang="en-US" sz="1000" b="0" i="0" u="none" strike="noStrike" kern="1200" dirty="0">
+                          <a:solidFill>
+                            <a:srgbClr val="000000"/>
+                          </a:solidFill>
+                          <a:effectLst/>
+                          <a:latin typeface="Aptos Narrow" panose="020B0004020202020204" pitchFamily="34" charset="0"/>
+                          <a:ea typeface="+mn-ea"/>
+                          <a:cs typeface="+mn-cs"/>
+                        </a:rPr>
+                        <a:t> </a:t>
+                      </a:r>
+                      <a:r>
+                        <a:rPr lang="en-US" sz="1000" b="0" i="0" u="none" strike="noStrike" kern="1200" dirty="0" err="1">
+                          <a:solidFill>
+                            <a:srgbClr val="000000"/>
+                          </a:solidFill>
+                          <a:effectLst/>
+                          <a:latin typeface="Aptos Narrow" panose="020B0004020202020204" pitchFamily="34" charset="0"/>
+                          <a:ea typeface="+mn-ea"/>
+                          <a:cs typeface="+mn-cs"/>
+                        </a:rPr>
+                        <a:t>sarcoma;advanced</a:t>
+                      </a:r>
+                      <a:r>
+                        <a:rPr lang="en-US" sz="1000" b="0" i="0" u="none" strike="noStrike" kern="1200" dirty="0">
+                          <a:solidFill>
+                            <a:srgbClr val="000000"/>
+                          </a:solidFill>
+                          <a:effectLst/>
+                          <a:latin typeface="Aptos Narrow" panose="020B0004020202020204" pitchFamily="34" charset="0"/>
+                          <a:ea typeface="+mn-ea"/>
+                          <a:cs typeface="+mn-cs"/>
+                        </a:rPr>
+                        <a:t> </a:t>
+                      </a:r>
+                      <a:r>
+                        <a:rPr lang="en-US" sz="1000" b="0" i="0" u="none" strike="noStrike" kern="1200" dirty="0" err="1">
+                          <a:solidFill>
+                            <a:srgbClr val="000000"/>
+                          </a:solidFill>
+                          <a:effectLst/>
+                          <a:latin typeface="Aptos Narrow" panose="020B0004020202020204" pitchFamily="34" charset="0"/>
+                          <a:ea typeface="+mn-ea"/>
+                          <a:cs typeface="+mn-cs"/>
+                        </a:rPr>
+                        <a:t>leiomyosarcoma;leiomyosarcoma</a:t>
+                      </a:r>
+                      <a:r>
+                        <a:rPr lang="en-US" sz="1000" b="0" i="0" u="none" strike="noStrike" kern="1200" dirty="0">
+                          <a:solidFill>
+                            <a:srgbClr val="000000"/>
+                          </a:solidFill>
+                          <a:effectLst/>
+                          <a:latin typeface="Aptos Narrow" panose="020B0004020202020204" pitchFamily="34" charset="0"/>
+                          <a:ea typeface="+mn-ea"/>
+                          <a:cs typeface="+mn-cs"/>
+                        </a:rPr>
+                        <a:t> of </a:t>
+                      </a:r>
+                      <a:r>
+                        <a:rPr lang="en-US" sz="1000" b="0" i="0" u="none" strike="noStrike" kern="1200" dirty="0" err="1">
+                          <a:solidFill>
+                            <a:srgbClr val="000000"/>
+                          </a:solidFill>
+                          <a:effectLst/>
+                          <a:latin typeface="Aptos Narrow" panose="020B0004020202020204" pitchFamily="34" charset="0"/>
+                          <a:ea typeface="+mn-ea"/>
+                          <a:cs typeface="+mn-cs"/>
+                        </a:rPr>
+                        <a:t>ovary;adenocarcinoma</a:t>
+                      </a:r>
+                      <a:r>
+                        <a:rPr lang="en-US" sz="1000" b="0" i="0" u="none" strike="noStrike" kern="1200" dirty="0">
+                          <a:solidFill>
+                            <a:srgbClr val="000000"/>
+                          </a:solidFill>
+                          <a:effectLst/>
+                          <a:latin typeface="Aptos Narrow" panose="020B0004020202020204" pitchFamily="34" charset="0"/>
+                          <a:ea typeface="+mn-ea"/>
+                          <a:cs typeface="+mn-cs"/>
+                        </a:rPr>
+                        <a:t> of </a:t>
+                      </a:r>
+                      <a:r>
+                        <a:rPr lang="en-US" sz="1000" b="0" i="0" u="none" strike="noStrike" kern="1200" dirty="0" err="1">
+                          <a:solidFill>
+                            <a:srgbClr val="000000"/>
+                          </a:solidFill>
+                          <a:effectLst/>
+                          <a:latin typeface="Aptos Narrow" panose="020B0004020202020204" pitchFamily="34" charset="0"/>
+                          <a:ea typeface="+mn-ea"/>
+                          <a:cs typeface="+mn-cs"/>
+                        </a:rPr>
+                        <a:t>ovary;solid</a:t>
+                      </a:r>
+                      <a:r>
+                        <a:rPr lang="en-US" sz="1000" b="0" i="0" u="none" strike="noStrike" kern="1200" dirty="0">
+                          <a:solidFill>
+                            <a:srgbClr val="000000"/>
+                          </a:solidFill>
+                          <a:effectLst/>
+                          <a:latin typeface="Aptos Narrow" panose="020B0004020202020204" pitchFamily="34" charset="0"/>
+                          <a:ea typeface="+mn-ea"/>
+                          <a:cs typeface="+mn-cs"/>
+                        </a:rPr>
+                        <a:t> alveolar </a:t>
+                      </a:r>
+                      <a:r>
+                        <a:rPr lang="en-US" sz="1000" b="0" i="0" u="none" strike="noStrike" kern="1200" dirty="0" err="1">
+                          <a:solidFill>
+                            <a:srgbClr val="000000"/>
+                          </a:solidFill>
+                          <a:effectLst/>
+                          <a:latin typeface="Aptos Narrow" panose="020B0004020202020204" pitchFamily="34" charset="0"/>
+                          <a:ea typeface="+mn-ea"/>
+                          <a:cs typeface="+mn-cs"/>
+                        </a:rPr>
+                        <a:t>rhabdomyosarcoma;rhabdomyosarcoma</a:t>
+                      </a:r>
+                      <a:r>
+                        <a:rPr lang="en-US" sz="1000" b="0" i="0" u="none" strike="noStrike" kern="1200" dirty="0">
+                          <a:solidFill>
+                            <a:srgbClr val="000000"/>
+                          </a:solidFill>
+                          <a:effectLst/>
+                          <a:latin typeface="Aptos Narrow" panose="020B0004020202020204" pitchFamily="34" charset="0"/>
+                          <a:ea typeface="+mn-ea"/>
+                          <a:cs typeface="+mn-cs"/>
+                        </a:rPr>
+                        <a:t>, </a:t>
+                      </a:r>
+                      <a:r>
+                        <a:rPr lang="en-US" sz="1000" b="0" i="0" u="none" strike="noStrike" kern="1200" dirty="0" err="1">
+                          <a:solidFill>
+                            <a:srgbClr val="000000"/>
+                          </a:solidFill>
+                          <a:effectLst/>
+                          <a:latin typeface="Aptos Narrow" panose="020B0004020202020204" pitchFamily="34" charset="0"/>
+                          <a:ea typeface="+mn-ea"/>
+                          <a:cs typeface="+mn-cs"/>
+                        </a:rPr>
+                        <a:t>pelvic;sarcoma</a:t>
+                      </a:r>
+                      <a:r>
+                        <a:rPr lang="en-US" sz="1000" b="0" i="0" u="none" strike="noStrike" kern="1200" dirty="0">
+                          <a:solidFill>
+                            <a:srgbClr val="000000"/>
+                          </a:solidFill>
+                          <a:effectLst/>
+                          <a:latin typeface="Aptos Narrow" panose="020B0004020202020204" pitchFamily="34" charset="0"/>
+                          <a:ea typeface="+mn-ea"/>
+                          <a:cs typeface="+mn-cs"/>
+                        </a:rPr>
+                        <a:t>, </a:t>
+                      </a:r>
+                      <a:r>
+                        <a:rPr lang="en-US" sz="1000" b="0" i="0" u="none" strike="noStrike" kern="1200" dirty="0" err="1">
+                          <a:solidFill>
+                            <a:srgbClr val="000000"/>
+                          </a:solidFill>
+                          <a:effectLst/>
+                          <a:latin typeface="Aptos Narrow" panose="020B0004020202020204" pitchFamily="34" charset="0"/>
+                          <a:ea typeface="+mn-ea"/>
+                          <a:cs typeface="+mn-cs"/>
+                        </a:rPr>
+                        <a:t>myeloid;localized</a:t>
+                      </a:r>
+                      <a:r>
+                        <a:rPr lang="en-US" sz="1000" b="0" i="0" u="none" strike="noStrike" kern="1200" dirty="0">
+                          <a:solidFill>
+                            <a:srgbClr val="000000"/>
+                          </a:solidFill>
+                          <a:effectLst/>
+                          <a:latin typeface="Aptos Narrow" panose="020B0004020202020204" pitchFamily="34" charset="0"/>
+                          <a:ea typeface="+mn-ea"/>
+                          <a:cs typeface="+mn-cs"/>
+                        </a:rPr>
+                        <a:t> </a:t>
+                      </a:r>
+                      <a:r>
+                        <a:rPr lang="en-US" sz="1000" b="0" i="0" u="none" strike="noStrike" kern="1200" dirty="0" err="1">
+                          <a:solidFill>
+                            <a:srgbClr val="000000"/>
+                          </a:solidFill>
+                          <a:effectLst/>
+                          <a:latin typeface="Aptos Narrow" panose="020B0004020202020204" pitchFamily="34" charset="0"/>
+                          <a:ea typeface="+mn-ea"/>
+                          <a:cs typeface="+mn-cs"/>
+                        </a:rPr>
+                        <a:t>osteosarcoma;advanced</a:t>
+                      </a:r>
+                      <a:r>
+                        <a:rPr lang="en-US" sz="1000" b="0" i="0" u="none" strike="noStrike" kern="1200" dirty="0">
+                          <a:solidFill>
+                            <a:srgbClr val="000000"/>
+                          </a:solidFill>
+                          <a:effectLst/>
+                          <a:latin typeface="Aptos Narrow" panose="020B0004020202020204" pitchFamily="34" charset="0"/>
+                          <a:ea typeface="+mn-ea"/>
+                          <a:cs typeface="+mn-cs"/>
+                        </a:rPr>
+                        <a:t> liposarcoma or </a:t>
+                      </a:r>
+                      <a:r>
+                        <a:rPr lang="en-US" sz="1000" b="0" i="0" u="none" strike="noStrike" kern="1200" dirty="0" err="1">
+                          <a:solidFill>
+                            <a:srgbClr val="000000"/>
+                          </a:solidFill>
+                          <a:effectLst/>
+                          <a:latin typeface="Aptos Narrow" panose="020B0004020202020204" pitchFamily="34" charset="0"/>
+                          <a:ea typeface="+mn-ea"/>
+                          <a:cs typeface="+mn-cs"/>
+                        </a:rPr>
+                        <a:t>leiomyosarcoma;locally</a:t>
+                      </a:r>
+                      <a:r>
+                        <a:rPr lang="en-US" sz="1000" b="0" i="0" u="none" strike="noStrike" kern="1200" dirty="0">
+                          <a:solidFill>
+                            <a:srgbClr val="000000"/>
+                          </a:solidFill>
+                          <a:effectLst/>
+                          <a:latin typeface="Aptos Narrow" panose="020B0004020202020204" pitchFamily="34" charset="0"/>
+                          <a:ea typeface="+mn-ea"/>
+                          <a:cs typeface="+mn-cs"/>
+                        </a:rPr>
+                        <a:t> advanced myxofibrosarcoma; leiomyosarcoma or </a:t>
+                      </a:r>
+                      <a:r>
+                        <a:rPr lang="en-US" sz="1000" b="0" i="0" u="none" strike="noStrike" kern="1200" dirty="0" err="1">
+                          <a:solidFill>
+                            <a:srgbClr val="000000"/>
+                          </a:solidFill>
+                          <a:effectLst/>
+                          <a:latin typeface="Aptos Narrow" panose="020B0004020202020204" pitchFamily="34" charset="0"/>
+                          <a:ea typeface="+mn-ea"/>
+                          <a:cs typeface="+mn-cs"/>
+                        </a:rPr>
+                        <a:t>carcinosarcoma;advanced</a:t>
+                      </a:r>
+                      <a:r>
+                        <a:rPr lang="en-US" sz="1000" b="0" i="0" u="none" strike="noStrike" kern="1200" dirty="0">
+                          <a:solidFill>
+                            <a:srgbClr val="000000"/>
+                          </a:solidFill>
+                          <a:effectLst/>
+                          <a:latin typeface="Aptos Narrow" panose="020B0004020202020204" pitchFamily="34" charset="0"/>
+                          <a:ea typeface="+mn-ea"/>
+                          <a:cs typeface="+mn-cs"/>
+                        </a:rPr>
+                        <a:t> or metastatic liposarcoma or </a:t>
+                      </a:r>
+                      <a:r>
+                        <a:rPr lang="en-US" sz="1000" b="0" i="0" u="none" strike="noStrike" kern="1200" dirty="0" err="1">
+                          <a:solidFill>
+                            <a:srgbClr val="000000"/>
+                          </a:solidFill>
+                          <a:effectLst/>
+                          <a:latin typeface="Aptos Narrow" panose="020B0004020202020204" pitchFamily="34" charset="0"/>
+                          <a:ea typeface="+mn-ea"/>
+                          <a:cs typeface="+mn-cs"/>
+                        </a:rPr>
+                        <a:t>leiomyosarcoma;fusion-negative</a:t>
+                      </a:r>
+                      <a:r>
+                        <a:rPr lang="en-US" sz="1000" b="0" i="0" u="none" strike="noStrike" kern="1200" dirty="0">
+                          <a:solidFill>
+                            <a:srgbClr val="000000"/>
+                          </a:solidFill>
+                          <a:effectLst/>
+                          <a:latin typeface="Aptos Narrow" panose="020B0004020202020204" pitchFamily="34" charset="0"/>
+                          <a:ea typeface="+mn-ea"/>
+                          <a:cs typeface="+mn-cs"/>
+                        </a:rPr>
+                        <a:t> alveolar rhabdomyosarcoma ;cardiac </a:t>
+                      </a:r>
+                      <a:r>
+                        <a:rPr lang="en-US" sz="1000" b="0" i="0" u="none" strike="noStrike" kern="1200" dirty="0" err="1">
+                          <a:solidFill>
+                            <a:srgbClr val="000000"/>
+                          </a:solidFill>
+                          <a:effectLst/>
+                          <a:latin typeface="Aptos Narrow" panose="020B0004020202020204" pitchFamily="34" charset="0"/>
+                          <a:ea typeface="+mn-ea"/>
+                          <a:cs typeface="+mn-cs"/>
+                        </a:rPr>
+                        <a:t>leiomyosarcoma;pleomorphic</a:t>
+                      </a:r>
+                      <a:r>
+                        <a:rPr lang="en-US" sz="1000" b="0" i="0" u="none" strike="noStrike" kern="1200" dirty="0">
+                          <a:solidFill>
+                            <a:srgbClr val="000000"/>
+                          </a:solidFill>
+                          <a:effectLst/>
+                          <a:latin typeface="Aptos Narrow" panose="020B0004020202020204" pitchFamily="34" charset="0"/>
+                          <a:ea typeface="+mn-ea"/>
+                          <a:cs typeface="+mn-cs"/>
+                        </a:rPr>
+                        <a:t> dermal sarcoma</a:t>
+                      </a:r>
+                    </a:p>
+                  </a:txBody>
+                  <a:tcPr marL="9525" marR="9525" marT="9525" marB="0"/>
+                </a:tc>
+                <a:tc>
+                  <a:txBody>
+                    <a:bodyPr/>
+                    <a:lstStyle/>
+                    <a:p>
+                      <a:pPr algn="l" fontAlgn="b"/>
+                      <a:r>
+                        <a:rPr lang="en-US" sz="1000" b="0" i="0" u="none" strike="noStrike" dirty="0">
+                          <a:solidFill>
+                            <a:srgbClr val="000000"/>
+                          </a:solidFill>
+                          <a:effectLst/>
+                          <a:latin typeface="Aptos Narrow" panose="020B0004020202020204" pitchFamily="34" charset="0"/>
+                        </a:rPr>
+                        <a:t>-0.4821895</a:t>
+                      </a:r>
+                    </a:p>
+                  </a:txBody>
+                  <a:tcPr marL="9525" marR="9525" marT="9525" marB="0"/>
+                </a:tc>
+                <a:extLst>
+                  <a:ext uri="{0D108BD9-81ED-4DB2-BD59-A6C34878D82A}">
+                    <a16:rowId xmlns:a16="http://schemas.microsoft.com/office/drawing/2014/main" val="808363429"/>
+                  </a:ext>
+                </a:extLst>
+              </a:tr>
+              <a:tr h="0">
+                <a:tc>
+                  <a:txBody>
+                    <a:bodyPr/>
+                    <a:lstStyle/>
+                    <a:p>
+                      <a:pPr marL="0" marR="0" lvl="0" indent="0" algn="l" defTabSz="914400" rtl="0" eaLnBrk="1" fontAlgn="b" latinLnBrk="0" hangingPunct="1">
+                        <a:lnSpc>
+                          <a:spcPct val="100000"/>
+                        </a:lnSpc>
+                        <a:spcBef>
+                          <a:spcPts val="0"/>
+                        </a:spcBef>
+                        <a:spcAft>
+                          <a:spcPts val="0"/>
+                        </a:spcAft>
+                        <a:buClrTx/>
+                        <a:buSzTx/>
+                        <a:buFontTx/>
+                        <a:buNone/>
+                        <a:tabLst/>
+                        <a:defRPr/>
+                      </a:pPr>
+                      <a:r>
+                        <a:rPr lang="en-US" sz="1000" b="0" i="0" u="none" strike="noStrike" dirty="0">
+                          <a:solidFill>
+                            <a:schemeClr val="bg2">
+                              <a:lumMod val="50000"/>
+                            </a:schemeClr>
+                          </a:solidFill>
+                          <a:effectLst/>
+                          <a:latin typeface="Aptos Narrow" panose="020B0004020202020204" pitchFamily="34" charset="0"/>
+                        </a:rPr>
+                        <a:t>cancer of the liver; cancer of the ureter; cancer of the kidney</a:t>
+                      </a:r>
+                    </a:p>
+                  </a:txBody>
+                  <a:tcPr marL="9525" marR="9525" marT="9525" marB="0"/>
+                </a:tc>
+                <a:tc>
+                  <a:txBody>
+                    <a:bodyPr/>
+                    <a:lstStyle/>
+                    <a:p>
+                      <a:pPr algn="l" fontAlgn="b"/>
+                      <a:r>
+                        <a:rPr lang="en-US" sz="1000" b="0" i="0" u="none" strike="noStrike" dirty="0">
+                          <a:solidFill>
+                            <a:schemeClr val="bg2">
+                              <a:lumMod val="50000"/>
+                            </a:schemeClr>
+                          </a:solidFill>
+                          <a:effectLst/>
+                          <a:latin typeface="Aptos Narrow" panose="020B0004020202020204" pitchFamily="34" charset="0"/>
+                        </a:rPr>
+                        <a:t>0.09780815</a:t>
+                      </a:r>
+                    </a:p>
+                  </a:txBody>
+                  <a:tcPr marL="9525" marR="9525" marT="9525" marB="0"/>
+                </a:tc>
+                <a:tc>
+                  <a:txBody>
+                    <a:bodyPr/>
+                    <a:lstStyle/>
+                    <a:p>
+                      <a:pPr marL="0" marR="0" lvl="0" indent="0" algn="l" defTabSz="914400" rtl="0" eaLnBrk="1" fontAlgn="b" latinLnBrk="0" hangingPunct="1">
+                        <a:lnSpc>
+                          <a:spcPct val="100000"/>
+                        </a:lnSpc>
+                        <a:spcBef>
+                          <a:spcPts val="0"/>
+                        </a:spcBef>
+                        <a:spcAft>
+                          <a:spcPts val="0"/>
+                        </a:spcAft>
+                        <a:buClrTx/>
+                        <a:buSzTx/>
+                        <a:buFontTx/>
+                        <a:buNone/>
+                        <a:tabLst/>
+                        <a:defRPr/>
+                      </a:pPr>
+                      <a:r>
+                        <a:rPr lang="en-US" sz="1000" b="0" i="0" u="none" strike="noStrike" dirty="0">
+                          <a:solidFill>
+                            <a:srgbClr val="000000"/>
+                          </a:solidFill>
+                          <a:effectLst/>
+                          <a:latin typeface="Aptos Narrow" panose="020B0004020202020204" pitchFamily="34" charset="0"/>
+                        </a:rPr>
+                        <a:t>cancer of the </a:t>
+                      </a:r>
+                      <a:r>
+                        <a:rPr lang="en-US" sz="1000" b="0" i="0" u="none" strike="noStrike" dirty="0" err="1">
+                          <a:solidFill>
+                            <a:srgbClr val="000000"/>
+                          </a:solidFill>
+                          <a:effectLst/>
+                          <a:latin typeface="Aptos Narrow" panose="020B0004020202020204" pitchFamily="34" charset="0"/>
+                        </a:rPr>
+                        <a:t>liver;cancer</a:t>
+                      </a:r>
+                      <a:r>
+                        <a:rPr lang="en-US" sz="1000" b="0" i="0" u="none" strike="noStrike" dirty="0">
+                          <a:solidFill>
+                            <a:srgbClr val="000000"/>
+                          </a:solidFill>
+                          <a:effectLst/>
+                          <a:latin typeface="Aptos Narrow" panose="020B0004020202020204" pitchFamily="34" charset="0"/>
+                        </a:rPr>
+                        <a:t> of the ovary;</a:t>
+                      </a:r>
+                    </a:p>
+                    <a:p>
+                      <a:pPr marL="0" marR="0" lvl="0" indent="0" algn="l" defTabSz="914400" rtl="0" eaLnBrk="1" fontAlgn="b" latinLnBrk="0" hangingPunct="1">
+                        <a:lnSpc>
+                          <a:spcPct val="100000"/>
+                        </a:lnSpc>
+                        <a:spcBef>
+                          <a:spcPts val="0"/>
+                        </a:spcBef>
+                        <a:spcAft>
+                          <a:spcPts val="0"/>
+                        </a:spcAft>
+                        <a:buClrTx/>
+                        <a:buSzTx/>
+                        <a:buFontTx/>
+                        <a:buNone/>
+                        <a:tabLst/>
+                        <a:defRPr/>
+                      </a:pPr>
+                      <a:r>
+                        <a:rPr lang="en-US" sz="1000" b="0" i="0" u="none" strike="noStrike" dirty="0">
+                          <a:solidFill>
+                            <a:srgbClr val="000000"/>
+                          </a:solidFill>
+                          <a:effectLst/>
+                          <a:latin typeface="Aptos Narrow" panose="020B0004020202020204" pitchFamily="34" charset="0"/>
+                        </a:rPr>
+                        <a:t>cancer of the </a:t>
+                      </a:r>
+                      <a:r>
+                        <a:rPr lang="en-US" sz="1000" b="0" i="0" u="none" strike="noStrike" dirty="0" err="1">
+                          <a:solidFill>
+                            <a:srgbClr val="000000"/>
+                          </a:solidFill>
+                          <a:effectLst/>
+                          <a:latin typeface="Aptos Narrow" panose="020B0004020202020204" pitchFamily="34" charset="0"/>
+                        </a:rPr>
+                        <a:t>larynx;cancer</a:t>
+                      </a:r>
+                      <a:r>
+                        <a:rPr lang="en-US" sz="1000" b="0" i="0" u="none" strike="noStrike" dirty="0">
+                          <a:solidFill>
+                            <a:srgbClr val="000000"/>
+                          </a:solidFill>
+                          <a:effectLst/>
+                          <a:latin typeface="Aptos Narrow" panose="020B0004020202020204" pitchFamily="34" charset="0"/>
+                        </a:rPr>
+                        <a:t> of the salivary gland; cancer of the oral cavity; cancer of head; cancer, other; cancer of ovary;</a:t>
+                      </a:r>
+                    </a:p>
+                    <a:p>
+                      <a:pPr marL="0" marR="0" lvl="0" indent="0" algn="l" defTabSz="914400" rtl="0" eaLnBrk="1" fontAlgn="b" latinLnBrk="0" hangingPunct="1">
+                        <a:lnSpc>
+                          <a:spcPct val="100000"/>
+                        </a:lnSpc>
+                        <a:spcBef>
+                          <a:spcPts val="0"/>
+                        </a:spcBef>
+                        <a:spcAft>
+                          <a:spcPts val="0"/>
+                        </a:spcAft>
+                        <a:buClrTx/>
+                        <a:buSzTx/>
+                        <a:buFontTx/>
+                        <a:buNone/>
+                        <a:tabLst/>
+                        <a:defRPr/>
+                      </a:pPr>
+                      <a:r>
+                        <a:rPr lang="en-US" sz="1000" b="0" i="0" u="none" strike="noStrike" dirty="0">
+                          <a:solidFill>
+                            <a:srgbClr val="000000"/>
+                          </a:solidFill>
+                          <a:effectLst/>
+                          <a:latin typeface="Aptos Narrow" panose="020B0004020202020204" pitchFamily="34" charset="0"/>
+                        </a:rPr>
+                        <a:t>cancer of the pharynx; cancer of the biliary tract</a:t>
+                      </a:r>
+                    </a:p>
+                  </a:txBody>
+                  <a:tcPr marL="9525" marR="9525" marT="9525" marB="0"/>
+                </a:tc>
+                <a:tc>
+                  <a:txBody>
+                    <a:bodyPr/>
+                    <a:lstStyle/>
+                    <a:p>
+                      <a:pPr algn="l" fontAlgn="b"/>
+                      <a:r>
+                        <a:rPr lang="en-US" sz="1000" b="0" i="0" u="none" strike="noStrike" dirty="0">
+                          <a:solidFill>
+                            <a:srgbClr val="000000"/>
+                          </a:solidFill>
+                          <a:effectLst/>
+                          <a:latin typeface="Aptos Narrow" panose="020B0004020202020204" pitchFamily="34" charset="0"/>
+                        </a:rPr>
+                        <a:t>-0.1121348</a:t>
+                      </a:r>
+                    </a:p>
+                  </a:txBody>
+                  <a:tcPr marL="9525" marR="9525" marT="9525" marB="0"/>
+                </a:tc>
+                <a:tc>
+                  <a:txBody>
+                    <a:bodyPr/>
+                    <a:lstStyle/>
+                    <a:p>
+                      <a:pPr marL="0" marR="0" lvl="0" indent="0" algn="l" defTabSz="914400" rtl="0" eaLnBrk="1" fontAlgn="b" latinLnBrk="0" hangingPunct="1">
+                        <a:lnSpc>
+                          <a:spcPct val="100000"/>
+                        </a:lnSpc>
+                        <a:spcBef>
+                          <a:spcPts val="0"/>
+                        </a:spcBef>
+                        <a:spcAft>
+                          <a:spcPts val="0"/>
+                        </a:spcAft>
+                        <a:buClrTx/>
+                        <a:buSzTx/>
+                        <a:buFontTx/>
+                        <a:buNone/>
+                        <a:tabLst/>
+                        <a:defRPr/>
+                      </a:pPr>
+                      <a:r>
+                        <a:rPr lang="en-US" sz="1000" b="0" i="0" u="none" strike="noStrike" kern="1200" dirty="0">
+                          <a:solidFill>
+                            <a:srgbClr val="000000"/>
+                          </a:solidFill>
+                          <a:effectLst/>
+                          <a:latin typeface="Aptos Narrow" panose="020B0004020202020204" pitchFamily="34" charset="0"/>
+                          <a:ea typeface="+mn-ea"/>
+                          <a:cs typeface="+mn-cs"/>
+                        </a:rPr>
+                        <a:t>cancer of the liver; cancer of </a:t>
+                      </a:r>
+                      <a:r>
+                        <a:rPr lang="en-US" sz="1000" b="0" i="0" u="none" strike="noStrike" kern="1200" dirty="0" err="1">
+                          <a:solidFill>
+                            <a:srgbClr val="000000"/>
+                          </a:solidFill>
+                          <a:effectLst/>
+                          <a:latin typeface="Aptos Narrow" panose="020B0004020202020204" pitchFamily="34" charset="0"/>
+                          <a:ea typeface="+mn-ea"/>
+                          <a:cs typeface="+mn-cs"/>
+                        </a:rPr>
+                        <a:t>cervix;cancer</a:t>
+                      </a:r>
+                      <a:r>
+                        <a:rPr lang="en-US" sz="1000" b="0" i="0" u="none" strike="noStrike" kern="1200" dirty="0">
+                          <a:solidFill>
+                            <a:srgbClr val="000000"/>
+                          </a:solidFill>
+                          <a:effectLst/>
+                          <a:latin typeface="Aptos Narrow" panose="020B0004020202020204" pitchFamily="34" charset="0"/>
+                          <a:ea typeface="+mn-ea"/>
+                          <a:cs typeface="+mn-cs"/>
+                        </a:rPr>
+                        <a:t> of the </a:t>
+                      </a:r>
+                      <a:r>
+                        <a:rPr lang="en-US" sz="1000" b="0" i="0" u="none" strike="noStrike" kern="1200" dirty="0" err="1">
+                          <a:solidFill>
+                            <a:srgbClr val="000000"/>
+                          </a:solidFill>
+                          <a:effectLst/>
+                          <a:latin typeface="Aptos Narrow" panose="020B0004020202020204" pitchFamily="34" charset="0"/>
+                          <a:ea typeface="+mn-ea"/>
+                          <a:cs typeface="+mn-cs"/>
+                        </a:rPr>
+                        <a:t>rectum;cancer</a:t>
+                      </a:r>
+                      <a:r>
+                        <a:rPr lang="en-US" sz="1000" b="0" i="0" u="none" strike="noStrike" kern="1200" dirty="0">
+                          <a:solidFill>
+                            <a:srgbClr val="000000"/>
+                          </a:solidFill>
+                          <a:effectLst/>
+                          <a:latin typeface="Aptos Narrow" panose="020B0004020202020204" pitchFamily="34" charset="0"/>
+                          <a:ea typeface="+mn-ea"/>
+                          <a:cs typeface="+mn-cs"/>
+                        </a:rPr>
+                        <a:t> of the cervix ;stage iv cancer of the cervix</a:t>
+                      </a:r>
+                    </a:p>
+                  </a:txBody>
+                  <a:tcPr/>
+                </a:tc>
+                <a:tc>
+                  <a:txBody>
+                    <a:bodyPr/>
+                    <a:lstStyle/>
+                    <a:p>
+                      <a:pPr algn="l" fontAlgn="b"/>
+                      <a:r>
+                        <a:rPr lang="en-US" sz="1000" b="0" i="0" u="none" strike="noStrike" dirty="0">
+                          <a:solidFill>
+                            <a:srgbClr val="000000"/>
+                          </a:solidFill>
+                          <a:effectLst/>
+                          <a:latin typeface="Aptos Narrow" panose="020B0004020202020204" pitchFamily="34" charset="0"/>
+                        </a:rPr>
+                        <a:t>-0.3244073</a:t>
+                      </a:r>
+                    </a:p>
+                  </a:txBody>
+                  <a:tcPr marL="9525" marR="9525" marT="9525" marB="0"/>
+                </a:tc>
+                <a:extLst>
+                  <a:ext uri="{0D108BD9-81ED-4DB2-BD59-A6C34878D82A}">
+                    <a16:rowId xmlns:a16="http://schemas.microsoft.com/office/drawing/2014/main" val="493799710"/>
+                  </a:ext>
+                </a:extLst>
+              </a:tr>
+              <a:tr h="370840">
+                <a:tc>
+                  <a:txBody>
+                    <a:bodyPr/>
+                    <a:lstStyle/>
+                    <a:p>
+                      <a:pPr marL="0" marR="0" lvl="0" indent="0" algn="l" defTabSz="914400" rtl="0" eaLnBrk="1" fontAlgn="b" latinLnBrk="0" hangingPunct="1">
+                        <a:lnSpc>
+                          <a:spcPct val="100000"/>
+                        </a:lnSpc>
+                        <a:spcBef>
+                          <a:spcPts val="0"/>
+                        </a:spcBef>
+                        <a:spcAft>
+                          <a:spcPts val="0"/>
+                        </a:spcAft>
+                        <a:buClrTx/>
+                        <a:buSzTx/>
+                        <a:buFontTx/>
+                        <a:buNone/>
+                        <a:tabLst/>
+                        <a:defRPr/>
+                      </a:pPr>
+                      <a:r>
+                        <a:rPr lang="en-US" sz="1000" b="0" i="0" u="none" strike="noStrike" dirty="0">
+                          <a:solidFill>
+                            <a:schemeClr val="bg2">
+                              <a:lumMod val="50000"/>
+                            </a:schemeClr>
+                          </a:solidFill>
+                          <a:effectLst/>
+                          <a:latin typeface="Aptos Narrow" panose="020B0004020202020204" pitchFamily="34" charset="0"/>
+                        </a:rPr>
+                        <a:t>smoldering myeloma; </a:t>
+                      </a:r>
+                      <a:r>
+                        <a:rPr lang="en-US" sz="1000" b="0" i="0" u="none" strike="noStrike" dirty="0" err="1">
+                          <a:solidFill>
+                            <a:schemeClr val="bg2">
+                              <a:lumMod val="50000"/>
+                            </a:schemeClr>
+                          </a:solidFill>
+                          <a:effectLst/>
+                          <a:latin typeface="Aptos Narrow" panose="020B0004020202020204" pitchFamily="34" charset="0"/>
+                        </a:rPr>
+                        <a:t>smouldering</a:t>
+                      </a:r>
+                      <a:r>
+                        <a:rPr lang="en-US" sz="1000" b="0" i="0" u="none" strike="noStrike" dirty="0">
+                          <a:solidFill>
+                            <a:schemeClr val="bg2">
+                              <a:lumMod val="50000"/>
+                            </a:schemeClr>
+                          </a:solidFill>
+                          <a:effectLst/>
+                          <a:latin typeface="Aptos Narrow" panose="020B0004020202020204" pitchFamily="34" charset="0"/>
+                        </a:rPr>
+                        <a:t> myeloma</a:t>
+                      </a:r>
+                    </a:p>
+                    <a:p>
+                      <a:pPr algn="l" fontAlgn="b"/>
+                      <a:endParaRPr lang="en-US" sz="1000" b="0" i="0" u="none" strike="noStrike" dirty="0">
                         <a:solidFill>
                           <a:schemeClr val="bg2">
                             <a:lumMod val="50000"/>
                           </a:schemeClr>
                         </a:solidFill>
+                        <a:effectLst/>
+                        <a:latin typeface="Aptos Narrow" panose="020B0004020202020204" pitchFamily="34" charset="0"/>
                       </a:endParaRPr>
                     </a:p>
                   </a:txBody>
-                  <a:tcPr/>
-                </a:tc>
-                <a:tc>
-                  <a:txBody>
-                    <a:bodyPr/>
-                    <a:lstStyle/>
-                    <a:p>
-                      <a:endParaRPr lang="en-US" sz="1000" dirty="0">
+                  <a:tcPr marL="9525" marR="9525" marT="9525" marB="0"/>
+                </a:tc>
+                <a:tc>
+                  <a:txBody>
+                    <a:bodyPr/>
+                    <a:lstStyle/>
+                    <a:p>
+                      <a:pPr algn="l" fontAlgn="b"/>
+                      <a:r>
+                        <a:rPr lang="en-US" sz="1000" b="0" i="0" u="none" strike="noStrike" dirty="0">
+                          <a:solidFill>
+                            <a:schemeClr val="bg2">
+                              <a:lumMod val="50000"/>
+                            </a:schemeClr>
+                          </a:solidFill>
+                          <a:effectLst/>
+                          <a:latin typeface="Aptos Narrow" panose="020B0004020202020204" pitchFamily="34" charset="0"/>
+                        </a:rPr>
+                        <a:t>0.88235294</a:t>
+                      </a:r>
+                    </a:p>
+                  </a:txBody>
+                  <a:tcPr marL="9525" marR="9525" marT="9525" marB="0"/>
+                </a:tc>
+                <a:tc>
+                  <a:txBody>
+                    <a:bodyPr/>
+                    <a:lstStyle/>
+                    <a:p>
+                      <a:pPr marL="0" marR="0" lvl="0" indent="0" algn="l" defTabSz="914400" rtl="0" eaLnBrk="1" fontAlgn="b" latinLnBrk="0" hangingPunct="1">
+                        <a:lnSpc>
+                          <a:spcPct val="100000"/>
+                        </a:lnSpc>
+                        <a:spcBef>
+                          <a:spcPts val="0"/>
+                        </a:spcBef>
+                        <a:spcAft>
+                          <a:spcPts val="0"/>
+                        </a:spcAft>
+                        <a:buClrTx/>
+                        <a:buSzTx/>
+                        <a:buFontTx/>
+                        <a:buNone/>
+                        <a:tabLst/>
+                        <a:defRPr/>
+                      </a:pPr>
+                      <a:r>
+                        <a:rPr lang="en-US" sz="1000" b="0" i="0" u="none" strike="noStrike" dirty="0">
+                          <a:solidFill>
+                            <a:srgbClr val="000000"/>
+                          </a:solidFill>
+                          <a:effectLst/>
+                          <a:latin typeface="Aptos Narrow" panose="020B0004020202020204" pitchFamily="34" charset="0"/>
+                        </a:rPr>
+                        <a:t>smoldering myeloma; smoldering multiple myeloma; smoldering plasma cell myeloma; smoldering multiple myeloma (</a:t>
+                      </a:r>
+                      <a:r>
+                        <a:rPr lang="en-US" sz="1000" b="0" i="0" u="none" strike="noStrike" dirty="0" err="1">
+                          <a:solidFill>
+                            <a:srgbClr val="000000"/>
+                          </a:solidFill>
+                          <a:effectLst/>
+                          <a:latin typeface="Aptos Narrow" panose="020B0004020202020204" pitchFamily="34" charset="0"/>
+                        </a:rPr>
+                        <a:t>smm</a:t>
+                      </a:r>
+                      <a:r>
+                        <a:rPr lang="en-US" sz="1000" b="0" i="0" u="none" strike="noStrike" dirty="0">
+                          <a:solidFill>
+                            <a:srgbClr val="000000"/>
+                          </a:solidFill>
+                          <a:effectLst/>
+                          <a:latin typeface="Aptos Narrow" panose="020B0004020202020204" pitchFamily="34" charset="0"/>
+                        </a:rPr>
+                        <a:t>)</a:t>
+                      </a:r>
+                    </a:p>
+                  </a:txBody>
+                  <a:tcPr marL="9525" marR="9525" marT="9525" marB="0"/>
+                </a:tc>
+                <a:tc>
+                  <a:txBody>
+                    <a:bodyPr/>
+                    <a:lstStyle/>
+                    <a:p>
+                      <a:pPr algn="l" fontAlgn="b"/>
+                      <a:r>
+                        <a:rPr lang="en-US" sz="1000" b="0" i="0" u="none" strike="noStrike" dirty="0">
+                          <a:solidFill>
+                            <a:srgbClr val="000000"/>
+                          </a:solidFill>
+                          <a:effectLst/>
+                          <a:latin typeface="Aptos Narrow" panose="020B0004020202020204" pitchFamily="34" charset="0"/>
+                        </a:rPr>
+                        <a:t>-0.062071</a:t>
+                      </a:r>
+                    </a:p>
+                  </a:txBody>
+                  <a:tcPr marL="9525" marR="9525" marT="9525" marB="0"/>
+                </a:tc>
+                <a:tc>
+                  <a:txBody>
+                    <a:bodyPr/>
+                    <a:lstStyle/>
+                    <a:p>
+                      <a:pPr marL="0" marR="0" lvl="0" indent="0" algn="l" defTabSz="914400" rtl="0" eaLnBrk="1" fontAlgn="b" latinLnBrk="0" hangingPunct="1">
+                        <a:lnSpc>
+                          <a:spcPct val="100000"/>
+                        </a:lnSpc>
+                        <a:spcBef>
+                          <a:spcPts val="0"/>
+                        </a:spcBef>
+                        <a:spcAft>
+                          <a:spcPts val="0"/>
+                        </a:spcAft>
+                        <a:buClrTx/>
+                        <a:buSzTx/>
+                        <a:buFontTx/>
+                        <a:buNone/>
+                        <a:tabLst/>
+                        <a:defRPr/>
+                      </a:pPr>
+                      <a:r>
+                        <a:rPr lang="en-US" sz="1000" b="0" i="0" u="none" strike="noStrike" dirty="0">
+                          <a:solidFill>
+                            <a:srgbClr val="000000"/>
+                          </a:solidFill>
+                          <a:effectLst/>
+                          <a:latin typeface="Aptos Narrow" panose="020B0004020202020204" pitchFamily="34" charset="0"/>
+                        </a:rPr>
+                        <a:t>smoldering myeloma; </a:t>
+                      </a:r>
+                      <a:r>
+                        <a:rPr lang="en-US" sz="1000" b="0" i="0" u="none" strike="noStrike" dirty="0" err="1">
+                          <a:solidFill>
+                            <a:srgbClr val="000000"/>
+                          </a:solidFill>
+                          <a:effectLst/>
+                          <a:latin typeface="Aptos Narrow" panose="020B0004020202020204" pitchFamily="34" charset="0"/>
+                        </a:rPr>
+                        <a:t>smouldering</a:t>
+                      </a:r>
+                      <a:r>
+                        <a:rPr lang="en-US" sz="1000" b="0" i="0" u="none" strike="noStrike" dirty="0">
+                          <a:solidFill>
+                            <a:srgbClr val="000000"/>
+                          </a:solidFill>
+                          <a:effectLst/>
+                          <a:latin typeface="Aptos Narrow" panose="020B0004020202020204" pitchFamily="34" charset="0"/>
+                        </a:rPr>
+                        <a:t> myeloma</a:t>
+                      </a:r>
+                    </a:p>
+                    <a:p>
+                      <a:pPr algn="l" fontAlgn="b"/>
+                      <a:endParaRPr lang="en-US" sz="1000" b="0" i="0" u="none" strike="noStrike" dirty="0">
                         <a:solidFill>
-                          <a:schemeClr val="bg2">
-                            <a:lumMod val="50000"/>
-                          </a:schemeClr>
+                          <a:srgbClr val="000000"/>
                         </a:solidFill>
+                        <a:effectLst/>
+                        <a:latin typeface="Aptos Narrow" panose="020B0004020202020204" pitchFamily="34" charset="0"/>
                       </a:endParaRPr>
                     </a:p>
                   </a:txBody>
-                  <a:tcPr/>
-                </a:tc>
-                <a:tc>
-                  <a:txBody>
-                    <a:bodyPr/>
-                    <a:lstStyle/>
-                    <a:p>
-                      <a:endParaRPr lang="en-US" sz="1000">
-                        <a:solidFill>
-                          <a:schemeClr val="bg2">
-                            <a:lumMod val="50000"/>
-                          </a:schemeClr>
-                        </a:solidFill>
-                      </a:endParaRPr>
-                    </a:p>
-                  </a:txBody>
-                  <a:tcPr/>
-                </a:tc>
-                <a:tc>
-                  <a:txBody>
-                    <a:bodyPr/>
-                    <a:lstStyle/>
-                    <a:p>
-                      <a:endParaRPr lang="en-US" sz="1000" dirty="0">
-                        <a:solidFill>
-                          <a:schemeClr val="bg2">
-                            <a:lumMod val="50000"/>
-                          </a:schemeClr>
-                        </a:solidFill>
-                      </a:endParaRPr>
-                    </a:p>
-                  </a:txBody>
-                  <a:tcPr/>
+                  <a:tcPr marL="9525" marR="9525" marT="9525" marB="0"/>
+                </a:tc>
+                <a:tc>
+                  <a:txBody>
+                    <a:bodyPr/>
+                    <a:lstStyle/>
+                    <a:p>
+                      <a:pPr algn="l" fontAlgn="b"/>
+                      <a:r>
+                        <a:rPr lang="en-US" sz="1000" b="0" i="0" u="none" strike="noStrike" dirty="0">
+                          <a:solidFill>
+                            <a:srgbClr val="000000"/>
+                          </a:solidFill>
+                          <a:effectLst/>
+                          <a:latin typeface="Aptos Narrow" panose="020B0004020202020204" pitchFamily="34" charset="0"/>
+                        </a:rPr>
+                        <a:t>0.78520413</a:t>
+                      </a:r>
+                    </a:p>
+                  </a:txBody>
+                  <a:tcPr marL="9525" marR="9525" marT="9525" marB="0"/>
                 </a:tc>
                 <a:extLst>
                   <a:ext uri="{0D108BD9-81ED-4DB2-BD59-A6C34878D82A}">
@@ -11790,10 +12781,10 @@
       </p:graphicFrame>
       <p:graphicFrame>
         <p:nvGraphicFramePr>
-          <p:cNvPr id="10" name="Table 9">
+          <p:cNvPr id="12" name="Table 11">
             <a:extLst>
               <a:ext uri="{FF2B5EF4-FFF2-40B4-BE49-F238E27FC236}">
-                <a16:creationId xmlns:a16="http://schemas.microsoft.com/office/drawing/2014/main" id="{FB8AF258-FD2A-7955-3C10-9F7685B592A2}"/>
+                <a16:creationId xmlns:a16="http://schemas.microsoft.com/office/drawing/2014/main" id="{40E6FEC4-C292-9102-60C2-34090873515D}"/>
               </a:ext>
             </a:extLst>
           </p:cNvPr>
@@ -11803,24 +12794,24 @@
           <p:nvPr>
             <p:extLst>
               <p:ext uri="{D42A27DB-BD31-4B8C-83A1-F6EECF244321}">
-                <p14:modId xmlns:p14="http://schemas.microsoft.com/office/powerpoint/2010/main" val="1969651073"/>
+                <p14:modId xmlns:p14="http://schemas.microsoft.com/office/powerpoint/2010/main" val="4136417845"/>
               </p:ext>
             </p:extLst>
           </p:nvPr>
         </p:nvGraphicFramePr>
         <p:xfrm>
-          <a:off x="4959350" y="2883694"/>
-          <a:ext cx="2273300" cy="2235200"/>
+          <a:off x="5683250" y="2945924"/>
+          <a:ext cx="825500" cy="1417334"/>
         </p:xfrm>
         <a:graphic>
           <a:graphicData uri="http://schemas.openxmlformats.org/drawingml/2006/table">
             <a:tbl>
               <a:tblPr/>
               <a:tblGrid>
-                <a:gridCol w="2273300">
+                <a:gridCol w="825500">
                   <a:extLst>
                     <a:ext uri="{9D8B030D-6E8A-4147-A177-3AD203B41FA5}">
-                      <a16:colId xmlns:a16="http://schemas.microsoft.com/office/drawing/2014/main" val="2720058215"/>
+                      <a16:colId xmlns:a16="http://schemas.microsoft.com/office/drawing/2014/main" val="2854495086"/>
                     </a:ext>
                   </a:extLst>
                 </a:gridCol>
@@ -11832,7 +12823,7 @@
                     <a:lstStyle/>
                     <a:p>
                       <a:pPr algn="l" fontAlgn="b"/>
-                      <a:endParaRPr lang="en-US" sz="1200" b="0" i="0" u="none" strike="noStrike">
+                      <a:endParaRPr lang="en-US" sz="1200" b="0" i="0" u="none" strike="noStrike" dirty="0">
                         <a:solidFill>
                           <a:srgbClr val="000000"/>
                         </a:solidFill>
@@ -11859,7 +12850,7 @@
                 </a:tc>
                 <a:extLst>
                   <a:ext uri="{0D108BD9-81ED-4DB2-BD59-A6C34878D82A}">
-                    <a16:rowId xmlns:a16="http://schemas.microsoft.com/office/drawing/2014/main" val="968940032"/>
+                    <a16:rowId xmlns:a16="http://schemas.microsoft.com/office/drawing/2014/main" val="45181460"/>
                   </a:ext>
                 </a:extLst>
               </a:tr>
@@ -11897,7 +12888,7 @@
                 </a:tc>
                 <a:extLst>
                   <a:ext uri="{0D108BD9-81ED-4DB2-BD59-A6C34878D82A}">
-                    <a16:rowId xmlns:a16="http://schemas.microsoft.com/office/drawing/2014/main" val="357269616"/>
+                    <a16:rowId xmlns:a16="http://schemas.microsoft.com/office/drawing/2014/main" val="1696963651"/>
                   </a:ext>
                 </a:extLst>
               </a:tr>
@@ -11908,7 +12899,7 @@
                     <a:lstStyle/>
                     <a:p>
                       <a:pPr algn="l" fontAlgn="b"/>
-                      <a:endParaRPr lang="en-US" sz="1200" b="0" i="0" u="none" strike="noStrike">
+                      <a:endParaRPr lang="en-US" sz="1200" b="0" i="0" u="none" strike="noStrike" dirty="0">
                         <a:solidFill>
                           <a:srgbClr val="000000"/>
                         </a:solidFill>
@@ -11935,7 +12926,7 @@
                 </a:tc>
                 <a:extLst>
                   <a:ext uri="{0D108BD9-81ED-4DB2-BD59-A6C34878D82A}">
-                    <a16:rowId xmlns:a16="http://schemas.microsoft.com/office/drawing/2014/main" val="1493847368"/>
+                    <a16:rowId xmlns:a16="http://schemas.microsoft.com/office/drawing/2014/main" val="2593264447"/>
                   </a:ext>
                 </a:extLst>
               </a:tr>
@@ -11973,18 +12964,18 @@
                 </a:tc>
                 <a:extLst>
                   <a:ext uri="{0D108BD9-81ED-4DB2-BD59-A6C34878D82A}">
-                    <a16:rowId xmlns:a16="http://schemas.microsoft.com/office/drawing/2014/main" val="466177873"/>
+                    <a16:rowId xmlns:a16="http://schemas.microsoft.com/office/drawing/2014/main" val="1833337470"/>
                   </a:ext>
                 </a:extLst>
               </a:tr>
-              <a:tr h="203200">
+              <a:tr h="198134">
                 <a:tc>
                   <a:txBody>
                     <a:bodyPr/>
                     <a:lstStyle/>
                     <a:p>
                       <a:pPr algn="l" fontAlgn="b"/>
-                      <a:endParaRPr lang="en-US" sz="1200" b="0" i="0" u="none" strike="noStrike">
+                      <a:endParaRPr lang="en-US" sz="1200" b="0" i="0" u="none" strike="noStrike" dirty="0">
                         <a:solidFill>
                           <a:srgbClr val="000000"/>
                         </a:solidFill>
@@ -12011,7 +13002,7 @@
                 </a:tc>
                 <a:extLst>
                   <a:ext uri="{0D108BD9-81ED-4DB2-BD59-A6C34878D82A}">
-                    <a16:rowId xmlns:a16="http://schemas.microsoft.com/office/drawing/2014/main" val="2789183045"/>
+                    <a16:rowId xmlns:a16="http://schemas.microsoft.com/office/drawing/2014/main" val="380757691"/>
                   </a:ext>
                 </a:extLst>
               </a:tr>
@@ -12022,7 +13013,7 @@
                     <a:lstStyle/>
                     <a:p>
                       <a:pPr algn="l" fontAlgn="b"/>
-                      <a:endParaRPr lang="en-US" sz="1200" b="0" i="0" u="none" strike="noStrike">
+                      <a:endParaRPr lang="en-US" sz="1200" b="0" i="0" u="none" strike="noStrike" dirty="0">
                         <a:solidFill>
                           <a:srgbClr val="000000"/>
                         </a:solidFill>
@@ -12049,7 +13040,7 @@
                 </a:tc>
                 <a:extLst>
                   <a:ext uri="{0D108BD9-81ED-4DB2-BD59-A6C34878D82A}">
-                    <a16:rowId xmlns:a16="http://schemas.microsoft.com/office/drawing/2014/main" val="1127600472"/>
+                    <a16:rowId xmlns:a16="http://schemas.microsoft.com/office/drawing/2014/main" val="1459295935"/>
                   </a:ext>
                 </a:extLst>
               </a:tr>
@@ -12060,7 +13051,7 @@
                     <a:lstStyle/>
                     <a:p>
                       <a:pPr algn="l" fontAlgn="b"/>
-                      <a:endParaRPr lang="en-US" sz="1200" b="0" i="0" u="none" strike="noStrike">
+                      <a:endParaRPr lang="en-US" sz="1200" b="0" i="0" u="none" strike="noStrike" dirty="0">
                         <a:solidFill>
                           <a:srgbClr val="000000"/>
                         </a:solidFill>
@@ -12087,159 +13078,7 @@
                 </a:tc>
                 <a:extLst>
                   <a:ext uri="{0D108BD9-81ED-4DB2-BD59-A6C34878D82A}">
-                    <a16:rowId xmlns:a16="http://schemas.microsoft.com/office/drawing/2014/main" val="1686309337"/>
-                  </a:ext>
-                </a:extLst>
-              </a:tr>
-              <a:tr h="203200">
-                <a:tc>
-                  <a:txBody>
-                    <a:bodyPr/>
-                    <a:lstStyle/>
-                    <a:p>
-                      <a:pPr algn="l" fontAlgn="b"/>
-                      <a:endParaRPr lang="en-US" sz="1200" b="0" i="0" u="none" strike="noStrike">
-                        <a:solidFill>
-                          <a:srgbClr val="000000"/>
-                        </a:solidFill>
-                        <a:effectLst/>
-                        <a:latin typeface="Aptos Narrow" panose="020B0004020202020204" pitchFamily="34" charset="0"/>
-                      </a:endParaRPr>
-                    </a:p>
-                  </a:txBody>
-                  <a:tcPr marL="9525" marR="9525" marT="9525" marB="0" anchor="b">
-                    <a:lnL>
-                      <a:noFill/>
-                    </a:lnL>
-                    <a:lnR>
-                      <a:noFill/>
-                    </a:lnR>
-                    <a:lnT>
-                      <a:noFill/>
-                    </a:lnT>
-                    <a:lnB>
-                      <a:noFill/>
-                    </a:lnB>
-                    <a:noFill/>
-                  </a:tcPr>
-                </a:tc>
-                <a:extLst>
-                  <a:ext uri="{0D108BD9-81ED-4DB2-BD59-A6C34878D82A}">
-                    <a16:rowId xmlns:a16="http://schemas.microsoft.com/office/drawing/2014/main" val="3556784299"/>
-                  </a:ext>
-                </a:extLst>
-              </a:tr>
-              <a:tr h="203200">
-                <a:tc>
-                  <a:txBody>
-                    <a:bodyPr/>
-                    <a:lstStyle/>
-                    <a:p>
-                      <a:pPr algn="l" fontAlgn="b"/>
-                      <a:endParaRPr lang="en-US" sz="1200" b="0" i="0" u="none" strike="noStrike">
-                        <a:solidFill>
-                          <a:srgbClr val="000000"/>
-                        </a:solidFill>
-                        <a:effectLst/>
-                        <a:latin typeface="Aptos Narrow" panose="020B0004020202020204" pitchFamily="34" charset="0"/>
-                      </a:endParaRPr>
-                    </a:p>
-                  </a:txBody>
-                  <a:tcPr marL="9525" marR="9525" marT="9525" marB="0" anchor="b">
-                    <a:lnL>
-                      <a:noFill/>
-                    </a:lnL>
-                    <a:lnR>
-                      <a:noFill/>
-                    </a:lnR>
-                    <a:lnT>
-                      <a:noFill/>
-                    </a:lnT>
-                    <a:lnB>
-                      <a:noFill/>
-                    </a:lnB>
-                    <a:noFill/>
-                  </a:tcPr>
-                </a:tc>
-                <a:extLst>
-                  <a:ext uri="{0D108BD9-81ED-4DB2-BD59-A6C34878D82A}">
-                    <a16:rowId xmlns:a16="http://schemas.microsoft.com/office/drawing/2014/main" val="2080094899"/>
-                  </a:ext>
-                </a:extLst>
-              </a:tr>
-              <a:tr h="203200">
-                <a:tc>
-                  <a:txBody>
-                    <a:bodyPr/>
-                    <a:lstStyle/>
-                    <a:p>
-                      <a:pPr algn="l" fontAlgn="b"/>
-                      <a:endParaRPr lang="en-US" sz="1200" b="0" i="0" u="none" strike="noStrike" dirty="0">
-                        <a:solidFill>
-                          <a:srgbClr val="000000"/>
-                        </a:solidFill>
-                        <a:effectLst/>
-                        <a:latin typeface="Aptos Narrow" panose="020B0004020202020204" pitchFamily="34" charset="0"/>
-                      </a:endParaRPr>
-                    </a:p>
-                  </a:txBody>
-                  <a:tcPr marL="9525" marR="9525" marT="9525" marB="0" anchor="b">
-                    <a:lnL>
-                      <a:noFill/>
-                    </a:lnL>
-                    <a:lnR>
-                      <a:noFill/>
-                    </a:lnR>
-                    <a:lnT>
-                      <a:noFill/>
-                    </a:lnT>
-                    <a:lnB>
-                      <a:noFill/>
-                    </a:lnB>
-                    <a:noFill/>
-                  </a:tcPr>
-                </a:tc>
-                <a:extLst>
-                  <a:ext uri="{0D108BD9-81ED-4DB2-BD59-A6C34878D82A}">
-                    <a16:rowId xmlns:a16="http://schemas.microsoft.com/office/drawing/2014/main" val="3512015513"/>
-                  </a:ext>
-                </a:extLst>
-              </a:tr>
-              <a:tr h="203200">
-                <a:tc>
-                  <a:txBody>
-                    <a:bodyPr/>
-                    <a:lstStyle/>
-                    <a:p>
-                      <a:pPr algn="l" fontAlgn="b"/>
-                      <a:endParaRPr lang="en-US" sz="1200" b="0" i="0" u="none" strike="noStrike" dirty="0">
-                        <a:solidFill>
-                          <a:srgbClr val="000000"/>
-                        </a:solidFill>
-                        <a:effectLst/>
-                        <a:latin typeface="Aptos Narrow" panose="020B0004020202020204" pitchFamily="34" charset="0"/>
-                      </a:endParaRPr>
-                    </a:p>
-                  </a:txBody>
-                  <a:tcPr marL="9525" marR="9525" marT="9525" marB="0" anchor="b">
-                    <a:lnL>
-                      <a:noFill/>
-                    </a:lnL>
-                    <a:lnR>
-                      <a:noFill/>
-                    </a:lnR>
-                    <a:lnT>
-                      <a:noFill/>
-                    </a:lnT>
-                    <a:lnB>
-                      <a:noFill/>
-                    </a:lnB>
-                    <a:noFill/>
-                  </a:tcPr>
-                </a:tc>
-                <a:extLst>
-                  <a:ext uri="{0D108BD9-81ED-4DB2-BD59-A6C34878D82A}">
-                    <a16:rowId xmlns:a16="http://schemas.microsoft.com/office/drawing/2014/main" val="3577544773"/>
+                    <a16:rowId xmlns:a16="http://schemas.microsoft.com/office/drawing/2014/main" val="794414573"/>
                   </a:ext>
                 </a:extLst>
               </a:tr>

</xml_diff>

<commit_message>
adding method 3 pipeline to ppt
</commit_message>
<xml_diff>
--- a/presentations/BIG_2024.pptx
+++ b/presentations/BIG_2024.pptx
@@ -4009,10 +4009,10 @@
       </p:sp>
       <p:pic>
         <p:nvPicPr>
-          <p:cNvPr id="10" name="Picture 9" descr="A screenshot of a computer&#10;&#10;Description automatically generated">
+          <p:cNvPr id="12" name="Picture 11" descr="A diagram of a diagram&#10;&#10;Description automatically generated">
             <a:extLst>
               <a:ext uri="{FF2B5EF4-FFF2-40B4-BE49-F238E27FC236}">
-                <a16:creationId xmlns:a16="http://schemas.microsoft.com/office/drawing/2014/main" id="{58E70648-14AB-85C5-25D0-8C29BBBFC97E}"/>
+                <a16:creationId xmlns:a16="http://schemas.microsoft.com/office/drawing/2014/main" id="{9A4C3CD7-BAE1-CB3F-4B9B-883239329899}"/>
               </a:ext>
             </a:extLst>
           </p:cNvPr>
@@ -4035,8 +4035,8 @@
         </p:blipFill>
         <p:spPr>
           <a:xfrm>
-            <a:off x="-66017" y="1078713"/>
-            <a:ext cx="9824696" cy="4965283"/>
+            <a:off x="660114" y="965009"/>
+            <a:ext cx="9994392" cy="4952834"/>
           </a:xfrm>
           <a:prstGeom prst="rect">
             <a:avLst/>
@@ -4376,10 +4376,10 @@
       </p:sp>
       <p:pic>
         <p:nvPicPr>
-          <p:cNvPr id="10" name="Picture 9" descr="A screenshot of a computer&#10;&#10;Description automatically generated">
+          <p:cNvPr id="6" name="Picture 5" descr="A diagram of a diagram&#10;&#10;Description automatically generated">
             <a:extLst>
               <a:ext uri="{FF2B5EF4-FFF2-40B4-BE49-F238E27FC236}">
-                <a16:creationId xmlns:a16="http://schemas.microsoft.com/office/drawing/2014/main" id="{C86BCC0C-9219-5FC9-872E-7A566D25D753}"/>
+                <a16:creationId xmlns:a16="http://schemas.microsoft.com/office/drawing/2014/main" id="{7514CCDA-2808-E0D0-20A8-A289348A4487}"/>
               </a:ext>
             </a:extLst>
           </p:cNvPr>
@@ -4402,8 +4402,8 @@
         </p:blipFill>
         <p:spPr>
           <a:xfrm>
-            <a:off x="-66017" y="1078713"/>
-            <a:ext cx="9824696" cy="4965283"/>
+            <a:off x="660114" y="965009"/>
+            <a:ext cx="9994392" cy="4952834"/>
           </a:xfrm>
           <a:prstGeom prst="rect">
             <a:avLst/>
@@ -10029,10 +10029,10 @@
       </p:sp>
       <p:pic>
         <p:nvPicPr>
-          <p:cNvPr id="5" name="Picture 4" descr="A screenshot of a computer&#10;&#10;Description automatically generated">
+          <p:cNvPr id="8" name="Picture 7" descr="A diagram of a diagram&#10;&#10;Description automatically generated">
             <a:extLst>
               <a:ext uri="{FF2B5EF4-FFF2-40B4-BE49-F238E27FC236}">
-                <a16:creationId xmlns:a16="http://schemas.microsoft.com/office/drawing/2014/main" id="{25E813A0-89D2-DF06-A388-F37E0A477CAB}"/>
+                <a16:creationId xmlns:a16="http://schemas.microsoft.com/office/drawing/2014/main" id="{6E19ED14-FAFC-5EA4-17BE-A27F474B8BBB}"/>
               </a:ext>
             </a:extLst>
           </p:cNvPr>
@@ -10055,8 +10055,8 @@
         </p:blipFill>
         <p:spPr>
           <a:xfrm>
-            <a:off x="-66017" y="1078713"/>
-            <a:ext cx="9824696" cy="4965283"/>
+            <a:off x="660114" y="965009"/>
+            <a:ext cx="9994392" cy="4952834"/>
           </a:xfrm>
           <a:prstGeom prst="rect">
             <a:avLst/>
@@ -10235,10 +10235,10 @@
       </p:sp>
       <p:pic>
         <p:nvPicPr>
-          <p:cNvPr id="11" name="Picture 10" descr="A screenshot of a computer screen&#10;&#10;Description automatically generated">
+          <p:cNvPr id="15" name="Picture 14" descr="A diagram of a diagram&#10;&#10;Description automatically generated">
             <a:extLst>
               <a:ext uri="{FF2B5EF4-FFF2-40B4-BE49-F238E27FC236}">
-                <a16:creationId xmlns:a16="http://schemas.microsoft.com/office/drawing/2014/main" id="{6CFB0D99-FD18-2C55-9037-64EEDCB61B28}"/>
+                <a16:creationId xmlns:a16="http://schemas.microsoft.com/office/drawing/2014/main" id="{69A343F9-A1C7-0761-EADA-AA0E21807A5B}"/>
               </a:ext>
             </a:extLst>
           </p:cNvPr>
@@ -10261,8 +10261,8 @@
         </p:blipFill>
         <p:spPr>
           <a:xfrm>
-            <a:off x="-66420" y="1134063"/>
-            <a:ext cx="9820656" cy="4589874"/>
+            <a:off x="349133" y="1226425"/>
+            <a:ext cx="9991900" cy="4579621"/>
           </a:xfrm>
           <a:prstGeom prst="rect">
             <a:avLst/>
@@ -13140,7 +13140,7 @@
         </p:nvSpPr>
         <p:spPr>
           <a:xfrm>
-            <a:off x="97340" y="83425"/>
+            <a:off x="0" y="-282335"/>
             <a:ext cx="11010595" cy="1143000"/>
           </a:xfrm>
         </p:spPr>
@@ -13173,7 +13173,7 @@
         </p:nvSpPr>
         <p:spPr>
           <a:xfrm>
-            <a:off x="216212" y="1481328"/>
+            <a:off x="207899" y="1481328"/>
             <a:ext cx="11010595" cy="3895344"/>
           </a:xfrm>
         </p:spPr>
@@ -13256,6 +13256,42 @@
           </a:p>
         </p:txBody>
       </p:sp>
+      <p:pic>
+        <p:nvPicPr>
+          <p:cNvPr id="7" name="Picture 6" descr="A screenshot of a computer screen&#10;&#10;Description automatically generated">
+            <a:extLst>
+              <a:ext uri="{FF2B5EF4-FFF2-40B4-BE49-F238E27FC236}">
+                <a16:creationId xmlns:a16="http://schemas.microsoft.com/office/drawing/2014/main" id="{D1FC255D-95F3-3323-450B-0A3C065F5C06}"/>
+              </a:ext>
+            </a:extLst>
+          </p:cNvPr>
+          <p:cNvPicPr>
+            <a:picLocks noChangeAspect="1"/>
+          </p:cNvPicPr>
+          <p:nvPr/>
+        </p:nvPicPr>
+        <p:blipFill>
+          <a:blip r:embed="rId2">
+            <a:extLst>
+              <a:ext uri="{28A0092B-C50C-407E-A947-70E740481C1C}">
+                <a14:useLocalDpi xmlns:a14="http://schemas.microsoft.com/office/drawing/2010/main" val="0"/>
+              </a:ext>
+            </a:extLst>
+          </a:blip>
+          <a:stretch>
+            <a:fillRect/>
+          </a:stretch>
+        </p:blipFill>
+        <p:spPr>
+          <a:xfrm>
+            <a:off x="74815" y="602970"/>
+            <a:ext cx="10578634" cy="4634048"/>
+          </a:xfrm>
+          <a:prstGeom prst="rect">
+            <a:avLst/>
+          </a:prstGeom>
+        </p:spPr>
+      </p:pic>
     </p:spTree>
     <p:extLst>
       <p:ext uri="{BB962C8B-B14F-4D97-AF65-F5344CB8AC3E}">

</xml_diff>

<commit_message>
adding kmeans embedding results to ppt
</commit_message>
<xml_diff>
--- a/presentations/BIG_2024.pptx
+++ b/presentations/BIG_2024.pptx
@@ -5,7 +5,7 @@
     <p:sldMasterId id="2147483672" r:id="rId4"/>
   </p:sldMasterIdLst>
   <p:notesMasterIdLst>
-    <p:notesMasterId r:id="rId24"/>
+    <p:notesMasterId r:id="rId25"/>
   </p:notesMasterIdLst>
   <p:sldIdLst>
     <p:sldId id="256" r:id="rId5"/>
@@ -27,6 +27,7 @@
     <p:sldId id="272" r:id="rId21"/>
     <p:sldId id="277" r:id="rId22"/>
     <p:sldId id="274" r:id="rId23"/>
+    <p:sldId id="280" r:id="rId24"/>
   </p:sldIdLst>
   <p:sldSz cx="12192000" cy="6858000"/>
   <p:notesSz cx="6858000" cy="9144000"/>
@@ -13437,6 +13438,1750 @@
     <p:extLst>
       <p:ext uri="{BB962C8B-B14F-4D97-AF65-F5344CB8AC3E}">
         <p14:creationId xmlns:p14="http://schemas.microsoft.com/office/powerpoint/2010/main" val="1860131220"/>
+      </p:ext>
+    </p:extLst>
+  </p:cSld>
+  <p:clrMapOvr>
+    <a:masterClrMapping/>
+  </p:clrMapOvr>
+</p:sld>
+</file>
+
+<file path=ppt/slides/slide20.xml><?xml version="1.0" encoding="utf-8"?>
+<p:sld xmlns:a="http://schemas.openxmlformats.org/drawingml/2006/main" xmlns:r="http://schemas.openxmlformats.org/officeDocument/2006/relationships" xmlns:p="http://schemas.openxmlformats.org/presentationml/2006/main">
+  <p:cSld>
+    <p:spTree>
+      <p:nvGrpSpPr>
+        <p:cNvPr id="1" name="">
+          <a:extLst>
+            <a:ext uri="{FF2B5EF4-FFF2-40B4-BE49-F238E27FC236}">
+              <a16:creationId xmlns:a16="http://schemas.microsoft.com/office/drawing/2014/main" id="{3745EA11-6D14-41B9-9A01-705894CC1618}"/>
+            </a:ext>
+          </a:extLst>
+        </p:cNvPr>
+        <p:cNvGrpSpPr/>
+        <p:nvPr/>
+      </p:nvGrpSpPr>
+      <p:grpSpPr>
+        <a:xfrm>
+          <a:off x="0" y="0"/>
+          <a:ext cx="0" cy="0"/>
+          <a:chOff x="0" y="0"/>
+          <a:chExt cx="0" cy="0"/>
+        </a:xfrm>
+      </p:grpSpPr>
+      <p:sp>
+        <p:nvSpPr>
+          <p:cNvPr id="2" name="Title 1">
+            <a:extLst>
+              <a:ext uri="{FF2B5EF4-FFF2-40B4-BE49-F238E27FC236}">
+                <a16:creationId xmlns:a16="http://schemas.microsoft.com/office/drawing/2014/main" id="{62913A93-F856-9445-B4FC-AB46DEFDDE6F}"/>
+              </a:ext>
+            </a:extLst>
+          </p:cNvPr>
+          <p:cNvSpPr>
+            <a:spLocks noGrp="1"/>
+          </p:cNvSpPr>
+          <p:nvPr>
+            <p:ph type="title"/>
+          </p:nvPr>
+        </p:nvSpPr>
+        <p:spPr>
+          <a:xfrm>
+            <a:off x="0" y="-321064"/>
+            <a:ext cx="11010595" cy="1143000"/>
+          </a:xfrm>
+        </p:spPr>
+        <p:txBody>
+          <a:bodyPr/>
+          <a:lstStyle/>
+          <a:p>
+            <a:r>
+              <a:rPr lang="en-US" sz="1800" dirty="0"/>
+              <a:t>Standardization Method 3 : Benchmark Results</a:t>
+            </a:r>
+          </a:p>
+        </p:txBody>
+      </p:sp>
+      <p:sp>
+        <p:nvSpPr>
+          <p:cNvPr id="3" name="Content Placeholder 2">
+            <a:extLst>
+              <a:ext uri="{FF2B5EF4-FFF2-40B4-BE49-F238E27FC236}">
+                <a16:creationId xmlns:a16="http://schemas.microsoft.com/office/drawing/2014/main" id="{8A186522-0A4F-5307-5583-43833C49CBE7}"/>
+              </a:ext>
+            </a:extLst>
+          </p:cNvPr>
+          <p:cNvSpPr>
+            <a:spLocks noGrp="1"/>
+          </p:cNvSpPr>
+          <p:nvPr>
+            <p:ph idx="1"/>
+          </p:nvPr>
+        </p:nvSpPr>
+        <p:spPr>
+          <a:xfrm>
+            <a:off x="216213" y="1481328"/>
+            <a:ext cx="8952726" cy="3895344"/>
+          </a:xfrm>
+        </p:spPr>
+        <p:txBody>
+          <a:bodyPr>
+            <a:normAutofit/>
+          </a:bodyPr>
+          <a:lstStyle/>
+          <a:p>
+            <a:endParaRPr lang="en-US" dirty="0">
+              <a:solidFill>
+                <a:schemeClr val="tx2">
+                  <a:lumMod val="10000"/>
+                </a:schemeClr>
+              </a:solidFill>
+            </a:endParaRPr>
+          </a:p>
+          <a:p>
+            <a:pPr marL="0" indent="0">
+              <a:buNone/>
+            </a:pPr>
+            <a:endParaRPr lang="en-US" dirty="0">
+              <a:solidFill>
+                <a:schemeClr val="tx2">
+                  <a:lumMod val="10000"/>
+                </a:schemeClr>
+              </a:solidFill>
+            </a:endParaRPr>
+          </a:p>
+          <a:p>
+            <a:endParaRPr lang="en-US" dirty="0">
+              <a:solidFill>
+                <a:schemeClr val="tx2">
+                  <a:lumMod val="10000"/>
+                </a:schemeClr>
+              </a:solidFill>
+            </a:endParaRPr>
+          </a:p>
+          <a:p>
+            <a:pPr marL="0" indent="0">
+              <a:buNone/>
+            </a:pPr>
+            <a:endParaRPr lang="en-US" dirty="0">
+              <a:solidFill>
+                <a:schemeClr val="tx2">
+                  <a:lumMod val="10000"/>
+                </a:schemeClr>
+              </a:solidFill>
+            </a:endParaRPr>
+          </a:p>
+        </p:txBody>
+      </p:sp>
+      <p:sp>
+        <p:nvSpPr>
+          <p:cNvPr id="4" name="Slide Number Placeholder 3">
+            <a:extLst>
+              <a:ext uri="{FF2B5EF4-FFF2-40B4-BE49-F238E27FC236}">
+                <a16:creationId xmlns:a16="http://schemas.microsoft.com/office/drawing/2014/main" id="{17879CF8-9FAF-CE9C-8943-DAC1924AF2CD}"/>
+              </a:ext>
+            </a:extLst>
+          </p:cNvPr>
+          <p:cNvSpPr>
+            <a:spLocks noGrp="1"/>
+          </p:cNvSpPr>
+          <p:nvPr>
+            <p:ph type="sldNum" sz="quarter" idx="12"/>
+          </p:nvPr>
+        </p:nvSpPr>
+        <p:spPr/>
+        <p:txBody>
+          <a:bodyPr/>
+          <a:lstStyle/>
+          <a:p>
+            <a:fld id="{AD40181A-01B0-4CB8-8614-1473649F6741}" type="slidenum">
+              <a:rPr lang="en-US" smtClean="0"/>
+              <a:pPr/>
+              <a:t>20</a:t>
+            </a:fld>
+            <a:endParaRPr lang="en-US" dirty="0"/>
+          </a:p>
+        </p:txBody>
+      </p:sp>
+      <p:graphicFrame>
+        <p:nvGraphicFramePr>
+          <p:cNvPr id="5" name="Table 4">
+            <a:extLst>
+              <a:ext uri="{FF2B5EF4-FFF2-40B4-BE49-F238E27FC236}">
+                <a16:creationId xmlns:a16="http://schemas.microsoft.com/office/drawing/2014/main" id="{CF2CA33E-4573-737F-D5FF-83BA000642EC}"/>
+              </a:ext>
+            </a:extLst>
+          </p:cNvPr>
+          <p:cNvGraphicFramePr>
+            <a:graphicFrameLocks noGrp="1"/>
+          </p:cNvGraphicFramePr>
+          <p:nvPr>
+            <p:extLst>
+              <p:ext uri="{D42A27DB-BD31-4B8C-83A1-F6EECF244321}">
+                <p14:modId xmlns:p14="http://schemas.microsoft.com/office/powerpoint/2010/main" val="2786922629"/>
+              </p:ext>
+            </p:extLst>
+          </p:nvPr>
+        </p:nvGraphicFramePr>
+        <p:xfrm>
+          <a:off x="510455" y="457200"/>
+          <a:ext cx="9614446" cy="5644631"/>
+        </p:xfrm>
+        <a:graphic>
+          <a:graphicData uri="http://schemas.openxmlformats.org/drawingml/2006/table">
+            <a:tbl>
+              <a:tblPr firstRow="1" bandRow="1">
+                <a:tableStyleId>{5C22544A-7EE6-4342-B048-85BDC9FD1C3A}</a:tableStyleId>
+              </a:tblPr>
+              <a:tblGrid>
+                <a:gridCol w="3575952">
+                  <a:extLst>
+                    <a:ext uri="{9D8B030D-6E8A-4147-A177-3AD203B41FA5}">
+                      <a16:colId xmlns:a16="http://schemas.microsoft.com/office/drawing/2014/main" val="1643565107"/>
+                    </a:ext>
+                  </a:extLst>
+                </a:gridCol>
+                <a:gridCol w="1084109">
+                  <a:extLst>
+                    <a:ext uri="{9D8B030D-6E8A-4147-A177-3AD203B41FA5}">
+                      <a16:colId xmlns:a16="http://schemas.microsoft.com/office/drawing/2014/main" val="731584528"/>
+                    </a:ext>
+                  </a:extLst>
+                </a:gridCol>
+                <a:gridCol w="3906982">
+                  <a:extLst>
+                    <a:ext uri="{9D8B030D-6E8A-4147-A177-3AD203B41FA5}">
+                      <a16:colId xmlns:a16="http://schemas.microsoft.com/office/drawing/2014/main" val="3887048142"/>
+                    </a:ext>
+                  </a:extLst>
+                </a:gridCol>
+                <a:gridCol w="1047403">
+                  <a:extLst>
+                    <a:ext uri="{9D8B030D-6E8A-4147-A177-3AD203B41FA5}">
+                      <a16:colId xmlns:a16="http://schemas.microsoft.com/office/drawing/2014/main" val="3285545827"/>
+                    </a:ext>
+                  </a:extLst>
+                </a:gridCol>
+              </a:tblGrid>
+              <a:tr h="370840">
+                <a:tc>
+                  <a:txBody>
+                    <a:bodyPr/>
+                    <a:lstStyle/>
+                    <a:p>
+                      <a:pPr algn="l"/>
+                      <a:r>
+                        <a:rPr lang="en-US" sz="1000" dirty="0"/>
+                        <a:t>AF Clusters</a:t>
+                      </a:r>
+                    </a:p>
+                  </a:txBody>
+                  <a:tcPr/>
+                </a:tc>
+                <a:tc>
+                  <a:txBody>
+                    <a:bodyPr/>
+                    <a:lstStyle/>
+                    <a:p>
+                      <a:pPr algn="l"/>
+                      <a:r>
+                        <a:rPr lang="en-US" sz="1000" dirty="0"/>
+                        <a:t>MSS</a:t>
+                      </a:r>
+                    </a:p>
+                  </a:txBody>
+                  <a:tcPr/>
+                </a:tc>
+                <a:tc>
+                  <a:txBody>
+                    <a:bodyPr/>
+                    <a:lstStyle/>
+                    <a:p>
+                      <a:pPr algn="l"/>
+                      <a:r>
+                        <a:rPr lang="en-US" sz="1000" dirty="0" err="1"/>
+                        <a:t>Kmeans</a:t>
+                      </a:r>
+                      <a:r>
+                        <a:rPr lang="en-US" sz="1000" dirty="0"/>
+                        <a:t>  (K=6000)</a:t>
+                      </a:r>
+                    </a:p>
+                  </a:txBody>
+                  <a:tcPr/>
+                </a:tc>
+                <a:tc>
+                  <a:txBody>
+                    <a:bodyPr/>
+                    <a:lstStyle/>
+                    <a:p>
+                      <a:pPr algn="l"/>
+                      <a:r>
+                        <a:rPr lang="en-US" sz="1000" dirty="0"/>
+                        <a:t>MSS</a:t>
+                      </a:r>
+                    </a:p>
+                  </a:txBody>
+                  <a:tcPr/>
+                </a:tc>
+                <a:extLst>
+                  <a:ext uri="{0D108BD9-81ED-4DB2-BD59-A6C34878D82A}">
+                    <a16:rowId xmlns:a16="http://schemas.microsoft.com/office/drawing/2014/main" val="3873200293"/>
+                  </a:ext>
+                </a:extLst>
+              </a:tr>
+              <a:tr h="0">
+                <a:tc>
+                  <a:txBody>
+                    <a:bodyPr/>
+                    <a:lstStyle/>
+                    <a:p>
+                      <a:pPr marL="0" marR="0" lvl="0" indent="0" algn="l" defTabSz="914400" rtl="0" eaLnBrk="1" fontAlgn="auto" latinLnBrk="0" hangingPunct="1">
+                        <a:lnSpc>
+                          <a:spcPct val="100000"/>
+                        </a:lnSpc>
+                        <a:spcBef>
+                          <a:spcPts val="0"/>
+                        </a:spcBef>
+                        <a:spcAft>
+                          <a:spcPts val="0"/>
+                        </a:spcAft>
+                        <a:buClrTx/>
+                        <a:buSzTx/>
+                        <a:buFontTx/>
+                        <a:buNone/>
+                        <a:tabLst/>
+                        <a:defRPr/>
+                      </a:pPr>
+                      <a:endParaRPr lang="en-US" sz="1000" b="0" i="0" u="none" strike="noStrike" dirty="0">
+                        <a:solidFill>
+                          <a:schemeClr val="bg2">
+                            <a:lumMod val="50000"/>
+                          </a:schemeClr>
+                        </a:solidFill>
+                        <a:effectLst/>
+                        <a:latin typeface="Aptos Narrow" panose="020B0004020202020204" pitchFamily="34" charset="0"/>
+                      </a:endParaRPr>
+                    </a:p>
+                  </a:txBody>
+                  <a:tcPr/>
+                </a:tc>
+                <a:tc>
+                  <a:txBody>
+                    <a:bodyPr/>
+                    <a:lstStyle/>
+                    <a:p>
+                      <a:pPr algn="l" fontAlgn="b"/>
+                      <a:endParaRPr lang="en-US" sz="1000" b="0" i="0" u="none" strike="noStrike" dirty="0">
+                        <a:solidFill>
+                          <a:schemeClr val="bg2">
+                            <a:lumMod val="50000"/>
+                          </a:schemeClr>
+                        </a:solidFill>
+                        <a:effectLst/>
+                        <a:latin typeface="Aptos Narrow" panose="020B0004020202020204" pitchFamily="34" charset="0"/>
+                      </a:endParaRPr>
+                    </a:p>
+                  </a:txBody>
+                  <a:tcPr marL="9525" marR="9525" marT="9525" marB="0"/>
+                </a:tc>
+                <a:tc>
+                  <a:txBody>
+                    <a:bodyPr/>
+                    <a:lstStyle/>
+                    <a:p>
+                      <a:pPr marL="0" marR="0" lvl="0" indent="0" algn="l" defTabSz="914400" rtl="0" eaLnBrk="1" fontAlgn="b" latinLnBrk="0" hangingPunct="1">
+                        <a:lnSpc>
+                          <a:spcPct val="100000"/>
+                        </a:lnSpc>
+                        <a:spcBef>
+                          <a:spcPts val="0"/>
+                        </a:spcBef>
+                        <a:spcAft>
+                          <a:spcPts val="0"/>
+                        </a:spcAft>
+                        <a:buClrTx/>
+                        <a:buSzTx/>
+                        <a:buFontTx/>
+                        <a:buNone/>
+                        <a:tabLst/>
+                        <a:defRPr/>
+                      </a:pPr>
+                      <a:r>
+                        <a:rPr lang="en-US" sz="1200" b="0" i="0" u="none" strike="noStrike" dirty="0">
+                          <a:solidFill>
+                            <a:srgbClr val="000000"/>
+                          </a:solidFill>
+                          <a:effectLst/>
+                          <a:latin typeface="Aptos Narrow" panose="020B0004020202020204" pitchFamily="34" charset="0"/>
+                        </a:rPr>
+                        <a:t>b cell </a:t>
+                      </a:r>
+                      <a:r>
+                        <a:rPr lang="en-US" sz="1200" b="0" i="0" u="none" strike="noStrike" dirty="0" err="1">
+                          <a:solidFill>
+                            <a:srgbClr val="000000"/>
+                          </a:solidFill>
+                          <a:effectLst/>
+                          <a:latin typeface="Aptos Narrow" panose="020B0004020202020204" pitchFamily="34" charset="0"/>
+                        </a:rPr>
+                        <a:t>lymphoma;b</a:t>
+                      </a:r>
+                      <a:r>
+                        <a:rPr lang="en-US" sz="1200" b="0" i="0" u="none" strike="noStrike" dirty="0">
+                          <a:solidFill>
+                            <a:srgbClr val="000000"/>
+                          </a:solidFill>
+                          <a:effectLst/>
+                          <a:latin typeface="Aptos Narrow" panose="020B0004020202020204" pitchFamily="34" charset="0"/>
+                        </a:rPr>
+                        <a:t> cell lymphoma (</a:t>
+                      </a:r>
+                      <a:r>
+                        <a:rPr lang="en-US" sz="1200" b="0" i="0" u="none" strike="noStrike" dirty="0" err="1">
+                          <a:solidFill>
+                            <a:srgbClr val="000000"/>
+                          </a:solidFill>
+                          <a:effectLst/>
+                          <a:latin typeface="Aptos Narrow" panose="020B0004020202020204" pitchFamily="34" charset="0"/>
+                        </a:rPr>
+                        <a:t>bcl</a:t>
+                      </a:r>
+                      <a:r>
+                        <a:rPr lang="en-US" sz="1200" b="0" i="0" u="none" strike="noStrike" dirty="0">
+                          <a:solidFill>
+                            <a:srgbClr val="000000"/>
+                          </a:solidFill>
+                          <a:effectLst/>
+                          <a:latin typeface="Aptos Narrow" panose="020B0004020202020204" pitchFamily="34" charset="0"/>
+                        </a:rPr>
+                        <a:t>) ;b cell </a:t>
+                      </a:r>
+                      <a:r>
+                        <a:rPr lang="en-US" sz="1200" b="0" i="0" u="none" strike="noStrike" dirty="0" err="1">
+                          <a:solidFill>
+                            <a:srgbClr val="000000"/>
+                          </a:solidFill>
+                          <a:effectLst/>
+                          <a:latin typeface="Aptos Narrow" panose="020B0004020202020204" pitchFamily="34" charset="0"/>
+                        </a:rPr>
+                        <a:t>lymphomas;b-cell</a:t>
+                      </a:r>
+                      <a:r>
+                        <a:rPr lang="en-US" sz="1200" b="0" i="0" u="none" strike="noStrike" dirty="0">
+                          <a:solidFill>
+                            <a:srgbClr val="000000"/>
+                          </a:solidFill>
+                          <a:effectLst/>
+                          <a:latin typeface="Aptos Narrow" panose="020B0004020202020204" pitchFamily="34" charset="0"/>
+                        </a:rPr>
+                        <a:t> lymphoid </a:t>
+                      </a:r>
+                      <a:r>
+                        <a:rPr lang="en-US" sz="1200" b="0" i="0" u="none" strike="noStrike" dirty="0" err="1">
+                          <a:solidFill>
+                            <a:srgbClr val="000000"/>
+                          </a:solidFill>
+                          <a:effectLst/>
+                          <a:latin typeface="Aptos Narrow" panose="020B0004020202020204" pitchFamily="34" charset="0"/>
+                        </a:rPr>
+                        <a:t>cancer;b-cell</a:t>
+                      </a:r>
+                      <a:r>
+                        <a:rPr lang="en-US" sz="1200" b="0" i="0" u="none" strike="noStrike" dirty="0">
+                          <a:solidFill>
+                            <a:srgbClr val="000000"/>
+                          </a:solidFill>
+                          <a:effectLst/>
+                          <a:latin typeface="Aptos Narrow" panose="020B0004020202020204" pitchFamily="34" charset="0"/>
+                        </a:rPr>
+                        <a:t> </a:t>
+                      </a:r>
+                      <a:r>
+                        <a:rPr lang="en-US" sz="1200" b="0" i="0" u="none" strike="noStrike" dirty="0" err="1">
+                          <a:solidFill>
+                            <a:srgbClr val="000000"/>
+                          </a:solidFill>
+                          <a:effectLst/>
+                          <a:latin typeface="Aptos Narrow" panose="020B0004020202020204" pitchFamily="34" charset="0"/>
+                        </a:rPr>
+                        <a:t>lymphoma;b-cell</a:t>
+                      </a:r>
+                      <a:r>
+                        <a:rPr lang="en-US" sz="1200" b="0" i="0" u="none" strike="noStrike" dirty="0">
+                          <a:solidFill>
+                            <a:srgbClr val="000000"/>
+                          </a:solidFill>
+                          <a:effectLst/>
+                          <a:latin typeface="Aptos Narrow" panose="020B0004020202020204" pitchFamily="34" charset="0"/>
+                        </a:rPr>
+                        <a:t> lymphomas</a:t>
+                      </a:r>
+                    </a:p>
+                    <a:p>
+                      <a:pPr algn="l" fontAlgn="b"/>
+                      <a:endParaRPr lang="en-US" sz="1200" b="0" i="0" u="none" strike="noStrike" dirty="0">
+                        <a:solidFill>
+                          <a:srgbClr val="000000"/>
+                        </a:solidFill>
+                        <a:effectLst/>
+                        <a:latin typeface="Aptos Narrow" panose="020B0004020202020204" pitchFamily="34" charset="0"/>
+                      </a:endParaRPr>
+                    </a:p>
+                  </a:txBody>
+                  <a:tcPr marL="9525" marR="9525" marT="9525" marB="0"/>
+                </a:tc>
+                <a:tc>
+                  <a:txBody>
+                    <a:bodyPr/>
+                    <a:lstStyle/>
+                    <a:p>
+                      <a:pPr algn="r" fontAlgn="b"/>
+                      <a:r>
+                        <a:rPr lang="en-US" sz="1200" b="0" i="0" u="none" strike="noStrike" dirty="0">
+                          <a:solidFill>
+                            <a:srgbClr val="000000"/>
+                          </a:solidFill>
+                          <a:effectLst/>
+                          <a:latin typeface="Aptos Narrow" panose="020B0004020202020204" pitchFamily="34" charset="0"/>
+                        </a:rPr>
+                        <a:t>0.23489899</a:t>
+                      </a:r>
+                    </a:p>
+                  </a:txBody>
+                  <a:tcPr marL="9525" marR="9525" marT="9525" marB="0"/>
+                </a:tc>
+                <a:extLst>
+                  <a:ext uri="{0D108BD9-81ED-4DB2-BD59-A6C34878D82A}">
+                    <a16:rowId xmlns:a16="http://schemas.microsoft.com/office/drawing/2014/main" val="4135079416"/>
+                  </a:ext>
+                </a:extLst>
+              </a:tr>
+              <a:tr h="0">
+                <a:tc>
+                  <a:txBody>
+                    <a:bodyPr/>
+                    <a:lstStyle/>
+                    <a:p>
+                      <a:pPr marL="0" marR="0" lvl="0" indent="0" algn="l" defTabSz="914400" rtl="0" eaLnBrk="1" fontAlgn="auto" latinLnBrk="0" hangingPunct="1">
+                        <a:lnSpc>
+                          <a:spcPct val="100000"/>
+                        </a:lnSpc>
+                        <a:spcBef>
+                          <a:spcPts val="0"/>
+                        </a:spcBef>
+                        <a:spcAft>
+                          <a:spcPts val="0"/>
+                        </a:spcAft>
+                        <a:buClrTx/>
+                        <a:buSzTx/>
+                        <a:buFontTx/>
+                        <a:buNone/>
+                        <a:tabLst/>
+                        <a:defRPr/>
+                      </a:pPr>
+                      <a:endParaRPr lang="en-US" sz="1000" b="0" i="0" u="none" strike="noStrike" dirty="0">
+                        <a:solidFill>
+                          <a:schemeClr val="bg2">
+                            <a:lumMod val="50000"/>
+                          </a:schemeClr>
+                        </a:solidFill>
+                        <a:effectLst/>
+                        <a:latin typeface="Aptos Narrow" panose="020B0004020202020204" pitchFamily="34" charset="0"/>
+                      </a:endParaRPr>
+                    </a:p>
+                  </a:txBody>
+                  <a:tcPr/>
+                </a:tc>
+                <a:tc>
+                  <a:txBody>
+                    <a:bodyPr/>
+                    <a:lstStyle/>
+                    <a:p>
+                      <a:pPr algn="l" fontAlgn="b"/>
+                      <a:endParaRPr lang="en-US" sz="1000" b="0" i="0" u="none" strike="noStrike" dirty="0">
+                        <a:solidFill>
+                          <a:schemeClr val="bg2">
+                            <a:lumMod val="50000"/>
+                          </a:schemeClr>
+                        </a:solidFill>
+                        <a:effectLst/>
+                        <a:latin typeface="Aptos Narrow" panose="020B0004020202020204" pitchFamily="34" charset="0"/>
+                      </a:endParaRPr>
+                    </a:p>
+                  </a:txBody>
+                  <a:tcPr marL="9525" marR="9525" marT="9525" marB="0"/>
+                </a:tc>
+                <a:tc>
+                  <a:txBody>
+                    <a:bodyPr/>
+                    <a:lstStyle/>
+                    <a:p>
+                      <a:pPr algn="l" fontAlgn="b"/>
+                      <a:endParaRPr lang="en-US" sz="1200" b="0" i="0" u="none" strike="noStrike" dirty="0">
+                        <a:solidFill>
+                          <a:srgbClr val="000000"/>
+                        </a:solidFill>
+                        <a:effectLst/>
+                        <a:latin typeface="Aptos Narrow" panose="020B0004020202020204" pitchFamily="34" charset="0"/>
+                      </a:endParaRPr>
+                    </a:p>
+                  </a:txBody>
+                  <a:tcPr marL="9525" marR="9525" marT="9525" marB="0"/>
+                </a:tc>
+                <a:tc>
+                  <a:txBody>
+                    <a:bodyPr/>
+                    <a:lstStyle/>
+                    <a:p>
+                      <a:pPr algn="l" fontAlgn="b"/>
+                      <a:endParaRPr lang="en-US" sz="1000" b="0" i="0" u="none" strike="noStrike" dirty="0">
+                        <a:solidFill>
+                          <a:srgbClr val="000000"/>
+                        </a:solidFill>
+                        <a:effectLst/>
+                        <a:latin typeface="Aptos Narrow" panose="020B0004020202020204" pitchFamily="34" charset="0"/>
+                      </a:endParaRPr>
+                    </a:p>
+                  </a:txBody>
+                  <a:tcPr marL="9525" marR="9525" marT="9525" marB="0"/>
+                </a:tc>
+                <a:extLst>
+                  <a:ext uri="{0D108BD9-81ED-4DB2-BD59-A6C34878D82A}">
+                    <a16:rowId xmlns:a16="http://schemas.microsoft.com/office/drawing/2014/main" val="1172921827"/>
+                  </a:ext>
+                </a:extLst>
+              </a:tr>
+              <a:tr h="225541">
+                <a:tc>
+                  <a:txBody>
+                    <a:bodyPr/>
+                    <a:lstStyle/>
+                    <a:p>
+                      <a:pPr marL="0" marR="0" lvl="0" indent="0" algn="l" defTabSz="914400" rtl="0" eaLnBrk="1" fontAlgn="auto" latinLnBrk="0" hangingPunct="1">
+                        <a:lnSpc>
+                          <a:spcPct val="100000"/>
+                        </a:lnSpc>
+                        <a:spcBef>
+                          <a:spcPts val="0"/>
+                        </a:spcBef>
+                        <a:spcAft>
+                          <a:spcPts val="0"/>
+                        </a:spcAft>
+                        <a:buClrTx/>
+                        <a:buSzTx/>
+                        <a:buFontTx/>
+                        <a:buNone/>
+                        <a:tabLst/>
+                        <a:defRPr/>
+                      </a:pPr>
+                      <a:endParaRPr lang="en-US" sz="1000" b="0" i="0" u="none" strike="noStrike" dirty="0">
+                        <a:solidFill>
+                          <a:schemeClr val="bg2">
+                            <a:lumMod val="50000"/>
+                          </a:schemeClr>
+                        </a:solidFill>
+                        <a:effectLst/>
+                        <a:latin typeface="Aptos Narrow" panose="020B0004020202020204" pitchFamily="34" charset="0"/>
+                      </a:endParaRPr>
+                    </a:p>
+                  </a:txBody>
+                  <a:tcPr/>
+                </a:tc>
+                <a:tc>
+                  <a:txBody>
+                    <a:bodyPr/>
+                    <a:lstStyle/>
+                    <a:p>
+                      <a:pPr algn="l" fontAlgn="b"/>
+                      <a:endParaRPr lang="en-US" sz="1000" b="0" i="0" u="none" strike="noStrike" dirty="0">
+                        <a:solidFill>
+                          <a:schemeClr val="bg2">
+                            <a:lumMod val="50000"/>
+                          </a:schemeClr>
+                        </a:solidFill>
+                        <a:effectLst/>
+                        <a:latin typeface="Aptos Narrow" panose="020B0004020202020204" pitchFamily="34" charset="0"/>
+                      </a:endParaRPr>
+                    </a:p>
+                  </a:txBody>
+                  <a:tcPr marL="9525" marR="9525" marT="9525" marB="0"/>
+                </a:tc>
+                <a:tc>
+                  <a:txBody>
+                    <a:bodyPr/>
+                    <a:lstStyle/>
+                    <a:p>
+                      <a:pPr marL="0" marR="0" lvl="0" indent="0" algn="l" defTabSz="914400" rtl="0" eaLnBrk="1" fontAlgn="b" latinLnBrk="0" hangingPunct="1">
+                        <a:lnSpc>
+                          <a:spcPct val="100000"/>
+                        </a:lnSpc>
+                        <a:spcBef>
+                          <a:spcPts val="0"/>
+                        </a:spcBef>
+                        <a:spcAft>
+                          <a:spcPts val="0"/>
+                        </a:spcAft>
+                        <a:buClrTx/>
+                        <a:buSzTx/>
+                        <a:buFontTx/>
+                        <a:buNone/>
+                        <a:tabLst/>
+                        <a:defRPr/>
+                      </a:pPr>
+                      <a:r>
+                        <a:rPr lang="en-US" sz="1200" b="0" i="0" u="none" strike="noStrike" dirty="0">
+                          <a:solidFill>
+                            <a:srgbClr val="000000"/>
+                          </a:solidFill>
+                          <a:effectLst/>
+                          <a:latin typeface="Aptos Narrow" panose="020B0004020202020204" pitchFamily="34" charset="0"/>
+                        </a:rPr>
+                        <a:t>Liposarcoma ;adult liposarcoma; liposarcomas</a:t>
+                      </a:r>
+                    </a:p>
+                    <a:p>
+                      <a:pPr algn="l" fontAlgn="b"/>
+                      <a:endParaRPr lang="en-US" sz="1200" b="0" i="0" u="none" strike="noStrike" dirty="0">
+                        <a:solidFill>
+                          <a:srgbClr val="000000"/>
+                        </a:solidFill>
+                        <a:effectLst/>
+                        <a:latin typeface="Aptos Narrow" panose="020B0004020202020204" pitchFamily="34" charset="0"/>
+                      </a:endParaRPr>
+                    </a:p>
+                  </a:txBody>
+                  <a:tcPr marL="9525" marR="9525" marT="9525" marB="0"/>
+                </a:tc>
+                <a:tc>
+                  <a:txBody>
+                    <a:bodyPr/>
+                    <a:lstStyle/>
+                    <a:p>
+                      <a:pPr algn="r" fontAlgn="b"/>
+                      <a:r>
+                        <a:rPr lang="en-US" sz="1200" b="0" i="0" u="none" strike="noStrike" dirty="0">
+                          <a:solidFill>
+                            <a:srgbClr val="000000"/>
+                          </a:solidFill>
+                          <a:effectLst/>
+                          <a:latin typeface="Aptos Narrow" panose="020B0004020202020204" pitchFamily="34" charset="0"/>
+                        </a:rPr>
+                        <a:t>0.1441252</a:t>
+                      </a:r>
+                    </a:p>
+                  </a:txBody>
+                  <a:tcPr marL="9525" marR="9525" marT="9525" marB="0"/>
+                </a:tc>
+                <a:extLst>
+                  <a:ext uri="{0D108BD9-81ED-4DB2-BD59-A6C34878D82A}">
+                    <a16:rowId xmlns:a16="http://schemas.microsoft.com/office/drawing/2014/main" val="2849662892"/>
+                  </a:ext>
+                </a:extLst>
+              </a:tr>
+              <a:tr h="0">
+                <a:tc>
+                  <a:txBody>
+                    <a:bodyPr/>
+                    <a:lstStyle/>
+                    <a:p>
+                      <a:pPr algn="l" fontAlgn="b"/>
+                      <a:endParaRPr lang="en-US" sz="1000" b="0" i="0" u="none" strike="noStrike" dirty="0">
+                        <a:solidFill>
+                          <a:schemeClr val="bg2">
+                            <a:lumMod val="50000"/>
+                          </a:schemeClr>
+                        </a:solidFill>
+                        <a:effectLst/>
+                        <a:latin typeface="Aptos Narrow" panose="020B0004020202020204" pitchFamily="34" charset="0"/>
+                      </a:endParaRPr>
+                    </a:p>
+                  </a:txBody>
+                  <a:tcPr marL="9525" marR="9525" marT="9525" marB="0"/>
+                </a:tc>
+                <a:tc>
+                  <a:txBody>
+                    <a:bodyPr/>
+                    <a:lstStyle/>
+                    <a:p>
+                      <a:pPr algn="l"/>
+                      <a:endParaRPr lang="en-US" sz="1000" dirty="0">
+                        <a:solidFill>
+                          <a:schemeClr val="bg2">
+                            <a:lumMod val="50000"/>
+                          </a:schemeClr>
+                        </a:solidFill>
+                      </a:endParaRPr>
+                    </a:p>
+                  </a:txBody>
+                  <a:tcPr/>
+                </a:tc>
+                <a:tc>
+                  <a:txBody>
+                    <a:bodyPr/>
+                    <a:lstStyle/>
+                    <a:p>
+                      <a:pPr marL="0" marR="0" lvl="0" indent="0" algn="l" defTabSz="914400" rtl="0" eaLnBrk="1" fontAlgn="b" latinLnBrk="0" hangingPunct="1">
+                        <a:lnSpc>
+                          <a:spcPct val="100000"/>
+                        </a:lnSpc>
+                        <a:spcBef>
+                          <a:spcPts val="0"/>
+                        </a:spcBef>
+                        <a:spcAft>
+                          <a:spcPts val="0"/>
+                        </a:spcAft>
+                        <a:buClrTx/>
+                        <a:buSzTx/>
+                        <a:buFontTx/>
+                        <a:buNone/>
+                        <a:tabLst/>
+                        <a:defRPr/>
+                      </a:pPr>
+                      <a:r>
+                        <a:rPr lang="en-US" sz="1200" b="0" i="0" u="none" strike="noStrike" dirty="0">
+                          <a:solidFill>
+                            <a:srgbClr val="000000"/>
+                          </a:solidFill>
+                          <a:effectLst/>
+                          <a:latin typeface="Aptos Narrow" panose="020B0004020202020204" pitchFamily="34" charset="0"/>
+                        </a:rPr>
+                        <a:t>unresectable lung carcinoma; unresectable lung small cell carcinoma</a:t>
+                      </a:r>
+                    </a:p>
+                    <a:p>
+                      <a:pPr marL="0" marR="0" lvl="0" indent="0" algn="l" defTabSz="914400" rtl="0" eaLnBrk="1" fontAlgn="b" latinLnBrk="0" hangingPunct="1">
+                        <a:lnSpc>
+                          <a:spcPct val="100000"/>
+                        </a:lnSpc>
+                        <a:spcBef>
+                          <a:spcPts val="0"/>
+                        </a:spcBef>
+                        <a:spcAft>
+                          <a:spcPts val="0"/>
+                        </a:spcAft>
+                        <a:buClrTx/>
+                        <a:buSzTx/>
+                        <a:buFontTx/>
+                        <a:buNone/>
+                        <a:tabLst/>
+                        <a:defRPr/>
+                      </a:pPr>
+                      <a:endParaRPr lang="en-US" sz="1200" b="0" i="0" u="none" strike="noStrike" dirty="0">
+                        <a:solidFill>
+                          <a:srgbClr val="000000"/>
+                        </a:solidFill>
+                        <a:effectLst/>
+                        <a:latin typeface="Aptos Narrow" panose="020B0004020202020204" pitchFamily="34" charset="0"/>
+                      </a:endParaRPr>
+                    </a:p>
+                    <a:p>
+                      <a:pPr algn="l" fontAlgn="b"/>
+                      <a:endParaRPr lang="en-US" sz="1200" b="0" i="0" u="none" strike="noStrike" dirty="0">
+                        <a:solidFill>
+                          <a:srgbClr val="000000"/>
+                        </a:solidFill>
+                        <a:effectLst/>
+                        <a:latin typeface="Aptos Narrow" panose="020B0004020202020204" pitchFamily="34" charset="0"/>
+                      </a:endParaRPr>
+                    </a:p>
+                  </a:txBody>
+                  <a:tcPr marL="9525" marR="9525" marT="9525" marB="0"/>
+                </a:tc>
+                <a:tc>
+                  <a:txBody>
+                    <a:bodyPr/>
+                    <a:lstStyle/>
+                    <a:p>
+                      <a:pPr algn="r" fontAlgn="b"/>
+                      <a:r>
+                        <a:rPr lang="en-US" sz="1200" b="0" i="0" u="none" strike="noStrike" dirty="0">
+                          <a:solidFill>
+                            <a:srgbClr val="000000"/>
+                          </a:solidFill>
+                          <a:effectLst/>
+                          <a:latin typeface="Aptos Narrow" panose="020B0004020202020204" pitchFamily="34" charset="0"/>
+                        </a:rPr>
+                        <a:t>0.05125004</a:t>
+                      </a:r>
+                    </a:p>
+                  </a:txBody>
+                  <a:tcPr marL="9525" marR="9525" marT="9525" marB="0"/>
+                </a:tc>
+                <a:extLst>
+                  <a:ext uri="{0D108BD9-81ED-4DB2-BD59-A6C34878D82A}">
+                    <a16:rowId xmlns:a16="http://schemas.microsoft.com/office/drawing/2014/main" val="808363429"/>
+                  </a:ext>
+                </a:extLst>
+              </a:tr>
+              <a:tr h="0">
+                <a:tc>
+                  <a:txBody>
+                    <a:bodyPr/>
+                    <a:lstStyle/>
+                    <a:p>
+                      <a:pPr marL="0" marR="0" lvl="0" indent="0" algn="l" defTabSz="914400" rtl="0" eaLnBrk="1" fontAlgn="b" latinLnBrk="0" hangingPunct="1">
+                        <a:lnSpc>
+                          <a:spcPct val="100000"/>
+                        </a:lnSpc>
+                        <a:spcBef>
+                          <a:spcPts val="0"/>
+                        </a:spcBef>
+                        <a:spcAft>
+                          <a:spcPts val="0"/>
+                        </a:spcAft>
+                        <a:buClrTx/>
+                        <a:buSzTx/>
+                        <a:buFontTx/>
+                        <a:buNone/>
+                        <a:tabLst/>
+                        <a:defRPr/>
+                      </a:pPr>
+                      <a:endParaRPr lang="en-US" sz="1000" b="0" i="0" u="none" strike="noStrike" dirty="0">
+                        <a:solidFill>
+                          <a:schemeClr val="bg2">
+                            <a:lumMod val="50000"/>
+                          </a:schemeClr>
+                        </a:solidFill>
+                        <a:effectLst/>
+                        <a:latin typeface="Aptos Narrow" panose="020B0004020202020204" pitchFamily="34" charset="0"/>
+                      </a:endParaRPr>
+                    </a:p>
+                  </a:txBody>
+                  <a:tcPr marL="9525" marR="9525" marT="9525" marB="0"/>
+                </a:tc>
+                <a:tc>
+                  <a:txBody>
+                    <a:bodyPr/>
+                    <a:lstStyle/>
+                    <a:p>
+                      <a:pPr algn="l" fontAlgn="b"/>
+                      <a:endParaRPr lang="en-US" sz="1000" b="0" i="0" u="none" strike="noStrike" dirty="0">
+                        <a:solidFill>
+                          <a:schemeClr val="bg2">
+                            <a:lumMod val="50000"/>
+                          </a:schemeClr>
+                        </a:solidFill>
+                        <a:effectLst/>
+                        <a:latin typeface="Aptos Narrow" panose="020B0004020202020204" pitchFamily="34" charset="0"/>
+                      </a:endParaRPr>
+                    </a:p>
+                  </a:txBody>
+                  <a:tcPr marL="9525" marR="9525" marT="9525" marB="0"/>
+                </a:tc>
+                <a:tc>
+                  <a:txBody>
+                    <a:bodyPr/>
+                    <a:lstStyle/>
+                    <a:p>
+                      <a:pPr marL="0" marR="0" lvl="0" indent="0" algn="l" defTabSz="914400" rtl="0" eaLnBrk="1" fontAlgn="b" latinLnBrk="0" hangingPunct="1">
+                        <a:lnSpc>
+                          <a:spcPct val="100000"/>
+                        </a:lnSpc>
+                        <a:spcBef>
+                          <a:spcPts val="0"/>
+                        </a:spcBef>
+                        <a:spcAft>
+                          <a:spcPts val="0"/>
+                        </a:spcAft>
+                        <a:buClrTx/>
+                        <a:buSzTx/>
+                        <a:buFontTx/>
+                        <a:buNone/>
+                        <a:tabLst/>
+                        <a:defRPr/>
+                      </a:pPr>
+                      <a:r>
+                        <a:rPr lang="en-US" sz="1200" b="0" i="0" u="none" strike="noStrike" dirty="0">
+                          <a:solidFill>
+                            <a:srgbClr val="000000"/>
+                          </a:solidFill>
+                          <a:effectLst/>
+                          <a:latin typeface="Aptos Narrow" panose="020B0004020202020204" pitchFamily="34" charset="0"/>
+                        </a:rPr>
+                        <a:t>cancer of liver; cancer of the liver</a:t>
+                      </a:r>
+                    </a:p>
+                    <a:p>
+                      <a:pPr marL="0" marR="0" lvl="0" indent="0" algn="l" defTabSz="914400" rtl="0" eaLnBrk="1" fontAlgn="b" latinLnBrk="0" hangingPunct="1">
+                        <a:lnSpc>
+                          <a:spcPct val="100000"/>
+                        </a:lnSpc>
+                        <a:spcBef>
+                          <a:spcPts val="0"/>
+                        </a:spcBef>
+                        <a:spcAft>
+                          <a:spcPts val="0"/>
+                        </a:spcAft>
+                        <a:buClrTx/>
+                        <a:buSzTx/>
+                        <a:buFontTx/>
+                        <a:buNone/>
+                        <a:tabLst/>
+                        <a:defRPr/>
+                      </a:pPr>
+                      <a:r>
+                        <a:rPr lang="en-US" sz="1200" b="0" i="0" u="none" strike="noStrike" dirty="0">
+                          <a:solidFill>
+                            <a:srgbClr val="000000"/>
+                          </a:solidFill>
+                          <a:effectLst/>
+                          <a:latin typeface="Aptos Narrow" panose="020B0004020202020204" pitchFamily="34" charset="0"/>
+                        </a:rPr>
+                        <a:t>; liver cancer</a:t>
+                      </a:r>
+                    </a:p>
+                    <a:p>
+                      <a:pPr algn="l" fontAlgn="b"/>
+                      <a:endParaRPr lang="en-US" sz="1200" b="0" i="0" u="none" strike="noStrike" dirty="0">
+                        <a:solidFill>
+                          <a:srgbClr val="000000"/>
+                        </a:solidFill>
+                        <a:effectLst/>
+                        <a:latin typeface="Aptos Narrow" panose="020B0004020202020204" pitchFamily="34" charset="0"/>
+                      </a:endParaRPr>
+                    </a:p>
+                    <a:p>
+                      <a:pPr algn="l" fontAlgn="b"/>
+                      <a:endParaRPr lang="en-US" sz="1200" b="0" i="0" u="none" strike="noStrike" dirty="0">
+                        <a:solidFill>
+                          <a:srgbClr val="000000"/>
+                        </a:solidFill>
+                        <a:effectLst/>
+                        <a:latin typeface="Aptos Narrow" panose="020B0004020202020204" pitchFamily="34" charset="0"/>
+                      </a:endParaRPr>
+                    </a:p>
+                  </a:txBody>
+                  <a:tcPr marL="9525" marR="9525" marT="9525" marB="0"/>
+                </a:tc>
+                <a:tc>
+                  <a:txBody>
+                    <a:bodyPr/>
+                    <a:lstStyle/>
+                    <a:p>
+                      <a:pPr algn="r" fontAlgn="b"/>
+                      <a:r>
+                        <a:rPr lang="en-US" sz="1200" b="0" i="0" u="none" strike="noStrike" dirty="0">
+                          <a:solidFill>
+                            <a:srgbClr val="000000"/>
+                          </a:solidFill>
+                          <a:effectLst/>
+                          <a:latin typeface="Aptos Narrow" panose="020B0004020202020204" pitchFamily="34" charset="0"/>
+                        </a:rPr>
+                        <a:t>0.38949709</a:t>
+                      </a:r>
+                    </a:p>
+                  </a:txBody>
+                  <a:tcPr marL="9525" marR="9525" marT="9525" marB="0"/>
+                </a:tc>
+                <a:extLst>
+                  <a:ext uri="{0D108BD9-81ED-4DB2-BD59-A6C34878D82A}">
+                    <a16:rowId xmlns:a16="http://schemas.microsoft.com/office/drawing/2014/main" val="493799710"/>
+                  </a:ext>
+                </a:extLst>
+              </a:tr>
+              <a:tr h="370840">
+                <a:tc>
+                  <a:txBody>
+                    <a:bodyPr/>
+                    <a:lstStyle/>
+                    <a:p>
+                      <a:pPr algn="l" fontAlgn="b"/>
+                      <a:endParaRPr lang="en-US" sz="1000" b="0" i="0" u="none" strike="noStrike" dirty="0">
+                        <a:solidFill>
+                          <a:schemeClr val="bg2">
+                            <a:lumMod val="50000"/>
+                          </a:schemeClr>
+                        </a:solidFill>
+                        <a:effectLst/>
+                        <a:latin typeface="Aptos Narrow" panose="020B0004020202020204" pitchFamily="34" charset="0"/>
+                      </a:endParaRPr>
+                    </a:p>
+                  </a:txBody>
+                  <a:tcPr marL="9525" marR="9525" marT="9525" marB="0"/>
+                </a:tc>
+                <a:tc>
+                  <a:txBody>
+                    <a:bodyPr/>
+                    <a:lstStyle/>
+                    <a:p>
+                      <a:pPr algn="l" fontAlgn="b"/>
+                      <a:endParaRPr lang="en-US" sz="1000" b="0" i="0" u="none" strike="noStrike" dirty="0">
+                        <a:solidFill>
+                          <a:schemeClr val="bg2">
+                            <a:lumMod val="50000"/>
+                          </a:schemeClr>
+                        </a:solidFill>
+                        <a:effectLst/>
+                        <a:latin typeface="Aptos Narrow" panose="020B0004020202020204" pitchFamily="34" charset="0"/>
+                      </a:endParaRPr>
+                    </a:p>
+                  </a:txBody>
+                  <a:tcPr marL="9525" marR="9525" marT="9525" marB="0"/>
+                </a:tc>
+                <a:tc>
+                  <a:txBody>
+                    <a:bodyPr/>
+                    <a:lstStyle/>
+                    <a:p>
+                      <a:pPr marL="0" marR="0" lvl="0" indent="0" algn="l" defTabSz="914400" rtl="0" eaLnBrk="1" fontAlgn="b" latinLnBrk="0" hangingPunct="1">
+                        <a:lnSpc>
+                          <a:spcPct val="100000"/>
+                        </a:lnSpc>
+                        <a:spcBef>
+                          <a:spcPts val="0"/>
+                        </a:spcBef>
+                        <a:spcAft>
+                          <a:spcPts val="0"/>
+                        </a:spcAft>
+                        <a:buClrTx/>
+                        <a:buSzTx/>
+                        <a:buFontTx/>
+                        <a:buNone/>
+                        <a:tabLst/>
+                        <a:defRPr/>
+                      </a:pPr>
+                      <a:r>
+                        <a:rPr lang="en-US" sz="1200" b="0" i="0" u="none" strike="noStrike" dirty="0">
+                          <a:solidFill>
+                            <a:srgbClr val="000000"/>
+                          </a:solidFill>
+                          <a:effectLst/>
+                          <a:latin typeface="Aptos Narrow" panose="020B0004020202020204" pitchFamily="34" charset="0"/>
+                        </a:rPr>
+                        <a:t>smoldering </a:t>
+                      </a:r>
+                      <a:r>
+                        <a:rPr lang="en-US" sz="1200" b="0" i="0" u="none" strike="noStrike" dirty="0" err="1">
+                          <a:solidFill>
+                            <a:srgbClr val="000000"/>
+                          </a:solidFill>
+                          <a:effectLst/>
+                          <a:latin typeface="Aptos Narrow" panose="020B0004020202020204" pitchFamily="34" charset="0"/>
+                        </a:rPr>
+                        <a:t>myeloma;smoldering</a:t>
+                      </a:r>
+                      <a:r>
+                        <a:rPr lang="en-US" sz="1200" b="0" i="0" u="none" strike="noStrike" dirty="0">
+                          <a:solidFill>
+                            <a:srgbClr val="000000"/>
+                          </a:solidFill>
+                          <a:effectLst/>
+                          <a:latin typeface="Aptos Narrow" panose="020B0004020202020204" pitchFamily="34" charset="0"/>
+                        </a:rPr>
+                        <a:t> multiple </a:t>
+                      </a:r>
+                      <a:r>
+                        <a:rPr lang="en-US" sz="1200" b="0" i="0" u="none" strike="noStrike" dirty="0" err="1">
+                          <a:solidFill>
+                            <a:srgbClr val="000000"/>
+                          </a:solidFill>
+                          <a:effectLst/>
+                          <a:latin typeface="Aptos Narrow" panose="020B0004020202020204" pitchFamily="34" charset="0"/>
+                        </a:rPr>
+                        <a:t>myeloma;smoldering</a:t>
+                      </a:r>
+                      <a:r>
+                        <a:rPr lang="en-US" sz="1200" b="0" i="0" u="none" strike="noStrike" dirty="0">
+                          <a:solidFill>
+                            <a:srgbClr val="000000"/>
+                          </a:solidFill>
+                          <a:effectLst/>
+                          <a:latin typeface="Aptos Narrow" panose="020B0004020202020204" pitchFamily="34" charset="0"/>
+                        </a:rPr>
+                        <a:t> multiple myeloma (</a:t>
+                      </a:r>
+                      <a:r>
+                        <a:rPr lang="en-US" sz="1200" b="0" i="0" u="none" strike="noStrike" dirty="0" err="1">
+                          <a:solidFill>
+                            <a:srgbClr val="000000"/>
+                          </a:solidFill>
+                          <a:effectLst/>
+                          <a:latin typeface="Aptos Narrow" panose="020B0004020202020204" pitchFamily="34" charset="0"/>
+                        </a:rPr>
+                        <a:t>smm</a:t>
+                      </a:r>
+                      <a:r>
+                        <a:rPr lang="en-US" sz="1200" b="0" i="0" u="none" strike="noStrike" dirty="0">
+                          <a:solidFill>
+                            <a:srgbClr val="000000"/>
+                          </a:solidFill>
+                          <a:effectLst/>
+                          <a:latin typeface="Aptos Narrow" panose="020B0004020202020204" pitchFamily="34" charset="0"/>
+                        </a:rPr>
+                        <a:t>); </a:t>
+                      </a:r>
+                      <a:r>
+                        <a:rPr lang="en-US" sz="1200" b="0" i="0" u="none" strike="noStrike" dirty="0" err="1">
+                          <a:solidFill>
+                            <a:srgbClr val="000000"/>
+                          </a:solidFill>
+                          <a:effectLst/>
+                          <a:latin typeface="Aptos Narrow" panose="020B0004020202020204" pitchFamily="34" charset="0"/>
+                        </a:rPr>
+                        <a:t>smouldering</a:t>
+                      </a:r>
+                      <a:r>
+                        <a:rPr lang="en-US" sz="1200" b="0" i="0" u="none" strike="noStrike" dirty="0">
+                          <a:solidFill>
+                            <a:srgbClr val="000000"/>
+                          </a:solidFill>
+                          <a:effectLst/>
+                          <a:latin typeface="Aptos Narrow" panose="020B0004020202020204" pitchFamily="34" charset="0"/>
+                        </a:rPr>
+                        <a:t> myeloma; high risk smoldering multiple myeloma; high-risk smoldering multiple myeloma</a:t>
+                      </a:r>
+                    </a:p>
+                    <a:p>
+                      <a:pPr marL="0" marR="0" lvl="0" indent="0" algn="l" defTabSz="914400" rtl="0" eaLnBrk="1" fontAlgn="b" latinLnBrk="0" hangingPunct="1">
+                        <a:lnSpc>
+                          <a:spcPct val="100000"/>
+                        </a:lnSpc>
+                        <a:spcBef>
+                          <a:spcPts val="0"/>
+                        </a:spcBef>
+                        <a:spcAft>
+                          <a:spcPts val="0"/>
+                        </a:spcAft>
+                        <a:buClrTx/>
+                        <a:buSzTx/>
+                        <a:buFontTx/>
+                        <a:buNone/>
+                        <a:tabLst/>
+                        <a:defRPr/>
+                      </a:pPr>
+                      <a:endParaRPr lang="en-US" sz="1200" b="0" i="0" u="none" strike="noStrike" dirty="0">
+                        <a:solidFill>
+                          <a:srgbClr val="000000"/>
+                        </a:solidFill>
+                        <a:effectLst/>
+                        <a:latin typeface="Aptos Narrow" panose="020B0004020202020204" pitchFamily="34" charset="0"/>
+                      </a:endParaRPr>
+                    </a:p>
+                    <a:p>
+                      <a:pPr marL="0" marR="0" lvl="0" indent="0" algn="l" defTabSz="914400" rtl="0" eaLnBrk="1" fontAlgn="b" latinLnBrk="0" hangingPunct="1">
+                        <a:lnSpc>
+                          <a:spcPct val="100000"/>
+                        </a:lnSpc>
+                        <a:spcBef>
+                          <a:spcPts val="0"/>
+                        </a:spcBef>
+                        <a:spcAft>
+                          <a:spcPts val="0"/>
+                        </a:spcAft>
+                        <a:buClrTx/>
+                        <a:buSzTx/>
+                        <a:buFontTx/>
+                        <a:buNone/>
+                        <a:tabLst/>
+                        <a:defRPr/>
+                      </a:pPr>
+                      <a:endParaRPr lang="en-US" sz="1200" b="0" i="0" u="none" strike="noStrike" dirty="0">
+                        <a:solidFill>
+                          <a:srgbClr val="000000"/>
+                        </a:solidFill>
+                        <a:effectLst/>
+                        <a:latin typeface="Aptos Narrow" panose="020B0004020202020204" pitchFamily="34" charset="0"/>
+                      </a:endParaRPr>
+                    </a:p>
+                    <a:p>
+                      <a:pPr marL="0" marR="0" lvl="0" indent="0" algn="l" defTabSz="914400" rtl="0" eaLnBrk="1" fontAlgn="b" latinLnBrk="0" hangingPunct="1">
+                        <a:lnSpc>
+                          <a:spcPct val="100000"/>
+                        </a:lnSpc>
+                        <a:spcBef>
+                          <a:spcPts val="0"/>
+                        </a:spcBef>
+                        <a:spcAft>
+                          <a:spcPts val="0"/>
+                        </a:spcAft>
+                        <a:buClrTx/>
+                        <a:buSzTx/>
+                        <a:buFontTx/>
+                        <a:buNone/>
+                        <a:tabLst/>
+                        <a:defRPr/>
+                      </a:pPr>
+                      <a:endParaRPr lang="en-US" sz="1200" b="0" i="0" u="none" strike="noStrike" dirty="0">
+                        <a:solidFill>
+                          <a:srgbClr val="000000"/>
+                        </a:solidFill>
+                        <a:effectLst/>
+                        <a:latin typeface="Aptos Narrow" panose="020B0004020202020204" pitchFamily="34" charset="0"/>
+                      </a:endParaRPr>
+                    </a:p>
+                    <a:p>
+                      <a:pPr algn="l" fontAlgn="b"/>
+                      <a:endParaRPr lang="en-US" sz="1200" b="0" i="0" u="none" strike="noStrike" dirty="0">
+                        <a:solidFill>
+                          <a:srgbClr val="000000"/>
+                        </a:solidFill>
+                        <a:effectLst/>
+                        <a:latin typeface="Aptos Narrow" panose="020B0004020202020204" pitchFamily="34" charset="0"/>
+                      </a:endParaRPr>
+                    </a:p>
+                  </a:txBody>
+                  <a:tcPr marL="9525" marR="9525" marT="9525" marB="0"/>
+                </a:tc>
+                <a:tc>
+                  <a:txBody>
+                    <a:bodyPr/>
+                    <a:lstStyle/>
+                    <a:p>
+                      <a:pPr algn="r" fontAlgn="b"/>
+                      <a:r>
+                        <a:rPr lang="en-US" sz="1200" b="0" i="0" u="none" strike="noStrike" dirty="0">
+                          <a:solidFill>
+                            <a:srgbClr val="000000"/>
+                          </a:solidFill>
+                          <a:effectLst/>
+                          <a:latin typeface="Aptos Narrow" panose="020B0004020202020204" pitchFamily="34" charset="0"/>
+                        </a:rPr>
+                        <a:t>0.25361543</a:t>
+                      </a:r>
+                    </a:p>
+                  </a:txBody>
+                  <a:tcPr marL="9525" marR="9525" marT="9525" marB="0"/>
+                </a:tc>
+                <a:extLst>
+                  <a:ext uri="{0D108BD9-81ED-4DB2-BD59-A6C34878D82A}">
+                    <a16:rowId xmlns:a16="http://schemas.microsoft.com/office/drawing/2014/main" val="2596835873"/>
+                  </a:ext>
+                </a:extLst>
+              </a:tr>
+              <a:tr h="400166">
+                <a:tc>
+                  <a:txBody>
+                    <a:bodyPr/>
+                    <a:lstStyle/>
+                    <a:p>
+                      <a:pPr algn="l" fontAlgn="b"/>
+                      <a:endParaRPr lang="en-US" sz="1000" b="0" i="0" u="none" strike="noStrike" dirty="0">
+                        <a:solidFill>
+                          <a:schemeClr val="bg2">
+                            <a:lumMod val="50000"/>
+                          </a:schemeClr>
+                        </a:solidFill>
+                        <a:effectLst/>
+                        <a:latin typeface="Aptos Narrow" panose="020B0004020202020204" pitchFamily="34" charset="0"/>
+                      </a:endParaRPr>
+                    </a:p>
+                  </a:txBody>
+                  <a:tcPr marL="9525" marR="9525" marT="9525" marB="0"/>
+                </a:tc>
+                <a:tc>
+                  <a:txBody>
+                    <a:bodyPr/>
+                    <a:lstStyle/>
+                    <a:p>
+                      <a:pPr algn="l" fontAlgn="b"/>
+                      <a:endParaRPr lang="en-US" sz="1000" b="0" i="0" u="none" strike="noStrike" dirty="0">
+                        <a:solidFill>
+                          <a:schemeClr val="bg2">
+                            <a:lumMod val="50000"/>
+                          </a:schemeClr>
+                        </a:solidFill>
+                        <a:effectLst/>
+                        <a:latin typeface="Aptos Narrow" panose="020B0004020202020204" pitchFamily="34" charset="0"/>
+                      </a:endParaRPr>
+                    </a:p>
+                  </a:txBody>
+                  <a:tcPr marL="9525" marR="9525" marT="9525" marB="0"/>
+                </a:tc>
+                <a:tc>
+                  <a:txBody>
+                    <a:bodyPr/>
+                    <a:lstStyle/>
+                    <a:p>
+                      <a:pPr algn="l" fontAlgn="b"/>
+                      <a:endParaRPr lang="en-US" sz="1200" b="0" i="0" u="none" strike="noStrike" dirty="0">
+                        <a:solidFill>
+                          <a:srgbClr val="000000"/>
+                        </a:solidFill>
+                        <a:effectLst/>
+                        <a:latin typeface="Aptos Narrow" panose="020B0004020202020204" pitchFamily="34" charset="0"/>
+                      </a:endParaRPr>
+                    </a:p>
+                  </a:txBody>
+                  <a:tcPr marL="9525" marR="9525" marT="9525" marB="0"/>
+                </a:tc>
+                <a:tc>
+                  <a:txBody>
+                    <a:bodyPr/>
+                    <a:lstStyle/>
+                    <a:p>
+                      <a:pPr algn="l" fontAlgn="b"/>
+                      <a:endParaRPr lang="en-US" sz="1000" b="0" i="0" u="none" strike="noStrike" dirty="0">
+                        <a:solidFill>
+                          <a:srgbClr val="000000"/>
+                        </a:solidFill>
+                        <a:effectLst/>
+                        <a:latin typeface="Aptos Narrow" panose="020B0004020202020204" pitchFamily="34" charset="0"/>
+                      </a:endParaRPr>
+                    </a:p>
+                  </a:txBody>
+                  <a:tcPr marL="9525" marR="9525" marT="9525" marB="0"/>
+                </a:tc>
+                <a:extLst>
+                  <a:ext uri="{0D108BD9-81ED-4DB2-BD59-A6C34878D82A}">
+                    <a16:rowId xmlns:a16="http://schemas.microsoft.com/office/drawing/2014/main" val="2425132235"/>
+                  </a:ext>
+                </a:extLst>
+              </a:tr>
+              <a:tr h="370840">
+                <a:tc>
+                  <a:txBody>
+                    <a:bodyPr/>
+                    <a:lstStyle/>
+                    <a:p>
+                      <a:pPr algn="l" fontAlgn="b"/>
+                      <a:endParaRPr lang="en-US" sz="1000" b="0" i="0" u="none" strike="noStrike" dirty="0">
+                        <a:solidFill>
+                          <a:schemeClr val="bg2">
+                            <a:lumMod val="50000"/>
+                          </a:schemeClr>
+                        </a:solidFill>
+                        <a:effectLst/>
+                        <a:latin typeface="Aptos Narrow" panose="020B0004020202020204" pitchFamily="34" charset="0"/>
+                      </a:endParaRPr>
+                    </a:p>
+                  </a:txBody>
+                  <a:tcPr marL="9525" marR="9525" marT="9525" marB="0"/>
+                </a:tc>
+                <a:tc>
+                  <a:txBody>
+                    <a:bodyPr/>
+                    <a:lstStyle/>
+                    <a:p>
+                      <a:pPr algn="l" fontAlgn="b"/>
+                      <a:endParaRPr lang="en-US" sz="1000" b="0" i="0" u="none" strike="noStrike" dirty="0">
+                        <a:solidFill>
+                          <a:schemeClr val="bg2">
+                            <a:lumMod val="50000"/>
+                          </a:schemeClr>
+                        </a:solidFill>
+                        <a:effectLst/>
+                        <a:latin typeface="Aptos Narrow" panose="020B0004020202020204" pitchFamily="34" charset="0"/>
+                      </a:endParaRPr>
+                    </a:p>
+                  </a:txBody>
+                  <a:tcPr marL="9525" marR="9525" marT="9525" marB="0"/>
+                </a:tc>
+                <a:tc>
+                  <a:txBody>
+                    <a:bodyPr/>
+                    <a:lstStyle/>
+                    <a:p>
+                      <a:pPr algn="l" fontAlgn="b"/>
+                      <a:endParaRPr lang="en-US" sz="1200" b="0" i="0" u="none" strike="noStrike" dirty="0">
+                        <a:solidFill>
+                          <a:srgbClr val="000000"/>
+                        </a:solidFill>
+                        <a:effectLst/>
+                        <a:latin typeface="Aptos Narrow" panose="020B0004020202020204" pitchFamily="34" charset="0"/>
+                      </a:endParaRPr>
+                    </a:p>
+                  </a:txBody>
+                  <a:tcPr marL="9525" marR="9525" marT="9525" marB="0"/>
+                </a:tc>
+                <a:tc>
+                  <a:txBody>
+                    <a:bodyPr/>
+                    <a:lstStyle/>
+                    <a:p>
+                      <a:pPr algn="l" fontAlgn="b"/>
+                      <a:endParaRPr lang="en-US" sz="1000" b="0" i="0" u="none" strike="noStrike" dirty="0">
+                        <a:solidFill>
+                          <a:srgbClr val="000000"/>
+                        </a:solidFill>
+                        <a:effectLst/>
+                        <a:latin typeface="Aptos Narrow" panose="020B0004020202020204" pitchFamily="34" charset="0"/>
+                      </a:endParaRPr>
+                    </a:p>
+                  </a:txBody>
+                  <a:tcPr marL="9525" marR="9525" marT="9525" marB="0"/>
+                </a:tc>
+                <a:extLst>
+                  <a:ext uri="{0D108BD9-81ED-4DB2-BD59-A6C34878D82A}">
+                    <a16:rowId xmlns:a16="http://schemas.microsoft.com/office/drawing/2014/main" val="3998811315"/>
+                  </a:ext>
+                </a:extLst>
+              </a:tr>
+              <a:tr h="370840">
+                <a:tc>
+                  <a:txBody>
+                    <a:bodyPr/>
+                    <a:lstStyle/>
+                    <a:p>
+                      <a:pPr algn="l" fontAlgn="b"/>
+                      <a:endParaRPr lang="en-US" sz="1000" b="0" i="0" u="none" strike="noStrike" dirty="0">
+                        <a:solidFill>
+                          <a:schemeClr val="bg2">
+                            <a:lumMod val="50000"/>
+                          </a:schemeClr>
+                        </a:solidFill>
+                        <a:effectLst/>
+                        <a:latin typeface="Aptos Narrow" panose="020B0004020202020204" pitchFamily="34" charset="0"/>
+                      </a:endParaRPr>
+                    </a:p>
+                  </a:txBody>
+                  <a:tcPr marL="9525" marR="9525" marT="9525" marB="0"/>
+                </a:tc>
+                <a:tc>
+                  <a:txBody>
+                    <a:bodyPr/>
+                    <a:lstStyle/>
+                    <a:p>
+                      <a:pPr algn="l" fontAlgn="b"/>
+                      <a:endParaRPr lang="en-US" sz="1000" b="0" i="0" u="none" strike="noStrike" dirty="0">
+                        <a:solidFill>
+                          <a:schemeClr val="bg2">
+                            <a:lumMod val="50000"/>
+                          </a:schemeClr>
+                        </a:solidFill>
+                        <a:effectLst/>
+                        <a:latin typeface="Aptos Narrow" panose="020B0004020202020204" pitchFamily="34" charset="0"/>
+                      </a:endParaRPr>
+                    </a:p>
+                  </a:txBody>
+                  <a:tcPr marL="9525" marR="9525" marT="9525" marB="0"/>
+                </a:tc>
+                <a:tc>
+                  <a:txBody>
+                    <a:bodyPr/>
+                    <a:lstStyle/>
+                    <a:p>
+                      <a:pPr algn="l" fontAlgn="b"/>
+                      <a:endParaRPr lang="en-US" sz="1200" b="0" i="0" u="none" strike="noStrike" dirty="0">
+                        <a:solidFill>
+                          <a:srgbClr val="000000"/>
+                        </a:solidFill>
+                        <a:effectLst/>
+                        <a:latin typeface="Aptos Narrow" panose="020B0004020202020204" pitchFamily="34" charset="0"/>
+                      </a:endParaRPr>
+                    </a:p>
+                  </a:txBody>
+                  <a:tcPr marL="9525" marR="9525" marT="9525" marB="0"/>
+                </a:tc>
+                <a:tc>
+                  <a:txBody>
+                    <a:bodyPr/>
+                    <a:lstStyle/>
+                    <a:p>
+                      <a:pPr algn="l" fontAlgn="b"/>
+                      <a:endParaRPr lang="en-US" sz="1000" b="0" i="0" u="none" strike="noStrike" dirty="0">
+                        <a:solidFill>
+                          <a:srgbClr val="000000"/>
+                        </a:solidFill>
+                        <a:effectLst/>
+                        <a:latin typeface="Aptos Narrow" panose="020B0004020202020204" pitchFamily="34" charset="0"/>
+                      </a:endParaRPr>
+                    </a:p>
+                  </a:txBody>
+                  <a:tcPr marL="9525" marR="9525" marT="9525" marB="0"/>
+                </a:tc>
+                <a:extLst>
+                  <a:ext uri="{0D108BD9-81ED-4DB2-BD59-A6C34878D82A}">
+                    <a16:rowId xmlns:a16="http://schemas.microsoft.com/office/drawing/2014/main" val="3925266982"/>
+                  </a:ext>
+                </a:extLst>
+              </a:tr>
+            </a:tbl>
+          </a:graphicData>
+        </a:graphic>
+      </p:graphicFrame>
+      <p:graphicFrame>
+        <p:nvGraphicFramePr>
+          <p:cNvPr id="7" name="Table 6">
+            <a:extLst>
+              <a:ext uri="{FF2B5EF4-FFF2-40B4-BE49-F238E27FC236}">
+                <a16:creationId xmlns:a16="http://schemas.microsoft.com/office/drawing/2014/main" id="{1541ECB9-FA5F-3E86-66B1-F6E3328F9C8B}"/>
+              </a:ext>
+            </a:extLst>
+          </p:cNvPr>
+          <p:cNvGraphicFramePr>
+            <a:graphicFrameLocks noGrp="1"/>
+          </p:cNvGraphicFramePr>
+          <p:nvPr/>
+        </p:nvGraphicFramePr>
+        <p:xfrm>
+          <a:off x="9576262" y="1550939"/>
+          <a:ext cx="2273300" cy="812800"/>
+        </p:xfrm>
+        <a:graphic>
+          <a:graphicData uri="http://schemas.openxmlformats.org/drawingml/2006/table">
+            <a:tbl>
+              <a:tblPr/>
+              <a:tblGrid>
+                <a:gridCol w="2273300">
+                  <a:extLst>
+                    <a:ext uri="{9D8B030D-6E8A-4147-A177-3AD203B41FA5}">
+                      <a16:colId xmlns:a16="http://schemas.microsoft.com/office/drawing/2014/main" val="3453916462"/>
+                    </a:ext>
+                  </a:extLst>
+                </a:gridCol>
+              </a:tblGrid>
+              <a:tr h="203200">
+                <a:tc>
+                  <a:txBody>
+                    <a:bodyPr/>
+                    <a:lstStyle/>
+                    <a:p>
+                      <a:pPr algn="l" fontAlgn="b"/>
+                      <a:endParaRPr lang="en-US" sz="1200" b="0" i="0" u="none" strike="noStrike" dirty="0">
+                        <a:solidFill>
+                          <a:srgbClr val="000000"/>
+                        </a:solidFill>
+                        <a:effectLst/>
+                        <a:latin typeface="Aptos Narrow" panose="020B0004020202020204" pitchFamily="34" charset="0"/>
+                      </a:endParaRPr>
+                    </a:p>
+                  </a:txBody>
+                  <a:tcPr marL="9525" marR="9525" marT="9525" marB="0" anchor="b">
+                    <a:lnL>
+                      <a:noFill/>
+                    </a:lnL>
+                    <a:lnR>
+                      <a:noFill/>
+                    </a:lnR>
+                    <a:lnT>
+                      <a:noFill/>
+                    </a:lnT>
+                    <a:lnB>
+                      <a:noFill/>
+                    </a:lnB>
+                    <a:noFill/>
+                  </a:tcPr>
+                </a:tc>
+                <a:extLst>
+                  <a:ext uri="{0D108BD9-81ED-4DB2-BD59-A6C34878D82A}">
+                    <a16:rowId xmlns:a16="http://schemas.microsoft.com/office/drawing/2014/main" val="752652226"/>
+                  </a:ext>
+                </a:extLst>
+              </a:tr>
+              <a:tr h="203200">
+                <a:tc>
+                  <a:txBody>
+                    <a:bodyPr/>
+                    <a:lstStyle/>
+                    <a:p>
+                      <a:pPr algn="l" fontAlgn="b"/>
+                      <a:endParaRPr lang="en-US" sz="1200" b="0" i="0" u="none" strike="noStrike" dirty="0">
+                        <a:solidFill>
+                          <a:srgbClr val="000000"/>
+                        </a:solidFill>
+                        <a:effectLst/>
+                        <a:latin typeface="Aptos Narrow" panose="020B0004020202020204" pitchFamily="34" charset="0"/>
+                      </a:endParaRPr>
+                    </a:p>
+                  </a:txBody>
+                  <a:tcPr marL="9525" marR="9525" marT="9525" marB="0" anchor="b">
+                    <a:lnL>
+                      <a:noFill/>
+                    </a:lnL>
+                    <a:lnR>
+                      <a:noFill/>
+                    </a:lnR>
+                    <a:lnT>
+                      <a:noFill/>
+                    </a:lnT>
+                    <a:lnB>
+                      <a:noFill/>
+                    </a:lnB>
+                    <a:noFill/>
+                  </a:tcPr>
+                </a:tc>
+                <a:extLst>
+                  <a:ext uri="{0D108BD9-81ED-4DB2-BD59-A6C34878D82A}">
+                    <a16:rowId xmlns:a16="http://schemas.microsoft.com/office/drawing/2014/main" val="395114167"/>
+                  </a:ext>
+                </a:extLst>
+              </a:tr>
+              <a:tr h="203200">
+                <a:tc>
+                  <a:txBody>
+                    <a:bodyPr/>
+                    <a:lstStyle/>
+                    <a:p>
+                      <a:pPr algn="l" fontAlgn="b"/>
+                      <a:endParaRPr lang="en-US" sz="1200" b="0" i="0" u="none" strike="noStrike" dirty="0">
+                        <a:solidFill>
+                          <a:srgbClr val="000000"/>
+                        </a:solidFill>
+                        <a:effectLst/>
+                        <a:latin typeface="Aptos Narrow" panose="020B0004020202020204" pitchFamily="34" charset="0"/>
+                      </a:endParaRPr>
+                    </a:p>
+                  </a:txBody>
+                  <a:tcPr marL="9525" marR="9525" marT="9525" marB="0" anchor="b">
+                    <a:lnL>
+                      <a:noFill/>
+                    </a:lnL>
+                    <a:lnR>
+                      <a:noFill/>
+                    </a:lnR>
+                    <a:lnT>
+                      <a:noFill/>
+                    </a:lnT>
+                    <a:lnB>
+                      <a:noFill/>
+                    </a:lnB>
+                    <a:noFill/>
+                  </a:tcPr>
+                </a:tc>
+                <a:extLst>
+                  <a:ext uri="{0D108BD9-81ED-4DB2-BD59-A6C34878D82A}">
+                    <a16:rowId xmlns:a16="http://schemas.microsoft.com/office/drawing/2014/main" val="3064603406"/>
+                  </a:ext>
+                </a:extLst>
+              </a:tr>
+              <a:tr h="203200">
+                <a:tc>
+                  <a:txBody>
+                    <a:bodyPr/>
+                    <a:lstStyle/>
+                    <a:p>
+                      <a:pPr algn="l" fontAlgn="b"/>
+                      <a:endParaRPr lang="en-US" sz="1200" b="0" i="0" u="none" strike="noStrike" dirty="0">
+                        <a:solidFill>
+                          <a:srgbClr val="000000"/>
+                        </a:solidFill>
+                        <a:effectLst/>
+                        <a:latin typeface="Aptos Narrow" panose="020B0004020202020204" pitchFamily="34" charset="0"/>
+                      </a:endParaRPr>
+                    </a:p>
+                  </a:txBody>
+                  <a:tcPr marL="9525" marR="9525" marT="9525" marB="0" anchor="b">
+                    <a:lnL>
+                      <a:noFill/>
+                    </a:lnL>
+                    <a:lnR>
+                      <a:noFill/>
+                    </a:lnR>
+                    <a:lnT>
+                      <a:noFill/>
+                    </a:lnT>
+                    <a:lnB>
+                      <a:noFill/>
+                    </a:lnB>
+                    <a:noFill/>
+                  </a:tcPr>
+                </a:tc>
+                <a:extLst>
+                  <a:ext uri="{0D108BD9-81ED-4DB2-BD59-A6C34878D82A}">
+                    <a16:rowId xmlns:a16="http://schemas.microsoft.com/office/drawing/2014/main" val="3498401855"/>
+                  </a:ext>
+                </a:extLst>
+              </a:tr>
+            </a:tbl>
+          </a:graphicData>
+        </a:graphic>
+      </p:graphicFrame>
+    </p:spTree>
+    <p:extLst>
+      <p:ext uri="{BB962C8B-B14F-4D97-AF65-F5344CB8AC3E}">
+        <p14:creationId xmlns:p14="http://schemas.microsoft.com/office/powerpoint/2010/main" val="179388810"/>
       </p:ext>
     </p:extLst>
   </p:cSld>

</xml_diff>